<commit_message>
applications to vector appendix
still missing vector product application, need some more checkpoint questions.
</commit_message>
<xml_diff>
--- a/tex/figures/Figures.pptx
+++ b/tex/figures/Figures.pptx
@@ -250,7 +250,7 @@
           <a:p>
             <a:fld id="{F7249F8D-641B-4CAF-BAE5-10524742F6F1}" type="datetimeFigureOut">
               <a:rPr lang="en-CA" smtClean="0"/>
-              <a:t>2017-09-22</a:t>
+              <a:t>2018-05-04</a:t>
             </a:fld>
             <a:endParaRPr lang="en-CA"/>
           </a:p>
@@ -420,7 +420,7 @@
           <a:p>
             <a:fld id="{F7249F8D-641B-4CAF-BAE5-10524742F6F1}" type="datetimeFigureOut">
               <a:rPr lang="en-CA" smtClean="0"/>
-              <a:t>2017-09-22</a:t>
+              <a:t>2018-05-04</a:t>
             </a:fld>
             <a:endParaRPr lang="en-CA"/>
           </a:p>
@@ -600,7 +600,7 @@
           <a:p>
             <a:fld id="{F7249F8D-641B-4CAF-BAE5-10524742F6F1}" type="datetimeFigureOut">
               <a:rPr lang="en-CA" smtClean="0"/>
-              <a:t>2017-09-22</a:t>
+              <a:t>2018-05-04</a:t>
             </a:fld>
             <a:endParaRPr lang="en-CA"/>
           </a:p>
@@ -770,7 +770,7 @@
           <a:p>
             <a:fld id="{F7249F8D-641B-4CAF-BAE5-10524742F6F1}" type="datetimeFigureOut">
               <a:rPr lang="en-CA" smtClean="0"/>
-              <a:t>2017-09-22</a:t>
+              <a:t>2018-05-04</a:t>
             </a:fld>
             <a:endParaRPr lang="en-CA"/>
           </a:p>
@@ -1016,7 +1016,7 @@
           <a:p>
             <a:fld id="{F7249F8D-641B-4CAF-BAE5-10524742F6F1}" type="datetimeFigureOut">
               <a:rPr lang="en-CA" smtClean="0"/>
-              <a:t>2017-09-22</a:t>
+              <a:t>2018-05-04</a:t>
             </a:fld>
             <a:endParaRPr lang="en-CA"/>
           </a:p>
@@ -1248,7 +1248,7 @@
           <a:p>
             <a:fld id="{F7249F8D-641B-4CAF-BAE5-10524742F6F1}" type="datetimeFigureOut">
               <a:rPr lang="en-CA" smtClean="0"/>
-              <a:t>2017-09-22</a:t>
+              <a:t>2018-05-04</a:t>
             </a:fld>
             <a:endParaRPr lang="en-CA"/>
           </a:p>
@@ -1615,7 +1615,7 @@
           <a:p>
             <a:fld id="{F7249F8D-641B-4CAF-BAE5-10524742F6F1}" type="datetimeFigureOut">
               <a:rPr lang="en-CA" smtClean="0"/>
-              <a:t>2017-09-22</a:t>
+              <a:t>2018-05-04</a:t>
             </a:fld>
             <a:endParaRPr lang="en-CA"/>
           </a:p>
@@ -1733,7 +1733,7 @@
           <a:p>
             <a:fld id="{F7249F8D-641B-4CAF-BAE5-10524742F6F1}" type="datetimeFigureOut">
               <a:rPr lang="en-CA" smtClean="0"/>
-              <a:t>2017-09-22</a:t>
+              <a:t>2018-05-04</a:t>
             </a:fld>
             <a:endParaRPr lang="en-CA"/>
           </a:p>
@@ -1828,7 +1828,7 @@
           <a:p>
             <a:fld id="{F7249F8D-641B-4CAF-BAE5-10524742F6F1}" type="datetimeFigureOut">
               <a:rPr lang="en-CA" smtClean="0"/>
-              <a:t>2017-09-22</a:t>
+              <a:t>2018-05-04</a:t>
             </a:fld>
             <a:endParaRPr lang="en-CA"/>
           </a:p>
@@ -2105,7 +2105,7 @@
           <a:p>
             <a:fld id="{F7249F8D-641B-4CAF-BAE5-10524742F6F1}" type="datetimeFigureOut">
               <a:rPr lang="en-CA" smtClean="0"/>
-              <a:t>2017-09-22</a:t>
+              <a:t>2018-05-04</a:t>
             </a:fld>
             <a:endParaRPr lang="en-CA"/>
           </a:p>
@@ -2358,7 +2358,7 @@
           <a:p>
             <a:fld id="{F7249F8D-641B-4CAF-BAE5-10524742F6F1}" type="datetimeFigureOut">
               <a:rPr lang="en-CA" smtClean="0"/>
-              <a:t>2017-09-22</a:t>
+              <a:t>2018-05-04</a:t>
             </a:fld>
             <a:endParaRPr lang="en-CA"/>
           </a:p>
@@ -2571,7 +2571,7 @@
           <a:p>
             <a:fld id="{F7249F8D-641B-4CAF-BAE5-10524742F6F1}" type="datetimeFigureOut">
               <a:rPr lang="en-CA" smtClean="0"/>
-              <a:t>2017-09-22</a:t>
+              <a:t>2018-05-04</a:t>
             </a:fld>
             <a:endParaRPr lang="en-CA"/>
           </a:p>
@@ -7488,8 +7488,8 @@
             </a:p>
           </p:txBody>
         </p:sp>
-        <mc:AlternateContent xmlns:mc="http://schemas.openxmlformats.org/markup-compatibility/2006">
-          <mc:Choice xmlns:a14="http://schemas.microsoft.com/office/drawing/2010/main" Requires="a14">
+        <mc:AlternateContent xmlns:mc="http://schemas.openxmlformats.org/markup-compatibility/2006" xmlns:a14="http://schemas.microsoft.com/office/drawing/2010/main">
+          <mc:Choice Requires="a14">
             <p:sp>
               <p:nvSpPr>
                 <p:cNvPr id="64" name="TextBox 63"/>
@@ -7547,7 +7547,7 @@
               </p:txBody>
             </p:sp>
           </mc:Choice>
-          <mc:Fallback>
+          <mc:Fallback xmlns="">
             <p:sp>
               <p:nvSpPr>
                 <p:cNvPr id="64" name="TextBox 63"/>
@@ -7623,8 +7623,8 @@
             </a:fontRef>
           </p:style>
         </p:cxnSp>
-        <mc:AlternateContent xmlns:mc="http://schemas.openxmlformats.org/markup-compatibility/2006">
-          <mc:Choice xmlns:a14="http://schemas.microsoft.com/office/drawing/2010/main" Requires="a14">
+        <mc:AlternateContent xmlns:mc="http://schemas.openxmlformats.org/markup-compatibility/2006" xmlns:a14="http://schemas.microsoft.com/office/drawing/2010/main">
+          <mc:Choice Requires="a14">
             <p:sp>
               <p:nvSpPr>
                 <p:cNvPr id="66" name="TextBox 65"/>
@@ -7734,7 +7734,7 @@
               </p:txBody>
             </p:sp>
           </mc:Choice>
-          <mc:Fallback>
+          <mc:Fallback xmlns="">
             <p:sp>
               <p:nvSpPr>
                 <p:cNvPr id="66" name="TextBox 65"/>
@@ -23580,6 +23580,4654 @@
           <a:chExt cx="0" cy="0"/>
         </a:xfrm>
       </p:grpSpPr>
+      <p:grpSp>
+        <p:nvGrpSpPr>
+          <p:cNvPr id="38" name="Group 37"/>
+          <p:cNvGrpSpPr/>
+          <p:nvPr/>
+        </p:nvGrpSpPr>
+        <p:grpSpPr>
+          <a:xfrm>
+            <a:off x="305055" y="545098"/>
+            <a:ext cx="2349307" cy="2146316"/>
+            <a:chOff x="548895" y="707658"/>
+            <a:chExt cx="2349307" cy="2146316"/>
+          </a:xfrm>
+        </p:grpSpPr>
+        <p:grpSp>
+          <p:nvGrpSpPr>
+            <p:cNvPr id="3" name="Group 2"/>
+            <p:cNvGrpSpPr/>
+            <p:nvPr/>
+          </p:nvGrpSpPr>
+          <p:grpSpPr>
+            <a:xfrm>
+              <a:off x="548895" y="707658"/>
+              <a:ext cx="2182785" cy="2146316"/>
+              <a:chOff x="1190506" y="680744"/>
+              <a:chExt cx="2182785" cy="2146316"/>
+            </a:xfrm>
+          </p:grpSpPr>
+          <p:cxnSp>
+            <p:nvCxnSpPr>
+              <p:cNvPr id="16" name="Straight Arrow Connector 15"/>
+              <p:cNvCxnSpPr/>
+              <p:nvPr/>
+            </p:nvCxnSpPr>
+            <p:spPr>
+              <a:xfrm flipV="1">
+                <a:off x="1516583" y="680744"/>
+                <a:ext cx="7684" cy="1859536"/>
+              </a:xfrm>
+              <a:prstGeom prst="straightConnector1">
+                <a:avLst/>
+              </a:prstGeom>
+              <a:ln w="38100">
+                <a:solidFill>
+                  <a:schemeClr val="tx1"/>
+                </a:solidFill>
+                <a:tailEnd type="triangle"/>
+              </a:ln>
+            </p:spPr>
+            <p:style>
+              <a:lnRef idx="1">
+                <a:schemeClr val="accent1"/>
+              </a:lnRef>
+              <a:fillRef idx="0">
+                <a:schemeClr val="accent1"/>
+              </a:fillRef>
+              <a:effectRef idx="0">
+                <a:schemeClr val="accent1"/>
+              </a:effectRef>
+              <a:fontRef idx="minor">
+                <a:schemeClr val="tx1"/>
+              </a:fontRef>
+            </p:style>
+          </p:cxnSp>
+          <p:cxnSp>
+            <p:nvCxnSpPr>
+              <p:cNvPr id="17" name="Straight Arrow Connector 16"/>
+              <p:cNvCxnSpPr/>
+              <p:nvPr/>
+            </p:nvCxnSpPr>
+            <p:spPr>
+              <a:xfrm flipV="1">
+                <a:off x="1498387" y="2526633"/>
+                <a:ext cx="1874904" cy="1"/>
+              </a:xfrm>
+              <a:prstGeom prst="straightConnector1">
+                <a:avLst/>
+              </a:prstGeom>
+              <a:ln w="38100">
+                <a:solidFill>
+                  <a:schemeClr val="tx1"/>
+                </a:solidFill>
+                <a:tailEnd type="triangle"/>
+              </a:ln>
+            </p:spPr>
+            <p:style>
+              <a:lnRef idx="1">
+                <a:schemeClr val="accent1"/>
+              </a:lnRef>
+              <a:fillRef idx="0">
+                <a:schemeClr val="accent1"/>
+              </a:fillRef>
+              <a:effectRef idx="0">
+                <a:schemeClr val="accent1"/>
+              </a:effectRef>
+              <a:fontRef idx="minor">
+                <a:schemeClr val="tx1"/>
+              </a:fontRef>
+            </p:style>
+          </p:cxnSp>
+          <mc:AlternateContent xmlns:mc="http://schemas.openxmlformats.org/markup-compatibility/2006" xmlns:a14="http://schemas.microsoft.com/office/drawing/2010/main">
+            <mc:Choice Requires="a14">
+              <p:sp>
+                <p:nvSpPr>
+                  <p:cNvPr id="18" name="Rectangle 17"/>
+                  <p:cNvSpPr/>
+                  <p:nvPr/>
+                </p:nvSpPr>
+                <p:spPr>
+                  <a:xfrm>
+                    <a:off x="2897675" y="2457728"/>
+                    <a:ext cx="367985" cy="369332"/>
+                  </a:xfrm>
+                  <a:prstGeom prst="rect">
+                    <a:avLst/>
+                  </a:prstGeom>
+                </p:spPr>
+                <p:txBody>
+                  <a:bodyPr wrap="none">
+                    <a:spAutoFit/>
+                  </a:bodyPr>
+                  <a:lstStyle/>
+                  <a:p>
+                    <a:pPr/>
+                    <a14:m>
+                      <m:oMathPara xmlns:m="http://schemas.openxmlformats.org/officeDocument/2006/math">
+                        <m:oMathParaPr>
+                          <m:jc m:val="centerGroup"/>
+                        </m:oMathParaPr>
+                        <m:oMath xmlns:m="http://schemas.openxmlformats.org/officeDocument/2006/math">
+                          <m:r>
+                            <a:rPr lang="en-US" i="1">
+                              <a:latin typeface="Cambria Math" panose="02040503050406030204" pitchFamily="18" charset="0"/>
+                              <a:cs typeface="Arial" panose="020B0604020202020204" pitchFamily="34" charset="0"/>
+                            </a:rPr>
+                            <m:t>𝑥</m:t>
+                          </m:r>
+                        </m:oMath>
+                      </m:oMathPara>
+                    </a14:m>
+                    <a:endParaRPr lang="en-CA" dirty="0"/>
+                  </a:p>
+                </p:txBody>
+              </p:sp>
+            </mc:Choice>
+            <mc:Fallback xmlns="">
+              <p:sp>
+                <p:nvSpPr>
+                  <p:cNvPr id="12" name="Rectangle 11"/>
+                  <p:cNvSpPr>
+                    <a:spLocks noRot="1" noChangeAspect="1" noMove="1" noResize="1" noEditPoints="1" noAdjustHandles="1" noChangeArrowheads="1" noChangeShapeType="1" noTextEdit="1"/>
+                  </p:cNvSpPr>
+                  <p:nvPr/>
+                </p:nvSpPr>
+                <p:spPr>
+                  <a:xfrm>
+                    <a:off x="2897675" y="2457728"/>
+                    <a:ext cx="367985" cy="369332"/>
+                  </a:xfrm>
+                  <a:prstGeom prst="rect">
+                    <a:avLst/>
+                  </a:prstGeom>
+                  <a:blipFill rotWithShape="0">
+                    <a:blip r:embed="rId2"/>
+                    <a:stretch>
+                      <a:fillRect/>
+                    </a:stretch>
+                  </a:blipFill>
+                </p:spPr>
+                <p:txBody>
+                  <a:bodyPr/>
+                  <a:lstStyle/>
+                  <a:p>
+                    <a:r>
+                      <a:rPr lang="en-CA">
+                        <a:noFill/>
+                      </a:rPr>
+                      <a:t> </a:t>
+                    </a:r>
+                  </a:p>
+                </p:txBody>
+              </p:sp>
+            </mc:Fallback>
+          </mc:AlternateContent>
+          <mc:AlternateContent xmlns:mc="http://schemas.openxmlformats.org/markup-compatibility/2006" xmlns:a14="http://schemas.microsoft.com/office/drawing/2010/main">
+            <mc:Choice Requires="a14">
+              <p:sp>
+                <p:nvSpPr>
+                  <p:cNvPr id="19" name="Rectangle 18"/>
+                  <p:cNvSpPr/>
+                  <p:nvPr/>
+                </p:nvSpPr>
+                <p:spPr>
+                  <a:xfrm>
+                    <a:off x="1190506" y="790545"/>
+                    <a:ext cx="371384" cy="369332"/>
+                  </a:xfrm>
+                  <a:prstGeom prst="rect">
+                    <a:avLst/>
+                  </a:prstGeom>
+                </p:spPr>
+                <p:txBody>
+                  <a:bodyPr wrap="none">
+                    <a:spAutoFit/>
+                  </a:bodyPr>
+                  <a:lstStyle/>
+                  <a:p>
+                    <a:pPr/>
+                    <a14:m>
+                      <m:oMathPara xmlns:m="http://schemas.openxmlformats.org/officeDocument/2006/math">
+                        <m:oMathParaPr>
+                          <m:jc m:val="centerGroup"/>
+                        </m:oMathParaPr>
+                        <m:oMath xmlns:m="http://schemas.openxmlformats.org/officeDocument/2006/math">
+                          <m:r>
+                            <a:rPr lang="en-US" b="0" i="1" smtClean="0">
+                              <a:latin typeface="Cambria Math" panose="02040503050406030204" pitchFamily="18" charset="0"/>
+                            </a:rPr>
+                            <m:t>𝑦</m:t>
+                          </m:r>
+                        </m:oMath>
+                      </m:oMathPara>
+                    </a14:m>
+                    <a:endParaRPr lang="en-CA" dirty="0"/>
+                  </a:p>
+                </p:txBody>
+              </p:sp>
+            </mc:Choice>
+            <mc:Fallback xmlns="">
+              <p:sp>
+                <p:nvSpPr>
+                  <p:cNvPr id="13" name="Rectangle 12"/>
+                  <p:cNvSpPr>
+                    <a:spLocks noRot="1" noChangeAspect="1" noMove="1" noResize="1" noEditPoints="1" noAdjustHandles="1" noChangeArrowheads="1" noChangeShapeType="1" noTextEdit="1"/>
+                  </p:cNvSpPr>
+                  <p:nvPr/>
+                </p:nvSpPr>
+                <p:spPr>
+                  <a:xfrm>
+                    <a:off x="1190506" y="790545"/>
+                    <a:ext cx="371384" cy="369332"/>
+                  </a:xfrm>
+                  <a:prstGeom prst="rect">
+                    <a:avLst/>
+                  </a:prstGeom>
+                  <a:blipFill rotWithShape="0">
+                    <a:blip r:embed="rId3"/>
+                    <a:stretch>
+                      <a:fillRect b="-6557"/>
+                    </a:stretch>
+                  </a:blipFill>
+                </p:spPr>
+                <p:txBody>
+                  <a:bodyPr/>
+                  <a:lstStyle/>
+                  <a:p>
+                    <a:r>
+                      <a:rPr lang="en-CA">
+                        <a:noFill/>
+                      </a:rPr>
+                      <a:t> </a:t>
+                    </a:r>
+                  </a:p>
+                </p:txBody>
+              </p:sp>
+            </mc:Fallback>
+          </mc:AlternateContent>
+          <mc:AlternateContent xmlns:mc="http://schemas.openxmlformats.org/markup-compatibility/2006" xmlns:a14="http://schemas.microsoft.com/office/drawing/2010/main">
+            <mc:Choice Requires="a14">
+              <p:sp>
+                <p:nvSpPr>
+                  <p:cNvPr id="20" name="Rectangle 19"/>
+                  <p:cNvSpPr/>
+                  <p:nvPr/>
+                </p:nvSpPr>
+                <p:spPr>
+                  <a:xfrm>
+                    <a:off x="1205483" y="2447020"/>
+                    <a:ext cx="367985" cy="369332"/>
+                  </a:xfrm>
+                  <a:prstGeom prst="rect">
+                    <a:avLst/>
+                  </a:prstGeom>
+                </p:spPr>
+                <p:txBody>
+                  <a:bodyPr wrap="none">
+                    <a:spAutoFit/>
+                  </a:bodyPr>
+                  <a:lstStyle/>
+                  <a:p>
+                    <a:pPr/>
+                    <a14:m>
+                      <m:oMathPara xmlns:m="http://schemas.openxmlformats.org/officeDocument/2006/math">
+                        <m:oMathParaPr>
+                          <m:jc m:val="centerGroup"/>
+                        </m:oMathParaPr>
+                        <m:oMath xmlns:m="http://schemas.openxmlformats.org/officeDocument/2006/math">
+                          <m:r>
+                            <a:rPr lang="en-US" b="0" i="1" smtClean="0">
+                              <a:latin typeface="Cambria Math" panose="02040503050406030204" pitchFamily="18" charset="0"/>
+                              <a:cs typeface="Arial" panose="020B0604020202020204" pitchFamily="34" charset="0"/>
+                            </a:rPr>
+                            <m:t>0</m:t>
+                          </m:r>
+                        </m:oMath>
+                      </m:oMathPara>
+                    </a14:m>
+                    <a:endParaRPr lang="en-CA" dirty="0"/>
+                  </a:p>
+                </p:txBody>
+              </p:sp>
+            </mc:Choice>
+            <mc:Fallback xmlns="">
+              <p:sp>
+                <p:nvSpPr>
+                  <p:cNvPr id="14" name="Rectangle 13"/>
+                  <p:cNvSpPr>
+                    <a:spLocks noRot="1" noChangeAspect="1" noMove="1" noResize="1" noEditPoints="1" noAdjustHandles="1" noChangeArrowheads="1" noChangeShapeType="1" noTextEdit="1"/>
+                  </p:cNvSpPr>
+                  <p:nvPr/>
+                </p:nvSpPr>
+                <p:spPr>
+                  <a:xfrm>
+                    <a:off x="1205483" y="2447020"/>
+                    <a:ext cx="367985" cy="369332"/>
+                  </a:xfrm>
+                  <a:prstGeom prst="rect">
+                    <a:avLst/>
+                  </a:prstGeom>
+                  <a:blipFill rotWithShape="0">
+                    <a:blip r:embed="rId4"/>
+                    <a:stretch>
+                      <a:fillRect/>
+                    </a:stretch>
+                  </a:blipFill>
+                </p:spPr>
+                <p:txBody>
+                  <a:bodyPr/>
+                  <a:lstStyle/>
+                  <a:p>
+                    <a:r>
+                      <a:rPr lang="en-CA">
+                        <a:noFill/>
+                      </a:rPr>
+                      <a:t> </a:t>
+                    </a:r>
+                  </a:p>
+                </p:txBody>
+              </p:sp>
+            </mc:Fallback>
+          </mc:AlternateContent>
+        </p:grpSp>
+        <p:cxnSp>
+          <p:nvCxnSpPr>
+            <p:cNvPr id="10" name="Straight Connector 9"/>
+            <p:cNvCxnSpPr/>
+            <p:nvPr/>
+          </p:nvCxnSpPr>
+          <p:spPr>
+            <a:xfrm flipV="1">
+              <a:off x="1336567" y="2156621"/>
+              <a:ext cx="628319" cy="10343"/>
+            </a:xfrm>
+            <a:prstGeom prst="line">
+              <a:avLst/>
+            </a:prstGeom>
+            <a:ln w="19050">
+              <a:solidFill>
+                <a:schemeClr val="tx1"/>
+              </a:solidFill>
+              <a:prstDash val="sysDot"/>
+            </a:ln>
+          </p:spPr>
+          <p:style>
+            <a:lnRef idx="1">
+              <a:schemeClr val="accent1"/>
+            </a:lnRef>
+            <a:fillRef idx="0">
+              <a:schemeClr val="accent1"/>
+            </a:fillRef>
+            <a:effectRef idx="0">
+              <a:schemeClr val="accent1"/>
+            </a:effectRef>
+            <a:fontRef idx="minor">
+              <a:schemeClr val="tx1"/>
+            </a:fontRef>
+          </p:style>
+        </p:cxnSp>
+        <p:cxnSp>
+          <p:nvCxnSpPr>
+            <p:cNvPr id="11" name="Straight Connector 10"/>
+            <p:cNvCxnSpPr/>
+            <p:nvPr/>
+          </p:nvCxnSpPr>
+          <p:spPr>
+            <a:xfrm flipH="1">
+              <a:off x="1325453" y="1732611"/>
+              <a:ext cx="1267" cy="443320"/>
+            </a:xfrm>
+            <a:prstGeom prst="line">
+              <a:avLst/>
+            </a:prstGeom>
+            <a:ln w="19050">
+              <a:solidFill>
+                <a:schemeClr val="tx1"/>
+              </a:solidFill>
+              <a:prstDash val="sysDot"/>
+            </a:ln>
+          </p:spPr>
+          <p:style>
+            <a:lnRef idx="1">
+              <a:schemeClr val="accent1"/>
+            </a:lnRef>
+            <a:fillRef idx="0">
+              <a:schemeClr val="accent1"/>
+            </a:fillRef>
+            <a:effectRef idx="0">
+              <a:schemeClr val="accent1"/>
+            </a:effectRef>
+            <a:fontRef idx="minor">
+              <a:schemeClr val="tx1"/>
+            </a:fontRef>
+          </p:style>
+        </p:cxnSp>
+        <p:cxnSp>
+          <p:nvCxnSpPr>
+            <p:cNvPr id="14" name="Straight Arrow Connector 13"/>
+            <p:cNvCxnSpPr/>
+            <p:nvPr/>
+          </p:nvCxnSpPr>
+          <p:spPr>
+            <a:xfrm flipH="1" flipV="1">
+              <a:off x="1316087" y="1724991"/>
+              <a:ext cx="648799" cy="429674"/>
+            </a:xfrm>
+            <a:prstGeom prst="straightConnector1">
+              <a:avLst/>
+            </a:prstGeom>
+            <a:ln w="38100">
+              <a:solidFill>
+                <a:schemeClr val="tx1"/>
+              </a:solidFill>
+              <a:tailEnd type="triangle"/>
+            </a:ln>
+          </p:spPr>
+          <p:style>
+            <a:lnRef idx="1">
+              <a:schemeClr val="accent1"/>
+            </a:lnRef>
+            <a:fillRef idx="0">
+              <a:schemeClr val="accent1"/>
+            </a:fillRef>
+            <a:effectRef idx="0">
+              <a:schemeClr val="accent1"/>
+            </a:effectRef>
+            <a:fontRef idx="minor">
+              <a:schemeClr val="tx1"/>
+            </a:fontRef>
+          </p:style>
+        </p:cxnSp>
+        <mc:AlternateContent xmlns:mc="http://schemas.openxmlformats.org/markup-compatibility/2006">
+          <mc:Choice xmlns:a14="http://schemas.microsoft.com/office/drawing/2010/main" Requires="a14">
+            <p:sp>
+              <p:nvSpPr>
+                <p:cNvPr id="15" name="Rectangle 14"/>
+                <p:cNvSpPr/>
+                <p:nvPr/>
+              </p:nvSpPr>
+              <p:spPr>
+                <a:xfrm>
+                  <a:off x="1657629" y="1621858"/>
+                  <a:ext cx="377924" cy="410305"/>
+                </a:xfrm>
+                <a:prstGeom prst="rect">
+                  <a:avLst/>
+                </a:prstGeom>
+              </p:spPr>
+              <p:txBody>
+                <a:bodyPr wrap="none">
+                  <a:spAutoFit/>
+                </a:bodyPr>
+                <a:lstStyle/>
+                <a:p>
+                  <a:pPr/>
+                  <a14:m>
+                    <m:oMathPara xmlns:m="http://schemas.openxmlformats.org/officeDocument/2006/math">
+                      <m:oMathParaPr>
+                        <m:jc m:val="centerGroup"/>
+                      </m:oMathParaPr>
+                      <m:oMath xmlns:m="http://schemas.openxmlformats.org/officeDocument/2006/math">
+                        <m:acc>
+                          <m:accPr>
+                            <m:chr m:val="⃗"/>
+                            <m:ctrlPr>
+                              <a:rPr lang="en-US" b="0" i="1" smtClean="0">
+                                <a:latin typeface="Cambria Math" panose="02040503050406030204" pitchFamily="18" charset="0"/>
+                                <a:cs typeface="Arial" panose="020B0604020202020204" pitchFamily="34" charset="0"/>
+                              </a:rPr>
+                            </m:ctrlPr>
+                          </m:accPr>
+                          <m:e>
+                            <m:r>
+                              <a:rPr lang="en-US" b="0" i="1" smtClean="0">
+                                <a:latin typeface="Cambria Math" panose="02040503050406030204" pitchFamily="18" charset="0"/>
+                                <a:cs typeface="Arial" panose="020B0604020202020204" pitchFamily="34" charset="0"/>
+                              </a:rPr>
+                              <m:t>𝑑</m:t>
+                            </m:r>
+                          </m:e>
+                        </m:acc>
+                      </m:oMath>
+                    </m:oMathPara>
+                  </a14:m>
+                  <a:endParaRPr lang="en-CA" dirty="0"/>
+                </a:p>
+              </p:txBody>
+            </p:sp>
+          </mc:Choice>
+          <mc:Fallback>
+            <p:sp>
+              <p:nvSpPr>
+                <p:cNvPr id="15" name="Rectangle 14"/>
+                <p:cNvSpPr>
+                  <a:spLocks noRot="1" noChangeAspect="1" noMove="1" noResize="1" noEditPoints="1" noAdjustHandles="1" noChangeArrowheads="1" noChangeShapeType="1" noTextEdit="1"/>
+                </p:cNvSpPr>
+                <p:nvPr/>
+              </p:nvSpPr>
+              <p:spPr>
+                <a:xfrm>
+                  <a:off x="1657629" y="1621858"/>
+                  <a:ext cx="377924" cy="410305"/>
+                </a:xfrm>
+                <a:prstGeom prst="rect">
+                  <a:avLst/>
+                </a:prstGeom>
+                <a:blipFill>
+                  <a:blip r:embed="rId5"/>
+                  <a:stretch>
+                    <a:fillRect t="-22059" r="-29032"/>
+                  </a:stretch>
+                </a:blipFill>
+              </p:spPr>
+              <p:txBody>
+                <a:bodyPr/>
+                <a:lstStyle/>
+                <a:p>
+                  <a:r>
+                    <a:rPr lang="en-US">
+                      <a:noFill/>
+                    </a:rPr>
+                    <a:t> </a:t>
+                  </a:r>
+                </a:p>
+              </p:txBody>
+            </p:sp>
+          </mc:Fallback>
+        </mc:AlternateContent>
+        <mc:AlternateContent xmlns:mc="http://schemas.openxmlformats.org/markup-compatibility/2006">
+          <mc:Choice xmlns:a14="http://schemas.microsoft.com/office/drawing/2010/main" Requires="a14">
+            <p:sp>
+              <p:nvSpPr>
+                <p:cNvPr id="25" name="Rectangle 24"/>
+                <p:cNvSpPr/>
+                <p:nvPr/>
+              </p:nvSpPr>
+              <p:spPr>
+                <a:xfrm>
+                  <a:off x="1819428" y="887434"/>
+                  <a:ext cx="377924" cy="410305"/>
+                </a:xfrm>
+                <a:prstGeom prst="rect">
+                  <a:avLst/>
+                </a:prstGeom>
+              </p:spPr>
+              <p:txBody>
+                <a:bodyPr wrap="none">
+                  <a:spAutoFit/>
+                </a:bodyPr>
+                <a:lstStyle/>
+                <a:p>
+                  <a:pPr/>
+                  <a14:m>
+                    <m:oMathPara xmlns:m="http://schemas.openxmlformats.org/officeDocument/2006/math">
+                      <m:oMathParaPr>
+                        <m:jc m:val="centerGroup"/>
+                      </m:oMathParaPr>
+                      <m:oMath xmlns:m="http://schemas.openxmlformats.org/officeDocument/2006/math">
+                        <m:acc>
+                          <m:accPr>
+                            <m:chr m:val="⃗"/>
+                            <m:ctrlPr>
+                              <a:rPr lang="en-US" b="0" i="1" smtClean="0">
+                                <a:latin typeface="Cambria Math" panose="02040503050406030204" pitchFamily="18" charset="0"/>
+                                <a:cs typeface="Arial" panose="020B0604020202020204" pitchFamily="34" charset="0"/>
+                              </a:rPr>
+                            </m:ctrlPr>
+                          </m:accPr>
+                          <m:e>
+                            <m:r>
+                              <a:rPr lang="en-US" b="0" i="1" smtClean="0">
+                                <a:latin typeface="Cambria Math" panose="02040503050406030204" pitchFamily="18" charset="0"/>
+                                <a:cs typeface="Arial" panose="020B0604020202020204" pitchFamily="34" charset="0"/>
+                              </a:rPr>
+                              <m:t>𝑑</m:t>
+                            </m:r>
+                          </m:e>
+                        </m:acc>
+                      </m:oMath>
+                    </m:oMathPara>
+                  </a14:m>
+                  <a:endParaRPr lang="en-CA" dirty="0"/>
+                </a:p>
+              </p:txBody>
+            </p:sp>
+          </mc:Choice>
+          <mc:Fallback>
+            <p:sp>
+              <p:nvSpPr>
+                <p:cNvPr id="25" name="Rectangle 24"/>
+                <p:cNvSpPr>
+                  <a:spLocks noRot="1" noChangeAspect="1" noMove="1" noResize="1" noEditPoints="1" noAdjustHandles="1" noChangeArrowheads="1" noChangeShapeType="1" noTextEdit="1"/>
+                </p:cNvSpPr>
+                <p:nvPr/>
+              </p:nvSpPr>
+              <p:spPr>
+                <a:xfrm>
+                  <a:off x="1819428" y="887434"/>
+                  <a:ext cx="377924" cy="410305"/>
+                </a:xfrm>
+                <a:prstGeom prst="rect">
+                  <a:avLst/>
+                </a:prstGeom>
+                <a:blipFill>
+                  <a:blip r:embed="rId6"/>
+                  <a:stretch>
+                    <a:fillRect t="-22388" r="-30645"/>
+                  </a:stretch>
+                </a:blipFill>
+              </p:spPr>
+              <p:txBody>
+                <a:bodyPr/>
+                <a:lstStyle/>
+                <a:p>
+                  <a:r>
+                    <a:rPr lang="en-US">
+                      <a:noFill/>
+                    </a:rPr>
+                    <a:t> </a:t>
+                  </a:r>
+                </a:p>
+              </p:txBody>
+            </p:sp>
+          </mc:Fallback>
+        </mc:AlternateContent>
+        <mc:AlternateContent xmlns:mc="http://schemas.openxmlformats.org/markup-compatibility/2006">
+          <mc:Choice xmlns:a14="http://schemas.microsoft.com/office/drawing/2010/main" Requires="a14">
+            <p:sp>
+              <p:nvSpPr>
+                <p:cNvPr id="26" name="TextBox 25"/>
+                <p:cNvSpPr txBox="1"/>
+                <p:nvPr/>
+              </p:nvSpPr>
+              <p:spPr>
+                <a:xfrm>
+                  <a:off x="1505036" y="2145636"/>
+                  <a:ext cx="345864" cy="307777"/>
+                </a:xfrm>
+                <a:prstGeom prst="rect">
+                  <a:avLst/>
+                </a:prstGeom>
+                <a:noFill/>
+              </p:spPr>
+              <p:txBody>
+                <a:bodyPr wrap="none" lIns="0" tIns="0" rIns="0" bIns="0" rtlCol="0">
+                  <a:spAutoFit/>
+                </a:bodyPr>
+                <a:lstStyle/>
+                <a:p>
+                  <a14:m>
+                    <m:oMathPara xmlns:m="http://schemas.openxmlformats.org/officeDocument/2006/math">
+                      <m:oMathParaPr>
+                        <m:jc m:val="centerGroup"/>
+                      </m:oMathParaPr>
+                      <m:oMath xmlns:m="http://schemas.openxmlformats.org/officeDocument/2006/math">
+                        <m:sSub>
+                          <m:sSubPr>
+                            <m:ctrlPr>
+                              <a:rPr lang="en-US" sz="2000" b="0" i="1" smtClean="0">
+                                <a:latin typeface="Cambria Math" panose="02040503050406030204" pitchFamily="18" charset="0"/>
+                                <a:cs typeface="Arial" panose="020B0604020202020204" pitchFamily="34" charset="0"/>
+                              </a:rPr>
+                            </m:ctrlPr>
+                          </m:sSubPr>
+                          <m:e>
+                            <m:r>
+                              <a:rPr lang="en-US" sz="2000" b="0" i="1" smtClean="0">
+                                <a:latin typeface="Cambria Math" panose="02040503050406030204" pitchFamily="18" charset="0"/>
+                                <a:cs typeface="Arial" panose="020B0604020202020204" pitchFamily="34" charset="0"/>
+                              </a:rPr>
+                              <m:t>𝑑</m:t>
+                            </m:r>
+                          </m:e>
+                          <m:sub>
+                            <m:r>
+                              <a:rPr lang="en-US" sz="2000" b="0" i="1" smtClean="0">
+                                <a:latin typeface="Cambria Math" panose="02040503050406030204" pitchFamily="18" charset="0"/>
+                                <a:cs typeface="Arial" panose="020B0604020202020204" pitchFamily="34" charset="0"/>
+                              </a:rPr>
+                              <m:t>𝑥</m:t>
+                            </m:r>
+                          </m:sub>
+                        </m:sSub>
+                      </m:oMath>
+                    </m:oMathPara>
+                  </a14:m>
+                  <a:endParaRPr lang="en-US" sz="2000" dirty="0" smtClean="0">
+                    <a:latin typeface="Arial" panose="020B0604020202020204" pitchFamily="34" charset="0"/>
+                    <a:cs typeface="Arial" panose="020B0604020202020204" pitchFamily="34" charset="0"/>
+                  </a:endParaRPr>
+                </a:p>
+              </p:txBody>
+            </p:sp>
+          </mc:Choice>
+          <mc:Fallback>
+            <p:sp>
+              <p:nvSpPr>
+                <p:cNvPr id="26" name="TextBox 25"/>
+                <p:cNvSpPr txBox="1">
+                  <a:spLocks noRot="1" noChangeAspect="1" noMove="1" noResize="1" noEditPoints="1" noAdjustHandles="1" noChangeArrowheads="1" noChangeShapeType="1" noTextEdit="1"/>
+                </p:cNvSpPr>
+                <p:nvPr/>
+              </p:nvSpPr>
+              <p:spPr>
+                <a:xfrm>
+                  <a:off x="1505036" y="2145636"/>
+                  <a:ext cx="345864" cy="307777"/>
+                </a:xfrm>
+                <a:prstGeom prst="rect">
+                  <a:avLst/>
+                </a:prstGeom>
+                <a:blipFill>
+                  <a:blip r:embed="rId7"/>
+                  <a:stretch>
+                    <a:fillRect l="-15789" b="-13725"/>
+                  </a:stretch>
+                </a:blipFill>
+              </p:spPr>
+              <p:txBody>
+                <a:bodyPr/>
+                <a:lstStyle/>
+                <a:p>
+                  <a:r>
+                    <a:rPr lang="en-US">
+                      <a:noFill/>
+                    </a:rPr>
+                    <a:t> </a:t>
+                  </a:r>
+                </a:p>
+              </p:txBody>
+            </p:sp>
+          </mc:Fallback>
+        </mc:AlternateContent>
+        <mc:AlternateContent xmlns:mc="http://schemas.openxmlformats.org/markup-compatibility/2006">
+          <mc:Choice xmlns:a14="http://schemas.microsoft.com/office/drawing/2010/main" Requires="a14">
+            <p:sp>
+              <p:nvSpPr>
+                <p:cNvPr id="27" name="TextBox 26"/>
+                <p:cNvSpPr txBox="1"/>
+                <p:nvPr/>
+              </p:nvSpPr>
+              <p:spPr>
+                <a:xfrm>
+                  <a:off x="995448" y="1768802"/>
+                  <a:ext cx="353430" cy="331950"/>
+                </a:xfrm>
+                <a:prstGeom prst="rect">
+                  <a:avLst/>
+                </a:prstGeom>
+                <a:noFill/>
+              </p:spPr>
+              <p:txBody>
+                <a:bodyPr wrap="none" lIns="0" tIns="0" rIns="0" bIns="0" rtlCol="0">
+                  <a:spAutoFit/>
+                </a:bodyPr>
+                <a:lstStyle/>
+                <a:p>
+                  <a14:m>
+                    <m:oMathPara xmlns:m="http://schemas.openxmlformats.org/officeDocument/2006/math">
+                      <m:oMathParaPr>
+                        <m:jc m:val="centerGroup"/>
+                      </m:oMathParaPr>
+                      <m:oMath xmlns:m="http://schemas.openxmlformats.org/officeDocument/2006/math">
+                        <m:sSub>
+                          <m:sSubPr>
+                            <m:ctrlPr>
+                              <a:rPr lang="en-US" sz="2000" b="0" i="1" smtClean="0">
+                                <a:latin typeface="Cambria Math" panose="02040503050406030204" pitchFamily="18" charset="0"/>
+                                <a:cs typeface="Arial" panose="020B0604020202020204" pitchFamily="34" charset="0"/>
+                              </a:rPr>
+                            </m:ctrlPr>
+                          </m:sSubPr>
+                          <m:e>
+                            <m:r>
+                              <a:rPr lang="en-US" sz="2000" b="0" i="1" smtClean="0">
+                                <a:latin typeface="Cambria Math" panose="02040503050406030204" pitchFamily="18" charset="0"/>
+                                <a:cs typeface="Arial" panose="020B0604020202020204" pitchFamily="34" charset="0"/>
+                              </a:rPr>
+                              <m:t>𝑑</m:t>
+                            </m:r>
+                          </m:e>
+                          <m:sub>
+                            <m:r>
+                              <a:rPr lang="en-US" sz="2000" b="0" i="1" smtClean="0">
+                                <a:latin typeface="Cambria Math" panose="02040503050406030204" pitchFamily="18" charset="0"/>
+                                <a:cs typeface="Arial" panose="020B0604020202020204" pitchFamily="34" charset="0"/>
+                              </a:rPr>
+                              <m:t>𝑦</m:t>
+                            </m:r>
+                          </m:sub>
+                        </m:sSub>
+                      </m:oMath>
+                    </m:oMathPara>
+                  </a14:m>
+                  <a:endParaRPr lang="en-US" sz="2000" dirty="0" smtClean="0">
+                    <a:latin typeface="Arial" panose="020B0604020202020204" pitchFamily="34" charset="0"/>
+                    <a:cs typeface="Arial" panose="020B0604020202020204" pitchFamily="34" charset="0"/>
+                  </a:endParaRPr>
+                </a:p>
+              </p:txBody>
+            </p:sp>
+          </mc:Choice>
+          <mc:Fallback>
+            <p:sp>
+              <p:nvSpPr>
+                <p:cNvPr id="27" name="TextBox 26"/>
+                <p:cNvSpPr txBox="1">
+                  <a:spLocks noRot="1" noChangeAspect="1" noMove="1" noResize="1" noEditPoints="1" noAdjustHandles="1" noChangeArrowheads="1" noChangeShapeType="1" noTextEdit="1"/>
+                </p:cNvSpPr>
+                <p:nvPr/>
+              </p:nvSpPr>
+              <p:spPr>
+                <a:xfrm>
+                  <a:off x="995448" y="1768802"/>
+                  <a:ext cx="353430" cy="331950"/>
+                </a:xfrm>
+                <a:prstGeom prst="rect">
+                  <a:avLst/>
+                </a:prstGeom>
+                <a:blipFill>
+                  <a:blip r:embed="rId8"/>
+                  <a:stretch>
+                    <a:fillRect l="-15517" r="-5172" b="-20000"/>
+                  </a:stretch>
+                </a:blipFill>
+              </p:spPr>
+              <p:txBody>
+                <a:bodyPr/>
+                <a:lstStyle/>
+                <a:p>
+                  <a:r>
+                    <a:rPr lang="en-US">
+                      <a:noFill/>
+                    </a:rPr>
+                    <a:t> </a:t>
+                  </a:r>
+                </a:p>
+              </p:txBody>
+            </p:sp>
+          </mc:Fallback>
+        </mc:AlternateContent>
+        <p:cxnSp>
+          <p:nvCxnSpPr>
+            <p:cNvPr id="28" name="Straight Connector 27"/>
+            <p:cNvCxnSpPr/>
+            <p:nvPr/>
+          </p:nvCxnSpPr>
+          <p:spPr>
+            <a:xfrm flipV="1">
+              <a:off x="2269883" y="1475700"/>
+              <a:ext cx="628319" cy="10343"/>
+            </a:xfrm>
+            <a:prstGeom prst="line">
+              <a:avLst/>
+            </a:prstGeom>
+            <a:ln w="19050">
+              <a:solidFill>
+                <a:schemeClr val="tx1"/>
+              </a:solidFill>
+              <a:prstDash val="sysDot"/>
+            </a:ln>
+          </p:spPr>
+          <p:style>
+            <a:lnRef idx="1">
+              <a:schemeClr val="accent1"/>
+            </a:lnRef>
+            <a:fillRef idx="0">
+              <a:schemeClr val="accent1"/>
+            </a:fillRef>
+            <a:effectRef idx="0">
+              <a:schemeClr val="accent1"/>
+            </a:effectRef>
+            <a:fontRef idx="minor">
+              <a:schemeClr val="tx1"/>
+            </a:fontRef>
+          </p:style>
+        </p:cxnSp>
+        <p:cxnSp>
+          <p:nvCxnSpPr>
+            <p:cNvPr id="34" name="Straight Arrow Connector 33"/>
+            <p:cNvCxnSpPr/>
+            <p:nvPr/>
+          </p:nvCxnSpPr>
+          <p:spPr>
+            <a:xfrm flipH="1" flipV="1">
+              <a:off x="1621084" y="1057383"/>
+              <a:ext cx="648799" cy="429674"/>
+            </a:xfrm>
+            <a:prstGeom prst="straightConnector1">
+              <a:avLst/>
+            </a:prstGeom>
+            <a:ln w="38100">
+              <a:solidFill>
+                <a:schemeClr val="tx1"/>
+              </a:solidFill>
+              <a:tailEnd type="triangle"/>
+            </a:ln>
+          </p:spPr>
+          <p:style>
+            <a:lnRef idx="1">
+              <a:schemeClr val="accent1"/>
+            </a:lnRef>
+            <a:fillRef idx="0">
+              <a:schemeClr val="accent1"/>
+            </a:fillRef>
+            <a:effectRef idx="0">
+              <a:schemeClr val="accent1"/>
+            </a:effectRef>
+            <a:fontRef idx="minor">
+              <a:schemeClr val="tx1"/>
+            </a:fontRef>
+          </p:style>
+        </p:cxnSp>
+        <mc:AlternateContent xmlns:mc="http://schemas.openxmlformats.org/markup-compatibility/2006">
+          <mc:Choice xmlns:a14="http://schemas.microsoft.com/office/drawing/2010/main" Requires="a14">
+            <p:sp>
+              <p:nvSpPr>
+                <p:cNvPr id="36" name="TextBox 35"/>
+                <p:cNvSpPr txBox="1"/>
+                <p:nvPr/>
+              </p:nvSpPr>
+              <p:spPr>
+                <a:xfrm>
+                  <a:off x="2234492" y="1166909"/>
+                  <a:ext cx="250773" cy="307777"/>
+                </a:xfrm>
+                <a:prstGeom prst="rect">
+                  <a:avLst/>
+                </a:prstGeom>
+                <a:noFill/>
+              </p:spPr>
+              <p:txBody>
+                <a:bodyPr wrap="none" lIns="0" tIns="0" rIns="0" bIns="0" rtlCol="0">
+                  <a:spAutoFit/>
+                </a:bodyPr>
+                <a:lstStyle/>
+                <a:p>
+                  <a14:m>
+                    <m:oMathPara xmlns:m="http://schemas.openxmlformats.org/officeDocument/2006/math">
+                      <m:oMathParaPr>
+                        <m:jc m:val="centerGroup"/>
+                      </m:oMathParaPr>
+                      <m:oMath xmlns:m="http://schemas.openxmlformats.org/officeDocument/2006/math">
+                        <m:r>
+                          <a:rPr lang="en-US" sz="2000" b="0" i="1" smtClean="0">
+                            <a:latin typeface="Cambria Math" panose="02040503050406030204" pitchFamily="18" charset="0"/>
+                            <a:cs typeface="Arial" panose="020B0604020202020204" pitchFamily="34" charset="0"/>
+                          </a:rPr>
+                          <m:t>𝜙</m:t>
+                        </m:r>
+                      </m:oMath>
+                    </m:oMathPara>
+                  </a14:m>
+                  <a:endParaRPr lang="en-US" sz="2000" dirty="0" smtClean="0">
+                    <a:latin typeface="Arial" panose="020B0604020202020204" pitchFamily="34" charset="0"/>
+                    <a:cs typeface="Arial" panose="020B0604020202020204" pitchFamily="34" charset="0"/>
+                  </a:endParaRPr>
+                </a:p>
+              </p:txBody>
+            </p:sp>
+          </mc:Choice>
+          <mc:Fallback>
+            <p:sp>
+              <p:nvSpPr>
+                <p:cNvPr id="36" name="TextBox 35"/>
+                <p:cNvSpPr txBox="1">
+                  <a:spLocks noRot="1" noChangeAspect="1" noMove="1" noResize="1" noEditPoints="1" noAdjustHandles="1" noChangeArrowheads="1" noChangeShapeType="1" noTextEdit="1"/>
+                </p:cNvSpPr>
+                <p:nvPr/>
+              </p:nvSpPr>
+              <p:spPr>
+                <a:xfrm>
+                  <a:off x="2234492" y="1166909"/>
+                  <a:ext cx="250773" cy="307777"/>
+                </a:xfrm>
+                <a:prstGeom prst="rect">
+                  <a:avLst/>
+                </a:prstGeom>
+                <a:blipFill>
+                  <a:blip r:embed="rId9"/>
+                  <a:stretch>
+                    <a:fillRect l="-31707" r="-31707" b="-38000"/>
+                  </a:stretch>
+                </a:blipFill>
+              </p:spPr>
+              <p:txBody>
+                <a:bodyPr/>
+                <a:lstStyle/>
+                <a:p>
+                  <a:r>
+                    <a:rPr lang="en-US">
+                      <a:noFill/>
+                    </a:rPr>
+                    <a:t> </a:t>
+                  </a:r>
+                </a:p>
+              </p:txBody>
+            </p:sp>
+          </mc:Fallback>
+        </mc:AlternateContent>
+        <p:sp>
+          <p:nvSpPr>
+            <p:cNvPr id="37" name="Arc 36"/>
+            <p:cNvSpPr/>
+            <p:nvPr/>
+          </p:nvSpPr>
+          <p:spPr>
+            <a:xfrm>
+              <a:off x="2065148" y="1219583"/>
+              <a:ext cx="508000" cy="512234"/>
+            </a:xfrm>
+            <a:prstGeom prst="arc">
+              <a:avLst>
+                <a:gd name="adj1" fmla="val 12351431"/>
+                <a:gd name="adj2" fmla="val 0"/>
+              </a:avLst>
+            </a:prstGeom>
+            <a:ln w="19050">
+              <a:solidFill>
+                <a:schemeClr val="tx1"/>
+              </a:solidFill>
+              <a:prstDash val="sysDot"/>
+            </a:ln>
+          </p:spPr>
+          <p:style>
+            <a:lnRef idx="1">
+              <a:schemeClr val="accent1"/>
+            </a:lnRef>
+            <a:fillRef idx="0">
+              <a:schemeClr val="accent1"/>
+            </a:fillRef>
+            <a:effectRef idx="0">
+              <a:schemeClr val="accent1"/>
+            </a:effectRef>
+            <a:fontRef idx="minor">
+              <a:schemeClr val="tx1"/>
+            </a:fontRef>
+          </p:style>
+          <p:txBody>
+            <a:bodyPr rtlCol="0" anchor="ctr"/>
+            <a:lstStyle/>
+            <a:p>
+              <a:pPr algn="ctr"/>
+              <a:endParaRPr lang="en-US"/>
+            </a:p>
+          </p:txBody>
+        </p:sp>
+      </p:grpSp>
+      <p:grpSp>
+        <p:nvGrpSpPr>
+          <p:cNvPr id="93" name="Group 92"/>
+          <p:cNvGrpSpPr/>
+          <p:nvPr/>
+        </p:nvGrpSpPr>
+        <p:grpSpPr>
+          <a:xfrm>
+            <a:off x="3804555" y="591292"/>
+            <a:ext cx="3590741" cy="2146316"/>
+            <a:chOff x="3804555" y="591292"/>
+            <a:chExt cx="3590741" cy="2146316"/>
+          </a:xfrm>
+        </p:grpSpPr>
+        <p:grpSp>
+          <p:nvGrpSpPr>
+            <p:cNvPr id="40" name="Group 39"/>
+            <p:cNvGrpSpPr/>
+            <p:nvPr/>
+          </p:nvGrpSpPr>
+          <p:grpSpPr>
+            <a:xfrm>
+              <a:off x="3804555" y="591292"/>
+              <a:ext cx="2182785" cy="2146316"/>
+              <a:chOff x="1190506" y="680744"/>
+              <a:chExt cx="2182785" cy="2146316"/>
+            </a:xfrm>
+          </p:grpSpPr>
+          <p:cxnSp>
+            <p:nvCxnSpPr>
+              <p:cNvPr id="52" name="Straight Arrow Connector 51"/>
+              <p:cNvCxnSpPr/>
+              <p:nvPr/>
+            </p:nvCxnSpPr>
+            <p:spPr>
+              <a:xfrm flipV="1">
+                <a:off x="1516583" y="680744"/>
+                <a:ext cx="7684" cy="1859536"/>
+              </a:xfrm>
+              <a:prstGeom prst="straightConnector1">
+                <a:avLst/>
+              </a:prstGeom>
+              <a:ln w="38100">
+                <a:solidFill>
+                  <a:schemeClr val="tx1"/>
+                </a:solidFill>
+                <a:tailEnd type="triangle"/>
+              </a:ln>
+            </p:spPr>
+            <p:style>
+              <a:lnRef idx="1">
+                <a:schemeClr val="accent1"/>
+              </a:lnRef>
+              <a:fillRef idx="0">
+                <a:schemeClr val="accent1"/>
+              </a:fillRef>
+              <a:effectRef idx="0">
+                <a:schemeClr val="accent1"/>
+              </a:effectRef>
+              <a:fontRef idx="minor">
+                <a:schemeClr val="tx1"/>
+              </a:fontRef>
+            </p:style>
+          </p:cxnSp>
+          <p:cxnSp>
+            <p:nvCxnSpPr>
+              <p:cNvPr id="53" name="Straight Arrow Connector 52"/>
+              <p:cNvCxnSpPr/>
+              <p:nvPr/>
+            </p:nvCxnSpPr>
+            <p:spPr>
+              <a:xfrm flipV="1">
+                <a:off x="1498387" y="2526633"/>
+                <a:ext cx="1874904" cy="1"/>
+              </a:xfrm>
+              <a:prstGeom prst="straightConnector1">
+                <a:avLst/>
+              </a:prstGeom>
+              <a:ln w="38100">
+                <a:solidFill>
+                  <a:schemeClr val="tx1"/>
+                </a:solidFill>
+                <a:tailEnd type="triangle"/>
+              </a:ln>
+            </p:spPr>
+            <p:style>
+              <a:lnRef idx="1">
+                <a:schemeClr val="accent1"/>
+              </a:lnRef>
+              <a:fillRef idx="0">
+                <a:schemeClr val="accent1"/>
+              </a:fillRef>
+              <a:effectRef idx="0">
+                <a:schemeClr val="accent1"/>
+              </a:effectRef>
+              <a:fontRef idx="minor">
+                <a:schemeClr val="tx1"/>
+              </a:fontRef>
+            </p:style>
+          </p:cxnSp>
+          <mc:AlternateContent xmlns:mc="http://schemas.openxmlformats.org/markup-compatibility/2006" xmlns:a14="http://schemas.microsoft.com/office/drawing/2010/main">
+            <mc:Choice Requires="a14">
+              <p:sp>
+                <p:nvSpPr>
+                  <p:cNvPr id="54" name="Rectangle 53"/>
+                  <p:cNvSpPr/>
+                  <p:nvPr/>
+                </p:nvSpPr>
+                <p:spPr>
+                  <a:xfrm>
+                    <a:off x="2897675" y="2457728"/>
+                    <a:ext cx="367985" cy="369332"/>
+                  </a:xfrm>
+                  <a:prstGeom prst="rect">
+                    <a:avLst/>
+                  </a:prstGeom>
+                </p:spPr>
+                <p:txBody>
+                  <a:bodyPr wrap="none">
+                    <a:spAutoFit/>
+                  </a:bodyPr>
+                  <a:lstStyle/>
+                  <a:p>
+                    <a:pPr/>
+                    <a14:m>
+                      <m:oMathPara xmlns:m="http://schemas.openxmlformats.org/officeDocument/2006/math">
+                        <m:oMathParaPr>
+                          <m:jc m:val="centerGroup"/>
+                        </m:oMathParaPr>
+                        <m:oMath xmlns:m="http://schemas.openxmlformats.org/officeDocument/2006/math">
+                          <m:r>
+                            <a:rPr lang="en-US" i="1">
+                              <a:latin typeface="Cambria Math" panose="02040503050406030204" pitchFamily="18" charset="0"/>
+                              <a:cs typeface="Arial" panose="020B0604020202020204" pitchFamily="34" charset="0"/>
+                            </a:rPr>
+                            <m:t>𝑥</m:t>
+                          </m:r>
+                        </m:oMath>
+                      </m:oMathPara>
+                    </a14:m>
+                    <a:endParaRPr lang="en-CA" dirty="0"/>
+                  </a:p>
+                </p:txBody>
+              </p:sp>
+            </mc:Choice>
+            <mc:Fallback xmlns="">
+              <p:sp>
+                <p:nvSpPr>
+                  <p:cNvPr id="12" name="Rectangle 11"/>
+                  <p:cNvSpPr>
+                    <a:spLocks noRot="1" noChangeAspect="1" noMove="1" noResize="1" noEditPoints="1" noAdjustHandles="1" noChangeArrowheads="1" noChangeShapeType="1" noTextEdit="1"/>
+                  </p:cNvSpPr>
+                  <p:nvPr/>
+                </p:nvSpPr>
+                <p:spPr>
+                  <a:xfrm>
+                    <a:off x="2897675" y="2457728"/>
+                    <a:ext cx="367985" cy="369332"/>
+                  </a:xfrm>
+                  <a:prstGeom prst="rect">
+                    <a:avLst/>
+                  </a:prstGeom>
+                  <a:blipFill rotWithShape="0">
+                    <a:blip r:embed="rId2"/>
+                    <a:stretch>
+                      <a:fillRect/>
+                    </a:stretch>
+                  </a:blipFill>
+                </p:spPr>
+                <p:txBody>
+                  <a:bodyPr/>
+                  <a:lstStyle/>
+                  <a:p>
+                    <a:r>
+                      <a:rPr lang="en-CA">
+                        <a:noFill/>
+                      </a:rPr>
+                      <a:t> </a:t>
+                    </a:r>
+                  </a:p>
+                </p:txBody>
+              </p:sp>
+            </mc:Fallback>
+          </mc:AlternateContent>
+          <mc:AlternateContent xmlns:mc="http://schemas.openxmlformats.org/markup-compatibility/2006" xmlns:a14="http://schemas.microsoft.com/office/drawing/2010/main">
+            <mc:Choice Requires="a14">
+              <p:sp>
+                <p:nvSpPr>
+                  <p:cNvPr id="55" name="Rectangle 54"/>
+                  <p:cNvSpPr/>
+                  <p:nvPr/>
+                </p:nvSpPr>
+                <p:spPr>
+                  <a:xfrm>
+                    <a:off x="1190506" y="790545"/>
+                    <a:ext cx="371384" cy="369332"/>
+                  </a:xfrm>
+                  <a:prstGeom prst="rect">
+                    <a:avLst/>
+                  </a:prstGeom>
+                </p:spPr>
+                <p:txBody>
+                  <a:bodyPr wrap="none">
+                    <a:spAutoFit/>
+                  </a:bodyPr>
+                  <a:lstStyle/>
+                  <a:p>
+                    <a:pPr/>
+                    <a14:m>
+                      <m:oMathPara xmlns:m="http://schemas.openxmlformats.org/officeDocument/2006/math">
+                        <m:oMathParaPr>
+                          <m:jc m:val="centerGroup"/>
+                        </m:oMathParaPr>
+                        <m:oMath xmlns:m="http://schemas.openxmlformats.org/officeDocument/2006/math">
+                          <m:r>
+                            <a:rPr lang="en-US" b="0" i="1" smtClean="0">
+                              <a:latin typeface="Cambria Math" panose="02040503050406030204" pitchFamily="18" charset="0"/>
+                            </a:rPr>
+                            <m:t>𝑦</m:t>
+                          </m:r>
+                        </m:oMath>
+                      </m:oMathPara>
+                    </a14:m>
+                    <a:endParaRPr lang="en-CA" dirty="0"/>
+                  </a:p>
+                </p:txBody>
+              </p:sp>
+            </mc:Choice>
+            <mc:Fallback xmlns="">
+              <p:sp>
+                <p:nvSpPr>
+                  <p:cNvPr id="13" name="Rectangle 12"/>
+                  <p:cNvSpPr>
+                    <a:spLocks noRot="1" noChangeAspect="1" noMove="1" noResize="1" noEditPoints="1" noAdjustHandles="1" noChangeArrowheads="1" noChangeShapeType="1" noTextEdit="1"/>
+                  </p:cNvSpPr>
+                  <p:nvPr/>
+                </p:nvSpPr>
+                <p:spPr>
+                  <a:xfrm>
+                    <a:off x="1190506" y="790545"/>
+                    <a:ext cx="371384" cy="369332"/>
+                  </a:xfrm>
+                  <a:prstGeom prst="rect">
+                    <a:avLst/>
+                  </a:prstGeom>
+                  <a:blipFill rotWithShape="0">
+                    <a:blip r:embed="rId3"/>
+                    <a:stretch>
+                      <a:fillRect b="-6557"/>
+                    </a:stretch>
+                  </a:blipFill>
+                </p:spPr>
+                <p:txBody>
+                  <a:bodyPr/>
+                  <a:lstStyle/>
+                  <a:p>
+                    <a:r>
+                      <a:rPr lang="en-CA">
+                        <a:noFill/>
+                      </a:rPr>
+                      <a:t> </a:t>
+                    </a:r>
+                  </a:p>
+                </p:txBody>
+              </p:sp>
+            </mc:Fallback>
+          </mc:AlternateContent>
+          <mc:AlternateContent xmlns:mc="http://schemas.openxmlformats.org/markup-compatibility/2006" xmlns:a14="http://schemas.microsoft.com/office/drawing/2010/main">
+            <mc:Choice Requires="a14">
+              <p:sp>
+                <p:nvSpPr>
+                  <p:cNvPr id="56" name="Rectangle 55"/>
+                  <p:cNvSpPr/>
+                  <p:nvPr/>
+                </p:nvSpPr>
+                <p:spPr>
+                  <a:xfrm>
+                    <a:off x="1205483" y="2447020"/>
+                    <a:ext cx="367985" cy="369332"/>
+                  </a:xfrm>
+                  <a:prstGeom prst="rect">
+                    <a:avLst/>
+                  </a:prstGeom>
+                </p:spPr>
+                <p:txBody>
+                  <a:bodyPr wrap="none">
+                    <a:spAutoFit/>
+                  </a:bodyPr>
+                  <a:lstStyle/>
+                  <a:p>
+                    <a:pPr/>
+                    <a14:m>
+                      <m:oMathPara xmlns:m="http://schemas.openxmlformats.org/officeDocument/2006/math">
+                        <m:oMathParaPr>
+                          <m:jc m:val="centerGroup"/>
+                        </m:oMathParaPr>
+                        <m:oMath xmlns:m="http://schemas.openxmlformats.org/officeDocument/2006/math">
+                          <m:r>
+                            <a:rPr lang="en-US" b="0" i="1" smtClean="0">
+                              <a:latin typeface="Cambria Math" panose="02040503050406030204" pitchFamily="18" charset="0"/>
+                              <a:cs typeface="Arial" panose="020B0604020202020204" pitchFamily="34" charset="0"/>
+                            </a:rPr>
+                            <m:t>0</m:t>
+                          </m:r>
+                        </m:oMath>
+                      </m:oMathPara>
+                    </a14:m>
+                    <a:endParaRPr lang="en-CA" dirty="0"/>
+                  </a:p>
+                </p:txBody>
+              </p:sp>
+            </mc:Choice>
+            <mc:Fallback xmlns="">
+              <p:sp>
+                <p:nvSpPr>
+                  <p:cNvPr id="14" name="Rectangle 13"/>
+                  <p:cNvSpPr>
+                    <a:spLocks noRot="1" noChangeAspect="1" noMove="1" noResize="1" noEditPoints="1" noAdjustHandles="1" noChangeArrowheads="1" noChangeShapeType="1" noTextEdit="1"/>
+                  </p:cNvSpPr>
+                  <p:nvPr/>
+                </p:nvSpPr>
+                <p:spPr>
+                  <a:xfrm>
+                    <a:off x="1205483" y="2447020"/>
+                    <a:ext cx="367985" cy="369332"/>
+                  </a:xfrm>
+                  <a:prstGeom prst="rect">
+                    <a:avLst/>
+                  </a:prstGeom>
+                  <a:blipFill rotWithShape="0">
+                    <a:blip r:embed="rId4"/>
+                    <a:stretch>
+                      <a:fillRect/>
+                    </a:stretch>
+                  </a:blipFill>
+                </p:spPr>
+                <p:txBody>
+                  <a:bodyPr/>
+                  <a:lstStyle/>
+                  <a:p>
+                    <a:r>
+                      <a:rPr lang="en-CA">
+                        <a:noFill/>
+                      </a:rPr>
+                      <a:t> </a:t>
+                    </a:r>
+                  </a:p>
+                </p:txBody>
+              </p:sp>
+            </mc:Fallback>
+          </mc:AlternateContent>
+        </p:grpSp>
+        <p:cxnSp>
+          <p:nvCxnSpPr>
+            <p:cNvPr id="41" name="Straight Connector 40"/>
+            <p:cNvCxnSpPr/>
+            <p:nvPr/>
+          </p:nvCxnSpPr>
+          <p:spPr>
+            <a:xfrm flipV="1">
+              <a:off x="4575692" y="1775431"/>
+              <a:ext cx="1031086" cy="16998"/>
+            </a:xfrm>
+            <a:prstGeom prst="line">
+              <a:avLst/>
+            </a:prstGeom>
+            <a:ln w="19050">
+              <a:solidFill>
+                <a:schemeClr val="tx1"/>
+              </a:solidFill>
+              <a:prstDash val="sysDot"/>
+            </a:ln>
+          </p:spPr>
+          <p:style>
+            <a:lnRef idx="1">
+              <a:schemeClr val="accent1"/>
+            </a:lnRef>
+            <a:fillRef idx="0">
+              <a:schemeClr val="accent1"/>
+            </a:fillRef>
+            <a:effectRef idx="0">
+              <a:schemeClr val="accent1"/>
+            </a:effectRef>
+            <a:fontRef idx="minor">
+              <a:schemeClr val="tx1"/>
+            </a:fontRef>
+          </p:style>
+        </p:cxnSp>
+        <p:cxnSp>
+          <p:nvCxnSpPr>
+            <p:cNvPr id="42" name="Straight Connector 41"/>
+            <p:cNvCxnSpPr/>
+            <p:nvPr/>
+          </p:nvCxnSpPr>
+          <p:spPr>
+            <a:xfrm>
+              <a:off x="5580005" y="1012130"/>
+              <a:ext cx="704" cy="771800"/>
+            </a:xfrm>
+            <a:prstGeom prst="line">
+              <a:avLst/>
+            </a:prstGeom>
+            <a:ln w="19050">
+              <a:solidFill>
+                <a:schemeClr val="tx1"/>
+              </a:solidFill>
+              <a:prstDash val="sysDot"/>
+            </a:ln>
+          </p:spPr>
+          <p:style>
+            <a:lnRef idx="1">
+              <a:schemeClr val="accent1"/>
+            </a:lnRef>
+            <a:fillRef idx="0">
+              <a:schemeClr val="accent1"/>
+            </a:fillRef>
+            <a:effectRef idx="0">
+              <a:schemeClr val="accent1"/>
+            </a:effectRef>
+            <a:fontRef idx="minor">
+              <a:schemeClr val="tx1"/>
+            </a:fontRef>
+          </p:style>
+        </p:cxnSp>
+        <p:cxnSp>
+          <p:nvCxnSpPr>
+            <p:cNvPr id="43" name="Straight Arrow Connector 42"/>
+            <p:cNvCxnSpPr/>
+            <p:nvPr/>
+          </p:nvCxnSpPr>
+          <p:spPr>
+            <a:xfrm flipV="1">
+              <a:off x="4585641" y="1215289"/>
+              <a:ext cx="270680" cy="560142"/>
+            </a:xfrm>
+            <a:prstGeom prst="straightConnector1">
+              <a:avLst/>
+            </a:prstGeom>
+            <a:ln w="38100">
+              <a:solidFill>
+                <a:schemeClr val="tx1"/>
+              </a:solidFill>
+              <a:tailEnd type="triangle"/>
+            </a:ln>
+          </p:spPr>
+          <p:style>
+            <a:lnRef idx="1">
+              <a:schemeClr val="accent1"/>
+            </a:lnRef>
+            <a:fillRef idx="0">
+              <a:schemeClr val="accent1"/>
+            </a:fillRef>
+            <a:effectRef idx="0">
+              <a:schemeClr val="accent1"/>
+            </a:effectRef>
+            <a:fontRef idx="minor">
+              <a:schemeClr val="tx1"/>
+            </a:fontRef>
+          </p:style>
+        </p:cxnSp>
+        <mc:AlternateContent xmlns:mc="http://schemas.openxmlformats.org/markup-compatibility/2006">
+          <mc:Choice xmlns:a14="http://schemas.microsoft.com/office/drawing/2010/main" Requires="a14">
+            <p:sp>
+              <p:nvSpPr>
+                <p:cNvPr id="44" name="Rectangle 43"/>
+                <p:cNvSpPr/>
+                <p:nvPr/>
+              </p:nvSpPr>
+              <p:spPr>
+                <a:xfrm>
+                  <a:off x="4357262" y="1240693"/>
+                  <a:ext cx="371448" cy="369332"/>
+                </a:xfrm>
+                <a:prstGeom prst="rect">
+                  <a:avLst/>
+                </a:prstGeom>
+              </p:spPr>
+              <p:txBody>
+                <a:bodyPr wrap="none">
+                  <a:spAutoFit/>
+                </a:bodyPr>
+                <a:lstStyle/>
+                <a:p>
+                  <a:pPr/>
+                  <a14:m>
+                    <m:oMathPara xmlns:m="http://schemas.openxmlformats.org/officeDocument/2006/math">
+                      <m:oMathParaPr>
+                        <m:jc m:val="centerGroup"/>
+                      </m:oMathParaPr>
+                      <m:oMath xmlns:m="http://schemas.openxmlformats.org/officeDocument/2006/math">
+                        <m:acc>
+                          <m:accPr>
+                            <m:chr m:val="⃗"/>
+                            <m:ctrlPr>
+                              <a:rPr lang="en-US" b="0" i="1" smtClean="0">
+                                <a:latin typeface="Cambria Math" panose="02040503050406030204" pitchFamily="18" charset="0"/>
+                                <a:cs typeface="Arial" panose="020B0604020202020204" pitchFamily="34" charset="0"/>
+                              </a:rPr>
+                            </m:ctrlPr>
+                          </m:accPr>
+                          <m:e>
+                            <m:r>
+                              <a:rPr lang="en-US" b="0" i="1" smtClean="0">
+                                <a:latin typeface="Cambria Math" panose="02040503050406030204" pitchFamily="18" charset="0"/>
+                                <a:cs typeface="Arial" panose="020B0604020202020204" pitchFamily="34" charset="0"/>
+                              </a:rPr>
+                              <m:t>𝑎</m:t>
+                            </m:r>
+                          </m:e>
+                        </m:acc>
+                      </m:oMath>
+                    </m:oMathPara>
+                  </a14:m>
+                  <a:endParaRPr lang="en-CA" dirty="0"/>
+                </a:p>
+              </p:txBody>
+            </p:sp>
+          </mc:Choice>
+          <mc:Fallback>
+            <p:sp>
+              <p:nvSpPr>
+                <p:cNvPr id="44" name="Rectangle 43"/>
+                <p:cNvSpPr>
+                  <a:spLocks noRot="1" noChangeAspect="1" noMove="1" noResize="1" noEditPoints="1" noAdjustHandles="1" noChangeArrowheads="1" noChangeShapeType="1" noTextEdit="1"/>
+                </p:cNvSpPr>
+                <p:nvPr/>
+              </p:nvSpPr>
+              <p:spPr>
+                <a:xfrm>
+                  <a:off x="4357262" y="1240693"/>
+                  <a:ext cx="371448" cy="369332"/>
+                </a:xfrm>
+                <a:prstGeom prst="rect">
+                  <a:avLst/>
+                </a:prstGeom>
+                <a:blipFill>
+                  <a:blip r:embed="rId10"/>
+                  <a:stretch>
+                    <a:fillRect t="-23333" r="-24590"/>
+                  </a:stretch>
+                </a:blipFill>
+              </p:spPr>
+              <p:txBody>
+                <a:bodyPr/>
+                <a:lstStyle/>
+                <a:p>
+                  <a:r>
+                    <a:rPr lang="en-US">
+                      <a:noFill/>
+                    </a:rPr>
+                    <a:t> </a:t>
+                  </a:r>
+                </a:p>
+              </p:txBody>
+            </p:sp>
+          </mc:Fallback>
+        </mc:AlternateContent>
+        <mc:AlternateContent xmlns:mc="http://schemas.openxmlformats.org/markup-compatibility/2006">
+          <mc:Choice xmlns:a14="http://schemas.microsoft.com/office/drawing/2010/main" Requires="a14">
+            <p:sp>
+              <p:nvSpPr>
+                <p:cNvPr id="45" name="Rectangle 44"/>
+                <p:cNvSpPr/>
+                <p:nvPr/>
+              </p:nvSpPr>
+              <p:spPr>
+                <a:xfrm>
+                  <a:off x="4876500" y="701776"/>
+                  <a:ext cx="377924" cy="410305"/>
+                </a:xfrm>
+                <a:prstGeom prst="rect">
+                  <a:avLst/>
+                </a:prstGeom>
+              </p:spPr>
+              <p:txBody>
+                <a:bodyPr wrap="none">
+                  <a:spAutoFit/>
+                </a:bodyPr>
+                <a:lstStyle/>
+                <a:p>
+                  <a:pPr/>
+                  <a14:m>
+                    <m:oMathPara xmlns:m="http://schemas.openxmlformats.org/officeDocument/2006/math">
+                      <m:oMathParaPr>
+                        <m:jc m:val="centerGroup"/>
+                      </m:oMathParaPr>
+                      <m:oMath xmlns:m="http://schemas.openxmlformats.org/officeDocument/2006/math">
+                        <m:acc>
+                          <m:accPr>
+                            <m:chr m:val="⃗"/>
+                            <m:ctrlPr>
+                              <a:rPr lang="en-US" b="0" i="1" smtClean="0">
+                                <a:latin typeface="Cambria Math" panose="02040503050406030204" pitchFamily="18" charset="0"/>
+                                <a:cs typeface="Arial" panose="020B0604020202020204" pitchFamily="34" charset="0"/>
+                              </a:rPr>
+                            </m:ctrlPr>
+                          </m:accPr>
+                          <m:e>
+                            <m:r>
+                              <a:rPr lang="en-US" b="0" i="1" smtClean="0">
+                                <a:latin typeface="Cambria Math" panose="02040503050406030204" pitchFamily="18" charset="0"/>
+                                <a:cs typeface="Arial" panose="020B0604020202020204" pitchFamily="34" charset="0"/>
+                              </a:rPr>
+                              <m:t>𝑏</m:t>
+                            </m:r>
+                          </m:e>
+                        </m:acc>
+                      </m:oMath>
+                    </m:oMathPara>
+                  </a14:m>
+                  <a:endParaRPr lang="en-CA" dirty="0"/>
+                </a:p>
+              </p:txBody>
+            </p:sp>
+          </mc:Choice>
+          <mc:Fallback>
+            <p:sp>
+              <p:nvSpPr>
+                <p:cNvPr id="45" name="Rectangle 44"/>
+                <p:cNvSpPr>
+                  <a:spLocks noRot="1" noChangeAspect="1" noMove="1" noResize="1" noEditPoints="1" noAdjustHandles="1" noChangeArrowheads="1" noChangeShapeType="1" noTextEdit="1"/>
+                </p:cNvSpPr>
+                <p:nvPr/>
+              </p:nvSpPr>
+              <p:spPr>
+                <a:xfrm>
+                  <a:off x="4876500" y="701776"/>
+                  <a:ext cx="377924" cy="410305"/>
+                </a:xfrm>
+                <a:prstGeom prst="rect">
+                  <a:avLst/>
+                </a:prstGeom>
+                <a:blipFill>
+                  <a:blip r:embed="rId11"/>
+                  <a:stretch>
+                    <a:fillRect/>
+                  </a:stretch>
+                </a:blipFill>
+              </p:spPr>
+              <p:txBody>
+                <a:bodyPr/>
+                <a:lstStyle/>
+                <a:p>
+                  <a:r>
+                    <a:rPr lang="en-US">
+                      <a:noFill/>
+                    </a:rPr>
+                    <a:t> </a:t>
+                  </a:r>
+                </a:p>
+              </p:txBody>
+            </p:sp>
+          </mc:Fallback>
+        </mc:AlternateContent>
+        <p:cxnSp>
+          <p:nvCxnSpPr>
+            <p:cNvPr id="49" name="Straight Arrow Connector 48"/>
+            <p:cNvCxnSpPr/>
+            <p:nvPr/>
+          </p:nvCxnSpPr>
+          <p:spPr>
+            <a:xfrm flipV="1">
+              <a:off x="4856321" y="1012130"/>
+              <a:ext cx="736676" cy="203159"/>
+            </a:xfrm>
+            <a:prstGeom prst="straightConnector1">
+              <a:avLst/>
+            </a:prstGeom>
+            <a:ln w="38100">
+              <a:solidFill>
+                <a:schemeClr val="tx1"/>
+              </a:solidFill>
+              <a:tailEnd type="triangle"/>
+            </a:ln>
+          </p:spPr>
+          <p:style>
+            <a:lnRef idx="1">
+              <a:schemeClr val="accent1"/>
+            </a:lnRef>
+            <a:fillRef idx="0">
+              <a:schemeClr val="accent1"/>
+            </a:fillRef>
+            <a:effectRef idx="0">
+              <a:schemeClr val="accent1"/>
+            </a:effectRef>
+            <a:fontRef idx="minor">
+              <a:schemeClr val="tx1"/>
+            </a:fontRef>
+          </p:style>
+        </p:cxnSp>
+        <p:cxnSp>
+          <p:nvCxnSpPr>
+            <p:cNvPr id="62" name="Straight Arrow Connector 61"/>
+            <p:cNvCxnSpPr/>
+            <p:nvPr/>
+          </p:nvCxnSpPr>
+          <p:spPr>
+            <a:xfrm flipV="1">
+              <a:off x="4578925" y="1012130"/>
+              <a:ext cx="1014072" cy="773718"/>
+            </a:xfrm>
+            <a:prstGeom prst="straightConnector1">
+              <a:avLst/>
+            </a:prstGeom>
+            <a:ln w="38100">
+              <a:solidFill>
+                <a:schemeClr val="tx1"/>
+              </a:solidFill>
+              <a:tailEnd type="triangle"/>
+            </a:ln>
+          </p:spPr>
+          <p:style>
+            <a:lnRef idx="1">
+              <a:schemeClr val="accent1"/>
+            </a:lnRef>
+            <a:fillRef idx="0">
+              <a:schemeClr val="accent1"/>
+            </a:fillRef>
+            <a:effectRef idx="0">
+              <a:schemeClr val="accent1"/>
+            </a:effectRef>
+            <a:fontRef idx="minor">
+              <a:schemeClr val="tx1"/>
+            </a:fontRef>
+          </p:style>
+        </p:cxnSp>
+        <mc:AlternateContent xmlns:mc="http://schemas.openxmlformats.org/markup-compatibility/2006">
+          <mc:Choice xmlns:a14="http://schemas.microsoft.com/office/drawing/2010/main" Requires="a14">
+            <p:sp>
+              <p:nvSpPr>
+                <p:cNvPr id="66" name="Rectangle 65"/>
+                <p:cNvSpPr/>
+                <p:nvPr/>
+              </p:nvSpPr>
+              <p:spPr>
+                <a:xfrm>
+                  <a:off x="5109687" y="1269038"/>
+                  <a:ext cx="341439" cy="380247"/>
+                </a:xfrm>
+                <a:prstGeom prst="rect">
+                  <a:avLst/>
+                </a:prstGeom>
+              </p:spPr>
+              <p:txBody>
+                <a:bodyPr wrap="square">
+                  <a:spAutoFit/>
+                </a:bodyPr>
+                <a:lstStyle/>
+                <a:p>
+                  <a:pPr/>
+                  <a14:m>
+                    <m:oMathPara xmlns:m="http://schemas.openxmlformats.org/officeDocument/2006/math">
+                      <m:oMathParaPr>
+                        <m:jc m:val="centerGroup"/>
+                      </m:oMathParaPr>
+                      <m:oMath xmlns:m="http://schemas.openxmlformats.org/officeDocument/2006/math">
+                        <m:acc>
+                          <m:accPr>
+                            <m:chr m:val="⃗"/>
+                            <m:ctrlPr>
+                              <a:rPr lang="en-US" b="0" i="1" smtClean="0">
+                                <a:latin typeface="Cambria Math" panose="02040503050406030204" pitchFamily="18" charset="0"/>
+                                <a:cs typeface="Arial" panose="020B0604020202020204" pitchFamily="34" charset="0"/>
+                              </a:rPr>
+                            </m:ctrlPr>
+                          </m:accPr>
+                          <m:e>
+                            <m:r>
+                              <a:rPr lang="en-US" b="0" i="1" smtClean="0">
+                                <a:latin typeface="Cambria Math" panose="02040503050406030204" pitchFamily="18" charset="0"/>
+                                <a:cs typeface="Arial" panose="020B0604020202020204" pitchFamily="34" charset="0"/>
+                              </a:rPr>
+                              <m:t>𝑐</m:t>
+                            </m:r>
+                          </m:e>
+                        </m:acc>
+                      </m:oMath>
+                    </m:oMathPara>
+                  </a14:m>
+                  <a:endParaRPr lang="en-CA" dirty="0"/>
+                </a:p>
+              </p:txBody>
+            </p:sp>
+          </mc:Choice>
+          <mc:Fallback>
+            <p:sp>
+              <p:nvSpPr>
+                <p:cNvPr id="66" name="Rectangle 65"/>
+                <p:cNvSpPr>
+                  <a:spLocks noRot="1" noChangeAspect="1" noMove="1" noResize="1" noEditPoints="1" noAdjustHandles="1" noChangeArrowheads="1" noChangeShapeType="1" noTextEdit="1"/>
+                </p:cNvSpPr>
+                <p:nvPr/>
+              </p:nvSpPr>
+              <p:spPr>
+                <a:xfrm>
+                  <a:off x="5109687" y="1269038"/>
+                  <a:ext cx="341439" cy="380247"/>
+                </a:xfrm>
+                <a:prstGeom prst="rect">
+                  <a:avLst/>
+                </a:prstGeom>
+                <a:blipFill>
+                  <a:blip r:embed="rId12"/>
+                  <a:stretch>
+                    <a:fillRect t="-22222" r="-28571"/>
+                  </a:stretch>
+                </a:blipFill>
+              </p:spPr>
+              <p:txBody>
+                <a:bodyPr/>
+                <a:lstStyle/>
+                <a:p>
+                  <a:r>
+                    <a:rPr lang="en-US">
+                      <a:noFill/>
+                    </a:rPr>
+                    <a:t> </a:t>
+                  </a:r>
+                </a:p>
+              </p:txBody>
+            </p:sp>
+          </mc:Fallback>
+        </mc:AlternateContent>
+        <mc:AlternateContent xmlns:mc="http://schemas.openxmlformats.org/markup-compatibility/2006">
+          <mc:Choice xmlns:a14="http://schemas.microsoft.com/office/drawing/2010/main" Requires="a14">
+            <p:sp>
+              <p:nvSpPr>
+                <p:cNvPr id="75" name="Rectangle 74"/>
+                <p:cNvSpPr/>
+                <p:nvPr/>
+              </p:nvSpPr>
+              <p:spPr>
+                <a:xfrm>
+                  <a:off x="4543883" y="1705594"/>
+                  <a:ext cx="412036" cy="307777"/>
+                </a:xfrm>
+                <a:prstGeom prst="rect">
+                  <a:avLst/>
+                </a:prstGeom>
+              </p:spPr>
+              <p:txBody>
+                <a:bodyPr wrap="none">
+                  <a:spAutoFit/>
+                </a:bodyPr>
+                <a:lstStyle/>
+                <a:p>
+                  <a14:m>
+                    <m:oMathPara xmlns:m="http://schemas.openxmlformats.org/officeDocument/2006/math">
+                      <m:oMathParaPr>
+                        <m:jc m:val="centerGroup"/>
+                      </m:oMathParaPr>
+                      <m:oMath xmlns:m="http://schemas.openxmlformats.org/officeDocument/2006/math">
+                        <m:sSub>
+                          <m:sSubPr>
+                            <m:ctrlPr>
+                              <a:rPr lang="en-US" sz="1400" b="0" i="1" smtClean="0">
+                                <a:latin typeface="Cambria Math" panose="02040503050406030204" pitchFamily="18" charset="0"/>
+                                <a:cs typeface="Arial" panose="020B0604020202020204" pitchFamily="34" charset="0"/>
+                              </a:rPr>
+                            </m:ctrlPr>
+                          </m:sSubPr>
+                          <m:e>
+                            <m:r>
+                              <a:rPr lang="en-US" sz="1400" b="0" i="1" smtClean="0">
+                                <a:latin typeface="Cambria Math" panose="02040503050406030204" pitchFamily="18" charset="0"/>
+                                <a:cs typeface="Arial" panose="020B0604020202020204" pitchFamily="34" charset="0"/>
+                              </a:rPr>
+                              <m:t>𝑎</m:t>
+                            </m:r>
+                          </m:e>
+                          <m:sub>
+                            <m:r>
+                              <a:rPr lang="en-US" sz="1400" b="0" i="1" smtClean="0">
+                                <a:latin typeface="Cambria Math" panose="02040503050406030204" pitchFamily="18" charset="0"/>
+                                <a:cs typeface="Arial" panose="020B0604020202020204" pitchFamily="34" charset="0"/>
+                              </a:rPr>
+                              <m:t>𝑥</m:t>
+                            </m:r>
+                          </m:sub>
+                        </m:sSub>
+                      </m:oMath>
+                    </m:oMathPara>
+                  </a14:m>
+                  <a:endParaRPr lang="en-US" sz="1400" dirty="0"/>
+                </a:p>
+              </p:txBody>
+            </p:sp>
+          </mc:Choice>
+          <mc:Fallback>
+            <p:sp>
+              <p:nvSpPr>
+                <p:cNvPr id="75" name="Rectangle 74"/>
+                <p:cNvSpPr>
+                  <a:spLocks noRot="1" noChangeAspect="1" noMove="1" noResize="1" noEditPoints="1" noAdjustHandles="1" noChangeArrowheads="1" noChangeShapeType="1" noTextEdit="1"/>
+                </p:cNvSpPr>
+                <p:nvPr/>
+              </p:nvSpPr>
+              <p:spPr>
+                <a:xfrm>
+                  <a:off x="4543883" y="1705594"/>
+                  <a:ext cx="412036" cy="307777"/>
+                </a:xfrm>
+                <a:prstGeom prst="rect">
+                  <a:avLst/>
+                </a:prstGeom>
+                <a:blipFill>
+                  <a:blip r:embed="rId13"/>
+                  <a:stretch>
+                    <a:fillRect/>
+                  </a:stretch>
+                </a:blipFill>
+              </p:spPr>
+              <p:txBody>
+                <a:bodyPr/>
+                <a:lstStyle/>
+                <a:p>
+                  <a:r>
+                    <a:rPr lang="en-US">
+                      <a:noFill/>
+                    </a:rPr>
+                    <a:t> </a:t>
+                  </a:r>
+                </a:p>
+              </p:txBody>
+            </p:sp>
+          </mc:Fallback>
+        </mc:AlternateContent>
+        <mc:AlternateContent xmlns:mc="http://schemas.openxmlformats.org/markup-compatibility/2006">
+          <mc:Choice xmlns:a14="http://schemas.microsoft.com/office/drawing/2010/main" Requires="a14">
+            <p:sp>
+              <p:nvSpPr>
+                <p:cNvPr id="76" name="Rectangle 75"/>
+                <p:cNvSpPr/>
+                <p:nvPr/>
+              </p:nvSpPr>
+              <p:spPr>
+                <a:xfrm>
+                  <a:off x="5077444" y="1737108"/>
+                  <a:ext cx="403124" cy="307777"/>
+                </a:xfrm>
+                <a:prstGeom prst="rect">
+                  <a:avLst/>
+                </a:prstGeom>
+              </p:spPr>
+              <p:txBody>
+                <a:bodyPr wrap="none">
+                  <a:spAutoFit/>
+                </a:bodyPr>
+                <a:lstStyle/>
+                <a:p>
+                  <a14:m>
+                    <m:oMathPara xmlns:m="http://schemas.openxmlformats.org/officeDocument/2006/math">
+                      <m:oMathParaPr>
+                        <m:jc m:val="centerGroup"/>
+                      </m:oMathParaPr>
+                      <m:oMath xmlns:m="http://schemas.openxmlformats.org/officeDocument/2006/math">
+                        <m:sSub>
+                          <m:sSubPr>
+                            <m:ctrlPr>
+                              <a:rPr lang="en-US" sz="1400" b="0" i="1" smtClean="0">
+                                <a:latin typeface="Cambria Math" panose="02040503050406030204" pitchFamily="18" charset="0"/>
+                                <a:cs typeface="Arial" panose="020B0604020202020204" pitchFamily="34" charset="0"/>
+                              </a:rPr>
+                            </m:ctrlPr>
+                          </m:sSubPr>
+                          <m:e>
+                            <m:r>
+                              <a:rPr lang="en-US" sz="1400" b="0" i="1" smtClean="0">
+                                <a:latin typeface="Cambria Math" panose="02040503050406030204" pitchFamily="18" charset="0"/>
+                                <a:cs typeface="Arial" panose="020B0604020202020204" pitchFamily="34" charset="0"/>
+                              </a:rPr>
+                              <m:t>𝑏</m:t>
+                            </m:r>
+                          </m:e>
+                          <m:sub>
+                            <m:r>
+                              <a:rPr lang="en-US" sz="1400" b="0" i="1" smtClean="0">
+                                <a:latin typeface="Cambria Math" panose="02040503050406030204" pitchFamily="18" charset="0"/>
+                                <a:cs typeface="Arial" panose="020B0604020202020204" pitchFamily="34" charset="0"/>
+                              </a:rPr>
+                              <m:t>𝑥</m:t>
+                            </m:r>
+                          </m:sub>
+                        </m:sSub>
+                      </m:oMath>
+                    </m:oMathPara>
+                  </a14:m>
+                  <a:endParaRPr lang="en-US" sz="1400" dirty="0"/>
+                </a:p>
+              </p:txBody>
+            </p:sp>
+          </mc:Choice>
+          <mc:Fallback>
+            <p:sp>
+              <p:nvSpPr>
+                <p:cNvPr id="76" name="Rectangle 75"/>
+                <p:cNvSpPr>
+                  <a:spLocks noRot="1" noChangeAspect="1" noMove="1" noResize="1" noEditPoints="1" noAdjustHandles="1" noChangeArrowheads="1" noChangeShapeType="1" noTextEdit="1"/>
+                </p:cNvSpPr>
+                <p:nvPr/>
+              </p:nvSpPr>
+              <p:spPr>
+                <a:xfrm>
+                  <a:off x="5077444" y="1737108"/>
+                  <a:ext cx="403124" cy="307777"/>
+                </a:xfrm>
+                <a:prstGeom prst="rect">
+                  <a:avLst/>
+                </a:prstGeom>
+                <a:blipFill>
+                  <a:blip r:embed="rId14"/>
+                  <a:stretch>
+                    <a:fillRect/>
+                  </a:stretch>
+                </a:blipFill>
+              </p:spPr>
+              <p:txBody>
+                <a:bodyPr/>
+                <a:lstStyle/>
+                <a:p>
+                  <a:r>
+                    <a:rPr lang="en-US">
+                      <a:noFill/>
+                    </a:rPr>
+                    <a:t> </a:t>
+                  </a:r>
+                </a:p>
+              </p:txBody>
+            </p:sp>
+          </mc:Fallback>
+        </mc:AlternateContent>
+        <p:cxnSp>
+          <p:nvCxnSpPr>
+            <p:cNvPr id="77" name="Straight Connector 76"/>
+            <p:cNvCxnSpPr/>
+            <p:nvPr/>
+          </p:nvCxnSpPr>
+          <p:spPr>
+            <a:xfrm>
+              <a:off x="4849162" y="1205142"/>
+              <a:ext cx="890" cy="586569"/>
+            </a:xfrm>
+            <a:prstGeom prst="line">
+              <a:avLst/>
+            </a:prstGeom>
+            <a:ln w="19050">
+              <a:solidFill>
+                <a:schemeClr val="tx1"/>
+              </a:solidFill>
+              <a:prstDash val="sysDot"/>
+            </a:ln>
+          </p:spPr>
+          <p:style>
+            <a:lnRef idx="1">
+              <a:schemeClr val="accent1"/>
+            </a:lnRef>
+            <a:fillRef idx="0">
+              <a:schemeClr val="accent1"/>
+            </a:fillRef>
+            <a:effectRef idx="0">
+              <a:schemeClr val="accent1"/>
+            </a:effectRef>
+            <a:fontRef idx="minor">
+              <a:schemeClr val="tx1"/>
+            </a:fontRef>
+          </p:style>
+        </p:cxnSp>
+        <p:cxnSp>
+          <p:nvCxnSpPr>
+            <p:cNvPr id="79" name="Straight Connector 78"/>
+            <p:cNvCxnSpPr/>
+            <p:nvPr/>
+          </p:nvCxnSpPr>
+          <p:spPr>
+            <a:xfrm flipV="1">
+              <a:off x="4881588" y="1221571"/>
+              <a:ext cx="698417" cy="9040"/>
+            </a:xfrm>
+            <a:prstGeom prst="line">
+              <a:avLst/>
+            </a:prstGeom>
+            <a:ln w="19050">
+              <a:solidFill>
+                <a:schemeClr val="tx1"/>
+              </a:solidFill>
+              <a:prstDash val="sysDot"/>
+            </a:ln>
+          </p:spPr>
+          <p:style>
+            <a:lnRef idx="1">
+              <a:schemeClr val="accent1"/>
+            </a:lnRef>
+            <a:fillRef idx="0">
+              <a:schemeClr val="accent1"/>
+            </a:fillRef>
+            <a:effectRef idx="0">
+              <a:schemeClr val="accent1"/>
+            </a:effectRef>
+            <a:fontRef idx="minor">
+              <a:schemeClr val="tx1"/>
+            </a:fontRef>
+          </p:style>
+        </p:cxnSp>
+        <mc:AlternateContent xmlns:mc="http://schemas.openxmlformats.org/markup-compatibility/2006">
+          <mc:Choice xmlns:a14="http://schemas.microsoft.com/office/drawing/2010/main" Requires="a14">
+            <p:sp>
+              <p:nvSpPr>
+                <p:cNvPr id="81" name="Rectangle 80"/>
+                <p:cNvSpPr/>
+                <p:nvPr/>
+              </p:nvSpPr>
+              <p:spPr>
+                <a:xfrm>
+                  <a:off x="5500475" y="1298745"/>
+                  <a:ext cx="418128" cy="324769"/>
+                </a:xfrm>
+                <a:prstGeom prst="rect">
+                  <a:avLst/>
+                </a:prstGeom>
+              </p:spPr>
+              <p:txBody>
+                <a:bodyPr wrap="none">
+                  <a:spAutoFit/>
+                </a:bodyPr>
+                <a:lstStyle/>
+                <a:p>
+                  <a14:m>
+                    <m:oMathPara xmlns:m="http://schemas.openxmlformats.org/officeDocument/2006/math">
+                      <m:oMathParaPr>
+                        <m:jc m:val="centerGroup"/>
+                      </m:oMathParaPr>
+                      <m:oMath xmlns:m="http://schemas.openxmlformats.org/officeDocument/2006/math">
+                        <m:sSub>
+                          <m:sSubPr>
+                            <m:ctrlPr>
+                              <a:rPr lang="en-US" sz="1400" b="0" i="1" smtClean="0">
+                                <a:latin typeface="Cambria Math" panose="02040503050406030204" pitchFamily="18" charset="0"/>
+                                <a:cs typeface="Arial" panose="020B0604020202020204" pitchFamily="34" charset="0"/>
+                              </a:rPr>
+                            </m:ctrlPr>
+                          </m:sSubPr>
+                          <m:e>
+                            <m:r>
+                              <a:rPr lang="en-US" sz="1400" i="1" smtClean="0">
+                                <a:latin typeface="Cambria Math" panose="02040503050406030204" pitchFamily="18" charset="0"/>
+                                <a:cs typeface="Arial" panose="020B0604020202020204" pitchFamily="34" charset="0"/>
+                              </a:rPr>
+                              <m:t>𝑎</m:t>
+                            </m:r>
+                          </m:e>
+                          <m:sub>
+                            <m:r>
+                              <a:rPr lang="en-US" sz="1400" b="0" i="1" smtClean="0">
+                                <a:latin typeface="Cambria Math" panose="02040503050406030204" pitchFamily="18" charset="0"/>
+                                <a:cs typeface="Arial" panose="020B0604020202020204" pitchFamily="34" charset="0"/>
+                              </a:rPr>
+                              <m:t>𝑦</m:t>
+                            </m:r>
+                          </m:sub>
+                        </m:sSub>
+                      </m:oMath>
+                    </m:oMathPara>
+                  </a14:m>
+                  <a:endParaRPr lang="en-US" sz="1400" dirty="0"/>
+                </a:p>
+              </p:txBody>
+            </p:sp>
+          </mc:Choice>
+          <mc:Fallback>
+            <p:sp>
+              <p:nvSpPr>
+                <p:cNvPr id="81" name="Rectangle 80"/>
+                <p:cNvSpPr>
+                  <a:spLocks noRot="1" noChangeAspect="1" noMove="1" noResize="1" noEditPoints="1" noAdjustHandles="1" noChangeArrowheads="1" noChangeShapeType="1" noTextEdit="1"/>
+                </p:cNvSpPr>
+                <p:nvPr/>
+              </p:nvSpPr>
+              <p:spPr>
+                <a:xfrm>
+                  <a:off x="5500475" y="1298745"/>
+                  <a:ext cx="418128" cy="324769"/>
+                </a:xfrm>
+                <a:prstGeom prst="rect">
+                  <a:avLst/>
+                </a:prstGeom>
+                <a:blipFill>
+                  <a:blip r:embed="rId15"/>
+                  <a:stretch>
+                    <a:fillRect/>
+                  </a:stretch>
+                </a:blipFill>
+              </p:spPr>
+              <p:txBody>
+                <a:bodyPr/>
+                <a:lstStyle/>
+                <a:p>
+                  <a:r>
+                    <a:rPr lang="en-US">
+                      <a:noFill/>
+                    </a:rPr>
+                    <a:t> </a:t>
+                  </a:r>
+                </a:p>
+              </p:txBody>
+            </p:sp>
+          </mc:Fallback>
+        </mc:AlternateContent>
+        <mc:AlternateContent xmlns:mc="http://schemas.openxmlformats.org/markup-compatibility/2006">
+          <mc:Choice xmlns:a14="http://schemas.microsoft.com/office/drawing/2010/main" Requires="a14">
+            <p:sp>
+              <p:nvSpPr>
+                <p:cNvPr id="82" name="Rectangle 81"/>
+                <p:cNvSpPr/>
+                <p:nvPr/>
+              </p:nvSpPr>
+              <p:spPr>
+                <a:xfrm>
+                  <a:off x="5507790" y="951458"/>
+                  <a:ext cx="409215" cy="324769"/>
+                </a:xfrm>
+                <a:prstGeom prst="rect">
+                  <a:avLst/>
+                </a:prstGeom>
+              </p:spPr>
+              <p:txBody>
+                <a:bodyPr wrap="none">
+                  <a:spAutoFit/>
+                </a:bodyPr>
+                <a:lstStyle/>
+                <a:p>
+                  <a14:m>
+                    <m:oMathPara xmlns:m="http://schemas.openxmlformats.org/officeDocument/2006/math">
+                      <m:oMathParaPr>
+                        <m:jc m:val="centerGroup"/>
+                      </m:oMathParaPr>
+                      <m:oMath xmlns:m="http://schemas.openxmlformats.org/officeDocument/2006/math">
+                        <m:sSub>
+                          <m:sSubPr>
+                            <m:ctrlPr>
+                              <a:rPr lang="en-US" sz="1400" b="0" i="1" smtClean="0">
+                                <a:latin typeface="Cambria Math" panose="02040503050406030204" pitchFamily="18" charset="0"/>
+                                <a:cs typeface="Arial" panose="020B0604020202020204" pitchFamily="34" charset="0"/>
+                              </a:rPr>
+                            </m:ctrlPr>
+                          </m:sSubPr>
+                          <m:e>
+                            <m:r>
+                              <a:rPr lang="en-US" sz="1400" b="0" i="1" smtClean="0">
+                                <a:latin typeface="Cambria Math" panose="02040503050406030204" pitchFamily="18" charset="0"/>
+                                <a:cs typeface="Arial" panose="020B0604020202020204" pitchFamily="34" charset="0"/>
+                              </a:rPr>
+                              <m:t>𝑏</m:t>
+                            </m:r>
+                          </m:e>
+                          <m:sub>
+                            <m:r>
+                              <a:rPr lang="en-US" sz="1400" b="0" i="1" smtClean="0">
+                                <a:latin typeface="Cambria Math" panose="02040503050406030204" pitchFamily="18" charset="0"/>
+                                <a:cs typeface="Arial" panose="020B0604020202020204" pitchFamily="34" charset="0"/>
+                              </a:rPr>
+                              <m:t>𝑦</m:t>
+                            </m:r>
+                          </m:sub>
+                        </m:sSub>
+                      </m:oMath>
+                    </m:oMathPara>
+                  </a14:m>
+                  <a:endParaRPr lang="en-US" sz="1400" dirty="0"/>
+                </a:p>
+              </p:txBody>
+            </p:sp>
+          </mc:Choice>
+          <mc:Fallback>
+            <p:sp>
+              <p:nvSpPr>
+                <p:cNvPr id="82" name="Rectangle 81"/>
+                <p:cNvSpPr>
+                  <a:spLocks noRot="1" noChangeAspect="1" noMove="1" noResize="1" noEditPoints="1" noAdjustHandles="1" noChangeArrowheads="1" noChangeShapeType="1" noTextEdit="1"/>
+                </p:cNvSpPr>
+                <p:nvPr/>
+              </p:nvSpPr>
+              <p:spPr>
+                <a:xfrm>
+                  <a:off x="5507790" y="951458"/>
+                  <a:ext cx="409215" cy="324769"/>
+                </a:xfrm>
+                <a:prstGeom prst="rect">
+                  <a:avLst/>
+                </a:prstGeom>
+                <a:blipFill>
+                  <a:blip r:embed="rId16"/>
+                  <a:stretch>
+                    <a:fillRect/>
+                  </a:stretch>
+                </a:blipFill>
+              </p:spPr>
+              <p:txBody>
+                <a:bodyPr/>
+                <a:lstStyle/>
+                <a:p>
+                  <a:r>
+                    <a:rPr lang="en-US">
+                      <a:noFill/>
+                    </a:rPr>
+                    <a:t> </a:t>
+                  </a:r>
+                </a:p>
+              </p:txBody>
+            </p:sp>
+          </mc:Fallback>
+        </mc:AlternateContent>
+        <mc:AlternateContent xmlns:mc="http://schemas.openxmlformats.org/markup-compatibility/2006">
+          <mc:Choice xmlns:a14="http://schemas.microsoft.com/office/drawing/2010/main" Requires="a14">
+            <p:sp>
+              <p:nvSpPr>
+                <p:cNvPr id="91" name="Rectangle 90"/>
+                <p:cNvSpPr/>
+                <p:nvPr/>
+              </p:nvSpPr>
+              <p:spPr>
+                <a:xfrm>
+                  <a:off x="5871353" y="1141028"/>
+                  <a:ext cx="1523943" cy="391261"/>
+                </a:xfrm>
+                <a:prstGeom prst="rect">
+                  <a:avLst/>
+                </a:prstGeom>
+              </p:spPr>
+              <p:txBody>
+                <a:bodyPr wrap="none">
+                  <a:spAutoFit/>
+                </a:bodyPr>
+                <a:lstStyle/>
+                <a:p>
+                  <a14:m>
+                    <m:oMathPara xmlns:m="http://schemas.openxmlformats.org/officeDocument/2006/math">
+                      <m:oMathParaPr>
+                        <m:jc m:val="centerGroup"/>
+                      </m:oMathParaPr>
+                      <m:oMath xmlns:m="http://schemas.openxmlformats.org/officeDocument/2006/math">
+                        <m:sSub>
+                          <m:sSubPr>
+                            <m:ctrlPr>
+                              <a:rPr lang="en-US" b="0" i="1" smtClean="0">
+                                <a:latin typeface="Cambria Math" panose="02040503050406030204" pitchFamily="18" charset="0"/>
+                                <a:cs typeface="Arial" panose="020B0604020202020204" pitchFamily="34" charset="0"/>
+                              </a:rPr>
+                            </m:ctrlPr>
+                          </m:sSubPr>
+                          <m:e>
+                            <m:r>
+                              <a:rPr lang="en-US" b="0" i="1" smtClean="0">
+                                <a:latin typeface="Cambria Math" panose="02040503050406030204" pitchFamily="18" charset="0"/>
+                                <a:cs typeface="Arial" panose="020B0604020202020204" pitchFamily="34" charset="0"/>
+                              </a:rPr>
+                              <m:t>𝑐</m:t>
+                            </m:r>
+                          </m:e>
+                          <m:sub>
+                            <m:r>
+                              <a:rPr lang="en-US" b="0" i="1" smtClean="0">
+                                <a:latin typeface="Cambria Math" panose="02040503050406030204" pitchFamily="18" charset="0"/>
+                                <a:cs typeface="Arial" panose="020B0604020202020204" pitchFamily="34" charset="0"/>
+                              </a:rPr>
+                              <m:t>𝑦</m:t>
+                            </m:r>
+                          </m:sub>
+                        </m:sSub>
+                        <m:r>
+                          <a:rPr lang="en-US" b="0" i="1" smtClean="0">
+                            <a:latin typeface="Cambria Math" panose="02040503050406030204" pitchFamily="18" charset="0"/>
+                            <a:cs typeface="Arial" panose="020B0604020202020204" pitchFamily="34" charset="0"/>
+                          </a:rPr>
+                          <m:t>=</m:t>
+                        </m:r>
+                        <m:sSub>
+                          <m:sSubPr>
+                            <m:ctrlPr>
+                              <a:rPr lang="en-US" b="0" i="1" smtClean="0">
+                                <a:latin typeface="Cambria Math" panose="02040503050406030204" pitchFamily="18" charset="0"/>
+                                <a:cs typeface="Arial" panose="020B0604020202020204" pitchFamily="34" charset="0"/>
+                              </a:rPr>
+                            </m:ctrlPr>
+                          </m:sSubPr>
+                          <m:e>
+                            <m:r>
+                              <a:rPr lang="en-US" b="0" i="1" smtClean="0">
+                                <a:latin typeface="Cambria Math" panose="02040503050406030204" pitchFamily="18" charset="0"/>
+                                <a:cs typeface="Arial" panose="020B0604020202020204" pitchFamily="34" charset="0"/>
+                              </a:rPr>
+                              <m:t>𝑎</m:t>
+                            </m:r>
+                          </m:e>
+                          <m:sub>
+                            <m:r>
+                              <a:rPr lang="en-US" b="0" i="1" smtClean="0">
+                                <a:latin typeface="Cambria Math" panose="02040503050406030204" pitchFamily="18" charset="0"/>
+                                <a:cs typeface="Arial" panose="020B0604020202020204" pitchFamily="34" charset="0"/>
+                              </a:rPr>
+                              <m:t>𝑦</m:t>
+                            </m:r>
+                          </m:sub>
+                        </m:sSub>
+                        <m:r>
+                          <a:rPr lang="en-US" b="0" i="1" smtClean="0">
+                            <a:latin typeface="Cambria Math" panose="02040503050406030204" pitchFamily="18" charset="0"/>
+                            <a:cs typeface="Arial" panose="020B0604020202020204" pitchFamily="34" charset="0"/>
+                          </a:rPr>
+                          <m:t>+</m:t>
+                        </m:r>
+                        <m:sSub>
+                          <m:sSubPr>
+                            <m:ctrlPr>
+                              <a:rPr lang="en-US" b="0" i="1" smtClean="0">
+                                <a:latin typeface="Cambria Math" panose="02040503050406030204" pitchFamily="18" charset="0"/>
+                                <a:cs typeface="Arial" panose="020B0604020202020204" pitchFamily="34" charset="0"/>
+                              </a:rPr>
+                            </m:ctrlPr>
+                          </m:sSubPr>
+                          <m:e>
+                            <m:r>
+                              <a:rPr lang="en-US" b="0" i="1" smtClean="0">
+                                <a:latin typeface="Cambria Math" panose="02040503050406030204" pitchFamily="18" charset="0"/>
+                                <a:cs typeface="Arial" panose="020B0604020202020204" pitchFamily="34" charset="0"/>
+                              </a:rPr>
+                              <m:t>𝑏</m:t>
+                            </m:r>
+                          </m:e>
+                          <m:sub>
+                            <m:r>
+                              <a:rPr lang="en-US" b="0" i="1" smtClean="0">
+                                <a:latin typeface="Cambria Math" panose="02040503050406030204" pitchFamily="18" charset="0"/>
+                                <a:cs typeface="Arial" panose="020B0604020202020204" pitchFamily="34" charset="0"/>
+                              </a:rPr>
+                              <m:t>𝑦</m:t>
+                            </m:r>
+                          </m:sub>
+                        </m:sSub>
+                      </m:oMath>
+                    </m:oMathPara>
+                  </a14:m>
+                  <a:endParaRPr lang="en-US" dirty="0"/>
+                </a:p>
+              </p:txBody>
+            </p:sp>
+          </mc:Choice>
+          <mc:Fallback>
+            <p:sp>
+              <p:nvSpPr>
+                <p:cNvPr id="91" name="Rectangle 90"/>
+                <p:cNvSpPr>
+                  <a:spLocks noRot="1" noChangeAspect="1" noMove="1" noResize="1" noEditPoints="1" noAdjustHandles="1" noChangeArrowheads="1" noChangeShapeType="1" noTextEdit="1"/>
+                </p:cNvSpPr>
+                <p:nvPr/>
+              </p:nvSpPr>
+              <p:spPr>
+                <a:xfrm>
+                  <a:off x="5871353" y="1141028"/>
+                  <a:ext cx="1523943" cy="391261"/>
+                </a:xfrm>
+                <a:prstGeom prst="rect">
+                  <a:avLst/>
+                </a:prstGeom>
+                <a:blipFill>
+                  <a:blip r:embed="rId17"/>
+                  <a:stretch>
+                    <a:fillRect b="-4688"/>
+                  </a:stretch>
+                </a:blipFill>
+              </p:spPr>
+              <p:txBody>
+                <a:bodyPr/>
+                <a:lstStyle/>
+                <a:p>
+                  <a:r>
+                    <a:rPr lang="en-US">
+                      <a:noFill/>
+                    </a:rPr>
+                    <a:t> </a:t>
+                  </a:r>
+                </a:p>
+              </p:txBody>
+            </p:sp>
+          </mc:Fallback>
+        </mc:AlternateContent>
+        <mc:AlternateContent xmlns:mc="http://schemas.openxmlformats.org/markup-compatibility/2006">
+          <mc:Choice xmlns:a14="http://schemas.microsoft.com/office/drawing/2010/main" Requires="a14">
+            <p:sp>
+              <p:nvSpPr>
+                <p:cNvPr id="92" name="Rectangle 91"/>
+                <p:cNvSpPr/>
+                <p:nvPr/>
+              </p:nvSpPr>
+              <p:spPr>
+                <a:xfrm>
+                  <a:off x="4543883" y="2012584"/>
+                  <a:ext cx="1501052" cy="369332"/>
+                </a:xfrm>
+                <a:prstGeom prst="rect">
+                  <a:avLst/>
+                </a:prstGeom>
+              </p:spPr>
+              <p:txBody>
+                <a:bodyPr wrap="none">
+                  <a:spAutoFit/>
+                </a:bodyPr>
+                <a:lstStyle/>
+                <a:p>
+                  <a14:m>
+                    <m:oMathPara xmlns:m="http://schemas.openxmlformats.org/officeDocument/2006/math">
+                      <m:oMathParaPr>
+                        <m:jc m:val="centerGroup"/>
+                      </m:oMathParaPr>
+                      <m:oMath xmlns:m="http://schemas.openxmlformats.org/officeDocument/2006/math">
+                        <m:sSub>
+                          <m:sSubPr>
+                            <m:ctrlPr>
+                              <a:rPr lang="en-US" b="0" i="1" smtClean="0">
+                                <a:latin typeface="Cambria Math" panose="02040503050406030204" pitchFamily="18" charset="0"/>
+                                <a:cs typeface="Arial" panose="020B0604020202020204" pitchFamily="34" charset="0"/>
+                              </a:rPr>
+                            </m:ctrlPr>
+                          </m:sSubPr>
+                          <m:e>
+                            <m:r>
+                              <a:rPr lang="en-US" b="0" i="1" smtClean="0">
+                                <a:latin typeface="Cambria Math" panose="02040503050406030204" pitchFamily="18" charset="0"/>
+                                <a:cs typeface="Arial" panose="020B0604020202020204" pitchFamily="34" charset="0"/>
+                              </a:rPr>
+                              <m:t>𝑐</m:t>
+                            </m:r>
+                          </m:e>
+                          <m:sub>
+                            <m:r>
+                              <a:rPr lang="en-US" b="0" i="1" smtClean="0">
+                                <a:latin typeface="Cambria Math" panose="02040503050406030204" pitchFamily="18" charset="0"/>
+                                <a:cs typeface="Arial" panose="020B0604020202020204" pitchFamily="34" charset="0"/>
+                              </a:rPr>
+                              <m:t>𝑥</m:t>
+                            </m:r>
+                          </m:sub>
+                        </m:sSub>
+                        <m:r>
+                          <a:rPr lang="en-US" b="0" i="1" smtClean="0">
+                            <a:latin typeface="Cambria Math" panose="02040503050406030204" pitchFamily="18" charset="0"/>
+                            <a:cs typeface="Arial" panose="020B0604020202020204" pitchFamily="34" charset="0"/>
+                          </a:rPr>
+                          <m:t>=</m:t>
+                        </m:r>
+                        <m:sSub>
+                          <m:sSubPr>
+                            <m:ctrlPr>
+                              <a:rPr lang="en-US" b="0" i="1" smtClean="0">
+                                <a:latin typeface="Cambria Math" panose="02040503050406030204" pitchFamily="18" charset="0"/>
+                                <a:cs typeface="Arial" panose="020B0604020202020204" pitchFamily="34" charset="0"/>
+                              </a:rPr>
+                            </m:ctrlPr>
+                          </m:sSubPr>
+                          <m:e>
+                            <m:r>
+                              <a:rPr lang="en-US" b="0" i="1" smtClean="0">
+                                <a:latin typeface="Cambria Math" panose="02040503050406030204" pitchFamily="18" charset="0"/>
+                                <a:cs typeface="Arial" panose="020B0604020202020204" pitchFamily="34" charset="0"/>
+                              </a:rPr>
+                              <m:t>𝑎</m:t>
+                            </m:r>
+                          </m:e>
+                          <m:sub>
+                            <m:r>
+                              <a:rPr lang="en-US" b="0" i="1" smtClean="0">
+                                <a:latin typeface="Cambria Math" panose="02040503050406030204" pitchFamily="18" charset="0"/>
+                                <a:cs typeface="Arial" panose="020B0604020202020204" pitchFamily="34" charset="0"/>
+                              </a:rPr>
+                              <m:t>𝑥</m:t>
+                            </m:r>
+                          </m:sub>
+                        </m:sSub>
+                        <m:r>
+                          <a:rPr lang="en-US" b="0" i="1" smtClean="0">
+                            <a:latin typeface="Cambria Math" panose="02040503050406030204" pitchFamily="18" charset="0"/>
+                            <a:cs typeface="Arial" panose="020B0604020202020204" pitchFamily="34" charset="0"/>
+                          </a:rPr>
+                          <m:t>+</m:t>
+                        </m:r>
+                        <m:sSub>
+                          <m:sSubPr>
+                            <m:ctrlPr>
+                              <a:rPr lang="en-US" b="0" i="1" smtClean="0">
+                                <a:latin typeface="Cambria Math" panose="02040503050406030204" pitchFamily="18" charset="0"/>
+                                <a:cs typeface="Arial" panose="020B0604020202020204" pitchFamily="34" charset="0"/>
+                              </a:rPr>
+                            </m:ctrlPr>
+                          </m:sSubPr>
+                          <m:e>
+                            <m:r>
+                              <a:rPr lang="en-US" b="0" i="1" smtClean="0">
+                                <a:latin typeface="Cambria Math" panose="02040503050406030204" pitchFamily="18" charset="0"/>
+                                <a:cs typeface="Arial" panose="020B0604020202020204" pitchFamily="34" charset="0"/>
+                              </a:rPr>
+                              <m:t>𝑏</m:t>
+                            </m:r>
+                          </m:e>
+                          <m:sub>
+                            <m:r>
+                              <a:rPr lang="en-US" b="0" i="1" smtClean="0">
+                                <a:latin typeface="Cambria Math" panose="02040503050406030204" pitchFamily="18" charset="0"/>
+                                <a:cs typeface="Arial" panose="020B0604020202020204" pitchFamily="34" charset="0"/>
+                              </a:rPr>
+                              <m:t>𝑥</m:t>
+                            </m:r>
+                          </m:sub>
+                        </m:sSub>
+                      </m:oMath>
+                    </m:oMathPara>
+                  </a14:m>
+                  <a:endParaRPr lang="en-US" dirty="0"/>
+                </a:p>
+              </p:txBody>
+            </p:sp>
+          </mc:Choice>
+          <mc:Fallback>
+            <p:sp>
+              <p:nvSpPr>
+                <p:cNvPr id="92" name="Rectangle 91"/>
+                <p:cNvSpPr>
+                  <a:spLocks noRot="1" noChangeAspect="1" noMove="1" noResize="1" noEditPoints="1" noAdjustHandles="1" noChangeArrowheads="1" noChangeShapeType="1" noTextEdit="1"/>
+                </p:cNvSpPr>
+                <p:nvPr/>
+              </p:nvSpPr>
+              <p:spPr>
+                <a:xfrm>
+                  <a:off x="4543883" y="2012584"/>
+                  <a:ext cx="1501052" cy="369332"/>
+                </a:xfrm>
+                <a:prstGeom prst="rect">
+                  <a:avLst/>
+                </a:prstGeom>
+                <a:blipFill>
+                  <a:blip r:embed="rId18"/>
+                  <a:stretch>
+                    <a:fillRect/>
+                  </a:stretch>
+                </a:blipFill>
+              </p:spPr>
+              <p:txBody>
+                <a:bodyPr/>
+                <a:lstStyle/>
+                <a:p>
+                  <a:r>
+                    <a:rPr lang="en-US">
+                      <a:noFill/>
+                    </a:rPr>
+                    <a:t> </a:t>
+                  </a:r>
+                </a:p>
+              </p:txBody>
+            </p:sp>
+          </mc:Fallback>
+        </mc:AlternateContent>
+      </p:grpSp>
+      <p:grpSp>
+        <p:nvGrpSpPr>
+          <p:cNvPr id="124" name="Group 123"/>
+          <p:cNvGrpSpPr/>
+          <p:nvPr/>
+        </p:nvGrpSpPr>
+        <p:grpSpPr>
+          <a:xfrm>
+            <a:off x="288600" y="3513144"/>
+            <a:ext cx="2677415" cy="2146316"/>
+            <a:chOff x="288600" y="3513144"/>
+            <a:chExt cx="2677415" cy="2146316"/>
+          </a:xfrm>
+        </p:grpSpPr>
+        <p:grpSp>
+          <p:nvGrpSpPr>
+            <p:cNvPr id="94" name="Group 93"/>
+            <p:cNvGrpSpPr/>
+            <p:nvPr/>
+          </p:nvGrpSpPr>
+          <p:grpSpPr>
+            <a:xfrm>
+              <a:off x="288600" y="3513144"/>
+              <a:ext cx="2216092" cy="2146316"/>
+              <a:chOff x="1129904" y="708040"/>
+              <a:chExt cx="2216092" cy="2146316"/>
+            </a:xfrm>
+          </p:grpSpPr>
+          <p:grpSp>
+            <p:nvGrpSpPr>
+              <p:cNvPr id="95" name="Group 94"/>
+              <p:cNvGrpSpPr/>
+              <p:nvPr/>
+            </p:nvGrpSpPr>
+            <p:grpSpPr>
+              <a:xfrm>
+                <a:off x="1163211" y="708040"/>
+                <a:ext cx="2182785" cy="2146316"/>
+                <a:chOff x="1190506" y="680744"/>
+                <a:chExt cx="2182785" cy="2146316"/>
+              </a:xfrm>
+            </p:grpSpPr>
+            <p:cxnSp>
+              <p:nvCxnSpPr>
+                <p:cNvPr id="97" name="Straight Arrow Connector 96"/>
+                <p:cNvCxnSpPr/>
+                <p:nvPr/>
+              </p:nvCxnSpPr>
+              <p:spPr>
+                <a:xfrm flipV="1">
+                  <a:off x="1516583" y="680744"/>
+                  <a:ext cx="7684" cy="1859536"/>
+                </a:xfrm>
+                <a:prstGeom prst="straightConnector1">
+                  <a:avLst/>
+                </a:prstGeom>
+                <a:ln w="38100">
+                  <a:solidFill>
+                    <a:schemeClr val="tx1"/>
+                  </a:solidFill>
+                  <a:tailEnd type="triangle"/>
+                </a:ln>
+              </p:spPr>
+              <p:style>
+                <a:lnRef idx="1">
+                  <a:schemeClr val="accent1"/>
+                </a:lnRef>
+                <a:fillRef idx="0">
+                  <a:schemeClr val="accent1"/>
+                </a:fillRef>
+                <a:effectRef idx="0">
+                  <a:schemeClr val="accent1"/>
+                </a:effectRef>
+                <a:fontRef idx="minor">
+                  <a:schemeClr val="tx1"/>
+                </a:fontRef>
+              </p:style>
+            </p:cxnSp>
+            <p:cxnSp>
+              <p:nvCxnSpPr>
+                <p:cNvPr id="98" name="Straight Arrow Connector 97"/>
+                <p:cNvCxnSpPr/>
+                <p:nvPr/>
+              </p:nvCxnSpPr>
+              <p:spPr>
+                <a:xfrm flipV="1">
+                  <a:off x="1498387" y="2526633"/>
+                  <a:ext cx="1874904" cy="1"/>
+                </a:xfrm>
+                <a:prstGeom prst="straightConnector1">
+                  <a:avLst/>
+                </a:prstGeom>
+                <a:ln w="38100">
+                  <a:solidFill>
+                    <a:schemeClr val="tx1"/>
+                  </a:solidFill>
+                  <a:tailEnd type="triangle"/>
+                </a:ln>
+              </p:spPr>
+              <p:style>
+                <a:lnRef idx="1">
+                  <a:schemeClr val="accent1"/>
+                </a:lnRef>
+                <a:fillRef idx="0">
+                  <a:schemeClr val="accent1"/>
+                </a:fillRef>
+                <a:effectRef idx="0">
+                  <a:schemeClr val="accent1"/>
+                </a:effectRef>
+                <a:fontRef idx="minor">
+                  <a:schemeClr val="tx1"/>
+                </a:fontRef>
+              </p:style>
+            </p:cxnSp>
+            <mc:AlternateContent xmlns:mc="http://schemas.openxmlformats.org/markup-compatibility/2006" xmlns:a14="http://schemas.microsoft.com/office/drawing/2010/main">
+              <mc:Choice Requires="a14">
+                <p:sp>
+                  <p:nvSpPr>
+                    <p:cNvPr id="99" name="Rectangle 98"/>
+                    <p:cNvSpPr/>
+                    <p:nvPr/>
+                  </p:nvSpPr>
+                  <p:spPr>
+                    <a:xfrm>
+                      <a:off x="2897675" y="2457728"/>
+                      <a:ext cx="367985" cy="369332"/>
+                    </a:xfrm>
+                    <a:prstGeom prst="rect">
+                      <a:avLst/>
+                    </a:prstGeom>
+                  </p:spPr>
+                  <p:txBody>
+                    <a:bodyPr wrap="none">
+                      <a:spAutoFit/>
+                    </a:bodyPr>
+                    <a:lstStyle/>
+                    <a:p>
+                      <a:pPr/>
+                      <a14:m>
+                        <m:oMathPara xmlns:m="http://schemas.openxmlformats.org/officeDocument/2006/math">
+                          <m:oMathParaPr>
+                            <m:jc m:val="centerGroup"/>
+                          </m:oMathParaPr>
+                          <m:oMath xmlns:m="http://schemas.openxmlformats.org/officeDocument/2006/math">
+                            <m:r>
+                              <a:rPr lang="en-US" i="1">
+                                <a:latin typeface="Cambria Math" panose="02040503050406030204" pitchFamily="18" charset="0"/>
+                                <a:cs typeface="Arial" panose="020B0604020202020204" pitchFamily="34" charset="0"/>
+                              </a:rPr>
+                              <m:t>𝑥</m:t>
+                            </m:r>
+                          </m:oMath>
+                        </m:oMathPara>
+                      </a14:m>
+                      <a:endParaRPr lang="en-CA" dirty="0"/>
+                    </a:p>
+                  </p:txBody>
+                </p:sp>
+              </mc:Choice>
+              <mc:Fallback xmlns="">
+                <p:sp>
+                  <p:nvSpPr>
+                    <p:cNvPr id="12" name="Rectangle 11"/>
+                    <p:cNvSpPr>
+                      <a:spLocks noRot="1" noChangeAspect="1" noMove="1" noResize="1" noEditPoints="1" noAdjustHandles="1" noChangeArrowheads="1" noChangeShapeType="1" noTextEdit="1"/>
+                    </p:cNvSpPr>
+                    <p:nvPr/>
+                  </p:nvSpPr>
+                  <p:spPr>
+                    <a:xfrm>
+                      <a:off x="2897675" y="2457728"/>
+                      <a:ext cx="367985" cy="369332"/>
+                    </a:xfrm>
+                    <a:prstGeom prst="rect">
+                      <a:avLst/>
+                    </a:prstGeom>
+                    <a:blipFill rotWithShape="0">
+                      <a:blip r:embed="rId19"/>
+                      <a:stretch>
+                        <a:fillRect/>
+                      </a:stretch>
+                    </a:blipFill>
+                  </p:spPr>
+                  <p:txBody>
+                    <a:bodyPr/>
+                    <a:lstStyle/>
+                    <a:p>
+                      <a:r>
+                        <a:rPr lang="en-CA">
+                          <a:noFill/>
+                        </a:rPr>
+                        <a:t> </a:t>
+                      </a:r>
+                    </a:p>
+                  </p:txBody>
+                </p:sp>
+              </mc:Fallback>
+            </mc:AlternateContent>
+            <mc:AlternateContent xmlns:mc="http://schemas.openxmlformats.org/markup-compatibility/2006" xmlns:a14="http://schemas.microsoft.com/office/drawing/2010/main">
+              <mc:Choice Requires="a14">
+                <p:sp>
+                  <p:nvSpPr>
+                    <p:cNvPr id="100" name="Rectangle 99"/>
+                    <p:cNvSpPr/>
+                    <p:nvPr/>
+                  </p:nvSpPr>
+                  <p:spPr>
+                    <a:xfrm>
+                      <a:off x="1190506" y="790545"/>
+                      <a:ext cx="371384" cy="369332"/>
+                    </a:xfrm>
+                    <a:prstGeom prst="rect">
+                      <a:avLst/>
+                    </a:prstGeom>
+                  </p:spPr>
+                  <p:txBody>
+                    <a:bodyPr wrap="none">
+                      <a:spAutoFit/>
+                    </a:bodyPr>
+                    <a:lstStyle/>
+                    <a:p>
+                      <a:pPr/>
+                      <a14:m>
+                        <m:oMathPara xmlns:m="http://schemas.openxmlformats.org/officeDocument/2006/math">
+                          <m:oMathParaPr>
+                            <m:jc m:val="centerGroup"/>
+                          </m:oMathParaPr>
+                          <m:oMath xmlns:m="http://schemas.openxmlformats.org/officeDocument/2006/math">
+                            <m:r>
+                              <a:rPr lang="en-US" b="0" i="1" smtClean="0">
+                                <a:latin typeface="Cambria Math" panose="02040503050406030204" pitchFamily="18" charset="0"/>
+                              </a:rPr>
+                              <m:t>𝑦</m:t>
+                            </m:r>
+                          </m:oMath>
+                        </m:oMathPara>
+                      </a14:m>
+                      <a:endParaRPr lang="en-CA" dirty="0"/>
+                    </a:p>
+                  </p:txBody>
+                </p:sp>
+              </mc:Choice>
+              <mc:Fallback xmlns="">
+                <p:sp>
+                  <p:nvSpPr>
+                    <p:cNvPr id="13" name="Rectangle 12"/>
+                    <p:cNvSpPr>
+                      <a:spLocks noRot="1" noChangeAspect="1" noMove="1" noResize="1" noEditPoints="1" noAdjustHandles="1" noChangeArrowheads="1" noChangeShapeType="1" noTextEdit="1"/>
+                    </p:cNvSpPr>
+                    <p:nvPr/>
+                  </p:nvSpPr>
+                  <p:spPr>
+                    <a:xfrm>
+                      <a:off x="1190506" y="790545"/>
+                      <a:ext cx="371384" cy="369332"/>
+                    </a:xfrm>
+                    <a:prstGeom prst="rect">
+                      <a:avLst/>
+                    </a:prstGeom>
+                    <a:blipFill rotWithShape="0">
+                      <a:blip r:embed="rId20"/>
+                      <a:stretch>
+                        <a:fillRect b="-6557"/>
+                      </a:stretch>
+                    </a:blipFill>
+                  </p:spPr>
+                  <p:txBody>
+                    <a:bodyPr/>
+                    <a:lstStyle/>
+                    <a:p>
+                      <a:r>
+                        <a:rPr lang="en-CA">
+                          <a:noFill/>
+                        </a:rPr>
+                        <a:t> </a:t>
+                      </a:r>
+                    </a:p>
+                  </p:txBody>
+                </p:sp>
+              </mc:Fallback>
+            </mc:AlternateContent>
+            <mc:AlternateContent xmlns:mc="http://schemas.openxmlformats.org/markup-compatibility/2006" xmlns:a14="http://schemas.microsoft.com/office/drawing/2010/main">
+              <mc:Choice Requires="a14">
+                <p:sp>
+                  <p:nvSpPr>
+                    <p:cNvPr id="101" name="Rectangle 100"/>
+                    <p:cNvSpPr/>
+                    <p:nvPr/>
+                  </p:nvSpPr>
+                  <p:spPr>
+                    <a:xfrm>
+                      <a:off x="1205483" y="2447020"/>
+                      <a:ext cx="367985" cy="369332"/>
+                    </a:xfrm>
+                    <a:prstGeom prst="rect">
+                      <a:avLst/>
+                    </a:prstGeom>
+                  </p:spPr>
+                  <p:txBody>
+                    <a:bodyPr wrap="none">
+                      <a:spAutoFit/>
+                    </a:bodyPr>
+                    <a:lstStyle/>
+                    <a:p>
+                      <a:pPr/>
+                      <a14:m>
+                        <m:oMathPara xmlns:m="http://schemas.openxmlformats.org/officeDocument/2006/math">
+                          <m:oMathParaPr>
+                            <m:jc m:val="centerGroup"/>
+                          </m:oMathParaPr>
+                          <m:oMath xmlns:m="http://schemas.openxmlformats.org/officeDocument/2006/math">
+                            <m:r>
+                              <a:rPr lang="en-US" b="0" i="1" smtClean="0">
+                                <a:latin typeface="Cambria Math" panose="02040503050406030204" pitchFamily="18" charset="0"/>
+                                <a:cs typeface="Arial" panose="020B0604020202020204" pitchFamily="34" charset="0"/>
+                              </a:rPr>
+                              <m:t>0</m:t>
+                            </m:r>
+                          </m:oMath>
+                        </m:oMathPara>
+                      </a14:m>
+                      <a:endParaRPr lang="en-CA" dirty="0"/>
+                    </a:p>
+                  </p:txBody>
+                </p:sp>
+              </mc:Choice>
+              <mc:Fallback xmlns="">
+                <p:sp>
+                  <p:nvSpPr>
+                    <p:cNvPr id="14" name="Rectangle 13"/>
+                    <p:cNvSpPr>
+                      <a:spLocks noRot="1" noChangeAspect="1" noMove="1" noResize="1" noEditPoints="1" noAdjustHandles="1" noChangeArrowheads="1" noChangeShapeType="1" noTextEdit="1"/>
+                    </p:cNvSpPr>
+                    <p:nvPr/>
+                  </p:nvSpPr>
+                  <p:spPr>
+                    <a:xfrm>
+                      <a:off x="1205483" y="2447020"/>
+                      <a:ext cx="367985" cy="369332"/>
+                    </a:xfrm>
+                    <a:prstGeom prst="rect">
+                      <a:avLst/>
+                    </a:prstGeom>
+                    <a:blipFill rotWithShape="0">
+                      <a:blip r:embed="rId21"/>
+                      <a:stretch>
+                        <a:fillRect/>
+                      </a:stretch>
+                    </a:blipFill>
+                  </p:spPr>
+                  <p:txBody>
+                    <a:bodyPr/>
+                    <a:lstStyle/>
+                    <a:p>
+                      <a:r>
+                        <a:rPr lang="en-CA">
+                          <a:noFill/>
+                        </a:rPr>
+                        <a:t> </a:t>
+                      </a:r>
+                    </a:p>
+                  </p:txBody>
+                </p:sp>
+              </mc:Fallback>
+            </mc:AlternateContent>
+          </p:grpSp>
+          <p:sp>
+            <p:nvSpPr>
+              <p:cNvPr id="96" name="Rectangle 95"/>
+              <p:cNvSpPr/>
+              <p:nvPr/>
+            </p:nvSpPr>
+            <p:spPr>
+              <a:xfrm>
+                <a:off x="1129904" y="1614682"/>
+                <a:ext cx="184731" cy="369332"/>
+              </a:xfrm>
+              <a:prstGeom prst="rect">
+                <a:avLst/>
+              </a:prstGeom>
+            </p:spPr>
+            <p:txBody>
+              <a:bodyPr wrap="none">
+                <a:spAutoFit/>
+              </a:bodyPr>
+              <a:lstStyle/>
+              <a:p>
+                <a:endParaRPr lang="en-CA" dirty="0"/>
+              </a:p>
+            </p:txBody>
+          </p:sp>
+        </p:grpSp>
+        <mc:AlternateContent xmlns:mc="http://schemas.openxmlformats.org/markup-compatibility/2006">
+          <mc:Choice xmlns:a14="http://schemas.microsoft.com/office/drawing/2010/main" Requires="a14">
+            <p:sp>
+              <p:nvSpPr>
+                <p:cNvPr id="102" name="Rectangle 101"/>
+                <p:cNvSpPr/>
+                <p:nvPr/>
+              </p:nvSpPr>
+              <p:spPr>
+                <a:xfrm>
+                  <a:off x="1178940" y="3917779"/>
+                  <a:ext cx="371448" cy="369332"/>
+                </a:xfrm>
+                <a:prstGeom prst="rect">
+                  <a:avLst/>
+                </a:prstGeom>
+              </p:spPr>
+              <p:txBody>
+                <a:bodyPr wrap="none">
+                  <a:spAutoFit/>
+                </a:bodyPr>
+                <a:lstStyle/>
+                <a:p>
+                  <a:pPr/>
+                  <a14:m>
+                    <m:oMathPara xmlns:m="http://schemas.openxmlformats.org/officeDocument/2006/math">
+                      <m:oMathParaPr>
+                        <m:jc m:val="centerGroup"/>
+                      </m:oMathParaPr>
+                      <m:oMath xmlns:m="http://schemas.openxmlformats.org/officeDocument/2006/math">
+                        <m:acc>
+                          <m:accPr>
+                            <m:chr m:val="⃗"/>
+                            <m:ctrlPr>
+                              <a:rPr lang="en-US" b="0" i="1" smtClean="0">
+                                <a:latin typeface="Cambria Math" panose="02040503050406030204" pitchFamily="18" charset="0"/>
+                                <a:cs typeface="Arial" panose="020B0604020202020204" pitchFamily="34" charset="0"/>
+                              </a:rPr>
+                            </m:ctrlPr>
+                          </m:accPr>
+                          <m:e>
+                            <m:r>
+                              <a:rPr lang="en-US" b="0" i="1" smtClean="0">
+                                <a:latin typeface="Cambria Math" panose="02040503050406030204" pitchFamily="18" charset="0"/>
+                                <a:cs typeface="Arial" panose="020B0604020202020204" pitchFamily="34" charset="0"/>
+                              </a:rPr>
+                              <m:t>𝑎</m:t>
+                            </m:r>
+                          </m:e>
+                        </m:acc>
+                      </m:oMath>
+                    </m:oMathPara>
+                  </a14:m>
+                  <a:endParaRPr lang="en-CA" dirty="0"/>
+                </a:p>
+              </p:txBody>
+            </p:sp>
+          </mc:Choice>
+          <mc:Fallback>
+            <p:sp>
+              <p:nvSpPr>
+                <p:cNvPr id="102" name="Rectangle 101"/>
+                <p:cNvSpPr>
+                  <a:spLocks noRot="1" noChangeAspect="1" noMove="1" noResize="1" noEditPoints="1" noAdjustHandles="1" noChangeArrowheads="1" noChangeShapeType="1" noTextEdit="1"/>
+                </p:cNvSpPr>
+                <p:nvPr/>
+              </p:nvSpPr>
+              <p:spPr>
+                <a:xfrm>
+                  <a:off x="1178940" y="3917779"/>
+                  <a:ext cx="371448" cy="369332"/>
+                </a:xfrm>
+                <a:prstGeom prst="rect">
+                  <a:avLst/>
+                </a:prstGeom>
+                <a:blipFill>
+                  <a:blip r:embed="rId22"/>
+                  <a:stretch>
+                    <a:fillRect t="-23333" r="-26230"/>
+                  </a:stretch>
+                </a:blipFill>
+              </p:spPr>
+              <p:txBody>
+                <a:bodyPr/>
+                <a:lstStyle/>
+                <a:p>
+                  <a:r>
+                    <a:rPr lang="en-US">
+                      <a:noFill/>
+                    </a:rPr>
+                    <a:t> </a:t>
+                  </a:r>
+                </a:p>
+              </p:txBody>
+            </p:sp>
+          </mc:Fallback>
+        </mc:AlternateContent>
+        <p:cxnSp>
+          <p:nvCxnSpPr>
+            <p:cNvPr id="103" name="Straight Arrow Connector 102"/>
+            <p:cNvCxnSpPr/>
+            <p:nvPr/>
+          </p:nvCxnSpPr>
+          <p:spPr>
+            <a:xfrm flipV="1">
+              <a:off x="1044369" y="3602979"/>
+              <a:ext cx="1243362" cy="1155972"/>
+            </a:xfrm>
+            <a:prstGeom prst="straightConnector1">
+              <a:avLst/>
+            </a:prstGeom>
+            <a:ln w="38100">
+              <a:solidFill>
+                <a:schemeClr val="tx1"/>
+              </a:solidFill>
+              <a:tailEnd type="triangle"/>
+            </a:ln>
+          </p:spPr>
+          <p:style>
+            <a:lnRef idx="1">
+              <a:schemeClr val="accent1"/>
+            </a:lnRef>
+            <a:fillRef idx="0">
+              <a:schemeClr val="accent1"/>
+            </a:fillRef>
+            <a:effectRef idx="0">
+              <a:schemeClr val="accent1"/>
+            </a:effectRef>
+            <a:fontRef idx="minor">
+              <a:schemeClr val="tx1"/>
+            </a:fontRef>
+          </p:style>
+        </p:cxnSp>
+        <p:cxnSp>
+          <p:nvCxnSpPr>
+            <p:cNvPr id="105" name="Straight Arrow Connector 104"/>
+            <p:cNvCxnSpPr/>
+            <p:nvPr/>
+          </p:nvCxnSpPr>
+          <p:spPr>
+            <a:xfrm flipV="1">
+              <a:off x="1055737" y="4756710"/>
+              <a:ext cx="1231994" cy="808"/>
+            </a:xfrm>
+            <a:prstGeom prst="straightConnector1">
+              <a:avLst/>
+            </a:prstGeom>
+            <a:ln w="38100">
+              <a:solidFill>
+                <a:schemeClr val="bg2">
+                  <a:lumMod val="50000"/>
+                </a:schemeClr>
+              </a:solidFill>
+              <a:tailEnd type="triangle"/>
+            </a:ln>
+          </p:spPr>
+          <p:style>
+            <a:lnRef idx="1">
+              <a:schemeClr val="accent1"/>
+            </a:lnRef>
+            <a:fillRef idx="0">
+              <a:schemeClr val="accent1"/>
+            </a:fillRef>
+            <a:effectRef idx="0">
+              <a:schemeClr val="accent1"/>
+            </a:effectRef>
+            <a:fontRef idx="minor">
+              <a:schemeClr val="tx1"/>
+            </a:fontRef>
+          </p:style>
+        </p:cxnSp>
+        <p:cxnSp>
+          <p:nvCxnSpPr>
+            <p:cNvPr id="109" name="Straight Arrow Connector 108"/>
+            <p:cNvCxnSpPr/>
+            <p:nvPr/>
+          </p:nvCxnSpPr>
+          <p:spPr>
+            <a:xfrm flipV="1">
+              <a:off x="2251585" y="3602979"/>
+              <a:ext cx="0" cy="1157152"/>
+            </a:xfrm>
+            <a:prstGeom prst="straightConnector1">
+              <a:avLst/>
+            </a:prstGeom>
+            <a:ln w="38100">
+              <a:solidFill>
+                <a:schemeClr val="bg2">
+                  <a:lumMod val="50000"/>
+                </a:schemeClr>
+              </a:solidFill>
+              <a:tailEnd type="triangle"/>
+            </a:ln>
+          </p:spPr>
+          <p:style>
+            <a:lnRef idx="1">
+              <a:schemeClr val="accent1"/>
+            </a:lnRef>
+            <a:fillRef idx="0">
+              <a:schemeClr val="accent1"/>
+            </a:fillRef>
+            <a:effectRef idx="0">
+              <a:schemeClr val="accent1"/>
+            </a:effectRef>
+            <a:fontRef idx="minor">
+              <a:schemeClr val="tx1"/>
+            </a:fontRef>
+          </p:style>
+        </p:cxnSp>
+        <p:cxnSp>
+          <p:nvCxnSpPr>
+            <p:cNvPr id="112" name="Straight Arrow Connector 111"/>
+            <p:cNvCxnSpPr/>
+            <p:nvPr/>
+          </p:nvCxnSpPr>
+          <p:spPr>
+            <a:xfrm>
+              <a:off x="1044369" y="5018515"/>
+              <a:ext cx="320295" cy="0"/>
+            </a:xfrm>
+            <a:prstGeom prst="straightConnector1">
+              <a:avLst/>
+            </a:prstGeom>
+            <a:ln w="38100">
+              <a:solidFill>
+                <a:schemeClr val="tx1"/>
+              </a:solidFill>
+              <a:tailEnd type="triangle"/>
+            </a:ln>
+          </p:spPr>
+          <p:style>
+            <a:lnRef idx="1">
+              <a:schemeClr val="accent1"/>
+            </a:lnRef>
+            <a:fillRef idx="0">
+              <a:schemeClr val="accent1"/>
+            </a:fillRef>
+            <a:effectRef idx="0">
+              <a:schemeClr val="accent1"/>
+            </a:effectRef>
+            <a:fontRef idx="minor">
+              <a:schemeClr val="tx1"/>
+            </a:fontRef>
+          </p:style>
+        </p:cxnSp>
+        <p:cxnSp>
+          <p:nvCxnSpPr>
+            <p:cNvPr id="117" name="Straight Arrow Connector 116"/>
+            <p:cNvCxnSpPr/>
+            <p:nvPr/>
+          </p:nvCxnSpPr>
+          <p:spPr>
+            <a:xfrm flipV="1">
+              <a:off x="2646804" y="4465675"/>
+              <a:ext cx="0" cy="277553"/>
+            </a:xfrm>
+            <a:prstGeom prst="straightConnector1">
+              <a:avLst/>
+            </a:prstGeom>
+            <a:ln w="38100">
+              <a:solidFill>
+                <a:schemeClr val="tx1"/>
+              </a:solidFill>
+              <a:tailEnd type="triangle"/>
+            </a:ln>
+          </p:spPr>
+          <p:style>
+            <a:lnRef idx="1">
+              <a:schemeClr val="accent1"/>
+            </a:lnRef>
+            <a:fillRef idx="0">
+              <a:schemeClr val="accent1"/>
+            </a:fillRef>
+            <a:effectRef idx="0">
+              <a:schemeClr val="accent1"/>
+            </a:effectRef>
+            <a:fontRef idx="minor">
+              <a:schemeClr val="tx1"/>
+            </a:fontRef>
+          </p:style>
+        </p:cxnSp>
+        <mc:AlternateContent xmlns:mc="http://schemas.openxmlformats.org/markup-compatibility/2006">
+          <mc:Choice xmlns:a14="http://schemas.microsoft.com/office/drawing/2010/main" Requires="a14">
+            <p:sp>
+              <p:nvSpPr>
+                <p:cNvPr id="119" name="Rectangle 118"/>
+                <p:cNvSpPr/>
+                <p:nvPr/>
+              </p:nvSpPr>
+              <p:spPr>
+                <a:xfrm>
+                  <a:off x="2594631" y="4455515"/>
+                  <a:ext cx="371384" cy="369332"/>
+                </a:xfrm>
+                <a:prstGeom prst="rect">
+                  <a:avLst/>
+                </a:prstGeom>
+              </p:spPr>
+              <p:txBody>
+                <a:bodyPr wrap="none">
+                  <a:spAutoFit/>
+                </a:bodyPr>
+                <a:lstStyle/>
+                <a:p>
+                  <a:pPr/>
+                  <a14:m>
+                    <m:oMathPara xmlns:m="http://schemas.openxmlformats.org/officeDocument/2006/math">
+                      <m:oMathParaPr>
+                        <m:jc m:val="centerGroup"/>
+                      </m:oMathParaPr>
+                      <m:oMath xmlns:m="http://schemas.openxmlformats.org/officeDocument/2006/math">
+                        <m:acc>
+                          <m:accPr>
+                            <m:chr m:val="̂"/>
+                            <m:ctrlPr>
+                              <a:rPr lang="en-US" b="0" i="1" smtClean="0">
+                                <a:latin typeface="Cambria Math" panose="02040503050406030204" pitchFamily="18" charset="0"/>
+                                <a:cs typeface="Arial" panose="020B0604020202020204" pitchFamily="34" charset="0"/>
+                              </a:rPr>
+                            </m:ctrlPr>
+                          </m:accPr>
+                          <m:e>
+                            <m:r>
+                              <a:rPr lang="en-US" b="0" i="1" smtClean="0">
+                                <a:latin typeface="Cambria Math" panose="02040503050406030204" pitchFamily="18" charset="0"/>
+                                <a:cs typeface="Arial" panose="020B0604020202020204" pitchFamily="34" charset="0"/>
+                              </a:rPr>
+                              <m:t>𝑦</m:t>
+                            </m:r>
+                          </m:e>
+                        </m:acc>
+                      </m:oMath>
+                    </m:oMathPara>
+                  </a14:m>
+                  <a:endParaRPr lang="en-CA" dirty="0"/>
+                </a:p>
+              </p:txBody>
+            </p:sp>
+          </mc:Choice>
+          <mc:Fallback>
+            <p:sp>
+              <p:nvSpPr>
+                <p:cNvPr id="119" name="Rectangle 118"/>
+                <p:cNvSpPr>
+                  <a:spLocks noRot="1" noChangeAspect="1" noMove="1" noResize="1" noEditPoints="1" noAdjustHandles="1" noChangeArrowheads="1" noChangeShapeType="1" noTextEdit="1"/>
+                </p:cNvSpPr>
+                <p:nvPr/>
+              </p:nvSpPr>
+              <p:spPr>
+                <a:xfrm>
+                  <a:off x="2594631" y="4455515"/>
+                  <a:ext cx="371384" cy="369332"/>
+                </a:xfrm>
+                <a:prstGeom prst="rect">
+                  <a:avLst/>
+                </a:prstGeom>
+                <a:blipFill>
+                  <a:blip r:embed="rId23"/>
+                  <a:stretch>
+                    <a:fillRect t="-6667" r="-14754" b="-6667"/>
+                  </a:stretch>
+                </a:blipFill>
+              </p:spPr>
+              <p:txBody>
+                <a:bodyPr/>
+                <a:lstStyle/>
+                <a:p>
+                  <a:r>
+                    <a:rPr lang="en-US">
+                      <a:noFill/>
+                    </a:rPr>
+                    <a:t> </a:t>
+                  </a:r>
+                </a:p>
+              </p:txBody>
+            </p:sp>
+          </mc:Fallback>
+        </mc:AlternateContent>
+        <mc:AlternateContent xmlns:mc="http://schemas.openxmlformats.org/markup-compatibility/2006">
+          <mc:Choice xmlns:a14="http://schemas.microsoft.com/office/drawing/2010/main" Requires="a14">
+            <p:sp>
+              <p:nvSpPr>
+                <p:cNvPr id="120" name="Rectangle 119"/>
+                <p:cNvSpPr/>
+                <p:nvPr/>
+              </p:nvSpPr>
+              <p:spPr>
+                <a:xfrm>
+                  <a:off x="945751" y="4966672"/>
+                  <a:ext cx="371384" cy="369332"/>
+                </a:xfrm>
+                <a:prstGeom prst="rect">
+                  <a:avLst/>
+                </a:prstGeom>
+              </p:spPr>
+              <p:txBody>
+                <a:bodyPr wrap="none">
+                  <a:spAutoFit/>
+                </a:bodyPr>
+                <a:lstStyle/>
+                <a:p>
+                  <a:pPr/>
+                  <a14:m>
+                    <m:oMathPara xmlns:m="http://schemas.openxmlformats.org/officeDocument/2006/math">
+                      <m:oMathParaPr>
+                        <m:jc m:val="centerGroup"/>
+                      </m:oMathParaPr>
+                      <m:oMath xmlns:m="http://schemas.openxmlformats.org/officeDocument/2006/math">
+                        <m:acc>
+                          <m:accPr>
+                            <m:chr m:val="̂"/>
+                            <m:ctrlPr>
+                              <a:rPr lang="en-US" b="0" i="1" smtClean="0">
+                                <a:latin typeface="Cambria Math" panose="02040503050406030204" pitchFamily="18" charset="0"/>
+                                <a:cs typeface="Arial" panose="020B0604020202020204" pitchFamily="34" charset="0"/>
+                              </a:rPr>
+                            </m:ctrlPr>
+                          </m:accPr>
+                          <m:e>
+                            <m:r>
+                              <a:rPr lang="en-US" b="0" i="1" smtClean="0">
+                                <a:latin typeface="Cambria Math" panose="02040503050406030204" pitchFamily="18" charset="0"/>
+                                <a:cs typeface="Arial" panose="020B0604020202020204" pitchFamily="34" charset="0"/>
+                              </a:rPr>
+                              <m:t>𝑥</m:t>
+                            </m:r>
+                          </m:e>
+                        </m:acc>
+                      </m:oMath>
+                    </m:oMathPara>
+                  </a14:m>
+                  <a:endParaRPr lang="en-CA" dirty="0"/>
+                </a:p>
+              </p:txBody>
+            </p:sp>
+          </mc:Choice>
+          <mc:Fallback>
+            <p:sp>
+              <p:nvSpPr>
+                <p:cNvPr id="120" name="Rectangle 119"/>
+                <p:cNvSpPr>
+                  <a:spLocks noRot="1" noChangeAspect="1" noMove="1" noResize="1" noEditPoints="1" noAdjustHandles="1" noChangeArrowheads="1" noChangeShapeType="1" noTextEdit="1"/>
+                </p:cNvSpPr>
+                <p:nvPr/>
+              </p:nvSpPr>
+              <p:spPr>
+                <a:xfrm>
+                  <a:off x="945751" y="4966672"/>
+                  <a:ext cx="371384" cy="369332"/>
+                </a:xfrm>
+                <a:prstGeom prst="rect">
+                  <a:avLst/>
+                </a:prstGeom>
+                <a:blipFill>
+                  <a:blip r:embed="rId24"/>
+                  <a:stretch>
+                    <a:fillRect t="-6667" r="-16393"/>
+                  </a:stretch>
+                </a:blipFill>
+              </p:spPr>
+              <p:txBody>
+                <a:bodyPr/>
+                <a:lstStyle/>
+                <a:p>
+                  <a:r>
+                    <a:rPr lang="en-US">
+                      <a:noFill/>
+                    </a:rPr>
+                    <a:t> </a:t>
+                  </a:r>
+                </a:p>
+              </p:txBody>
+            </p:sp>
+          </mc:Fallback>
+        </mc:AlternateContent>
+        <mc:AlternateContent xmlns:mc="http://schemas.openxmlformats.org/markup-compatibility/2006">
+          <mc:Choice xmlns:a14="http://schemas.microsoft.com/office/drawing/2010/main" Requires="a14">
+            <p:sp>
+              <p:nvSpPr>
+                <p:cNvPr id="121" name="Rectangle 120"/>
+                <p:cNvSpPr/>
+                <p:nvPr/>
+              </p:nvSpPr>
+              <p:spPr>
+                <a:xfrm>
+                  <a:off x="2241425" y="3980326"/>
+                  <a:ext cx="620683" cy="391261"/>
+                </a:xfrm>
+                <a:prstGeom prst="rect">
+                  <a:avLst/>
+                </a:prstGeom>
+              </p:spPr>
+              <p:txBody>
+                <a:bodyPr wrap="none">
+                  <a:spAutoFit/>
+                </a:bodyPr>
+                <a:lstStyle/>
+                <a:p>
+                  <a:pPr/>
+                  <a14:m>
+                    <m:oMathPara xmlns:m="http://schemas.openxmlformats.org/officeDocument/2006/math">
+                      <m:oMathParaPr>
+                        <m:jc m:val="centerGroup"/>
+                      </m:oMathParaPr>
+                      <m:oMath xmlns:m="http://schemas.openxmlformats.org/officeDocument/2006/math">
+                        <m:sSub>
+                          <m:sSubPr>
+                            <m:ctrlPr>
+                              <a:rPr lang="en-US" b="0" i="1" smtClean="0">
+                                <a:latin typeface="Cambria Math" panose="02040503050406030204" pitchFamily="18" charset="0"/>
+                                <a:cs typeface="Arial" panose="020B0604020202020204" pitchFamily="34" charset="0"/>
+                              </a:rPr>
+                            </m:ctrlPr>
+                          </m:sSubPr>
+                          <m:e>
+                            <m:r>
+                              <a:rPr lang="en-US" b="0" i="1" smtClean="0">
+                                <a:latin typeface="Cambria Math" panose="02040503050406030204" pitchFamily="18" charset="0"/>
+                                <a:cs typeface="Arial" panose="020B0604020202020204" pitchFamily="34" charset="0"/>
+                              </a:rPr>
+                              <m:t>𝑎</m:t>
+                            </m:r>
+                          </m:e>
+                          <m:sub>
+                            <m:r>
+                              <a:rPr lang="en-US" b="0" i="1" smtClean="0">
+                                <a:latin typeface="Cambria Math" panose="02040503050406030204" pitchFamily="18" charset="0"/>
+                                <a:cs typeface="Arial" panose="020B0604020202020204" pitchFamily="34" charset="0"/>
+                              </a:rPr>
+                              <m:t>𝑦</m:t>
+                            </m:r>
+                          </m:sub>
+                        </m:sSub>
+                        <m:acc>
+                          <m:accPr>
+                            <m:chr m:val="̂"/>
+                            <m:ctrlPr>
+                              <a:rPr lang="en-US" b="0" i="1" smtClean="0">
+                                <a:latin typeface="Cambria Math" panose="02040503050406030204" pitchFamily="18" charset="0"/>
+                                <a:cs typeface="Arial" panose="020B0604020202020204" pitchFamily="34" charset="0"/>
+                              </a:rPr>
+                            </m:ctrlPr>
+                          </m:accPr>
+                          <m:e>
+                            <m:r>
+                              <a:rPr lang="en-US" b="0" i="1" smtClean="0">
+                                <a:latin typeface="Cambria Math" panose="02040503050406030204" pitchFamily="18" charset="0"/>
+                                <a:cs typeface="Arial" panose="020B0604020202020204" pitchFamily="34" charset="0"/>
+                              </a:rPr>
+                              <m:t>𝑦</m:t>
+                            </m:r>
+                          </m:e>
+                        </m:acc>
+                      </m:oMath>
+                    </m:oMathPara>
+                  </a14:m>
+                  <a:endParaRPr lang="en-CA" dirty="0"/>
+                </a:p>
+              </p:txBody>
+            </p:sp>
+          </mc:Choice>
+          <mc:Fallback>
+            <p:sp>
+              <p:nvSpPr>
+                <p:cNvPr id="121" name="Rectangle 120"/>
+                <p:cNvSpPr>
+                  <a:spLocks noRot="1" noChangeAspect="1" noMove="1" noResize="1" noEditPoints="1" noAdjustHandles="1" noChangeArrowheads="1" noChangeShapeType="1" noTextEdit="1"/>
+                </p:cNvSpPr>
+                <p:nvPr/>
+              </p:nvSpPr>
+              <p:spPr>
+                <a:xfrm>
+                  <a:off x="2241425" y="3980326"/>
+                  <a:ext cx="620683" cy="391261"/>
+                </a:xfrm>
+                <a:prstGeom prst="rect">
+                  <a:avLst/>
+                </a:prstGeom>
+                <a:blipFill>
+                  <a:blip r:embed="rId25"/>
+                  <a:stretch>
+                    <a:fillRect t="-4688" r="-41176" b="-3125"/>
+                  </a:stretch>
+                </a:blipFill>
+              </p:spPr>
+              <p:txBody>
+                <a:bodyPr/>
+                <a:lstStyle/>
+                <a:p>
+                  <a:r>
+                    <a:rPr lang="en-US">
+                      <a:noFill/>
+                    </a:rPr>
+                    <a:t> </a:t>
+                  </a:r>
+                </a:p>
+              </p:txBody>
+            </p:sp>
+          </mc:Fallback>
+        </mc:AlternateContent>
+        <mc:AlternateContent xmlns:mc="http://schemas.openxmlformats.org/markup-compatibility/2006">
+          <mc:Choice xmlns:a14="http://schemas.microsoft.com/office/drawing/2010/main" Requires="a14">
+            <p:sp>
+              <p:nvSpPr>
+                <p:cNvPr id="122" name="Rectangle 121"/>
+                <p:cNvSpPr/>
+                <p:nvPr/>
+              </p:nvSpPr>
+              <p:spPr>
+                <a:xfrm>
+                  <a:off x="1406886" y="4717321"/>
+                  <a:ext cx="613052" cy="369332"/>
+                </a:xfrm>
+                <a:prstGeom prst="rect">
+                  <a:avLst/>
+                </a:prstGeom>
+              </p:spPr>
+              <p:txBody>
+                <a:bodyPr wrap="none">
+                  <a:spAutoFit/>
+                </a:bodyPr>
+                <a:lstStyle/>
+                <a:p>
+                  <a:pPr/>
+                  <a14:m>
+                    <m:oMathPara xmlns:m="http://schemas.openxmlformats.org/officeDocument/2006/math">
+                      <m:oMathParaPr>
+                        <m:jc m:val="centerGroup"/>
+                      </m:oMathParaPr>
+                      <m:oMath xmlns:m="http://schemas.openxmlformats.org/officeDocument/2006/math">
+                        <m:sSub>
+                          <m:sSubPr>
+                            <m:ctrlPr>
+                              <a:rPr lang="en-US" b="0" i="1" smtClean="0">
+                                <a:latin typeface="Cambria Math" panose="02040503050406030204" pitchFamily="18" charset="0"/>
+                                <a:cs typeface="Arial" panose="020B0604020202020204" pitchFamily="34" charset="0"/>
+                              </a:rPr>
+                            </m:ctrlPr>
+                          </m:sSubPr>
+                          <m:e>
+                            <m:r>
+                              <a:rPr lang="en-US" b="0" i="1" smtClean="0">
+                                <a:latin typeface="Cambria Math" panose="02040503050406030204" pitchFamily="18" charset="0"/>
+                                <a:cs typeface="Arial" panose="020B0604020202020204" pitchFamily="34" charset="0"/>
+                              </a:rPr>
+                              <m:t>𝑎</m:t>
+                            </m:r>
+                          </m:e>
+                          <m:sub>
+                            <m:r>
+                              <a:rPr lang="en-US" b="0" i="1" smtClean="0">
+                                <a:latin typeface="Cambria Math" panose="02040503050406030204" pitchFamily="18" charset="0"/>
+                                <a:cs typeface="Arial" panose="020B0604020202020204" pitchFamily="34" charset="0"/>
+                              </a:rPr>
+                              <m:t>𝑥</m:t>
+                            </m:r>
+                          </m:sub>
+                        </m:sSub>
+                        <m:acc>
+                          <m:accPr>
+                            <m:chr m:val="̂"/>
+                            <m:ctrlPr>
+                              <a:rPr lang="en-US" b="0" i="1" smtClean="0">
+                                <a:latin typeface="Cambria Math" panose="02040503050406030204" pitchFamily="18" charset="0"/>
+                                <a:cs typeface="Arial" panose="020B0604020202020204" pitchFamily="34" charset="0"/>
+                              </a:rPr>
+                            </m:ctrlPr>
+                          </m:accPr>
+                          <m:e>
+                            <m:r>
+                              <a:rPr lang="en-US" b="0" i="1" smtClean="0">
+                                <a:latin typeface="Cambria Math" panose="02040503050406030204" pitchFamily="18" charset="0"/>
+                                <a:cs typeface="Arial" panose="020B0604020202020204" pitchFamily="34" charset="0"/>
+                              </a:rPr>
+                              <m:t>𝑥</m:t>
+                            </m:r>
+                          </m:e>
+                        </m:acc>
+                      </m:oMath>
+                    </m:oMathPara>
+                  </a14:m>
+                  <a:endParaRPr lang="en-CA" dirty="0"/>
+                </a:p>
+              </p:txBody>
+            </p:sp>
+          </mc:Choice>
+          <mc:Fallback>
+            <p:sp>
+              <p:nvSpPr>
+                <p:cNvPr id="122" name="Rectangle 121"/>
+                <p:cNvSpPr>
+                  <a:spLocks noRot="1" noChangeAspect="1" noMove="1" noResize="1" noEditPoints="1" noAdjustHandles="1" noChangeArrowheads="1" noChangeShapeType="1" noTextEdit="1"/>
+                </p:cNvSpPr>
+                <p:nvPr/>
+              </p:nvSpPr>
+              <p:spPr>
+                <a:xfrm>
+                  <a:off x="1406886" y="4717321"/>
+                  <a:ext cx="613052" cy="369332"/>
+                </a:xfrm>
+                <a:prstGeom prst="rect">
+                  <a:avLst/>
+                </a:prstGeom>
+                <a:blipFill>
+                  <a:blip r:embed="rId26"/>
+                  <a:stretch>
+                    <a:fillRect t="-6667" r="-43000"/>
+                  </a:stretch>
+                </a:blipFill>
+              </p:spPr>
+              <p:txBody>
+                <a:bodyPr/>
+                <a:lstStyle/>
+                <a:p>
+                  <a:r>
+                    <a:rPr lang="en-US">
+                      <a:noFill/>
+                    </a:rPr>
+                    <a:t> </a:t>
+                  </a:r>
+                </a:p>
+              </p:txBody>
+            </p:sp>
+          </mc:Fallback>
+        </mc:AlternateContent>
+      </p:grpSp>
+      <p:grpSp>
+        <p:nvGrpSpPr>
+          <p:cNvPr id="150" name="Group 149"/>
+          <p:cNvGrpSpPr/>
+          <p:nvPr/>
+        </p:nvGrpSpPr>
+        <p:grpSpPr>
+          <a:xfrm>
+            <a:off x="3804555" y="3392517"/>
+            <a:ext cx="2216092" cy="2146316"/>
+            <a:chOff x="3804555" y="3392517"/>
+            <a:chExt cx="2216092" cy="2146316"/>
+          </a:xfrm>
+        </p:grpSpPr>
+        <p:grpSp>
+          <p:nvGrpSpPr>
+            <p:cNvPr id="125" name="Group 124"/>
+            <p:cNvGrpSpPr/>
+            <p:nvPr/>
+          </p:nvGrpSpPr>
+          <p:grpSpPr>
+            <a:xfrm>
+              <a:off x="3804555" y="3392517"/>
+              <a:ext cx="2216092" cy="2146316"/>
+              <a:chOff x="1129904" y="708040"/>
+              <a:chExt cx="2216092" cy="2146316"/>
+            </a:xfrm>
+          </p:grpSpPr>
+          <p:grpSp>
+            <p:nvGrpSpPr>
+              <p:cNvPr id="126" name="Group 125"/>
+              <p:cNvGrpSpPr/>
+              <p:nvPr/>
+            </p:nvGrpSpPr>
+            <p:grpSpPr>
+              <a:xfrm>
+                <a:off x="1163211" y="708040"/>
+                <a:ext cx="2182785" cy="2146316"/>
+                <a:chOff x="1190506" y="680744"/>
+                <a:chExt cx="2182785" cy="2146316"/>
+              </a:xfrm>
+            </p:grpSpPr>
+            <p:cxnSp>
+              <p:nvCxnSpPr>
+                <p:cNvPr id="128" name="Straight Arrow Connector 127"/>
+                <p:cNvCxnSpPr/>
+                <p:nvPr/>
+              </p:nvCxnSpPr>
+              <p:spPr>
+                <a:xfrm flipV="1">
+                  <a:off x="1516583" y="680744"/>
+                  <a:ext cx="7684" cy="1859536"/>
+                </a:xfrm>
+                <a:prstGeom prst="straightConnector1">
+                  <a:avLst/>
+                </a:prstGeom>
+                <a:ln w="38100">
+                  <a:solidFill>
+                    <a:schemeClr val="tx1"/>
+                  </a:solidFill>
+                  <a:tailEnd type="triangle"/>
+                </a:ln>
+              </p:spPr>
+              <p:style>
+                <a:lnRef idx="1">
+                  <a:schemeClr val="accent1"/>
+                </a:lnRef>
+                <a:fillRef idx="0">
+                  <a:schemeClr val="accent1"/>
+                </a:fillRef>
+                <a:effectRef idx="0">
+                  <a:schemeClr val="accent1"/>
+                </a:effectRef>
+                <a:fontRef idx="minor">
+                  <a:schemeClr val="tx1"/>
+                </a:fontRef>
+              </p:style>
+            </p:cxnSp>
+            <p:cxnSp>
+              <p:nvCxnSpPr>
+                <p:cNvPr id="129" name="Straight Arrow Connector 128"/>
+                <p:cNvCxnSpPr/>
+                <p:nvPr/>
+              </p:nvCxnSpPr>
+              <p:spPr>
+                <a:xfrm flipV="1">
+                  <a:off x="1498387" y="2526633"/>
+                  <a:ext cx="1874904" cy="1"/>
+                </a:xfrm>
+                <a:prstGeom prst="straightConnector1">
+                  <a:avLst/>
+                </a:prstGeom>
+                <a:ln w="38100">
+                  <a:solidFill>
+                    <a:schemeClr val="tx1"/>
+                  </a:solidFill>
+                  <a:tailEnd type="triangle"/>
+                </a:ln>
+              </p:spPr>
+              <p:style>
+                <a:lnRef idx="1">
+                  <a:schemeClr val="accent1"/>
+                </a:lnRef>
+                <a:fillRef idx="0">
+                  <a:schemeClr val="accent1"/>
+                </a:fillRef>
+                <a:effectRef idx="0">
+                  <a:schemeClr val="accent1"/>
+                </a:effectRef>
+                <a:fontRef idx="minor">
+                  <a:schemeClr val="tx1"/>
+                </a:fontRef>
+              </p:style>
+            </p:cxnSp>
+            <mc:AlternateContent xmlns:mc="http://schemas.openxmlformats.org/markup-compatibility/2006" xmlns:a14="http://schemas.microsoft.com/office/drawing/2010/main">
+              <mc:Choice Requires="a14">
+                <p:sp>
+                  <p:nvSpPr>
+                    <p:cNvPr id="130" name="Rectangle 129"/>
+                    <p:cNvSpPr/>
+                    <p:nvPr/>
+                  </p:nvSpPr>
+                  <p:spPr>
+                    <a:xfrm>
+                      <a:off x="2897675" y="2457728"/>
+                      <a:ext cx="367985" cy="369332"/>
+                    </a:xfrm>
+                    <a:prstGeom prst="rect">
+                      <a:avLst/>
+                    </a:prstGeom>
+                  </p:spPr>
+                  <p:txBody>
+                    <a:bodyPr wrap="none">
+                      <a:spAutoFit/>
+                    </a:bodyPr>
+                    <a:lstStyle/>
+                    <a:p>
+                      <a:pPr/>
+                      <a14:m>
+                        <m:oMathPara xmlns:m="http://schemas.openxmlformats.org/officeDocument/2006/math">
+                          <m:oMathParaPr>
+                            <m:jc m:val="centerGroup"/>
+                          </m:oMathParaPr>
+                          <m:oMath xmlns:m="http://schemas.openxmlformats.org/officeDocument/2006/math">
+                            <m:r>
+                              <a:rPr lang="en-US" i="1">
+                                <a:latin typeface="Cambria Math" panose="02040503050406030204" pitchFamily="18" charset="0"/>
+                                <a:cs typeface="Arial" panose="020B0604020202020204" pitchFamily="34" charset="0"/>
+                              </a:rPr>
+                              <m:t>𝑥</m:t>
+                            </m:r>
+                          </m:oMath>
+                        </m:oMathPara>
+                      </a14:m>
+                      <a:endParaRPr lang="en-CA" dirty="0"/>
+                    </a:p>
+                  </p:txBody>
+                </p:sp>
+              </mc:Choice>
+              <mc:Fallback xmlns="">
+                <p:sp>
+                  <p:nvSpPr>
+                    <p:cNvPr id="12" name="Rectangle 11"/>
+                    <p:cNvSpPr>
+                      <a:spLocks noRot="1" noChangeAspect="1" noMove="1" noResize="1" noEditPoints="1" noAdjustHandles="1" noChangeArrowheads="1" noChangeShapeType="1" noTextEdit="1"/>
+                    </p:cNvSpPr>
+                    <p:nvPr/>
+                  </p:nvSpPr>
+                  <p:spPr>
+                    <a:xfrm>
+                      <a:off x="2897675" y="2457728"/>
+                      <a:ext cx="367985" cy="369332"/>
+                    </a:xfrm>
+                    <a:prstGeom prst="rect">
+                      <a:avLst/>
+                    </a:prstGeom>
+                    <a:blipFill rotWithShape="0">
+                      <a:blip r:embed="rId19"/>
+                      <a:stretch>
+                        <a:fillRect/>
+                      </a:stretch>
+                    </a:blipFill>
+                  </p:spPr>
+                  <p:txBody>
+                    <a:bodyPr/>
+                    <a:lstStyle/>
+                    <a:p>
+                      <a:r>
+                        <a:rPr lang="en-CA">
+                          <a:noFill/>
+                        </a:rPr>
+                        <a:t> </a:t>
+                      </a:r>
+                    </a:p>
+                  </p:txBody>
+                </p:sp>
+              </mc:Fallback>
+            </mc:AlternateContent>
+            <mc:AlternateContent xmlns:mc="http://schemas.openxmlformats.org/markup-compatibility/2006" xmlns:a14="http://schemas.microsoft.com/office/drawing/2010/main">
+              <mc:Choice Requires="a14">
+                <p:sp>
+                  <p:nvSpPr>
+                    <p:cNvPr id="131" name="Rectangle 130"/>
+                    <p:cNvSpPr/>
+                    <p:nvPr/>
+                  </p:nvSpPr>
+                  <p:spPr>
+                    <a:xfrm>
+                      <a:off x="1190506" y="790545"/>
+                      <a:ext cx="371384" cy="369332"/>
+                    </a:xfrm>
+                    <a:prstGeom prst="rect">
+                      <a:avLst/>
+                    </a:prstGeom>
+                  </p:spPr>
+                  <p:txBody>
+                    <a:bodyPr wrap="none">
+                      <a:spAutoFit/>
+                    </a:bodyPr>
+                    <a:lstStyle/>
+                    <a:p>
+                      <a:pPr/>
+                      <a14:m>
+                        <m:oMathPara xmlns:m="http://schemas.openxmlformats.org/officeDocument/2006/math">
+                          <m:oMathParaPr>
+                            <m:jc m:val="centerGroup"/>
+                          </m:oMathParaPr>
+                          <m:oMath xmlns:m="http://schemas.openxmlformats.org/officeDocument/2006/math">
+                            <m:r>
+                              <a:rPr lang="en-US" b="0" i="1" smtClean="0">
+                                <a:latin typeface="Cambria Math" panose="02040503050406030204" pitchFamily="18" charset="0"/>
+                              </a:rPr>
+                              <m:t>𝑦</m:t>
+                            </m:r>
+                          </m:oMath>
+                        </m:oMathPara>
+                      </a14:m>
+                      <a:endParaRPr lang="en-CA" dirty="0"/>
+                    </a:p>
+                  </p:txBody>
+                </p:sp>
+              </mc:Choice>
+              <mc:Fallback xmlns="">
+                <p:sp>
+                  <p:nvSpPr>
+                    <p:cNvPr id="13" name="Rectangle 12"/>
+                    <p:cNvSpPr>
+                      <a:spLocks noRot="1" noChangeAspect="1" noMove="1" noResize="1" noEditPoints="1" noAdjustHandles="1" noChangeArrowheads="1" noChangeShapeType="1" noTextEdit="1"/>
+                    </p:cNvSpPr>
+                    <p:nvPr/>
+                  </p:nvSpPr>
+                  <p:spPr>
+                    <a:xfrm>
+                      <a:off x="1190506" y="790545"/>
+                      <a:ext cx="371384" cy="369332"/>
+                    </a:xfrm>
+                    <a:prstGeom prst="rect">
+                      <a:avLst/>
+                    </a:prstGeom>
+                    <a:blipFill rotWithShape="0">
+                      <a:blip r:embed="rId20"/>
+                      <a:stretch>
+                        <a:fillRect b="-6557"/>
+                      </a:stretch>
+                    </a:blipFill>
+                  </p:spPr>
+                  <p:txBody>
+                    <a:bodyPr/>
+                    <a:lstStyle/>
+                    <a:p>
+                      <a:r>
+                        <a:rPr lang="en-CA">
+                          <a:noFill/>
+                        </a:rPr>
+                        <a:t> </a:t>
+                      </a:r>
+                    </a:p>
+                  </p:txBody>
+                </p:sp>
+              </mc:Fallback>
+            </mc:AlternateContent>
+            <mc:AlternateContent xmlns:mc="http://schemas.openxmlformats.org/markup-compatibility/2006" xmlns:a14="http://schemas.microsoft.com/office/drawing/2010/main">
+              <mc:Choice Requires="a14">
+                <p:sp>
+                  <p:nvSpPr>
+                    <p:cNvPr id="132" name="Rectangle 131"/>
+                    <p:cNvSpPr/>
+                    <p:nvPr/>
+                  </p:nvSpPr>
+                  <p:spPr>
+                    <a:xfrm>
+                      <a:off x="1205483" y="2447020"/>
+                      <a:ext cx="367985" cy="369332"/>
+                    </a:xfrm>
+                    <a:prstGeom prst="rect">
+                      <a:avLst/>
+                    </a:prstGeom>
+                  </p:spPr>
+                  <p:txBody>
+                    <a:bodyPr wrap="none">
+                      <a:spAutoFit/>
+                    </a:bodyPr>
+                    <a:lstStyle/>
+                    <a:p>
+                      <a:pPr/>
+                      <a14:m>
+                        <m:oMathPara xmlns:m="http://schemas.openxmlformats.org/officeDocument/2006/math">
+                          <m:oMathParaPr>
+                            <m:jc m:val="centerGroup"/>
+                          </m:oMathParaPr>
+                          <m:oMath xmlns:m="http://schemas.openxmlformats.org/officeDocument/2006/math">
+                            <m:r>
+                              <a:rPr lang="en-US" b="0" i="1" smtClean="0">
+                                <a:latin typeface="Cambria Math" panose="02040503050406030204" pitchFamily="18" charset="0"/>
+                                <a:cs typeface="Arial" panose="020B0604020202020204" pitchFamily="34" charset="0"/>
+                              </a:rPr>
+                              <m:t>0</m:t>
+                            </m:r>
+                          </m:oMath>
+                        </m:oMathPara>
+                      </a14:m>
+                      <a:endParaRPr lang="en-CA" dirty="0"/>
+                    </a:p>
+                  </p:txBody>
+                </p:sp>
+              </mc:Choice>
+              <mc:Fallback xmlns="">
+                <p:sp>
+                  <p:nvSpPr>
+                    <p:cNvPr id="14" name="Rectangle 13"/>
+                    <p:cNvSpPr>
+                      <a:spLocks noRot="1" noChangeAspect="1" noMove="1" noResize="1" noEditPoints="1" noAdjustHandles="1" noChangeArrowheads="1" noChangeShapeType="1" noTextEdit="1"/>
+                    </p:cNvSpPr>
+                    <p:nvPr/>
+                  </p:nvSpPr>
+                  <p:spPr>
+                    <a:xfrm>
+                      <a:off x="1205483" y="2447020"/>
+                      <a:ext cx="367985" cy="369332"/>
+                    </a:xfrm>
+                    <a:prstGeom prst="rect">
+                      <a:avLst/>
+                    </a:prstGeom>
+                    <a:blipFill rotWithShape="0">
+                      <a:blip r:embed="rId21"/>
+                      <a:stretch>
+                        <a:fillRect/>
+                      </a:stretch>
+                    </a:blipFill>
+                  </p:spPr>
+                  <p:txBody>
+                    <a:bodyPr/>
+                    <a:lstStyle/>
+                    <a:p>
+                      <a:r>
+                        <a:rPr lang="en-CA">
+                          <a:noFill/>
+                        </a:rPr>
+                        <a:t> </a:t>
+                      </a:r>
+                    </a:p>
+                  </p:txBody>
+                </p:sp>
+              </mc:Fallback>
+            </mc:AlternateContent>
+          </p:grpSp>
+          <p:sp>
+            <p:nvSpPr>
+              <p:cNvPr id="127" name="Rectangle 126"/>
+              <p:cNvSpPr/>
+              <p:nvPr/>
+            </p:nvSpPr>
+            <p:spPr>
+              <a:xfrm>
+                <a:off x="1129904" y="1614682"/>
+                <a:ext cx="184731" cy="369332"/>
+              </a:xfrm>
+              <a:prstGeom prst="rect">
+                <a:avLst/>
+              </a:prstGeom>
+            </p:spPr>
+            <p:txBody>
+              <a:bodyPr wrap="none">
+                <a:spAutoFit/>
+              </a:bodyPr>
+              <a:lstStyle/>
+              <a:p>
+                <a:endParaRPr lang="en-CA" dirty="0"/>
+              </a:p>
+            </p:txBody>
+          </p:sp>
+        </p:grpSp>
+        <p:cxnSp>
+          <p:nvCxnSpPr>
+            <p:cNvPr id="133" name="Straight Arrow Connector 132"/>
+            <p:cNvCxnSpPr/>
+            <p:nvPr/>
+          </p:nvCxnSpPr>
+          <p:spPr>
+            <a:xfrm flipV="1">
+              <a:off x="4479798" y="4699759"/>
+              <a:ext cx="1008169" cy="102104"/>
+            </a:xfrm>
+            <a:prstGeom prst="straightConnector1">
+              <a:avLst/>
+            </a:prstGeom>
+            <a:ln w="38100">
+              <a:solidFill>
+                <a:schemeClr val="tx1"/>
+              </a:solidFill>
+              <a:tailEnd type="triangle"/>
+            </a:ln>
+          </p:spPr>
+          <p:style>
+            <a:lnRef idx="1">
+              <a:schemeClr val="accent1"/>
+            </a:lnRef>
+            <a:fillRef idx="0">
+              <a:schemeClr val="accent1"/>
+            </a:fillRef>
+            <a:effectRef idx="0">
+              <a:schemeClr val="accent1"/>
+            </a:effectRef>
+            <a:fontRef idx="minor">
+              <a:schemeClr val="tx1"/>
+            </a:fontRef>
+          </p:style>
+        </p:cxnSp>
+        <p:cxnSp>
+          <p:nvCxnSpPr>
+            <p:cNvPr id="135" name="Straight Arrow Connector 134"/>
+            <p:cNvCxnSpPr/>
+            <p:nvPr/>
+          </p:nvCxnSpPr>
+          <p:spPr>
+            <a:xfrm flipV="1">
+              <a:off x="4494273" y="3871650"/>
+              <a:ext cx="902137" cy="930213"/>
+            </a:xfrm>
+            <a:prstGeom prst="straightConnector1">
+              <a:avLst/>
+            </a:prstGeom>
+            <a:ln w="38100">
+              <a:solidFill>
+                <a:schemeClr val="tx1"/>
+              </a:solidFill>
+              <a:tailEnd type="triangle"/>
+            </a:ln>
+          </p:spPr>
+          <p:style>
+            <a:lnRef idx="1">
+              <a:schemeClr val="accent1"/>
+            </a:lnRef>
+            <a:fillRef idx="0">
+              <a:schemeClr val="accent1"/>
+            </a:fillRef>
+            <a:effectRef idx="0">
+              <a:schemeClr val="accent1"/>
+            </a:effectRef>
+            <a:fontRef idx="minor">
+              <a:schemeClr val="tx1"/>
+            </a:fontRef>
+          </p:style>
+        </p:cxnSp>
+        <p:sp>
+          <p:nvSpPr>
+            <p:cNvPr id="137" name="Arc 136"/>
+            <p:cNvSpPr/>
+            <p:nvPr/>
+          </p:nvSpPr>
+          <p:spPr>
+            <a:xfrm>
+              <a:off x="4553104" y="4564226"/>
+              <a:ext cx="363438" cy="430210"/>
+            </a:xfrm>
+            <a:prstGeom prst="arc">
+              <a:avLst>
+                <a:gd name="adj1" fmla="val 16657186"/>
+                <a:gd name="adj2" fmla="val 20972173"/>
+              </a:avLst>
+            </a:prstGeom>
+            <a:ln w="19050">
+              <a:solidFill>
+                <a:schemeClr val="tx1"/>
+              </a:solidFill>
+              <a:prstDash val="sysDot"/>
+            </a:ln>
+          </p:spPr>
+          <p:style>
+            <a:lnRef idx="1">
+              <a:schemeClr val="accent1"/>
+            </a:lnRef>
+            <a:fillRef idx="0">
+              <a:schemeClr val="accent1"/>
+            </a:fillRef>
+            <a:effectRef idx="0">
+              <a:schemeClr val="accent1"/>
+            </a:effectRef>
+            <a:fontRef idx="minor">
+              <a:schemeClr val="tx1"/>
+            </a:fontRef>
+          </p:style>
+          <p:txBody>
+            <a:bodyPr rtlCol="0" anchor="ctr"/>
+            <a:lstStyle/>
+            <a:p>
+              <a:pPr algn="ctr"/>
+              <a:endParaRPr lang="en-US"/>
+            </a:p>
+          </p:txBody>
+        </p:sp>
+        <mc:AlternateContent xmlns:mc="http://schemas.openxmlformats.org/markup-compatibility/2006">
+          <mc:Choice xmlns:a14="http://schemas.microsoft.com/office/drawing/2010/main" Requires="a14">
+            <p:sp>
+              <p:nvSpPr>
+                <p:cNvPr id="138" name="TextBox 137"/>
+                <p:cNvSpPr txBox="1"/>
+                <p:nvPr/>
+              </p:nvSpPr>
+              <p:spPr>
+                <a:xfrm>
+                  <a:off x="4941953" y="4335614"/>
+                  <a:ext cx="222304" cy="307777"/>
+                </a:xfrm>
+                <a:prstGeom prst="rect">
+                  <a:avLst/>
+                </a:prstGeom>
+                <a:noFill/>
+              </p:spPr>
+              <p:txBody>
+                <a:bodyPr wrap="none" lIns="0" tIns="0" rIns="0" bIns="0" rtlCol="0">
+                  <a:spAutoFit/>
+                </a:bodyPr>
+                <a:lstStyle/>
+                <a:p>
+                  <a14:m>
+                    <m:oMathPara xmlns:m="http://schemas.openxmlformats.org/officeDocument/2006/math">
+                      <m:oMathParaPr>
+                        <m:jc m:val="centerGroup"/>
+                      </m:oMathParaPr>
+                      <m:oMath xmlns:m="http://schemas.openxmlformats.org/officeDocument/2006/math">
+                        <m:r>
+                          <a:rPr lang="en-US" sz="2000" b="0" i="1" smtClean="0">
+                            <a:latin typeface="Cambria Math" panose="02040503050406030204" pitchFamily="18" charset="0"/>
+                            <a:cs typeface="Arial" panose="020B0604020202020204" pitchFamily="34" charset="0"/>
+                          </a:rPr>
+                          <m:t>𝜃</m:t>
+                        </m:r>
+                      </m:oMath>
+                    </m:oMathPara>
+                  </a14:m>
+                  <a:endParaRPr lang="en-US" sz="2000" dirty="0" smtClean="0">
+                    <a:latin typeface="Arial" panose="020B0604020202020204" pitchFamily="34" charset="0"/>
+                    <a:cs typeface="Arial" panose="020B0604020202020204" pitchFamily="34" charset="0"/>
+                  </a:endParaRPr>
+                </a:p>
+              </p:txBody>
+            </p:sp>
+          </mc:Choice>
+          <mc:Fallback>
+            <p:sp>
+              <p:nvSpPr>
+                <p:cNvPr id="138" name="TextBox 137"/>
+                <p:cNvSpPr txBox="1">
+                  <a:spLocks noRot="1" noChangeAspect="1" noMove="1" noResize="1" noEditPoints="1" noAdjustHandles="1" noChangeArrowheads="1" noChangeShapeType="1" noTextEdit="1"/>
+                </p:cNvSpPr>
+                <p:nvPr/>
+              </p:nvSpPr>
+              <p:spPr>
+                <a:xfrm>
+                  <a:off x="4941953" y="4335614"/>
+                  <a:ext cx="222304" cy="307777"/>
+                </a:xfrm>
+                <a:prstGeom prst="rect">
+                  <a:avLst/>
+                </a:prstGeom>
+                <a:blipFill>
+                  <a:blip r:embed="rId27"/>
+                  <a:stretch>
+                    <a:fillRect l="-25000" r="-25000" b="-9804"/>
+                  </a:stretch>
+                </a:blipFill>
+              </p:spPr>
+              <p:txBody>
+                <a:bodyPr/>
+                <a:lstStyle/>
+                <a:p>
+                  <a:r>
+                    <a:rPr lang="en-US">
+                      <a:noFill/>
+                    </a:rPr>
+                    <a:t> </a:t>
+                  </a:r>
+                </a:p>
+              </p:txBody>
+            </p:sp>
+          </mc:Fallback>
+        </mc:AlternateContent>
+        <mc:AlternateContent xmlns:mc="http://schemas.openxmlformats.org/markup-compatibility/2006">
+          <mc:Choice xmlns:a14="http://schemas.microsoft.com/office/drawing/2010/main" Requires="a14">
+            <p:sp>
+              <p:nvSpPr>
+                <p:cNvPr id="139" name="Rectangle 138"/>
+                <p:cNvSpPr/>
+                <p:nvPr/>
+              </p:nvSpPr>
+              <p:spPr>
+                <a:xfrm>
+                  <a:off x="5054785" y="4717127"/>
+                  <a:ext cx="371448" cy="369332"/>
+                </a:xfrm>
+                <a:prstGeom prst="rect">
+                  <a:avLst/>
+                </a:prstGeom>
+              </p:spPr>
+              <p:txBody>
+                <a:bodyPr wrap="none">
+                  <a:spAutoFit/>
+                </a:bodyPr>
+                <a:lstStyle/>
+                <a:p>
+                  <a:pPr/>
+                  <a14:m>
+                    <m:oMathPara xmlns:m="http://schemas.openxmlformats.org/officeDocument/2006/math">
+                      <m:oMathParaPr>
+                        <m:jc m:val="centerGroup"/>
+                      </m:oMathParaPr>
+                      <m:oMath xmlns:m="http://schemas.openxmlformats.org/officeDocument/2006/math">
+                        <m:acc>
+                          <m:accPr>
+                            <m:chr m:val="⃗"/>
+                            <m:ctrlPr>
+                              <a:rPr lang="en-US" b="0" i="1" smtClean="0">
+                                <a:latin typeface="Cambria Math" panose="02040503050406030204" pitchFamily="18" charset="0"/>
+                                <a:cs typeface="Arial" panose="020B0604020202020204" pitchFamily="34" charset="0"/>
+                              </a:rPr>
+                            </m:ctrlPr>
+                          </m:accPr>
+                          <m:e>
+                            <m:r>
+                              <a:rPr lang="en-US" b="0" i="1" smtClean="0">
+                                <a:latin typeface="Cambria Math" panose="02040503050406030204" pitchFamily="18" charset="0"/>
+                                <a:cs typeface="Arial" panose="020B0604020202020204" pitchFamily="34" charset="0"/>
+                              </a:rPr>
+                              <m:t>𝑎</m:t>
+                            </m:r>
+                          </m:e>
+                        </m:acc>
+                      </m:oMath>
+                    </m:oMathPara>
+                  </a14:m>
+                  <a:endParaRPr lang="en-CA" dirty="0"/>
+                </a:p>
+              </p:txBody>
+            </p:sp>
+          </mc:Choice>
+          <mc:Fallback>
+            <p:sp>
+              <p:nvSpPr>
+                <p:cNvPr id="139" name="Rectangle 138"/>
+                <p:cNvSpPr>
+                  <a:spLocks noRot="1" noChangeAspect="1" noMove="1" noResize="1" noEditPoints="1" noAdjustHandles="1" noChangeArrowheads="1" noChangeShapeType="1" noTextEdit="1"/>
+                </p:cNvSpPr>
+                <p:nvPr/>
+              </p:nvSpPr>
+              <p:spPr>
+                <a:xfrm>
+                  <a:off x="5054785" y="4717127"/>
+                  <a:ext cx="371448" cy="369332"/>
+                </a:xfrm>
+                <a:prstGeom prst="rect">
+                  <a:avLst/>
+                </a:prstGeom>
+                <a:blipFill>
+                  <a:blip r:embed="rId28"/>
+                  <a:stretch>
+                    <a:fillRect t="-23333" r="-26230"/>
+                  </a:stretch>
+                </a:blipFill>
+              </p:spPr>
+              <p:txBody>
+                <a:bodyPr/>
+                <a:lstStyle/>
+                <a:p>
+                  <a:r>
+                    <a:rPr lang="en-US">
+                      <a:noFill/>
+                    </a:rPr>
+                    <a:t> </a:t>
+                  </a:r>
+                </a:p>
+              </p:txBody>
+            </p:sp>
+          </mc:Fallback>
+        </mc:AlternateContent>
+        <mc:AlternateContent xmlns:mc="http://schemas.openxmlformats.org/markup-compatibility/2006">
+          <mc:Choice xmlns:a14="http://schemas.microsoft.com/office/drawing/2010/main" Requires="a14">
+            <p:sp>
+              <p:nvSpPr>
+                <p:cNvPr id="140" name="Rectangle 139"/>
+                <p:cNvSpPr/>
+                <p:nvPr/>
+              </p:nvSpPr>
+              <p:spPr>
+                <a:xfrm>
+                  <a:off x="4887111" y="3679042"/>
+                  <a:ext cx="367665" cy="410305"/>
+                </a:xfrm>
+                <a:prstGeom prst="rect">
+                  <a:avLst/>
+                </a:prstGeom>
+              </p:spPr>
+              <p:txBody>
+                <a:bodyPr wrap="none">
+                  <a:spAutoFit/>
+                </a:bodyPr>
+                <a:lstStyle/>
+                <a:p>
+                  <a:pPr/>
+                  <a14:m>
+                    <m:oMathPara xmlns:m="http://schemas.openxmlformats.org/officeDocument/2006/math">
+                      <m:oMathParaPr>
+                        <m:jc m:val="centerGroup"/>
+                      </m:oMathParaPr>
+                      <m:oMath xmlns:m="http://schemas.openxmlformats.org/officeDocument/2006/math">
+                        <m:acc>
+                          <m:accPr>
+                            <m:chr m:val="⃗"/>
+                            <m:ctrlPr>
+                              <a:rPr lang="en-US" b="0" i="1" smtClean="0">
+                                <a:latin typeface="Cambria Math" panose="02040503050406030204" pitchFamily="18" charset="0"/>
+                                <a:cs typeface="Arial" panose="020B0604020202020204" pitchFamily="34" charset="0"/>
+                              </a:rPr>
+                            </m:ctrlPr>
+                          </m:accPr>
+                          <m:e>
+                            <m:r>
+                              <a:rPr lang="en-US" b="0" i="1" smtClean="0">
+                                <a:latin typeface="Cambria Math" panose="02040503050406030204" pitchFamily="18" charset="0"/>
+                                <a:cs typeface="Arial" panose="020B0604020202020204" pitchFamily="34" charset="0"/>
+                              </a:rPr>
+                              <m:t>𝑏</m:t>
+                            </m:r>
+                          </m:e>
+                        </m:acc>
+                      </m:oMath>
+                    </m:oMathPara>
+                  </a14:m>
+                  <a:endParaRPr lang="en-CA" dirty="0"/>
+                </a:p>
+              </p:txBody>
+            </p:sp>
+          </mc:Choice>
+          <mc:Fallback>
+            <p:sp>
+              <p:nvSpPr>
+                <p:cNvPr id="140" name="Rectangle 139"/>
+                <p:cNvSpPr>
+                  <a:spLocks noRot="1" noChangeAspect="1" noMove="1" noResize="1" noEditPoints="1" noAdjustHandles="1" noChangeArrowheads="1" noChangeShapeType="1" noTextEdit="1"/>
+                </p:cNvSpPr>
+                <p:nvPr/>
+              </p:nvSpPr>
+              <p:spPr>
+                <a:xfrm>
+                  <a:off x="4887111" y="3679042"/>
+                  <a:ext cx="367665" cy="410305"/>
+                </a:xfrm>
+                <a:prstGeom prst="rect">
+                  <a:avLst/>
+                </a:prstGeom>
+                <a:blipFill>
+                  <a:blip r:embed="rId29"/>
+                  <a:stretch>
+                    <a:fillRect/>
+                  </a:stretch>
+                </a:blipFill>
+              </p:spPr>
+              <p:txBody>
+                <a:bodyPr/>
+                <a:lstStyle/>
+                <a:p>
+                  <a:r>
+                    <a:rPr lang="en-US">
+                      <a:noFill/>
+                    </a:rPr>
+                    <a:t> </a:t>
+                  </a:r>
+                </a:p>
+              </p:txBody>
+            </p:sp>
+          </mc:Fallback>
+        </mc:AlternateContent>
+      </p:grpSp>
     </p:spTree>
     <p:extLst>
       <p:ext uri="{BB962C8B-B14F-4D97-AF65-F5344CB8AC3E}">
@@ -23590,6 +28238,13 @@
   <p:clrMapOvr>
     <a:masterClrMapping/>
   </p:clrMapOvr>
+  <p:timing>
+    <p:tnLst>
+      <p:par>
+        <p:cTn id="1" dur="indefinite" restart="never" nodeType="tmRoot"/>
+      </p:par>
+    </p:tnLst>
+  </p:timing>
 </p:sld>
 </file>
 
@@ -23620,6 +28275,13 @@
   <p:clrMapOvr>
     <a:masterClrMapping/>
   </p:clrMapOvr>
+  <p:timing>
+    <p:tnLst>
+      <p:par>
+        <p:cTn id="1" dur="indefinite" restart="never" nodeType="tmRoot"/>
+      </p:par>
+    </p:tnLst>
+  </p:timing>
 </p:sld>
 </file>
 

</xml_diff>

<commit_message>
moved python stuff to appendix
removed python code from chapter 2 into appendix C
</commit_message>
<xml_diff>
--- a/tex/figures/Figures.pptx
+++ b/tex/figures/Figures.pptx
@@ -29359,193 +29359,755 @@
           </p:txBody>
         </p:sp>
       </p:grpSp>
-      <p:sp>
-        <p:nvSpPr>
-          <p:cNvPr id="19" name="Oval 18"/>
-          <p:cNvSpPr/>
+      <p:grpSp>
+        <p:nvGrpSpPr>
+          <p:cNvPr id="42" name="Group 41"/>
+          <p:cNvGrpSpPr/>
           <p:nvPr/>
-        </p:nvSpPr>
-        <p:spPr>
+        </p:nvGrpSpPr>
+        <p:grpSpPr>
           <a:xfrm>
-            <a:off x="740389" y="3088640"/>
-            <a:ext cx="1596411" cy="1584960"/>
+            <a:off x="2189660" y="2683219"/>
+            <a:ext cx="3372973" cy="2081821"/>
+            <a:chOff x="2189660" y="2683219"/>
+            <a:chExt cx="3372973" cy="2081821"/>
           </a:xfrm>
-          <a:prstGeom prst="ellipse">
-            <a:avLst/>
-          </a:prstGeom>
-          <a:noFill/>
-          <a:ln w="38100">
+        </p:grpSpPr>
+        <p:sp>
+          <p:nvSpPr>
+            <p:cNvPr id="19" name="Oval 18"/>
+            <p:cNvSpPr/>
+            <p:nvPr/>
+          </p:nvSpPr>
+          <p:spPr>
+            <a:xfrm>
+              <a:off x="2189660" y="3180080"/>
+              <a:ext cx="1596411" cy="1584960"/>
+            </a:xfrm>
+            <a:prstGeom prst="ellipse">
+              <a:avLst/>
+            </a:prstGeom>
             <a:solidFill>
+              <a:schemeClr val="bg2">
+                <a:lumMod val="90000"/>
+              </a:schemeClr>
+            </a:solidFill>
+            <a:ln w="38100">
+              <a:solidFill>
+                <a:schemeClr val="tx1"/>
+              </a:solidFill>
+            </a:ln>
+          </p:spPr>
+          <p:style>
+            <a:lnRef idx="2">
+              <a:schemeClr val="accent1">
+                <a:shade val="50000"/>
+              </a:schemeClr>
+            </a:lnRef>
+            <a:fillRef idx="1">
+              <a:schemeClr val="accent1"/>
+            </a:fillRef>
+            <a:effectRef idx="0">
+              <a:schemeClr val="accent1"/>
+            </a:effectRef>
+            <a:fontRef idx="minor">
+              <a:schemeClr val="lt1"/>
+            </a:fontRef>
+          </p:style>
+          <p:txBody>
+            <a:bodyPr rot="0" spcFirstLastPara="0" vertOverflow="overflow" horzOverflow="overflow" vert="horz" wrap="square" lIns="91440" tIns="45720" rIns="91440" bIns="45720" numCol="1" spcCol="0" rtlCol="0" fromWordArt="0" anchor="ctr" anchorCtr="0" forceAA="0" compatLnSpc="1">
+              <a:prstTxWarp prst="textNoShape">
+                <a:avLst/>
+              </a:prstTxWarp>
+              <a:noAutofit/>
+            </a:bodyPr>
+            <a:lstStyle/>
+            <a:p>
+              <a:pPr algn="ctr"/>
+              <a:endParaRPr lang="en-US"/>
+            </a:p>
+          </p:txBody>
+        </p:sp>
+        <p:cxnSp>
+          <p:nvCxnSpPr>
+            <p:cNvPr id="20" name="Straight Arrow Connector 19"/>
+            <p:cNvCxnSpPr/>
+            <p:nvPr/>
+          </p:nvCxnSpPr>
+          <p:spPr>
+            <a:xfrm flipV="1">
+              <a:off x="3745431" y="2683219"/>
+              <a:ext cx="259458" cy="1007692"/>
+            </a:xfrm>
+            <a:prstGeom prst="straightConnector1">
+              <a:avLst/>
+            </a:prstGeom>
+            <a:ln w="38100">
+              <a:solidFill>
+                <a:schemeClr val="tx1"/>
+              </a:solidFill>
+              <a:tailEnd type="triangle"/>
+            </a:ln>
+          </p:spPr>
+          <p:style>
+            <a:lnRef idx="1">
+              <a:schemeClr val="accent1"/>
+            </a:lnRef>
+            <a:fillRef idx="0">
+              <a:schemeClr val="accent1"/>
+            </a:fillRef>
+            <a:effectRef idx="0">
+              <a:schemeClr val="accent1"/>
+            </a:effectRef>
+            <a:fontRef idx="minor">
               <a:schemeClr val="tx1"/>
-            </a:solidFill>
-          </a:ln>
-        </p:spPr>
-        <p:style>
-          <a:lnRef idx="2">
-            <a:schemeClr val="accent1">
-              <a:shade val="50000"/>
-            </a:schemeClr>
-          </a:lnRef>
-          <a:fillRef idx="1">
-            <a:schemeClr val="accent1"/>
-          </a:fillRef>
-          <a:effectRef idx="0">
-            <a:schemeClr val="accent1"/>
-          </a:effectRef>
-          <a:fontRef idx="minor">
-            <a:schemeClr val="lt1"/>
-          </a:fontRef>
-        </p:style>
-        <p:txBody>
-          <a:bodyPr rot="0" spcFirstLastPara="0" vertOverflow="overflow" horzOverflow="overflow" vert="horz" wrap="square" lIns="91440" tIns="45720" rIns="91440" bIns="45720" numCol="1" spcCol="0" rtlCol="0" fromWordArt="0" anchor="ctr" anchorCtr="0" forceAA="0" compatLnSpc="1">
-            <a:prstTxWarp prst="textNoShape">
+            </a:fontRef>
+          </p:style>
+        </p:cxnSp>
+        <mc:AlternateContent xmlns:mc="http://schemas.openxmlformats.org/markup-compatibility/2006">
+          <mc:Choice xmlns:a14="http://schemas.microsoft.com/office/drawing/2010/main" Requires="a14">
+            <p:sp>
+              <p:nvSpPr>
+                <p:cNvPr id="21" name="TextBox 20"/>
+                <p:cNvSpPr txBox="1"/>
+                <p:nvPr/>
+              </p:nvSpPr>
+              <p:spPr>
+                <a:xfrm>
+                  <a:off x="3596838" y="3007500"/>
+                  <a:ext cx="208416" cy="345159"/>
+                </a:xfrm>
+                <a:prstGeom prst="rect">
+                  <a:avLst/>
+                </a:prstGeom>
+                <a:noFill/>
+              </p:spPr>
+              <p:txBody>
+                <a:bodyPr wrap="square" lIns="0" tIns="0" rIns="0" bIns="0" rtlCol="0">
+                  <a:spAutoFit/>
+                </a:bodyPr>
+                <a:lstStyle/>
+                <a:p>
+                  <a14:m>
+                    <m:oMathPara xmlns:m="http://schemas.openxmlformats.org/officeDocument/2006/math">
+                      <m:oMathParaPr>
+                        <m:jc m:val="centerGroup"/>
+                      </m:oMathParaPr>
+                      <m:oMath xmlns:m="http://schemas.openxmlformats.org/officeDocument/2006/math">
+                        <m:acc>
+                          <m:accPr>
+                            <m:chr m:val="⃗"/>
+                            <m:ctrlPr>
+                              <a:rPr lang="en-US" sz="2000" b="0" i="1" smtClean="0">
+                                <a:latin typeface="Cambria Math" panose="02040503050406030204" pitchFamily="18" charset="0"/>
+                                <a:cs typeface="Arial" panose="020B0604020202020204" pitchFamily="34" charset="0"/>
+                              </a:rPr>
+                            </m:ctrlPr>
+                          </m:accPr>
+                          <m:e>
+                            <m:r>
+                              <a:rPr lang="en-US" sz="2000" b="0" i="1" smtClean="0">
+                                <a:latin typeface="Cambria Math" panose="02040503050406030204" pitchFamily="18" charset="0"/>
+                                <a:cs typeface="Arial" panose="020B0604020202020204" pitchFamily="34" charset="0"/>
+                              </a:rPr>
+                              <m:t>𝐹</m:t>
+                            </m:r>
+                          </m:e>
+                        </m:acc>
+                      </m:oMath>
+                    </m:oMathPara>
+                  </a14:m>
+                  <a:endParaRPr lang="en-US" sz="2000" dirty="0" smtClean="0">
+                    <a:latin typeface="Arial" panose="020B0604020202020204" pitchFamily="34" charset="0"/>
+                    <a:cs typeface="Arial" panose="020B0604020202020204" pitchFamily="34" charset="0"/>
+                  </a:endParaRPr>
+                </a:p>
+              </p:txBody>
+            </p:sp>
+          </mc:Choice>
+          <mc:Fallback>
+            <p:sp>
+              <p:nvSpPr>
+                <p:cNvPr id="21" name="TextBox 20"/>
+                <p:cNvSpPr txBox="1">
+                  <a:spLocks noRot="1" noChangeAspect="1" noMove="1" noResize="1" noEditPoints="1" noAdjustHandles="1" noChangeArrowheads="1" noChangeShapeType="1" noTextEdit="1"/>
+                </p:cNvSpPr>
+                <p:nvPr/>
+              </p:nvSpPr>
+              <p:spPr>
+                <a:xfrm>
+                  <a:off x="3596838" y="3007500"/>
+                  <a:ext cx="208416" cy="345159"/>
+                </a:xfrm>
+                <a:prstGeom prst="rect">
+                  <a:avLst/>
+                </a:prstGeom>
+                <a:blipFill>
+                  <a:blip r:embed="rId5"/>
+                  <a:stretch>
+                    <a:fillRect l="-32353" t="-33333" r="-97059" b="-8772"/>
+                  </a:stretch>
+                </a:blipFill>
+              </p:spPr>
+              <p:txBody>
+                <a:bodyPr/>
+                <a:lstStyle/>
+                <a:p>
+                  <a:r>
+                    <a:rPr lang="en-US">
+                      <a:noFill/>
+                    </a:rPr>
+                    <a:t> </a:t>
+                  </a:r>
+                </a:p>
+              </p:txBody>
+            </p:sp>
+          </mc:Fallback>
+        </mc:AlternateContent>
+        <p:cxnSp>
+          <p:nvCxnSpPr>
+            <p:cNvPr id="24" name="Straight Arrow Connector 23"/>
+            <p:cNvCxnSpPr/>
+            <p:nvPr/>
+          </p:nvCxnSpPr>
+          <p:spPr>
+            <a:xfrm flipV="1">
+              <a:off x="2942791" y="3690912"/>
+              <a:ext cx="802640" cy="310310"/>
+            </a:xfrm>
+            <a:prstGeom prst="straightConnector1">
               <a:avLst/>
-            </a:prstTxWarp>
-            <a:noAutofit/>
-          </a:bodyPr>
-          <a:lstStyle/>
-          <a:p>
-            <a:pPr algn="ctr"/>
-            <a:endParaRPr lang="en-US"/>
-          </a:p>
-        </p:txBody>
-      </p:sp>
-      <p:cxnSp>
-        <p:nvCxnSpPr>
-          <p:cNvPr id="20" name="Straight Arrow Connector 19"/>
-          <p:cNvCxnSpPr/>
-          <p:nvPr/>
-        </p:nvCxnSpPr>
-        <p:spPr>
-          <a:xfrm flipH="1" flipV="1">
-            <a:off x="2112672" y="2605750"/>
-            <a:ext cx="109786" cy="846110"/>
-          </a:xfrm>
-          <a:prstGeom prst="straightConnector1">
-            <a:avLst/>
-          </a:prstGeom>
-          <a:ln w="38100">
-            <a:solidFill>
+            </a:prstGeom>
+            <a:ln w="38100">
+              <a:solidFill>
+                <a:schemeClr val="tx1"/>
+              </a:solidFill>
+              <a:tailEnd type="triangle"/>
+            </a:ln>
+          </p:spPr>
+          <p:style>
+            <a:lnRef idx="1">
+              <a:schemeClr val="accent1"/>
+            </a:lnRef>
+            <a:fillRef idx="0">
+              <a:schemeClr val="accent1"/>
+            </a:fillRef>
+            <a:effectRef idx="0">
+              <a:schemeClr val="accent1"/>
+            </a:effectRef>
+            <a:fontRef idx="minor">
               <a:schemeClr val="tx1"/>
-            </a:solidFill>
-            <a:tailEnd type="triangle"/>
-          </a:ln>
-        </p:spPr>
-        <p:style>
-          <a:lnRef idx="1">
-            <a:schemeClr val="accent1"/>
-          </a:lnRef>
-          <a:fillRef idx="0">
-            <a:schemeClr val="accent1"/>
-          </a:fillRef>
-          <a:effectRef idx="0">
-            <a:schemeClr val="accent1"/>
-          </a:effectRef>
-          <a:fontRef idx="minor">
-            <a:schemeClr val="tx1"/>
-          </a:fontRef>
-        </p:style>
-      </p:cxnSp>
-      <mc:AlternateContent xmlns:mc="http://schemas.openxmlformats.org/markup-compatibility/2006">
-        <mc:Choice xmlns:a14="http://schemas.microsoft.com/office/drawing/2010/main" Requires="a14">
-          <p:sp>
-            <p:nvSpPr>
-              <p:cNvPr id="21" name="TextBox 20"/>
-              <p:cNvSpPr txBox="1"/>
-              <p:nvPr/>
-            </p:nvSpPr>
-            <p:spPr>
-              <a:xfrm>
-                <a:off x="2301104" y="2743481"/>
-                <a:ext cx="208416" cy="345159"/>
-              </a:xfrm>
-              <a:prstGeom prst="rect">
-                <a:avLst/>
-              </a:prstGeom>
-              <a:noFill/>
-            </p:spPr>
-            <p:txBody>
-              <a:bodyPr wrap="square" lIns="0" tIns="0" rIns="0" bIns="0" rtlCol="0">
-                <a:spAutoFit/>
-              </a:bodyPr>
-              <a:lstStyle/>
-              <a:p>
-                <a14:m>
-                  <m:oMathPara xmlns:m="http://schemas.openxmlformats.org/officeDocument/2006/math">
-                    <m:oMathParaPr>
-                      <m:jc m:val="centerGroup"/>
-                    </m:oMathParaPr>
-                    <m:oMath xmlns:m="http://schemas.openxmlformats.org/officeDocument/2006/math">
-                      <m:acc>
-                        <m:accPr>
-                          <m:chr m:val="⃗"/>
-                          <m:ctrlPr>
-                            <a:rPr lang="en-US" sz="2000" b="0" i="1" smtClean="0">
-                              <a:latin typeface="Cambria Math" panose="02040503050406030204" pitchFamily="18" charset="0"/>
-                              <a:cs typeface="Arial" panose="020B0604020202020204" pitchFamily="34" charset="0"/>
-                            </a:rPr>
-                          </m:ctrlPr>
-                        </m:accPr>
-                        <m:e>
-                          <m:r>
-                            <a:rPr lang="en-US" sz="2000" b="0" i="1" smtClean="0">
-                              <a:latin typeface="Cambria Math" panose="02040503050406030204" pitchFamily="18" charset="0"/>
-                              <a:cs typeface="Arial" panose="020B0604020202020204" pitchFamily="34" charset="0"/>
-                            </a:rPr>
-                            <m:t>𝐹</m:t>
-                          </m:r>
-                        </m:e>
-                      </m:acc>
-                    </m:oMath>
-                  </m:oMathPara>
-                </a14:m>
-                <a:endParaRPr lang="en-US" sz="2000" dirty="0" smtClean="0">
-                  <a:latin typeface="Arial" panose="020B0604020202020204" pitchFamily="34" charset="0"/>
-                  <a:cs typeface="Arial" panose="020B0604020202020204" pitchFamily="34" charset="0"/>
-                </a:endParaRPr>
-              </a:p>
-            </p:txBody>
-          </p:sp>
-        </mc:Choice>
-        <mc:Fallback>
-          <p:sp>
-            <p:nvSpPr>
-              <p:cNvPr id="21" name="TextBox 20"/>
-              <p:cNvSpPr txBox="1">
-                <a:spLocks noRot="1" noChangeAspect="1" noMove="1" noResize="1" noEditPoints="1" noAdjustHandles="1" noChangeArrowheads="1" noChangeShapeType="1" noTextEdit="1"/>
-              </p:cNvSpPr>
-              <p:nvPr/>
-            </p:nvSpPr>
-            <p:spPr>
-              <a:xfrm>
-                <a:off x="2301104" y="2743481"/>
-                <a:ext cx="208416" cy="345159"/>
-              </a:xfrm>
-              <a:prstGeom prst="rect">
-                <a:avLst/>
-              </a:prstGeom>
-              <a:blipFill>
-                <a:blip r:embed="rId5"/>
-                <a:stretch>
-                  <a:fillRect l="-31429" t="-33333" r="-91429" b="-8772"/>
-                </a:stretch>
-              </a:blipFill>
-            </p:spPr>
-            <p:txBody>
-              <a:bodyPr/>
-              <a:lstStyle/>
-              <a:p>
-                <a:r>
-                  <a:rPr lang="en-US">
-                    <a:noFill/>
-                  </a:rPr>
-                  <a:t> </a:t>
-                </a:r>
-              </a:p>
-            </p:txBody>
-          </p:sp>
-        </mc:Fallback>
-      </mc:AlternateContent>
+            </a:fontRef>
+          </p:style>
+        </p:cxnSp>
+        <mc:AlternateContent xmlns:mc="http://schemas.openxmlformats.org/markup-compatibility/2006">
+          <mc:Choice xmlns:a14="http://schemas.microsoft.com/office/drawing/2010/main" Requires="a14">
+            <p:sp>
+              <p:nvSpPr>
+                <p:cNvPr id="27" name="TextBox 26"/>
+                <p:cNvSpPr txBox="1"/>
+                <p:nvPr/>
+              </p:nvSpPr>
+              <p:spPr>
+                <a:xfrm>
+                  <a:off x="3344111" y="3866025"/>
+                  <a:ext cx="198003" cy="307777"/>
+                </a:xfrm>
+                <a:prstGeom prst="rect">
+                  <a:avLst/>
+                </a:prstGeom>
+                <a:noFill/>
+              </p:spPr>
+              <p:txBody>
+                <a:bodyPr wrap="none" lIns="0" tIns="0" rIns="0" bIns="0" rtlCol="0">
+                  <a:spAutoFit/>
+                </a:bodyPr>
+                <a:lstStyle/>
+                <a:p>
+                  <a14:m>
+                    <m:oMathPara xmlns:m="http://schemas.openxmlformats.org/officeDocument/2006/math">
+                      <m:oMathParaPr>
+                        <m:jc m:val="centerGroup"/>
+                      </m:oMathParaPr>
+                      <m:oMath xmlns:m="http://schemas.openxmlformats.org/officeDocument/2006/math">
+                        <m:acc>
+                          <m:accPr>
+                            <m:chr m:val="⃗"/>
+                            <m:ctrlPr>
+                              <a:rPr lang="en-US" sz="2000" b="0" i="1" smtClean="0">
+                                <a:latin typeface="Cambria Math" panose="02040503050406030204" pitchFamily="18" charset="0"/>
+                                <a:cs typeface="Arial" panose="020B0604020202020204" pitchFamily="34" charset="0"/>
+                              </a:rPr>
+                            </m:ctrlPr>
+                          </m:accPr>
+                          <m:e>
+                            <m:r>
+                              <a:rPr lang="en-US" sz="2000" b="0" i="1" smtClean="0">
+                                <a:latin typeface="Cambria Math" panose="02040503050406030204" pitchFamily="18" charset="0"/>
+                                <a:cs typeface="Arial" panose="020B0604020202020204" pitchFamily="34" charset="0"/>
+                              </a:rPr>
+                              <m:t>𝑟</m:t>
+                            </m:r>
+                          </m:e>
+                        </m:acc>
+                      </m:oMath>
+                    </m:oMathPara>
+                  </a14:m>
+                  <a:endParaRPr lang="en-US" sz="2000" dirty="0" smtClean="0">
+                    <a:latin typeface="Arial" panose="020B0604020202020204" pitchFamily="34" charset="0"/>
+                    <a:cs typeface="Arial" panose="020B0604020202020204" pitchFamily="34" charset="0"/>
+                  </a:endParaRPr>
+                </a:p>
+              </p:txBody>
+            </p:sp>
+          </mc:Choice>
+          <mc:Fallback>
+            <p:sp>
+              <p:nvSpPr>
+                <p:cNvPr id="27" name="TextBox 26"/>
+                <p:cNvSpPr txBox="1">
+                  <a:spLocks noRot="1" noChangeAspect="1" noMove="1" noResize="1" noEditPoints="1" noAdjustHandles="1" noChangeArrowheads="1" noChangeShapeType="1" noTextEdit="1"/>
+                </p:cNvSpPr>
+                <p:nvPr/>
+              </p:nvSpPr>
+              <p:spPr>
+                <a:xfrm>
+                  <a:off x="3344111" y="3866025"/>
+                  <a:ext cx="198003" cy="307777"/>
+                </a:xfrm>
+                <a:prstGeom prst="rect">
+                  <a:avLst/>
+                </a:prstGeom>
+                <a:blipFill>
+                  <a:blip r:embed="rId6"/>
+                  <a:stretch>
+                    <a:fillRect l="-31250" t="-33333" r="-96875" b="-5882"/>
+                  </a:stretch>
+                </a:blipFill>
+              </p:spPr>
+              <p:txBody>
+                <a:bodyPr/>
+                <a:lstStyle/>
+                <a:p>
+                  <a:r>
+                    <a:rPr lang="en-US">
+                      <a:noFill/>
+                    </a:rPr>
+                    <a:t> </a:t>
+                  </a:r>
+                </a:p>
+              </p:txBody>
+            </p:sp>
+          </mc:Fallback>
+        </mc:AlternateContent>
+        <p:cxnSp>
+          <p:nvCxnSpPr>
+            <p:cNvPr id="34" name="Straight Arrow Connector 33"/>
+            <p:cNvCxnSpPr/>
+            <p:nvPr/>
+          </p:nvCxnSpPr>
+          <p:spPr>
+            <a:xfrm flipV="1">
+              <a:off x="4770153" y="2848813"/>
+              <a:ext cx="259458" cy="1007692"/>
+            </a:xfrm>
+            <a:prstGeom prst="straightConnector1">
+              <a:avLst/>
+            </a:prstGeom>
+            <a:ln w="38100">
+              <a:solidFill>
+                <a:schemeClr val="tx1"/>
+              </a:solidFill>
+              <a:tailEnd type="triangle"/>
+            </a:ln>
+          </p:spPr>
+          <p:style>
+            <a:lnRef idx="1">
+              <a:schemeClr val="accent1"/>
+            </a:lnRef>
+            <a:fillRef idx="0">
+              <a:schemeClr val="accent1"/>
+            </a:fillRef>
+            <a:effectRef idx="0">
+              <a:schemeClr val="accent1"/>
+            </a:effectRef>
+            <a:fontRef idx="minor">
+              <a:schemeClr val="tx1"/>
+            </a:fontRef>
+          </p:style>
+        </p:cxnSp>
+        <mc:AlternateContent xmlns:mc="http://schemas.openxmlformats.org/markup-compatibility/2006">
+          <mc:Choice xmlns:a14="http://schemas.microsoft.com/office/drawing/2010/main" Requires="a14">
+            <p:sp>
+              <p:nvSpPr>
+                <p:cNvPr id="35" name="TextBox 34"/>
+                <p:cNvSpPr txBox="1"/>
+                <p:nvPr/>
+              </p:nvSpPr>
+              <p:spPr>
+                <a:xfrm>
+                  <a:off x="4611400" y="3162934"/>
+                  <a:ext cx="208416" cy="345159"/>
+                </a:xfrm>
+                <a:prstGeom prst="rect">
+                  <a:avLst/>
+                </a:prstGeom>
+                <a:noFill/>
+              </p:spPr>
+              <p:txBody>
+                <a:bodyPr wrap="square" lIns="0" tIns="0" rIns="0" bIns="0" rtlCol="0">
+                  <a:spAutoFit/>
+                </a:bodyPr>
+                <a:lstStyle/>
+                <a:p>
+                  <a14:m>
+                    <m:oMathPara xmlns:m="http://schemas.openxmlformats.org/officeDocument/2006/math">
+                      <m:oMathParaPr>
+                        <m:jc m:val="centerGroup"/>
+                      </m:oMathParaPr>
+                      <m:oMath xmlns:m="http://schemas.openxmlformats.org/officeDocument/2006/math">
+                        <m:acc>
+                          <m:accPr>
+                            <m:chr m:val="⃗"/>
+                            <m:ctrlPr>
+                              <a:rPr lang="en-US" sz="2000" b="0" i="1" smtClean="0">
+                                <a:latin typeface="Cambria Math" panose="02040503050406030204" pitchFamily="18" charset="0"/>
+                                <a:cs typeface="Arial" panose="020B0604020202020204" pitchFamily="34" charset="0"/>
+                              </a:rPr>
+                            </m:ctrlPr>
+                          </m:accPr>
+                          <m:e>
+                            <m:r>
+                              <a:rPr lang="en-US" sz="2000" b="0" i="1" smtClean="0">
+                                <a:latin typeface="Cambria Math" panose="02040503050406030204" pitchFamily="18" charset="0"/>
+                                <a:cs typeface="Arial" panose="020B0604020202020204" pitchFamily="34" charset="0"/>
+                              </a:rPr>
+                              <m:t>𝐹</m:t>
+                            </m:r>
+                          </m:e>
+                        </m:acc>
+                      </m:oMath>
+                    </m:oMathPara>
+                  </a14:m>
+                  <a:endParaRPr lang="en-US" sz="2000" dirty="0" smtClean="0">
+                    <a:latin typeface="Arial" panose="020B0604020202020204" pitchFamily="34" charset="0"/>
+                    <a:cs typeface="Arial" panose="020B0604020202020204" pitchFamily="34" charset="0"/>
+                  </a:endParaRPr>
+                </a:p>
+              </p:txBody>
+            </p:sp>
+          </mc:Choice>
+          <mc:Fallback>
+            <p:sp>
+              <p:nvSpPr>
+                <p:cNvPr id="35" name="TextBox 34"/>
+                <p:cNvSpPr txBox="1">
+                  <a:spLocks noRot="1" noChangeAspect="1" noMove="1" noResize="1" noEditPoints="1" noAdjustHandles="1" noChangeArrowheads="1" noChangeShapeType="1" noTextEdit="1"/>
+                </p:cNvSpPr>
+                <p:nvPr/>
+              </p:nvSpPr>
+              <p:spPr>
+                <a:xfrm>
+                  <a:off x="4611400" y="3162934"/>
+                  <a:ext cx="208416" cy="345159"/>
+                </a:xfrm>
+                <a:prstGeom prst="rect">
+                  <a:avLst/>
+                </a:prstGeom>
+                <a:blipFill>
+                  <a:blip r:embed="rId7"/>
+                  <a:stretch>
+                    <a:fillRect l="-31429" t="-35714" r="-91429" b="-8929"/>
+                  </a:stretch>
+                </a:blipFill>
+              </p:spPr>
+              <p:txBody>
+                <a:bodyPr/>
+                <a:lstStyle/>
+                <a:p>
+                  <a:r>
+                    <a:rPr lang="en-US">
+                      <a:noFill/>
+                    </a:rPr>
+                    <a:t> </a:t>
+                  </a:r>
+                </a:p>
+              </p:txBody>
+            </p:sp>
+          </mc:Fallback>
+        </mc:AlternateContent>
+        <mc:AlternateContent xmlns:mc="http://schemas.openxmlformats.org/markup-compatibility/2006">
+          <mc:Choice xmlns:a14="http://schemas.microsoft.com/office/drawing/2010/main" Requires="a14">
+            <p:sp>
+              <p:nvSpPr>
+                <p:cNvPr id="37" name="TextBox 36"/>
+                <p:cNvSpPr txBox="1"/>
+                <p:nvPr/>
+              </p:nvSpPr>
+              <p:spPr>
+                <a:xfrm>
+                  <a:off x="5201478" y="3722003"/>
+                  <a:ext cx="198003" cy="307777"/>
+                </a:xfrm>
+                <a:prstGeom prst="rect">
+                  <a:avLst/>
+                </a:prstGeom>
+                <a:noFill/>
+              </p:spPr>
+              <p:txBody>
+                <a:bodyPr wrap="none" lIns="0" tIns="0" rIns="0" bIns="0" rtlCol="0">
+                  <a:spAutoFit/>
+                </a:bodyPr>
+                <a:lstStyle/>
+                <a:p>
+                  <a14:m>
+                    <m:oMathPara xmlns:m="http://schemas.openxmlformats.org/officeDocument/2006/math">
+                      <m:oMathParaPr>
+                        <m:jc m:val="centerGroup"/>
+                      </m:oMathParaPr>
+                      <m:oMath xmlns:m="http://schemas.openxmlformats.org/officeDocument/2006/math">
+                        <m:acc>
+                          <m:accPr>
+                            <m:chr m:val="⃗"/>
+                            <m:ctrlPr>
+                              <a:rPr lang="en-US" sz="2000" b="0" i="1" smtClean="0">
+                                <a:latin typeface="Cambria Math" panose="02040503050406030204" pitchFamily="18" charset="0"/>
+                                <a:cs typeface="Arial" panose="020B0604020202020204" pitchFamily="34" charset="0"/>
+                              </a:rPr>
+                            </m:ctrlPr>
+                          </m:accPr>
+                          <m:e>
+                            <m:r>
+                              <a:rPr lang="en-US" sz="2000" b="0" i="1" smtClean="0">
+                                <a:latin typeface="Cambria Math" panose="02040503050406030204" pitchFamily="18" charset="0"/>
+                                <a:cs typeface="Arial" panose="020B0604020202020204" pitchFamily="34" charset="0"/>
+                              </a:rPr>
+                              <m:t>𝑟</m:t>
+                            </m:r>
+                          </m:e>
+                        </m:acc>
+                      </m:oMath>
+                    </m:oMathPara>
+                  </a14:m>
+                  <a:endParaRPr lang="en-US" sz="2000" dirty="0" smtClean="0">
+                    <a:latin typeface="Arial" panose="020B0604020202020204" pitchFamily="34" charset="0"/>
+                    <a:cs typeface="Arial" panose="020B0604020202020204" pitchFamily="34" charset="0"/>
+                  </a:endParaRPr>
+                </a:p>
+              </p:txBody>
+            </p:sp>
+          </mc:Choice>
+          <mc:Fallback>
+            <p:sp>
+              <p:nvSpPr>
+                <p:cNvPr id="37" name="TextBox 36"/>
+                <p:cNvSpPr txBox="1">
+                  <a:spLocks noRot="1" noChangeAspect="1" noMove="1" noResize="1" noEditPoints="1" noAdjustHandles="1" noChangeArrowheads="1" noChangeShapeType="1" noTextEdit="1"/>
+                </p:cNvSpPr>
+                <p:nvPr/>
+              </p:nvSpPr>
+              <p:spPr>
+                <a:xfrm>
+                  <a:off x="5201478" y="3722003"/>
+                  <a:ext cx="198003" cy="307777"/>
+                </a:xfrm>
+                <a:prstGeom prst="rect">
+                  <a:avLst/>
+                </a:prstGeom>
+                <a:blipFill>
+                  <a:blip r:embed="rId8"/>
+                  <a:stretch>
+                    <a:fillRect l="-27273" t="-36000" r="-93939" b="-6000"/>
+                  </a:stretch>
+                </a:blipFill>
+              </p:spPr>
+              <p:txBody>
+                <a:bodyPr/>
+                <a:lstStyle/>
+                <a:p>
+                  <a:r>
+                    <a:rPr lang="en-US">
+                      <a:noFill/>
+                    </a:rPr>
+                    <a:t> </a:t>
+                  </a:r>
+                </a:p>
+              </p:txBody>
+            </p:sp>
+          </mc:Fallback>
+        </mc:AlternateContent>
+        <p:cxnSp>
+          <p:nvCxnSpPr>
+            <p:cNvPr id="38" name="Straight Arrow Connector 37"/>
+            <p:cNvCxnSpPr/>
+            <p:nvPr/>
+          </p:nvCxnSpPr>
+          <p:spPr>
+            <a:xfrm flipV="1">
+              <a:off x="4759993" y="3541845"/>
+              <a:ext cx="802640" cy="310310"/>
+            </a:xfrm>
+            <a:prstGeom prst="straightConnector1">
+              <a:avLst/>
+            </a:prstGeom>
+            <a:ln w="38100">
+              <a:solidFill>
+                <a:schemeClr val="tx1"/>
+              </a:solidFill>
+              <a:prstDash val="solid"/>
+              <a:tailEnd type="triangle"/>
+            </a:ln>
+          </p:spPr>
+          <p:style>
+            <a:lnRef idx="1">
+              <a:schemeClr val="accent1"/>
+            </a:lnRef>
+            <a:fillRef idx="0">
+              <a:schemeClr val="accent1"/>
+            </a:fillRef>
+            <a:effectRef idx="0">
+              <a:schemeClr val="accent1"/>
+            </a:effectRef>
+            <a:fontRef idx="minor">
+              <a:schemeClr val="tx1"/>
+            </a:fontRef>
+          </p:style>
+        </p:cxnSp>
+        <p:sp>
+          <p:nvSpPr>
+            <p:cNvPr id="40" name="Arc 39"/>
+            <p:cNvSpPr/>
+            <p:nvPr/>
+          </p:nvSpPr>
+          <p:spPr>
+            <a:xfrm rot="21358464">
+              <a:off x="4674794" y="3544951"/>
+              <a:ext cx="363438" cy="430210"/>
+            </a:xfrm>
+            <a:prstGeom prst="arc">
+              <a:avLst>
+                <a:gd name="adj1" fmla="val 16657186"/>
+                <a:gd name="adj2" fmla="val 20972173"/>
+              </a:avLst>
+            </a:prstGeom>
+            <a:ln w="19050">
+              <a:solidFill>
+                <a:schemeClr val="tx1"/>
+              </a:solidFill>
+              <a:prstDash val="sysDot"/>
+            </a:ln>
+          </p:spPr>
+          <p:style>
+            <a:lnRef idx="1">
+              <a:schemeClr val="accent1"/>
+            </a:lnRef>
+            <a:fillRef idx="0">
+              <a:schemeClr val="accent1"/>
+            </a:fillRef>
+            <a:effectRef idx="0">
+              <a:schemeClr val="accent1"/>
+            </a:effectRef>
+            <a:fontRef idx="minor">
+              <a:schemeClr val="tx1"/>
+            </a:fontRef>
+          </p:style>
+          <p:txBody>
+            <a:bodyPr rtlCol="0" anchor="ctr"/>
+            <a:lstStyle/>
+            <a:p>
+              <a:pPr algn="ctr"/>
+              <a:endParaRPr lang="en-US"/>
+            </a:p>
+          </p:txBody>
+        </p:sp>
+        <mc:AlternateContent xmlns:mc="http://schemas.openxmlformats.org/markup-compatibility/2006">
+          <mc:Choice xmlns:a14="http://schemas.microsoft.com/office/drawing/2010/main" Requires="a14">
+            <p:sp>
+              <p:nvSpPr>
+                <p:cNvPr id="41" name="TextBox 40"/>
+                <p:cNvSpPr txBox="1"/>
+                <p:nvPr/>
+              </p:nvSpPr>
+              <p:spPr>
+                <a:xfrm>
+                  <a:off x="4956753" y="3340453"/>
+                  <a:ext cx="222304" cy="307777"/>
+                </a:xfrm>
+                <a:prstGeom prst="rect">
+                  <a:avLst/>
+                </a:prstGeom>
+                <a:noFill/>
+              </p:spPr>
+              <p:txBody>
+                <a:bodyPr wrap="none" lIns="0" tIns="0" rIns="0" bIns="0" rtlCol="0">
+                  <a:spAutoFit/>
+                </a:bodyPr>
+                <a:lstStyle/>
+                <a:p>
+                  <a14:m>
+                    <m:oMathPara xmlns:m="http://schemas.openxmlformats.org/officeDocument/2006/math">
+                      <m:oMathParaPr>
+                        <m:jc m:val="centerGroup"/>
+                      </m:oMathParaPr>
+                      <m:oMath xmlns:m="http://schemas.openxmlformats.org/officeDocument/2006/math">
+                        <m:r>
+                          <a:rPr lang="en-US" sz="2000" b="0" i="1" smtClean="0">
+                            <a:latin typeface="Cambria Math" panose="02040503050406030204" pitchFamily="18" charset="0"/>
+                            <a:cs typeface="Arial" panose="020B0604020202020204" pitchFamily="34" charset="0"/>
+                          </a:rPr>
+                          <m:t>𝜃</m:t>
+                        </m:r>
+                      </m:oMath>
+                    </m:oMathPara>
+                  </a14:m>
+                  <a:endParaRPr lang="en-US" sz="2000" dirty="0" smtClean="0">
+                    <a:latin typeface="Arial" panose="020B0604020202020204" pitchFamily="34" charset="0"/>
+                    <a:cs typeface="Arial" panose="020B0604020202020204" pitchFamily="34" charset="0"/>
+                  </a:endParaRPr>
+                </a:p>
+              </p:txBody>
+            </p:sp>
+          </mc:Choice>
+          <mc:Fallback>
+            <p:sp>
+              <p:nvSpPr>
+                <p:cNvPr id="41" name="TextBox 40"/>
+                <p:cNvSpPr txBox="1">
+                  <a:spLocks noRot="1" noChangeAspect="1" noMove="1" noResize="1" noEditPoints="1" noAdjustHandles="1" noChangeArrowheads="1" noChangeShapeType="1" noTextEdit="1"/>
+                </p:cNvSpPr>
+                <p:nvPr/>
+              </p:nvSpPr>
+              <p:spPr>
+                <a:xfrm>
+                  <a:off x="4956753" y="3340453"/>
+                  <a:ext cx="222304" cy="307777"/>
+                </a:xfrm>
+                <a:prstGeom prst="rect">
+                  <a:avLst/>
+                </a:prstGeom>
+                <a:blipFill>
+                  <a:blip r:embed="rId9"/>
+                  <a:stretch>
+                    <a:fillRect l="-24324" r="-21622" b="-12000"/>
+                  </a:stretch>
+                </a:blipFill>
+              </p:spPr>
+              <p:txBody>
+                <a:bodyPr/>
+                <a:lstStyle/>
+                <a:p>
+                  <a:r>
+                    <a:rPr lang="en-US">
+                      <a:noFill/>
+                    </a:rPr>
+                    <a:t> </a:t>
+                  </a:r>
+                </a:p>
+              </p:txBody>
+            </p:sp>
+          </mc:Fallback>
+        </mc:AlternateContent>
+      </p:grpSp>
     </p:spTree>
     <p:extLst>
       <p:ext uri="{BB962C8B-B14F-4D97-AF65-F5344CB8AC3E}">

</xml_diff>

<commit_message>
Added more text, figures
</commit_message>
<xml_diff>
--- a/tex/figures/Figures.pptx
+++ b/tex/figures/Figures.pptx
@@ -250,7 +250,7 @@
           <a:p>
             <a:fld id="{F7249F8D-641B-4CAF-BAE5-10524742F6F1}" type="datetimeFigureOut">
               <a:rPr lang="en-CA" smtClean="0"/>
-              <a:t>2018-05-16</a:t>
+              <a:t>2018-05-17</a:t>
             </a:fld>
             <a:endParaRPr lang="en-CA"/>
           </a:p>
@@ -420,7 +420,7 @@
           <a:p>
             <a:fld id="{F7249F8D-641B-4CAF-BAE5-10524742F6F1}" type="datetimeFigureOut">
               <a:rPr lang="en-CA" smtClean="0"/>
-              <a:t>2018-05-16</a:t>
+              <a:t>2018-05-17</a:t>
             </a:fld>
             <a:endParaRPr lang="en-CA"/>
           </a:p>
@@ -600,7 +600,7 @@
           <a:p>
             <a:fld id="{F7249F8D-641B-4CAF-BAE5-10524742F6F1}" type="datetimeFigureOut">
               <a:rPr lang="en-CA" smtClean="0"/>
-              <a:t>2018-05-16</a:t>
+              <a:t>2018-05-17</a:t>
             </a:fld>
             <a:endParaRPr lang="en-CA"/>
           </a:p>
@@ -770,7 +770,7 @@
           <a:p>
             <a:fld id="{F7249F8D-641B-4CAF-BAE5-10524742F6F1}" type="datetimeFigureOut">
               <a:rPr lang="en-CA" smtClean="0"/>
-              <a:t>2018-05-16</a:t>
+              <a:t>2018-05-17</a:t>
             </a:fld>
             <a:endParaRPr lang="en-CA"/>
           </a:p>
@@ -1016,7 +1016,7 @@
           <a:p>
             <a:fld id="{F7249F8D-641B-4CAF-BAE5-10524742F6F1}" type="datetimeFigureOut">
               <a:rPr lang="en-CA" smtClean="0"/>
-              <a:t>2018-05-16</a:t>
+              <a:t>2018-05-17</a:t>
             </a:fld>
             <a:endParaRPr lang="en-CA"/>
           </a:p>
@@ -1248,7 +1248,7 @@
           <a:p>
             <a:fld id="{F7249F8D-641B-4CAF-BAE5-10524742F6F1}" type="datetimeFigureOut">
               <a:rPr lang="en-CA" smtClean="0"/>
-              <a:t>2018-05-16</a:t>
+              <a:t>2018-05-17</a:t>
             </a:fld>
             <a:endParaRPr lang="en-CA"/>
           </a:p>
@@ -1615,7 +1615,7 @@
           <a:p>
             <a:fld id="{F7249F8D-641B-4CAF-BAE5-10524742F6F1}" type="datetimeFigureOut">
               <a:rPr lang="en-CA" smtClean="0"/>
-              <a:t>2018-05-16</a:t>
+              <a:t>2018-05-17</a:t>
             </a:fld>
             <a:endParaRPr lang="en-CA"/>
           </a:p>
@@ -1733,7 +1733,7 @@
           <a:p>
             <a:fld id="{F7249F8D-641B-4CAF-BAE5-10524742F6F1}" type="datetimeFigureOut">
               <a:rPr lang="en-CA" smtClean="0"/>
-              <a:t>2018-05-16</a:t>
+              <a:t>2018-05-17</a:t>
             </a:fld>
             <a:endParaRPr lang="en-CA"/>
           </a:p>
@@ -1828,7 +1828,7 @@
           <a:p>
             <a:fld id="{F7249F8D-641B-4CAF-BAE5-10524742F6F1}" type="datetimeFigureOut">
               <a:rPr lang="en-CA" smtClean="0"/>
-              <a:t>2018-05-16</a:t>
+              <a:t>2018-05-17</a:t>
             </a:fld>
             <a:endParaRPr lang="en-CA"/>
           </a:p>
@@ -2105,7 +2105,7 @@
           <a:p>
             <a:fld id="{F7249F8D-641B-4CAF-BAE5-10524742F6F1}" type="datetimeFigureOut">
               <a:rPr lang="en-CA" smtClean="0"/>
-              <a:t>2018-05-16</a:t>
+              <a:t>2018-05-17</a:t>
             </a:fld>
             <a:endParaRPr lang="en-CA"/>
           </a:p>
@@ -2358,7 +2358,7 @@
           <a:p>
             <a:fld id="{F7249F8D-641B-4CAF-BAE5-10524742F6F1}" type="datetimeFigureOut">
               <a:rPr lang="en-CA" smtClean="0"/>
-              <a:t>2018-05-16</a:t>
+              <a:t>2018-05-17</a:t>
             </a:fld>
             <a:endParaRPr lang="en-CA"/>
           </a:p>
@@ -2571,7 +2571,7 @@
           <a:p>
             <a:fld id="{F7249F8D-641B-4CAF-BAE5-10524742F6F1}" type="datetimeFigureOut">
               <a:rPr lang="en-CA" smtClean="0"/>
-              <a:t>2018-05-16</a:t>
+              <a:t>2018-05-17</a:t>
             </a:fld>
             <a:endParaRPr lang="en-CA"/>
           </a:p>
@@ -3819,9 +3819,9 @@
         <p:grpSpPr>
           <a:xfrm>
             <a:off x="1482851" y="3593039"/>
-            <a:ext cx="2216092" cy="2146316"/>
+            <a:ext cx="2224718" cy="2146316"/>
             <a:chOff x="1129904" y="708040"/>
-            <a:chExt cx="2216092" cy="2146316"/>
+            <a:chExt cx="2224718" cy="2146316"/>
           </a:xfrm>
         </p:grpSpPr>
         <p:grpSp>
@@ -3833,9 +3833,9 @@
           <p:grpSpPr>
             <a:xfrm>
               <a:off x="1163211" y="708040"/>
-              <a:ext cx="2182785" cy="2146316"/>
+              <a:ext cx="2191411" cy="2146316"/>
               <a:chOff x="1190506" y="680744"/>
-              <a:chExt cx="2182785" cy="2146316"/>
+              <a:chExt cx="2191411" cy="2146316"/>
             </a:xfrm>
           </p:grpSpPr>
           <p:cxnSp>
@@ -3882,7 +3882,7 @@
             </p:nvCxnSpPr>
             <p:spPr>
               <a:xfrm flipV="1">
-                <a:off x="1498387" y="2526633"/>
+                <a:off x="1507013" y="2535259"/>
                 <a:ext cx="1874904" cy="1"/>
               </a:xfrm>
               <a:prstGeom prst="straightConnector1">
@@ -31744,8 +31744,8 @@
             </a:fontRef>
           </p:style>
         </p:cxnSp>
-        <mc:AlternateContent xmlns:mc="http://schemas.openxmlformats.org/markup-compatibility/2006">
-          <mc:Choice xmlns:a14="http://schemas.microsoft.com/office/drawing/2010/main" Requires="a14">
+        <mc:AlternateContent xmlns:mc="http://schemas.openxmlformats.org/markup-compatibility/2006" xmlns:a14="http://schemas.microsoft.com/office/drawing/2010/main">
+          <mc:Choice Requires="a14">
             <p:sp>
               <p:nvSpPr>
                 <p:cNvPr id="14" name="TextBox 13"/>
@@ -31768,6 +31768,7 @@
                 </a:bodyPr>
                 <a:lstStyle/>
                 <a:p>
+                  <a:pPr/>
                   <a14:m>
                     <m:oMathPara xmlns:m="http://schemas.openxmlformats.org/officeDocument/2006/math">
                       <m:oMathParaPr>
@@ -31826,7 +31827,7 @@
               </p:txBody>
             </p:sp>
           </mc:Choice>
-          <mc:Fallback>
+          <mc:Fallback xmlns="">
             <p:sp>
               <p:nvSpPr>
                 <p:cNvPr id="14" name="TextBox 13"/>
@@ -31980,8 +31981,8 @@
               </a:fontRef>
             </p:style>
           </p:cxnSp>
-          <mc:AlternateContent xmlns:mc="http://schemas.openxmlformats.org/markup-compatibility/2006">
-            <mc:Choice xmlns:a14="http://schemas.microsoft.com/office/drawing/2010/main" Requires="a14">
+          <mc:AlternateContent xmlns:mc="http://schemas.openxmlformats.org/markup-compatibility/2006" xmlns:a14="http://schemas.microsoft.com/office/drawing/2010/main">
+            <mc:Choice Requires="a14">
               <p:sp>
                 <p:nvSpPr>
                   <p:cNvPr id="33" name="TextBox 32"/>
@@ -32004,6 +32005,7 @@
                   </a:bodyPr>
                   <a:lstStyle/>
                   <a:p>
+                    <a:pPr/>
                     <a14:m>
                       <m:oMathPara xmlns:m="http://schemas.openxmlformats.org/officeDocument/2006/math">
                         <m:oMathParaPr>
@@ -32041,7 +32043,7 @@
                 </p:txBody>
               </p:sp>
             </mc:Choice>
-            <mc:Fallback>
+            <mc:Fallback xmlns="">
               <p:sp>
                 <p:nvSpPr>
                   <p:cNvPr id="33" name="TextBox 32"/>
@@ -32231,8 +32233,8 @@
               </a:fontRef>
             </p:style>
           </p:cxnSp>
-          <mc:AlternateContent xmlns:mc="http://schemas.openxmlformats.org/markup-compatibility/2006">
-            <mc:Choice xmlns:a14="http://schemas.microsoft.com/office/drawing/2010/main" Requires="a14">
+          <mc:AlternateContent xmlns:mc="http://schemas.openxmlformats.org/markup-compatibility/2006" xmlns:a14="http://schemas.microsoft.com/office/drawing/2010/main">
+            <mc:Choice Requires="a14">
               <p:sp>
                 <p:nvSpPr>
                   <p:cNvPr id="44" name="TextBox 43"/>
@@ -32255,6 +32257,7 @@
                   </a:bodyPr>
                   <a:lstStyle/>
                   <a:p>
+                    <a:pPr/>
                     <a14:m>
                       <m:oMathPara xmlns:m="http://schemas.openxmlformats.org/officeDocument/2006/math">
                         <m:oMathParaPr>
@@ -32292,7 +32295,7 @@
                 </p:txBody>
               </p:sp>
             </mc:Choice>
-            <mc:Fallback>
+            <mc:Fallback xmlns="">
               <p:sp>
                 <p:nvSpPr>
                   <p:cNvPr id="44" name="TextBox 43"/>

</xml_diff>

<commit_message>
Vector Figures and Changes
</commit_message>
<xml_diff>
--- a/tex/figures/Figures.pptx
+++ b/tex/figures/Figures.pptx
@@ -254,7 +254,7 @@
           <a:p>
             <a:fld id="{F7249F8D-641B-4CAF-BAE5-10524742F6F1}" type="datetimeFigureOut">
               <a:rPr lang="en-CA" smtClean="0"/>
-              <a:t>2018-06-04</a:t>
+              <a:t>2018-07-16</a:t>
             </a:fld>
             <a:endParaRPr lang="en-CA"/>
           </a:p>
@@ -424,7 +424,7 @@
           <a:p>
             <a:fld id="{F7249F8D-641B-4CAF-BAE5-10524742F6F1}" type="datetimeFigureOut">
               <a:rPr lang="en-CA" smtClean="0"/>
-              <a:t>2018-06-04</a:t>
+              <a:t>2018-07-16</a:t>
             </a:fld>
             <a:endParaRPr lang="en-CA"/>
           </a:p>
@@ -604,7 +604,7 @@
           <a:p>
             <a:fld id="{F7249F8D-641B-4CAF-BAE5-10524742F6F1}" type="datetimeFigureOut">
               <a:rPr lang="en-CA" smtClean="0"/>
-              <a:t>2018-06-04</a:t>
+              <a:t>2018-07-16</a:t>
             </a:fld>
             <a:endParaRPr lang="en-CA"/>
           </a:p>
@@ -774,7 +774,7 @@
           <a:p>
             <a:fld id="{F7249F8D-641B-4CAF-BAE5-10524742F6F1}" type="datetimeFigureOut">
               <a:rPr lang="en-CA" smtClean="0"/>
-              <a:t>2018-06-04</a:t>
+              <a:t>2018-07-16</a:t>
             </a:fld>
             <a:endParaRPr lang="en-CA"/>
           </a:p>
@@ -1020,7 +1020,7 @@
           <a:p>
             <a:fld id="{F7249F8D-641B-4CAF-BAE5-10524742F6F1}" type="datetimeFigureOut">
               <a:rPr lang="en-CA" smtClean="0"/>
-              <a:t>2018-06-04</a:t>
+              <a:t>2018-07-16</a:t>
             </a:fld>
             <a:endParaRPr lang="en-CA"/>
           </a:p>
@@ -1252,7 +1252,7 @@
           <a:p>
             <a:fld id="{F7249F8D-641B-4CAF-BAE5-10524742F6F1}" type="datetimeFigureOut">
               <a:rPr lang="en-CA" smtClean="0"/>
-              <a:t>2018-06-04</a:t>
+              <a:t>2018-07-16</a:t>
             </a:fld>
             <a:endParaRPr lang="en-CA"/>
           </a:p>
@@ -1619,7 +1619,7 @@
           <a:p>
             <a:fld id="{F7249F8D-641B-4CAF-BAE5-10524742F6F1}" type="datetimeFigureOut">
               <a:rPr lang="en-CA" smtClean="0"/>
-              <a:t>2018-06-04</a:t>
+              <a:t>2018-07-16</a:t>
             </a:fld>
             <a:endParaRPr lang="en-CA"/>
           </a:p>
@@ -1737,7 +1737,7 @@
           <a:p>
             <a:fld id="{F7249F8D-641B-4CAF-BAE5-10524742F6F1}" type="datetimeFigureOut">
               <a:rPr lang="en-CA" smtClean="0"/>
-              <a:t>2018-06-04</a:t>
+              <a:t>2018-07-16</a:t>
             </a:fld>
             <a:endParaRPr lang="en-CA"/>
           </a:p>
@@ -1832,7 +1832,7 @@
           <a:p>
             <a:fld id="{F7249F8D-641B-4CAF-BAE5-10524742F6F1}" type="datetimeFigureOut">
               <a:rPr lang="en-CA" smtClean="0"/>
-              <a:t>2018-06-04</a:t>
+              <a:t>2018-07-16</a:t>
             </a:fld>
             <a:endParaRPr lang="en-CA"/>
           </a:p>
@@ -2109,7 +2109,7 @@
           <a:p>
             <a:fld id="{F7249F8D-641B-4CAF-BAE5-10524742F6F1}" type="datetimeFigureOut">
               <a:rPr lang="en-CA" smtClean="0"/>
-              <a:t>2018-06-04</a:t>
+              <a:t>2018-07-16</a:t>
             </a:fld>
             <a:endParaRPr lang="en-CA"/>
           </a:p>
@@ -2362,7 +2362,7 @@
           <a:p>
             <a:fld id="{F7249F8D-641B-4CAF-BAE5-10524742F6F1}" type="datetimeFigureOut">
               <a:rPr lang="en-CA" smtClean="0"/>
-              <a:t>2018-06-04</a:t>
+              <a:t>2018-07-16</a:t>
             </a:fld>
             <a:endParaRPr lang="en-CA"/>
           </a:p>
@@ -2575,7 +2575,7 @@
           <a:p>
             <a:fld id="{F7249F8D-641B-4CAF-BAE5-10524742F6F1}" type="datetimeFigureOut">
               <a:rPr lang="en-CA" smtClean="0"/>
-              <a:t>2018-06-04</a:t>
+              <a:t>2018-07-16</a:t>
             </a:fld>
             <a:endParaRPr lang="en-CA"/>
           </a:p>
@@ -4200,7 +4200,7 @@
           <p:cNvPr id="19" name="Picture 18">
             <a:extLst>
               <a:ext uri="{FF2B5EF4-FFF2-40B4-BE49-F238E27FC236}">
-                <a16:creationId xmlns:a16="http://schemas.microsoft.com/office/drawing/2014/main" id="{CEA7C585-4AC1-C345-9A08-739DBF8DED93}"/>
+                <a16:creationId xmlns:a16="http://schemas.microsoft.com/office/drawing/2014/main" xmlns="" id="{CEA7C585-4AC1-C345-9A08-739DBF8DED93}"/>
               </a:ext>
             </a:extLst>
           </p:cNvPr>
@@ -4236,7 +4236,7 @@
           <p:cNvPr id="17" name="Picture 16">
             <a:extLst>
               <a:ext uri="{FF2B5EF4-FFF2-40B4-BE49-F238E27FC236}">
-                <a16:creationId xmlns:a16="http://schemas.microsoft.com/office/drawing/2014/main" id="{EEF707B4-8939-CA48-A54F-4E1C6EB4CCA5}"/>
+                <a16:creationId xmlns:a16="http://schemas.microsoft.com/office/drawing/2014/main" xmlns="" id="{EEF707B4-8939-CA48-A54F-4E1C6EB4CCA5}"/>
               </a:ext>
             </a:extLst>
           </p:cNvPr>
@@ -4272,7 +4272,7 @@
           <p:cNvPr id="73" name="Group 72">
             <a:extLst>
               <a:ext uri="{FF2B5EF4-FFF2-40B4-BE49-F238E27FC236}">
-                <a16:creationId xmlns:a16="http://schemas.microsoft.com/office/drawing/2014/main" id="{E341D7A9-8730-824D-9FA7-722A3869558A}"/>
+                <a16:creationId xmlns:a16="http://schemas.microsoft.com/office/drawing/2014/main" xmlns="" id="{E341D7A9-8730-824D-9FA7-722A3869558A}"/>
               </a:ext>
             </a:extLst>
           </p:cNvPr>
@@ -4292,7 +4292,7 @@
             <p:cNvPr id="5" name="Picture 4">
               <a:extLst>
                 <a:ext uri="{FF2B5EF4-FFF2-40B4-BE49-F238E27FC236}">
-                  <a16:creationId xmlns:a16="http://schemas.microsoft.com/office/drawing/2014/main" id="{84320F98-3341-BA42-B376-E667EA284AB9}"/>
+                  <a16:creationId xmlns:a16="http://schemas.microsoft.com/office/drawing/2014/main" xmlns="" id="{84320F98-3341-BA42-B376-E667EA284AB9}"/>
                 </a:ext>
               </a:extLst>
             </p:cNvPr>
@@ -4328,7 +4328,7 @@
             <p:cNvPr id="22" name="Straight Arrow Connector 21">
               <a:extLst>
                 <a:ext uri="{FF2B5EF4-FFF2-40B4-BE49-F238E27FC236}">
-                  <a16:creationId xmlns:a16="http://schemas.microsoft.com/office/drawing/2014/main" id="{83825F84-64F0-7A4B-9473-6B21120226B9}"/>
+                  <a16:creationId xmlns:a16="http://schemas.microsoft.com/office/drawing/2014/main" xmlns="" id="{83825F84-64F0-7A4B-9473-6B21120226B9}"/>
                 </a:ext>
               </a:extLst>
             </p:cNvPr>
@@ -4372,7 +4372,7 @@
             <p:cNvPr id="25" name="Straight Arrow Connector 24">
               <a:extLst>
                 <a:ext uri="{FF2B5EF4-FFF2-40B4-BE49-F238E27FC236}">
-                  <a16:creationId xmlns:a16="http://schemas.microsoft.com/office/drawing/2014/main" id="{C7E30327-D32A-7A48-B1D7-63BCB6D1C079}"/>
+                  <a16:creationId xmlns:a16="http://schemas.microsoft.com/office/drawing/2014/main" xmlns="" id="{C7E30327-D32A-7A48-B1D7-63BCB6D1C079}"/>
                 </a:ext>
               </a:extLst>
             </p:cNvPr>
@@ -4416,7 +4416,7 @@
             <p:cNvPr id="27" name="Straight Arrow Connector 26">
               <a:extLst>
                 <a:ext uri="{FF2B5EF4-FFF2-40B4-BE49-F238E27FC236}">
-                  <a16:creationId xmlns:a16="http://schemas.microsoft.com/office/drawing/2014/main" id="{AE80DFD5-4A51-FE47-A98C-467D6E5A58D8}"/>
+                  <a16:creationId xmlns:a16="http://schemas.microsoft.com/office/drawing/2014/main" xmlns="" id="{AE80DFD5-4A51-FE47-A98C-467D6E5A58D8}"/>
                 </a:ext>
               </a:extLst>
             </p:cNvPr>
@@ -4455,14 +4455,14 @@
             </a:fontRef>
           </p:style>
         </p:cxnSp>
-        <mc:AlternateContent xmlns:mc="http://schemas.openxmlformats.org/markup-compatibility/2006">
-          <mc:Choice xmlns:a14="http://schemas.microsoft.com/office/drawing/2010/main" Requires="a14">
+        <mc:AlternateContent xmlns:mc="http://schemas.openxmlformats.org/markup-compatibility/2006" xmlns:a14="http://schemas.microsoft.com/office/drawing/2010/main">
+          <mc:Choice Requires="a14">
             <p:sp>
               <p:nvSpPr>
                 <p:cNvPr id="38" name="Rectangle 37">
                   <a:extLst>
                     <a:ext uri="{FF2B5EF4-FFF2-40B4-BE49-F238E27FC236}">
-                      <a16:creationId xmlns:a16="http://schemas.microsoft.com/office/drawing/2014/main" id="{B4A04741-0A13-E741-BCC1-DF73A2C5ACE3}"/>
+                      <a16:creationId xmlns:a16="http://schemas.microsoft.com/office/drawing/2014/main" xmlns="" id="{B4A04741-0A13-E741-BCC1-DF73A2C5ACE3}"/>
                     </a:ext>
                   </a:extLst>
                 </p:cNvPr>
@@ -4503,7 +4503,7 @@
               </p:txBody>
             </p:sp>
           </mc:Choice>
-          <mc:Fallback>
+          <mc:Fallback xmlns="">
             <p:sp>
               <p:nvSpPr>
                 <p:cNvPr id="38" name="Rectangle 37">
@@ -4553,7 +4553,7 @@
             <p:cNvPr id="39" name="Arc 38">
               <a:extLst>
                 <a:ext uri="{FF2B5EF4-FFF2-40B4-BE49-F238E27FC236}">
-                  <a16:creationId xmlns:a16="http://schemas.microsoft.com/office/drawing/2014/main" id="{98A52D6D-B964-AD43-BCBA-962B6A16D7BE}"/>
+                  <a16:creationId xmlns:a16="http://schemas.microsoft.com/office/drawing/2014/main" xmlns="" id="{98A52D6D-B964-AD43-BCBA-962B6A16D7BE}"/>
                 </a:ext>
               </a:extLst>
             </p:cNvPr>
@@ -4606,7 +4606,7 @@
             <p:cNvPr id="67" name="Group 66">
               <a:extLst>
                 <a:ext uri="{FF2B5EF4-FFF2-40B4-BE49-F238E27FC236}">
-                  <a16:creationId xmlns:a16="http://schemas.microsoft.com/office/drawing/2014/main" id="{DA028E65-79F9-4A47-84BC-CCEF3479D1DA}"/>
+                  <a16:creationId xmlns:a16="http://schemas.microsoft.com/office/drawing/2014/main" xmlns="" id="{DA028E65-79F9-4A47-84BC-CCEF3479D1DA}"/>
                 </a:ext>
               </a:extLst>
             </p:cNvPr>
@@ -4626,7 +4626,7 @@
               <p:cNvPr id="61" name="Straight Arrow Connector 60">
                 <a:extLst>
                   <a:ext uri="{FF2B5EF4-FFF2-40B4-BE49-F238E27FC236}">
-                    <a16:creationId xmlns:a16="http://schemas.microsoft.com/office/drawing/2014/main" id="{8A63031D-CAA9-3045-AA66-AF4CA2688C19}"/>
+                    <a16:creationId xmlns:a16="http://schemas.microsoft.com/office/drawing/2014/main" xmlns="" id="{8A63031D-CAA9-3045-AA66-AF4CA2688C19}"/>
                   </a:ext>
                 </a:extLst>
               </p:cNvPr>
@@ -4668,7 +4668,7 @@
               <p:cNvPr id="62" name="Straight Arrow Connector 61">
                 <a:extLst>
                   <a:ext uri="{FF2B5EF4-FFF2-40B4-BE49-F238E27FC236}">
-                    <a16:creationId xmlns:a16="http://schemas.microsoft.com/office/drawing/2014/main" id="{9068D077-B250-6344-9DB8-EE8E96E33196}"/>
+                    <a16:creationId xmlns:a16="http://schemas.microsoft.com/office/drawing/2014/main" xmlns="" id="{9068D077-B250-6344-9DB8-EE8E96E33196}"/>
                   </a:ext>
                 </a:extLst>
               </p:cNvPr>
@@ -4712,7 +4712,7 @@
               <p:cNvPr id="63" name="Rectangle 62">
                 <a:extLst>
                   <a:ext uri="{FF2B5EF4-FFF2-40B4-BE49-F238E27FC236}">
-                    <a16:creationId xmlns:a16="http://schemas.microsoft.com/office/drawing/2014/main" id="{BF4A76EB-7607-AD41-8F3D-59893DC96394}"/>
+                    <a16:creationId xmlns:a16="http://schemas.microsoft.com/office/drawing/2014/main" xmlns="" id="{BF4A76EB-7607-AD41-8F3D-59893DC96394}"/>
                   </a:ext>
                 </a:extLst>
               </p:cNvPr>
@@ -4748,14 +4748,14 @@
               </a:p>
             </p:txBody>
           </p:sp>
-          <mc:AlternateContent xmlns:mc="http://schemas.openxmlformats.org/markup-compatibility/2006">
-            <mc:Choice xmlns:a14="http://schemas.microsoft.com/office/drawing/2010/main" Requires="a14">
+          <mc:AlternateContent xmlns:mc="http://schemas.openxmlformats.org/markup-compatibility/2006" xmlns:a14="http://schemas.microsoft.com/office/drawing/2010/main">
+            <mc:Choice Requires="a14">
               <p:sp>
                 <p:nvSpPr>
                   <p:cNvPr id="65" name="Rectangle 64">
                     <a:extLst>
                       <a:ext uri="{FF2B5EF4-FFF2-40B4-BE49-F238E27FC236}">
-                        <a16:creationId xmlns:a16="http://schemas.microsoft.com/office/drawing/2014/main" id="{18D3870A-EAC4-6848-9CD3-D35EC430F1FC}"/>
+                        <a16:creationId xmlns:a16="http://schemas.microsoft.com/office/drawing/2014/main" xmlns="" id="{18D3870A-EAC4-6848-9CD3-D35EC430F1FC}"/>
                       </a:ext>
                     </a:extLst>
                   </p:cNvPr>
@@ -4795,7 +4795,7 @@
                 </p:txBody>
               </p:sp>
             </mc:Choice>
-            <mc:Fallback>
+            <mc:Fallback xmlns="">
               <p:sp>
                 <p:nvSpPr>
                   <p:cNvPr id="65" name="Rectangle 64">
@@ -4840,14 +4840,14 @@
               </p:sp>
             </mc:Fallback>
           </mc:AlternateContent>
-          <mc:AlternateContent xmlns:mc="http://schemas.openxmlformats.org/markup-compatibility/2006">
-            <mc:Choice xmlns:a14="http://schemas.microsoft.com/office/drawing/2010/main" Requires="a14">
+          <mc:AlternateContent xmlns:mc="http://schemas.openxmlformats.org/markup-compatibility/2006" xmlns:a14="http://schemas.microsoft.com/office/drawing/2010/main">
+            <mc:Choice Requires="a14">
               <p:sp>
                 <p:nvSpPr>
                   <p:cNvPr id="66" name="Rectangle 65">
                     <a:extLst>
                       <a:ext uri="{FF2B5EF4-FFF2-40B4-BE49-F238E27FC236}">
-                        <a16:creationId xmlns:a16="http://schemas.microsoft.com/office/drawing/2014/main" id="{DB675D4B-26F0-DE47-B99B-69C8B788B8EB}"/>
+                        <a16:creationId xmlns:a16="http://schemas.microsoft.com/office/drawing/2014/main" xmlns="" id="{DB675D4B-26F0-DE47-B99B-69C8B788B8EB}"/>
                       </a:ext>
                     </a:extLst>
                   </p:cNvPr>
@@ -4888,7 +4888,7 @@
                 </p:txBody>
               </p:sp>
             </mc:Choice>
-            <mc:Fallback>
+            <mc:Fallback xmlns="">
               <p:sp>
                 <p:nvSpPr>
                   <p:cNvPr id="66" name="Rectangle 65">
@@ -4934,14 +4934,14 @@
             </mc:Fallback>
           </mc:AlternateContent>
         </p:grpSp>
-        <mc:AlternateContent xmlns:mc="http://schemas.openxmlformats.org/markup-compatibility/2006">
-          <mc:Choice xmlns:a14="http://schemas.microsoft.com/office/drawing/2010/main" Requires="a14">
+        <mc:AlternateContent xmlns:mc="http://schemas.openxmlformats.org/markup-compatibility/2006" xmlns:a14="http://schemas.microsoft.com/office/drawing/2010/main">
+          <mc:Choice Requires="a14">
             <p:sp>
               <p:nvSpPr>
                 <p:cNvPr id="68" name="Rectangle 67">
                   <a:extLst>
                     <a:ext uri="{FF2B5EF4-FFF2-40B4-BE49-F238E27FC236}">
-                      <a16:creationId xmlns:a16="http://schemas.microsoft.com/office/drawing/2014/main" id="{C4CE5173-E54E-1D41-A24C-A87E1617927D}"/>
+                      <a16:creationId xmlns:a16="http://schemas.microsoft.com/office/drawing/2014/main" xmlns="" id="{C4CE5173-E54E-1D41-A24C-A87E1617927D}"/>
                     </a:ext>
                   </a:extLst>
                 </p:cNvPr>
@@ -4963,6 +4963,7 @@
                 </a:bodyPr>
                 <a:lstStyle/>
                 <a:p>
+                  <a:pPr/>
                   <a14:m>
                     <m:oMathPara xmlns:m="http://schemas.openxmlformats.org/officeDocument/2006/math">
                       <m:oMathParaPr>
@@ -4974,7 +4975,7 @@
                             <m:chr m:val="⃗"/>
                             <m:ctrlPr>
                               <a:rPr lang="en-US" sz="2000" i="1">
-                                <a:latin typeface="Cambria Math" panose="02040503050406030204" pitchFamily="18" charset="0"/>
+                                <a:latin typeface="Cambria Math" charset="0"/>
                                 <a:cs typeface="Arial" panose="020B0604020202020204" pitchFamily="34" charset="0"/>
                               </a:rPr>
                             </m:ctrlPr>
@@ -5000,7 +5001,7 @@
               </p:txBody>
             </p:sp>
           </mc:Choice>
-          <mc:Fallback>
+          <mc:Fallback xmlns="">
             <p:sp>
               <p:nvSpPr>
                 <p:cNvPr id="68" name="Rectangle 67">
@@ -5045,14 +5046,14 @@
             </p:sp>
           </mc:Fallback>
         </mc:AlternateContent>
-        <mc:AlternateContent xmlns:mc="http://schemas.openxmlformats.org/markup-compatibility/2006">
-          <mc:Choice xmlns:a14="http://schemas.microsoft.com/office/drawing/2010/main" Requires="a14">
+        <mc:AlternateContent xmlns:mc="http://schemas.openxmlformats.org/markup-compatibility/2006" xmlns:a14="http://schemas.microsoft.com/office/drawing/2010/main">
+          <mc:Choice Requires="a14">
             <p:sp>
               <p:nvSpPr>
                 <p:cNvPr id="69" name="Rectangle 68">
                   <a:extLst>
                     <a:ext uri="{FF2B5EF4-FFF2-40B4-BE49-F238E27FC236}">
-                      <a16:creationId xmlns:a16="http://schemas.microsoft.com/office/drawing/2014/main" id="{4126345B-83F8-464F-86C8-88C8DDB4C2A9}"/>
+                      <a16:creationId xmlns:a16="http://schemas.microsoft.com/office/drawing/2014/main" xmlns="" id="{4126345B-83F8-464F-86C8-88C8DDB4C2A9}"/>
                     </a:ext>
                   </a:extLst>
                 </p:cNvPr>
@@ -5074,6 +5075,7 @@
                 </a:bodyPr>
                 <a:lstStyle/>
                 <a:p>
+                  <a:pPr/>
                   <a14:m>
                     <m:oMathPara xmlns:m="http://schemas.openxmlformats.org/officeDocument/2006/math">
                       <m:oMathParaPr>
@@ -5085,7 +5087,7 @@
                             <m:chr m:val="⃗"/>
                             <m:ctrlPr>
                               <a:rPr lang="en-US" sz="2000" i="1" smtClean="0">
-                                <a:latin typeface="Cambria Math" panose="02040503050406030204" pitchFamily="18" charset="0"/>
+                                <a:latin typeface="Cambria Math" charset="0"/>
                                 <a:cs typeface="Arial" panose="020B0604020202020204" pitchFamily="34" charset="0"/>
                               </a:rPr>
                             </m:ctrlPr>
@@ -5115,7 +5117,7 @@
               </p:txBody>
             </p:sp>
           </mc:Choice>
-          <mc:Fallback>
+          <mc:Fallback xmlns="">
             <p:sp>
               <p:nvSpPr>
                 <p:cNvPr id="69" name="Rectangle 68">
@@ -5160,14 +5162,14 @@
             </p:sp>
           </mc:Fallback>
         </mc:AlternateContent>
-        <mc:AlternateContent xmlns:mc="http://schemas.openxmlformats.org/markup-compatibility/2006">
-          <mc:Choice xmlns:a14="http://schemas.microsoft.com/office/drawing/2010/main" Requires="a14">
+        <mc:AlternateContent xmlns:mc="http://schemas.openxmlformats.org/markup-compatibility/2006" xmlns:a14="http://schemas.microsoft.com/office/drawing/2010/main">
+          <mc:Choice Requires="a14">
             <p:sp>
               <p:nvSpPr>
                 <p:cNvPr id="70" name="Rectangle 69">
                   <a:extLst>
                     <a:ext uri="{FF2B5EF4-FFF2-40B4-BE49-F238E27FC236}">
-                      <a16:creationId xmlns:a16="http://schemas.microsoft.com/office/drawing/2014/main" id="{1379BC8A-2F8E-EA44-BC7E-68FF4FD2E41F}"/>
+                      <a16:creationId xmlns:a16="http://schemas.microsoft.com/office/drawing/2014/main" xmlns="" id="{1379BC8A-2F8E-EA44-BC7E-68FF4FD2E41F}"/>
                     </a:ext>
                   </a:extLst>
                 </p:cNvPr>
@@ -5189,6 +5191,7 @@
                 </a:bodyPr>
                 <a:lstStyle/>
                 <a:p>
+                  <a:pPr/>
                   <a14:m>
                     <m:oMathPara xmlns:m="http://schemas.openxmlformats.org/officeDocument/2006/math">
                       <m:oMathParaPr>
@@ -5200,7 +5203,7 @@
                             <m:chr m:val="⃗"/>
                             <m:ctrlPr>
                               <a:rPr lang="en-US" sz="2000" i="1" smtClean="0">
-                                <a:latin typeface="Cambria Math" panose="02040503050406030204" pitchFamily="18" charset="0"/>
+                                <a:latin typeface="Cambria Math" charset="0"/>
                                 <a:cs typeface="Arial" panose="020B0604020202020204" pitchFamily="34" charset="0"/>
                               </a:rPr>
                             </m:ctrlPr>
@@ -5230,7 +5233,7 @@
               </p:txBody>
             </p:sp>
           </mc:Choice>
-          <mc:Fallback>
+          <mc:Fallback xmlns="">
             <p:sp>
               <p:nvSpPr>
                 <p:cNvPr id="70" name="Rectangle 69">
@@ -5280,7 +5283,7 @@
             <p:cNvPr id="71" name="Right Arrow 70">
               <a:extLst>
                 <a:ext uri="{FF2B5EF4-FFF2-40B4-BE49-F238E27FC236}">
-                  <a16:creationId xmlns:a16="http://schemas.microsoft.com/office/drawing/2014/main" id="{6B6E1C74-3787-964F-83B0-923A4C9A0AB9}"/>
+                  <a16:creationId xmlns:a16="http://schemas.microsoft.com/office/drawing/2014/main" xmlns="" id="{6B6E1C74-3787-964F-83B0-923A4C9A0AB9}"/>
                 </a:ext>
               </a:extLst>
             </p:cNvPr>
@@ -5329,14 +5332,14 @@
             </a:p>
           </p:txBody>
         </p:sp>
-        <mc:AlternateContent xmlns:mc="http://schemas.openxmlformats.org/markup-compatibility/2006">
-          <mc:Choice xmlns:a14="http://schemas.microsoft.com/office/drawing/2010/main" Requires="a14">
+        <mc:AlternateContent xmlns:mc="http://schemas.openxmlformats.org/markup-compatibility/2006" xmlns:a14="http://schemas.microsoft.com/office/drawing/2010/main">
+          <mc:Choice Requires="a14">
             <p:sp>
               <p:nvSpPr>
                 <p:cNvPr id="72" name="Rectangle 71">
                   <a:extLst>
                     <a:ext uri="{FF2B5EF4-FFF2-40B4-BE49-F238E27FC236}">
-                      <a16:creationId xmlns:a16="http://schemas.microsoft.com/office/drawing/2014/main" id="{9E0FC6A1-9C8A-8146-A6D0-F9E3266A95EC}"/>
+                      <a16:creationId xmlns:a16="http://schemas.microsoft.com/office/drawing/2014/main" xmlns="" id="{9E0FC6A1-9C8A-8146-A6D0-F9E3266A95EC}"/>
                     </a:ext>
                   </a:extLst>
                 </p:cNvPr>
@@ -5358,6 +5361,7 @@
                 </a:bodyPr>
                 <a:lstStyle/>
                 <a:p>
+                  <a:pPr/>
                   <a14:m>
                     <m:oMathPara xmlns:m="http://schemas.openxmlformats.org/officeDocument/2006/math">
                       <m:oMathParaPr>
@@ -5369,7 +5373,7 @@
                             <m:chr m:val="⃗"/>
                             <m:ctrlPr>
                               <a:rPr lang="en-US" sz="2400" i="1" smtClean="0">
-                                <a:latin typeface="Cambria Math" panose="02040503050406030204" pitchFamily="18" charset="0"/>
+                                <a:latin typeface="Cambria Math" charset="0"/>
                                 <a:cs typeface="Arial" panose="020B0604020202020204" pitchFamily="34" charset="0"/>
                               </a:rPr>
                             </m:ctrlPr>
@@ -5392,7 +5396,7 @@
               </p:txBody>
             </p:sp>
           </mc:Choice>
-          <mc:Fallback>
+          <mc:Fallback xmlns="">
             <p:sp>
               <p:nvSpPr>
                 <p:cNvPr id="72" name="Rectangle 71">
@@ -5473,7 +5477,7 @@
           <p:cNvPr id="34" name="Group 33">
             <a:extLst>
               <a:ext uri="{FF2B5EF4-FFF2-40B4-BE49-F238E27FC236}">
-                <a16:creationId xmlns:a16="http://schemas.microsoft.com/office/drawing/2014/main" id="{2968E25A-E0F0-4743-BCF9-DB80B3BE4E10}"/>
+                <a16:creationId xmlns:a16="http://schemas.microsoft.com/office/drawing/2014/main" xmlns="" id="{2968E25A-E0F0-4743-BCF9-DB80B3BE4E10}"/>
               </a:ext>
             </a:extLst>
           </p:cNvPr>
@@ -5493,7 +5497,7 @@
             <p:cNvPr id="5" name="Picture 4">
               <a:extLst>
                 <a:ext uri="{FF2B5EF4-FFF2-40B4-BE49-F238E27FC236}">
-                  <a16:creationId xmlns:a16="http://schemas.microsoft.com/office/drawing/2014/main" id="{862DDED0-28CD-A849-A46D-972FB68D3F7F}"/>
+                  <a16:creationId xmlns:a16="http://schemas.microsoft.com/office/drawing/2014/main" xmlns="" id="{862DDED0-28CD-A849-A46D-972FB68D3F7F}"/>
                 </a:ext>
               </a:extLst>
             </p:cNvPr>
@@ -5529,7 +5533,7 @@
             <p:cNvPr id="32" name="Group 31">
               <a:extLst>
                 <a:ext uri="{FF2B5EF4-FFF2-40B4-BE49-F238E27FC236}">
-                  <a16:creationId xmlns:a16="http://schemas.microsoft.com/office/drawing/2014/main" id="{849CEAB8-A185-2C46-A5AD-4DE470B95610}"/>
+                  <a16:creationId xmlns:a16="http://schemas.microsoft.com/office/drawing/2014/main" xmlns="" id="{849CEAB8-A185-2C46-A5AD-4DE470B95610}"/>
                 </a:ext>
               </a:extLst>
             </p:cNvPr>
@@ -5549,7 +5553,7 @@
               <p:cNvPr id="11" name="Picture 10">
                 <a:extLst>
                   <a:ext uri="{FF2B5EF4-FFF2-40B4-BE49-F238E27FC236}">
-                    <a16:creationId xmlns:a16="http://schemas.microsoft.com/office/drawing/2014/main" id="{33777C93-2AC5-2B45-8F96-3D25FB0CDBA2}"/>
+                    <a16:creationId xmlns:a16="http://schemas.microsoft.com/office/drawing/2014/main" xmlns="" id="{33777C93-2AC5-2B45-8F96-3D25FB0CDBA2}"/>
                   </a:ext>
                 </a:extLst>
               </p:cNvPr>
@@ -5585,7 +5589,7 @@
               <p:cNvPr id="9" name="Picture 8">
                 <a:extLst>
                   <a:ext uri="{FF2B5EF4-FFF2-40B4-BE49-F238E27FC236}">
-                    <a16:creationId xmlns:a16="http://schemas.microsoft.com/office/drawing/2014/main" id="{F3225B15-42E0-D54E-AACA-7467F5F93D3E}"/>
+                    <a16:creationId xmlns:a16="http://schemas.microsoft.com/office/drawing/2014/main" xmlns="" id="{F3225B15-42E0-D54E-AACA-7467F5F93D3E}"/>
                   </a:ext>
                 </a:extLst>
               </p:cNvPr>
@@ -5621,7 +5625,7 @@
               <p:cNvPr id="13" name="Picture 12">
                 <a:extLst>
                   <a:ext uri="{FF2B5EF4-FFF2-40B4-BE49-F238E27FC236}">
-                    <a16:creationId xmlns:a16="http://schemas.microsoft.com/office/drawing/2014/main" id="{CA298BF4-876F-AE42-B5DE-72E28566250D}"/>
+                    <a16:creationId xmlns:a16="http://schemas.microsoft.com/office/drawing/2014/main" xmlns="" id="{CA298BF4-876F-AE42-B5DE-72E28566250D}"/>
                   </a:ext>
                 </a:extLst>
               </p:cNvPr>
@@ -5657,7 +5661,7 @@
               <p:cNvPr id="15" name="Picture 14">
                 <a:extLst>
                   <a:ext uri="{FF2B5EF4-FFF2-40B4-BE49-F238E27FC236}">
-                    <a16:creationId xmlns:a16="http://schemas.microsoft.com/office/drawing/2014/main" id="{3E620177-C4F7-9448-9E58-F1F617DB2327}"/>
+                    <a16:creationId xmlns:a16="http://schemas.microsoft.com/office/drawing/2014/main" xmlns="" id="{3E620177-C4F7-9448-9E58-F1F617DB2327}"/>
                   </a:ext>
                 </a:extLst>
               </p:cNvPr>
@@ -5693,7 +5697,7 @@
               <p:cNvPr id="17" name="Picture 16">
                 <a:extLst>
                   <a:ext uri="{FF2B5EF4-FFF2-40B4-BE49-F238E27FC236}">
-                    <a16:creationId xmlns:a16="http://schemas.microsoft.com/office/drawing/2014/main" id="{A18192C4-71FC-2541-8334-92AFCC8114BB}"/>
+                    <a16:creationId xmlns:a16="http://schemas.microsoft.com/office/drawing/2014/main" xmlns="" id="{A18192C4-71FC-2541-8334-92AFCC8114BB}"/>
                   </a:ext>
                 </a:extLst>
               </p:cNvPr>
@@ -5732,7 +5736,7 @@
               <p:cNvPr id="20" name="Picture 19">
                 <a:extLst>
                   <a:ext uri="{FF2B5EF4-FFF2-40B4-BE49-F238E27FC236}">
-                    <a16:creationId xmlns:a16="http://schemas.microsoft.com/office/drawing/2014/main" id="{D19E6756-109C-D44C-A9C0-1E2F5A74207B}"/>
+                    <a16:creationId xmlns:a16="http://schemas.microsoft.com/office/drawing/2014/main" xmlns="" id="{D19E6756-109C-D44C-A9C0-1E2F5A74207B}"/>
                   </a:ext>
                 </a:extLst>
               </p:cNvPr>
@@ -5768,7 +5772,7 @@
               <p:cNvPr id="22" name="Picture 21">
                 <a:extLst>
                   <a:ext uri="{FF2B5EF4-FFF2-40B4-BE49-F238E27FC236}">
-                    <a16:creationId xmlns:a16="http://schemas.microsoft.com/office/drawing/2014/main" id="{19E743AB-A6EB-AC46-9701-519DD44AB637}"/>
+                    <a16:creationId xmlns:a16="http://schemas.microsoft.com/office/drawing/2014/main" xmlns="" id="{19E743AB-A6EB-AC46-9701-519DD44AB637}"/>
                   </a:ext>
                 </a:extLst>
               </p:cNvPr>
@@ -5804,7 +5808,7 @@
               <p:cNvPr id="24" name="Picture 23">
                 <a:extLst>
                   <a:ext uri="{FF2B5EF4-FFF2-40B4-BE49-F238E27FC236}">
-                    <a16:creationId xmlns:a16="http://schemas.microsoft.com/office/drawing/2014/main" id="{3C9795DD-A882-E944-B3C8-C21954748ED0}"/>
+                    <a16:creationId xmlns:a16="http://schemas.microsoft.com/office/drawing/2014/main" xmlns="" id="{3C9795DD-A882-E944-B3C8-C21954748ED0}"/>
                   </a:ext>
                 </a:extLst>
               </p:cNvPr>
@@ -5840,7 +5844,7 @@
               <p:cNvPr id="26" name="Picture 25">
                 <a:extLst>
                   <a:ext uri="{FF2B5EF4-FFF2-40B4-BE49-F238E27FC236}">
-                    <a16:creationId xmlns:a16="http://schemas.microsoft.com/office/drawing/2014/main" id="{2CA0F1BF-AF47-FE49-BD94-CD19BD4458D9}"/>
+                    <a16:creationId xmlns:a16="http://schemas.microsoft.com/office/drawing/2014/main" xmlns="" id="{2CA0F1BF-AF47-FE49-BD94-CD19BD4458D9}"/>
                   </a:ext>
                 </a:extLst>
               </p:cNvPr>
@@ -5876,7 +5880,7 @@
               <p:cNvPr id="28" name="Picture 27">
                 <a:extLst>
                   <a:ext uri="{FF2B5EF4-FFF2-40B4-BE49-F238E27FC236}">
-                    <a16:creationId xmlns:a16="http://schemas.microsoft.com/office/drawing/2014/main" id="{E797D9A0-6C8F-9941-ABB6-35AA6AB6D08C}"/>
+                    <a16:creationId xmlns:a16="http://schemas.microsoft.com/office/drawing/2014/main" xmlns="" id="{E797D9A0-6C8F-9941-ABB6-35AA6AB6D08C}"/>
                   </a:ext>
                 </a:extLst>
               </p:cNvPr>
@@ -5944,7 +5948,7 @@
           <p:cNvPr id="5" name="Content Placeholder 4">
             <a:extLst>
               <a:ext uri="{FF2B5EF4-FFF2-40B4-BE49-F238E27FC236}">
-                <a16:creationId xmlns:a16="http://schemas.microsoft.com/office/drawing/2014/main" id="{952598BC-B983-D442-AB43-1DA9E3EA04F3}"/>
+                <a16:creationId xmlns:a16="http://schemas.microsoft.com/office/drawing/2014/main" xmlns="" id="{952598BC-B983-D442-AB43-1DA9E3EA04F3}"/>
               </a:ext>
             </a:extLst>
           </p:cNvPr>
@@ -5979,7 +5983,7 @@
           <p:cNvPr id="6" name="Group 5">
             <a:extLst>
               <a:ext uri="{FF2B5EF4-FFF2-40B4-BE49-F238E27FC236}">
-                <a16:creationId xmlns:a16="http://schemas.microsoft.com/office/drawing/2014/main" id="{C68C002A-4070-BB41-A157-2EE6021AD65D}"/>
+                <a16:creationId xmlns:a16="http://schemas.microsoft.com/office/drawing/2014/main" xmlns="" id="{C68C002A-4070-BB41-A157-2EE6021AD65D}"/>
               </a:ext>
             </a:extLst>
           </p:cNvPr>
@@ -5999,7 +6003,7 @@
             <p:cNvPr id="7" name="Picture 6">
               <a:extLst>
                 <a:ext uri="{FF2B5EF4-FFF2-40B4-BE49-F238E27FC236}">
-                  <a16:creationId xmlns:a16="http://schemas.microsoft.com/office/drawing/2014/main" id="{4701B07A-9F93-2D47-B6F0-A8E18740DCC6}"/>
+                  <a16:creationId xmlns:a16="http://schemas.microsoft.com/office/drawing/2014/main" xmlns="" id="{4701B07A-9F93-2D47-B6F0-A8E18740DCC6}"/>
                 </a:ext>
               </a:extLst>
             </p:cNvPr>
@@ -6035,7 +6039,7 @@
             <p:cNvPr id="8" name="Picture 7">
               <a:extLst>
                 <a:ext uri="{FF2B5EF4-FFF2-40B4-BE49-F238E27FC236}">
-                  <a16:creationId xmlns:a16="http://schemas.microsoft.com/office/drawing/2014/main" id="{661F01C5-D41E-D348-8B8F-B22507334DB9}"/>
+                  <a16:creationId xmlns:a16="http://schemas.microsoft.com/office/drawing/2014/main" xmlns="" id="{661F01C5-D41E-D348-8B8F-B22507334DB9}"/>
                 </a:ext>
               </a:extLst>
             </p:cNvPr>
@@ -6071,7 +6075,7 @@
             <p:cNvPr id="9" name="Picture 8">
               <a:extLst>
                 <a:ext uri="{FF2B5EF4-FFF2-40B4-BE49-F238E27FC236}">
-                  <a16:creationId xmlns:a16="http://schemas.microsoft.com/office/drawing/2014/main" id="{C9E989EC-B613-5D44-9C09-9B109ABEC478}"/>
+                  <a16:creationId xmlns:a16="http://schemas.microsoft.com/office/drawing/2014/main" xmlns="" id="{C9E989EC-B613-5D44-9C09-9B109ABEC478}"/>
                 </a:ext>
               </a:extLst>
             </p:cNvPr>
@@ -6107,7 +6111,7 @@
             <p:cNvPr id="10" name="Picture 9">
               <a:extLst>
                 <a:ext uri="{FF2B5EF4-FFF2-40B4-BE49-F238E27FC236}">
-                  <a16:creationId xmlns:a16="http://schemas.microsoft.com/office/drawing/2014/main" id="{08F61961-195A-4B47-8092-1123DCFCE023}"/>
+                  <a16:creationId xmlns:a16="http://schemas.microsoft.com/office/drawing/2014/main" xmlns="" id="{08F61961-195A-4B47-8092-1123DCFCE023}"/>
                 </a:ext>
               </a:extLst>
             </p:cNvPr>
@@ -6143,7 +6147,7 @@
             <p:cNvPr id="11" name="Picture 10">
               <a:extLst>
                 <a:ext uri="{FF2B5EF4-FFF2-40B4-BE49-F238E27FC236}">
-                  <a16:creationId xmlns:a16="http://schemas.microsoft.com/office/drawing/2014/main" id="{92D2909D-3ED4-DF44-901E-F5423EFAFBE2}"/>
+                  <a16:creationId xmlns:a16="http://schemas.microsoft.com/office/drawing/2014/main" xmlns="" id="{92D2909D-3ED4-DF44-901E-F5423EFAFBE2}"/>
                 </a:ext>
               </a:extLst>
             </p:cNvPr>
@@ -6182,7 +6186,7 @@
             <p:cNvPr id="12" name="Picture 11">
               <a:extLst>
                 <a:ext uri="{FF2B5EF4-FFF2-40B4-BE49-F238E27FC236}">
-                  <a16:creationId xmlns:a16="http://schemas.microsoft.com/office/drawing/2014/main" id="{E074D22B-DE95-5E4F-B8AF-CAFDAA9468DD}"/>
+                  <a16:creationId xmlns:a16="http://schemas.microsoft.com/office/drawing/2014/main" xmlns="" id="{E074D22B-DE95-5E4F-B8AF-CAFDAA9468DD}"/>
                 </a:ext>
               </a:extLst>
             </p:cNvPr>
@@ -6218,7 +6222,7 @@
             <p:cNvPr id="13" name="Picture 12">
               <a:extLst>
                 <a:ext uri="{FF2B5EF4-FFF2-40B4-BE49-F238E27FC236}">
-                  <a16:creationId xmlns:a16="http://schemas.microsoft.com/office/drawing/2014/main" id="{42F97D83-9CCF-944D-A263-0AD3A4567F89}"/>
+                  <a16:creationId xmlns:a16="http://schemas.microsoft.com/office/drawing/2014/main" xmlns="" id="{42F97D83-9CCF-944D-A263-0AD3A4567F89}"/>
                 </a:ext>
               </a:extLst>
             </p:cNvPr>
@@ -6254,7 +6258,7 @@
             <p:cNvPr id="14" name="Picture 13">
               <a:extLst>
                 <a:ext uri="{FF2B5EF4-FFF2-40B4-BE49-F238E27FC236}">
-                  <a16:creationId xmlns:a16="http://schemas.microsoft.com/office/drawing/2014/main" id="{CBA71493-620F-3147-A6F2-D9A0B1297686}"/>
+                  <a16:creationId xmlns:a16="http://schemas.microsoft.com/office/drawing/2014/main" xmlns="" id="{CBA71493-620F-3147-A6F2-D9A0B1297686}"/>
                 </a:ext>
               </a:extLst>
             </p:cNvPr>
@@ -6290,7 +6294,7 @@
             <p:cNvPr id="15" name="Picture 14">
               <a:extLst>
                 <a:ext uri="{FF2B5EF4-FFF2-40B4-BE49-F238E27FC236}">
-                  <a16:creationId xmlns:a16="http://schemas.microsoft.com/office/drawing/2014/main" id="{6ED3B572-9A47-AB41-9674-DACFDD6D0FE8}"/>
+                  <a16:creationId xmlns:a16="http://schemas.microsoft.com/office/drawing/2014/main" xmlns="" id="{6ED3B572-9A47-AB41-9674-DACFDD6D0FE8}"/>
                 </a:ext>
               </a:extLst>
             </p:cNvPr>
@@ -6326,7 +6330,7 @@
             <p:cNvPr id="16" name="Picture 15">
               <a:extLst>
                 <a:ext uri="{FF2B5EF4-FFF2-40B4-BE49-F238E27FC236}">
-                  <a16:creationId xmlns:a16="http://schemas.microsoft.com/office/drawing/2014/main" id="{124C0B23-3AF6-4545-9CD6-9023252686F0}"/>
+                  <a16:creationId xmlns:a16="http://schemas.microsoft.com/office/drawing/2014/main" xmlns="" id="{124C0B23-3AF6-4545-9CD6-9023252686F0}"/>
                 </a:ext>
               </a:extLst>
             </p:cNvPr>
@@ -6680,7 +6684,7 @@
                           <m:sSubPr>
                             <m:ctrlPr>
                               <a:rPr lang="en-US" sz="2000" b="0" i="1" smtClean="0">
-                                <a:latin typeface="Cambria Math" panose="02040503050406030204" pitchFamily="18" charset="0"/>
+                                <a:latin typeface="Cambria Math" charset="0"/>
                                 <a:cs typeface="Arial" panose="020B0604020202020204" pitchFamily="34" charset="0"/>
                               </a:rPr>
                             </m:ctrlPr>
@@ -6729,7 +6733,7 @@
                           <m:sSubPr>
                             <m:ctrlPr>
                               <a:rPr lang="en-US" sz="2000" b="0" i="1" smtClean="0">
-                                <a:latin typeface="Cambria Math" panose="02040503050406030204" pitchFamily="18" charset="0"/>
+                                <a:latin typeface="Cambria Math" charset="0"/>
                                 <a:cs typeface="Arial" panose="020B0604020202020204" pitchFamily="34" charset="0"/>
                               </a:rPr>
                             </m:ctrlPr>
@@ -6898,7 +6902,7 @@
                           <m:sSubPr>
                             <m:ctrlPr>
                               <a:rPr lang="en-US" sz="2000" b="0" i="1" smtClean="0">
-                                <a:latin typeface="Cambria Math" panose="02040503050406030204" pitchFamily="18" charset="0"/>
+                                <a:latin typeface="Cambria Math" charset="0"/>
                                 <a:cs typeface="Arial" panose="020B0604020202020204" pitchFamily="34" charset="0"/>
                               </a:rPr>
                             </m:ctrlPr>
@@ -7954,7 +7958,7 @@
                                 <m:sSupPr>
                                   <m:ctrlPr>
                                     <a:rPr lang="en-US" sz="2000" b="0" i="1" smtClean="0">
-                                      <a:latin typeface="Cambria Math" panose="02040503050406030204" pitchFamily="18" charset="0"/>
+                                      <a:latin typeface="Cambria Math" charset="0"/>
                                       <a:cs typeface="Arial" panose="020B0604020202020204" pitchFamily="34" charset="0"/>
                                     </a:rPr>
                                   </m:ctrlPr>
@@ -8363,7 +8367,7 @@
                                 <m:sSupPr>
                                   <m:ctrlPr>
                                     <a:rPr lang="en-US" b="0" i="1" smtClean="0">
-                                      <a:latin typeface="Cambria Math" panose="02040503050406030204" pitchFamily="18" charset="0"/>
+                                      <a:latin typeface="Cambria Math" charset="0"/>
                                     </a:rPr>
                                   </m:ctrlPr>
                                 </m:sSupPr>
@@ -9097,7 +9101,7 @@
                             <m:sSupPr>
                               <m:ctrlPr>
                                 <a:rPr lang="en-US" sz="2000" b="0" i="1" smtClean="0">
-                                  <a:latin typeface="Cambria Math" panose="02040503050406030204" pitchFamily="18" charset="0"/>
+                                  <a:latin typeface="Cambria Math" charset="0"/>
                                   <a:cs typeface="Arial" panose="020B0604020202020204" pitchFamily="34" charset="0"/>
                                 </a:rPr>
                               </m:ctrlPr>
@@ -9107,7 +9111,7 @@
                                 <m:sSupPr>
                                   <m:ctrlPr>
                                     <a:rPr lang="en-US" sz="2000" b="0" i="1" smtClean="0">
-                                      <a:latin typeface="Cambria Math" panose="02040503050406030204" pitchFamily="18" charset="0"/>
+                                      <a:latin typeface="Cambria Math" charset="0"/>
                                       <a:cs typeface="Arial" panose="020B0604020202020204" pitchFamily="34" charset="0"/>
                                     </a:rPr>
                                   </m:ctrlPr>
@@ -9283,7 +9287,7 @@
                             <m:sSupPr>
                               <m:ctrlPr>
                                 <a:rPr lang="en-US" sz="2000" b="0" i="1" smtClean="0">
-                                  <a:latin typeface="Cambria Math" panose="02040503050406030204" pitchFamily="18" charset="0"/>
+                                  <a:latin typeface="Cambria Math" charset="0"/>
                                   <a:cs typeface="Arial" panose="020B0604020202020204" pitchFamily="34" charset="0"/>
                                 </a:rPr>
                               </m:ctrlPr>
@@ -9293,7 +9297,7 @@
                                 <m:sSupPr>
                                   <m:ctrlPr>
                                     <a:rPr lang="en-US" sz="2000" b="0" i="1" smtClean="0">
-                                      <a:latin typeface="Cambria Math" panose="02040503050406030204" pitchFamily="18" charset="0"/>
+                                      <a:latin typeface="Cambria Math" charset="0"/>
                                       <a:cs typeface="Arial" panose="020B0604020202020204" pitchFamily="34" charset="0"/>
                                     </a:rPr>
                                   </m:ctrlPr>
@@ -9470,7 +9474,7 @@
                           <m:sSupPr>
                             <m:ctrlPr>
                               <a:rPr lang="en-US" b="0" i="1" smtClean="0">
-                                <a:latin typeface="Cambria Math" panose="02040503050406030204" pitchFamily="18" charset="0"/>
+                                <a:latin typeface="Cambria Math" charset="0"/>
                               </a:rPr>
                             </m:ctrlPr>
                           </m:sSupPr>
@@ -9831,7 +9835,7 @@
                           <m:sSubPr>
                             <m:ctrlPr>
                               <a:rPr lang="en-US" sz="2000" b="0" i="1" smtClean="0">
-                                <a:latin typeface="Cambria Math" panose="02040503050406030204" pitchFamily="18" charset="0"/>
+                                <a:latin typeface="Cambria Math" charset="0"/>
                                 <a:cs typeface="Arial" panose="020B0604020202020204" pitchFamily="34" charset="0"/>
                               </a:rPr>
                             </m:ctrlPr>
@@ -10007,7 +10011,7 @@
                           <m:sSubPr>
                             <m:ctrlPr>
                               <a:rPr lang="en-US" sz="2000" b="0" i="1" smtClean="0">
-                                <a:latin typeface="Cambria Math" panose="02040503050406030204" pitchFamily="18" charset="0"/>
+                                <a:latin typeface="Cambria Math" charset="0"/>
                                 <a:cs typeface="Arial" panose="020B0604020202020204" pitchFamily="34" charset="0"/>
                               </a:rPr>
                             </m:ctrlPr>
@@ -10985,7 +10989,7 @@
                           <m:sSubPr>
                             <m:ctrlPr>
                               <a:rPr lang="en-US" i="1">
-                                <a:latin typeface="Cambria Math" panose="02040503050406030204" pitchFamily="18" charset="0"/>
+                                <a:latin typeface="Cambria Math" charset="0"/>
                                 <a:cs typeface="Arial" panose="020B0604020202020204" pitchFamily="34" charset="0"/>
                               </a:rPr>
                             </m:ctrlPr>
@@ -11090,7 +11094,7 @@
                           <m:sSubPr>
                             <m:ctrlPr>
                               <a:rPr lang="en-US" i="1">
-                                <a:latin typeface="Cambria Math" panose="02040503050406030204" pitchFamily="18" charset="0"/>
+                                <a:latin typeface="Cambria Math" charset="0"/>
                                 <a:cs typeface="Arial" panose="020B0604020202020204" pitchFamily="34" charset="0"/>
                               </a:rPr>
                             </m:ctrlPr>
@@ -11682,7 +11686,7 @@
                           <m:sSubPr>
                             <m:ctrlPr>
                               <a:rPr lang="en-US" i="1" smtClean="0">
-                                <a:latin typeface="Cambria Math" panose="02040503050406030204" pitchFamily="18" charset="0"/>
+                                <a:latin typeface="Cambria Math" charset="0"/>
                                 <a:cs typeface="Arial" panose="020B0604020202020204" pitchFamily="34" charset="0"/>
                               </a:rPr>
                             </m:ctrlPr>
@@ -11895,7 +11899,7 @@
                           <m:sSubPr>
                             <m:ctrlPr>
                               <a:rPr lang="en-US" i="1" smtClean="0">
-                                <a:latin typeface="Cambria Math" panose="02040503050406030204" pitchFamily="18" charset="0"/>
+                                <a:latin typeface="Cambria Math" charset="0"/>
                                 <a:cs typeface="Arial" panose="020B0604020202020204" pitchFamily="34" charset="0"/>
                               </a:rPr>
                             </m:ctrlPr>
@@ -12000,7 +12004,7 @@
                           <m:sSubPr>
                             <m:ctrlPr>
                               <a:rPr lang="en-US" i="1" smtClean="0">
-                                <a:latin typeface="Cambria Math" panose="02040503050406030204" pitchFamily="18" charset="0"/>
+                                <a:latin typeface="Cambria Math" charset="0"/>
                                 <a:cs typeface="Arial" panose="020B0604020202020204" pitchFamily="34" charset="0"/>
                               </a:rPr>
                             </m:ctrlPr>
@@ -12977,7 +12981,7 @@
                               <m:chr m:val="⃗"/>
                               <m:ctrlPr>
                                 <a:rPr lang="en-US" i="1">
-                                  <a:latin typeface="Cambria Math" panose="02040503050406030204" pitchFamily="18" charset="0"/>
+                                  <a:latin typeface="Cambria Math" charset="0"/>
                                   <a:cs typeface="Arial" panose="020B0604020202020204" pitchFamily="34" charset="0"/>
                                 </a:rPr>
                               </m:ctrlPr>
@@ -13074,7 +13078,7 @@
                               <m:chr m:val="⃗"/>
                               <m:ctrlPr>
                                 <a:rPr lang="en-US" i="1" smtClean="0">
-                                  <a:latin typeface="Cambria Math" panose="02040503050406030204" pitchFamily="18" charset="0"/>
+                                  <a:latin typeface="Cambria Math" charset="0"/>
                                   <a:cs typeface="Arial" panose="020B0604020202020204" pitchFamily="34" charset="0"/>
                                 </a:rPr>
                               </m:ctrlPr>
@@ -13084,7 +13088,7 @@
                                 <m:sSubPr>
                                   <m:ctrlPr>
                                     <a:rPr lang="en-US" b="0" i="1" smtClean="0">
-                                      <a:latin typeface="Cambria Math" panose="02040503050406030204" pitchFamily="18" charset="0"/>
+                                      <a:latin typeface="Cambria Math" charset="0"/>
                                       <a:cs typeface="Arial" panose="020B0604020202020204" pitchFamily="34" charset="0"/>
                                     </a:rPr>
                                   </m:ctrlPr>
@@ -13192,7 +13196,7 @@
                               <m:chr m:val="⃗"/>
                               <m:ctrlPr>
                                 <a:rPr lang="en-US" i="1" smtClean="0">
-                                  <a:latin typeface="Cambria Math" panose="02040503050406030204" pitchFamily="18" charset="0"/>
+                                  <a:latin typeface="Cambria Math" charset="0"/>
                                   <a:cs typeface="Arial" panose="020B0604020202020204" pitchFamily="34" charset="0"/>
                                 </a:rPr>
                               </m:ctrlPr>
@@ -13202,7 +13206,7 @@
                                 <m:sSubPr>
                                   <m:ctrlPr>
                                     <a:rPr lang="en-US" b="0" i="1" smtClean="0">
-                                      <a:latin typeface="Cambria Math" panose="02040503050406030204" pitchFamily="18" charset="0"/>
+                                      <a:latin typeface="Cambria Math" charset="0"/>
                                       <a:cs typeface="Arial" panose="020B0604020202020204" pitchFamily="34" charset="0"/>
                                     </a:rPr>
                                   </m:ctrlPr>
@@ -13310,7 +13314,7 @@
                           <m:sSubPr>
                             <m:ctrlPr>
                               <a:rPr lang="en-US" b="0" i="1" smtClean="0">
-                                <a:latin typeface="Cambria Math" panose="02040503050406030204" pitchFamily="18" charset="0"/>
+                                <a:latin typeface="Cambria Math" charset="0"/>
                                 <a:cs typeface="Arial" panose="020B0604020202020204" pitchFamily="34" charset="0"/>
                               </a:rPr>
                             </m:ctrlPr>
@@ -13415,7 +13419,7 @@
                           <m:sSubPr>
                             <m:ctrlPr>
                               <a:rPr lang="en-US" b="0" i="1" smtClean="0">
-                                <a:latin typeface="Cambria Math" panose="02040503050406030204" pitchFamily="18" charset="0"/>
+                                <a:latin typeface="Cambria Math" charset="0"/>
                                 <a:cs typeface="Arial" panose="020B0604020202020204" pitchFamily="34" charset="0"/>
                               </a:rPr>
                             </m:ctrlPr>
@@ -13651,7 +13655,7 @@
                             <m:chr m:val="⃗"/>
                             <m:ctrlPr>
                               <a:rPr lang="en-US" i="1" smtClean="0">
-                                <a:latin typeface="Cambria Math" panose="02040503050406030204" pitchFamily="18" charset="0"/>
+                                <a:latin typeface="Cambria Math" charset="0"/>
                                 <a:cs typeface="Arial" panose="020B0604020202020204" pitchFamily="34" charset="0"/>
                               </a:rPr>
                             </m:ctrlPr>
@@ -13661,7 +13665,7 @@
                               <m:sSubPr>
                                 <m:ctrlPr>
                                   <a:rPr lang="en-US" b="0" i="1" smtClean="0">
-                                    <a:latin typeface="Cambria Math" panose="02040503050406030204" pitchFamily="18" charset="0"/>
+                                    <a:latin typeface="Cambria Math" charset="0"/>
                                     <a:cs typeface="Arial" panose="020B0604020202020204" pitchFamily="34" charset="0"/>
                                   </a:rPr>
                                 </m:ctrlPr>
@@ -13776,7 +13780,7 @@
                             <m:chr m:val="⃗"/>
                             <m:ctrlPr>
                               <a:rPr lang="en-US" i="1" smtClean="0">
-                                <a:latin typeface="Cambria Math" panose="02040503050406030204" pitchFamily="18" charset="0"/>
+                                <a:latin typeface="Cambria Math" charset="0"/>
                                 <a:cs typeface="Arial" panose="020B0604020202020204" pitchFamily="34" charset="0"/>
                               </a:rPr>
                             </m:ctrlPr>
@@ -13786,7 +13790,7 @@
                               <m:sSubPr>
                                 <m:ctrlPr>
                                   <a:rPr lang="en-US" b="0" i="1" smtClean="0">
-                                    <a:latin typeface="Cambria Math" panose="02040503050406030204" pitchFamily="18" charset="0"/>
+                                    <a:latin typeface="Cambria Math" charset="0"/>
                                     <a:cs typeface="Arial" panose="020B0604020202020204" pitchFamily="34" charset="0"/>
                                   </a:rPr>
                                 </m:ctrlPr>
@@ -13894,7 +13898,7 @@
                             <m:chr m:val="⃗"/>
                             <m:ctrlPr>
                               <a:rPr lang="en-US" i="1" smtClean="0">
-                                <a:latin typeface="Cambria Math" panose="02040503050406030204" pitchFamily="18" charset="0"/>
+                                <a:latin typeface="Cambria Math" charset="0"/>
                                 <a:cs typeface="Arial" panose="020B0604020202020204" pitchFamily="34" charset="0"/>
                               </a:rPr>
                             </m:ctrlPr>
@@ -13904,7 +13908,7 @@
                               <m:sSubPr>
                                 <m:ctrlPr>
                                   <a:rPr lang="en-US" b="0" i="1" smtClean="0">
-                                    <a:latin typeface="Cambria Math" panose="02040503050406030204" pitchFamily="18" charset="0"/>
+                                    <a:latin typeface="Cambria Math" charset="0"/>
                                     <a:cs typeface="Arial" panose="020B0604020202020204" pitchFamily="34" charset="0"/>
                                   </a:rPr>
                                 </m:ctrlPr>
@@ -14058,7 +14062,7 @@
                             <m:chr m:val="⃗"/>
                             <m:ctrlPr>
                               <a:rPr lang="en-US" b="0" i="1" smtClean="0">
-                                <a:latin typeface="Cambria Math" panose="02040503050406030204" pitchFamily="18" charset="0"/>
+                                <a:latin typeface="Cambria Math" charset="0"/>
                                 <a:cs typeface="Arial" panose="020B0604020202020204" pitchFamily="34" charset="0"/>
                               </a:rPr>
                             </m:ctrlPr>
@@ -14085,7 +14089,7 @@
                             <m:chr m:val="⃗"/>
                             <m:ctrlPr>
                               <a:rPr lang="en-US" b="0" i="1" smtClean="0">
-                                <a:latin typeface="Cambria Math" panose="02040503050406030204" pitchFamily="18" charset="0"/>
+                                <a:latin typeface="Cambria Math" charset="0"/>
                                 <a:cs typeface="Arial" panose="020B0604020202020204" pitchFamily="34" charset="0"/>
                               </a:rPr>
                             </m:ctrlPr>
@@ -14095,7 +14099,7 @@
                               <m:sSubPr>
                                 <m:ctrlPr>
                                   <a:rPr lang="en-US" b="0" i="1" smtClean="0">
-                                    <a:latin typeface="Cambria Math" panose="02040503050406030204" pitchFamily="18" charset="0"/>
+                                    <a:latin typeface="Cambria Math" charset="0"/>
                                     <a:cs typeface="Arial" panose="020B0604020202020204" pitchFamily="34" charset="0"/>
                                   </a:rPr>
                                 </m:ctrlPr>
@@ -14133,7 +14137,7 @@
                             <m:chr m:val="⃗"/>
                             <m:ctrlPr>
                               <a:rPr lang="en-US" i="1" smtClean="0">
-                                <a:latin typeface="Cambria Math" panose="02040503050406030204" pitchFamily="18" charset="0"/>
+                                <a:latin typeface="Cambria Math" charset="0"/>
                                 <a:cs typeface="Arial" panose="020B0604020202020204" pitchFamily="34" charset="0"/>
                               </a:rPr>
                             </m:ctrlPr>
@@ -14143,7 +14147,7 @@
                               <m:sSubPr>
                                 <m:ctrlPr>
                                   <a:rPr lang="en-US" b="0" i="1" smtClean="0">
-                                    <a:latin typeface="Cambria Math" panose="02040503050406030204" pitchFamily="18" charset="0"/>
+                                    <a:latin typeface="Cambria Math" charset="0"/>
                                     <a:cs typeface="Arial" panose="020B0604020202020204" pitchFamily="34" charset="0"/>
                                   </a:rPr>
                                 </m:ctrlPr>
@@ -14639,7 +14643,7 @@
                               <m:chr m:val="⃗"/>
                               <m:ctrlPr>
                                 <a:rPr lang="en-US" i="1" smtClean="0">
-                                  <a:latin typeface="Cambria Math" panose="02040503050406030204" pitchFamily="18" charset="0"/>
+                                  <a:latin typeface="Cambria Math" charset="0"/>
                                   <a:cs typeface="Arial" panose="020B0604020202020204" pitchFamily="34" charset="0"/>
                                 </a:rPr>
                               </m:ctrlPr>
@@ -14735,7 +14739,7 @@
                             <m:sSubPr>
                               <m:ctrlPr>
                                 <a:rPr lang="en-US" b="0" i="1" smtClean="0">
-                                  <a:latin typeface="Cambria Math" panose="02040503050406030204" pitchFamily="18" charset="0"/>
+                                  <a:latin typeface="Cambria Math" charset="0"/>
                                   <a:cs typeface="Arial" panose="020B0604020202020204" pitchFamily="34" charset="0"/>
                                 </a:rPr>
                               </m:ctrlPr>
@@ -14840,7 +14844,7 @@
                             <m:sSubPr>
                               <m:ctrlPr>
                                 <a:rPr lang="en-US" b="0" i="1" smtClean="0">
-                                  <a:latin typeface="Cambria Math" panose="02040503050406030204" pitchFamily="18" charset="0"/>
+                                  <a:latin typeface="Cambria Math" charset="0"/>
                                   <a:cs typeface="Arial" panose="020B0604020202020204" pitchFamily="34" charset="0"/>
                                 </a:rPr>
                               </m:ctrlPr>
@@ -15053,7 +15057,7 @@
                             <m:fPr>
                               <m:ctrlPr>
                                 <a:rPr lang="en-US" b="0" i="1" smtClean="0">
-                                  <a:latin typeface="Cambria Math" panose="02040503050406030204" pitchFamily="18" charset="0"/>
+                                  <a:latin typeface="Cambria Math" charset="0"/>
                                   <a:cs typeface="Arial" panose="020B0604020202020204" pitchFamily="34" charset="0"/>
                                 </a:rPr>
                               </m:ctrlPr>
@@ -15063,7 +15067,7 @@
                                 <m:sSubPr>
                                   <m:ctrlPr>
                                     <a:rPr lang="en-US" b="0" i="1" smtClean="0">
-                                      <a:latin typeface="Cambria Math" panose="02040503050406030204" pitchFamily="18" charset="0"/>
+                                      <a:latin typeface="Cambria Math" charset="0"/>
                                       <a:cs typeface="Arial" panose="020B0604020202020204" pitchFamily="34" charset="0"/>
                                     </a:rPr>
                                   </m:ctrlPr>
@@ -15093,7 +15097,7 @@
                                 <m:sSubPr>
                                   <m:ctrlPr>
                                     <a:rPr lang="en-US" b="0" i="1" smtClean="0">
-                                      <a:latin typeface="Cambria Math" panose="02040503050406030204" pitchFamily="18" charset="0"/>
+                                      <a:latin typeface="Cambria Math" charset="0"/>
                                       <a:cs typeface="Arial" panose="020B0604020202020204" pitchFamily="34" charset="0"/>
                                     </a:rPr>
                                   </m:ctrlPr>
@@ -15454,7 +15458,7 @@
                             <m:chr m:val="⃗"/>
                             <m:ctrlPr>
                               <a:rPr lang="en-US" i="1" smtClean="0">
-                                <a:latin typeface="Cambria Math" panose="02040503050406030204" pitchFamily="18" charset="0"/>
+                                <a:latin typeface="Cambria Math" charset="0"/>
                                 <a:cs typeface="Arial" panose="020B0604020202020204" pitchFamily="34" charset="0"/>
                               </a:rPr>
                             </m:ctrlPr>
@@ -15917,7 +15921,7 @@
                             <m:sSubPr>
                               <m:ctrlPr>
                                 <a:rPr lang="en-US" i="1" smtClean="0">
-                                  <a:latin typeface="Cambria Math" panose="02040503050406030204" pitchFamily="18" charset="0"/>
+                                  <a:latin typeface="Cambria Math" charset="0"/>
                                   <a:cs typeface="Arial" panose="020B0604020202020204" pitchFamily="34" charset="0"/>
                                 </a:rPr>
                               </m:ctrlPr>
@@ -16022,7 +16026,7 @@
                             <m:sSubPr>
                               <m:ctrlPr>
                                 <a:rPr lang="en-US" i="1" smtClean="0">
-                                  <a:latin typeface="Cambria Math" panose="02040503050406030204" pitchFamily="18" charset="0"/>
+                                  <a:latin typeface="Cambria Math" charset="0"/>
                                   <a:cs typeface="Arial" panose="020B0604020202020204" pitchFamily="34" charset="0"/>
                                 </a:rPr>
                               </m:ctrlPr>
@@ -16127,7 +16131,7 @@
                             <m:sSubPr>
                               <m:ctrlPr>
                                 <a:rPr lang="en-US" i="1" smtClean="0">
-                                  <a:latin typeface="Cambria Math" panose="02040503050406030204" pitchFamily="18" charset="0"/>
+                                  <a:latin typeface="Cambria Math" charset="0"/>
                                   <a:cs typeface="Arial" panose="020B0604020202020204" pitchFamily="34" charset="0"/>
                                 </a:rPr>
                               </m:ctrlPr>
@@ -16232,7 +16236,7 @@
                             <m:sSubPr>
                               <m:ctrlPr>
                                 <a:rPr lang="en-US" i="1" smtClean="0">
-                                  <a:latin typeface="Cambria Math" panose="02040503050406030204" pitchFamily="18" charset="0"/>
+                                  <a:latin typeface="Cambria Math" charset="0"/>
                                   <a:cs typeface="Arial" panose="020B0604020202020204" pitchFamily="34" charset="0"/>
                                 </a:rPr>
                               </m:ctrlPr>
@@ -16640,7 +16644,7 @@
                                   <a:solidFill>
                                     <a:srgbClr val="FF0000"/>
                                   </a:solidFill>
-                                  <a:latin typeface="Cambria Math" panose="02040503050406030204" pitchFamily="18" charset="0"/>
+                                  <a:latin typeface="Cambria Math" charset="0"/>
                                   <a:cs typeface="Arial" panose="020B0604020202020204" pitchFamily="34" charset="0"/>
                                 </a:rPr>
                               </m:ctrlPr>
@@ -16817,7 +16821,7 @@
                           <m:sSubPr>
                             <m:ctrlPr>
                               <a:rPr lang="en-US" sz="2000" b="0" i="1" smtClean="0">
-                                <a:latin typeface="Cambria Math" panose="02040503050406030204" pitchFamily="18" charset="0"/>
+                                <a:latin typeface="Cambria Math" charset="0"/>
                                 <a:cs typeface="Arial" panose="020B0604020202020204" pitchFamily="34" charset="0"/>
                               </a:rPr>
                             </m:ctrlPr>
@@ -16828,7 +16832,7 @@
                                 <m:chr m:val="⃗"/>
                                 <m:ctrlPr>
                                   <a:rPr lang="en-US" sz="2000" b="0" i="1" smtClean="0">
-                                    <a:latin typeface="Cambria Math" panose="02040503050406030204" pitchFamily="18" charset="0"/>
+                                    <a:latin typeface="Cambria Math" charset="0"/>
                                     <a:cs typeface="Arial" panose="020B0604020202020204" pitchFamily="34" charset="0"/>
                                   </a:rPr>
                                 </m:ctrlPr>
@@ -16939,7 +16943,7 @@
                           <m:sSubPr>
                             <m:ctrlPr>
                               <a:rPr lang="en-US" sz="2000" b="0" i="1" smtClean="0">
-                                <a:latin typeface="Cambria Math" panose="02040503050406030204" pitchFamily="18" charset="0"/>
+                                <a:latin typeface="Cambria Math" charset="0"/>
                                 <a:cs typeface="Arial" panose="020B0604020202020204" pitchFamily="34" charset="0"/>
                               </a:rPr>
                             </m:ctrlPr>
@@ -16950,7 +16954,7 @@
                                 <m:chr m:val="⃗"/>
                                 <m:ctrlPr>
                                   <a:rPr lang="en-US" sz="2000" b="0" i="1" smtClean="0">
-                                    <a:latin typeface="Cambria Math" panose="02040503050406030204" pitchFamily="18" charset="0"/>
+                                    <a:latin typeface="Cambria Math" charset="0"/>
                                     <a:cs typeface="Arial" panose="020B0604020202020204" pitchFamily="34" charset="0"/>
                                   </a:rPr>
                                 </m:ctrlPr>
@@ -17427,7 +17431,7 @@
                             <m:sSubPr>
                               <m:ctrlPr>
                                 <a:rPr lang="en-US" i="1" smtClean="0">
-                                  <a:latin typeface="Cambria Math" panose="02040503050406030204" pitchFamily="18" charset="0"/>
+                                  <a:latin typeface="Cambria Math" charset="0"/>
                                   <a:cs typeface="Arial" panose="020B0604020202020204" pitchFamily="34" charset="0"/>
                                 </a:rPr>
                               </m:ctrlPr>
@@ -17532,7 +17536,7 @@
                             <m:sSubPr>
                               <m:ctrlPr>
                                 <a:rPr lang="en-US" i="1" smtClean="0">
-                                  <a:latin typeface="Cambria Math" panose="02040503050406030204" pitchFamily="18" charset="0"/>
+                                  <a:latin typeface="Cambria Math" charset="0"/>
                                   <a:cs typeface="Arial" panose="020B0604020202020204" pitchFamily="34" charset="0"/>
                                 </a:rPr>
                               </m:ctrlPr>
@@ -17637,7 +17641,7 @@
                             <m:sSubPr>
                               <m:ctrlPr>
                                 <a:rPr lang="en-US" i="1" smtClean="0">
-                                  <a:latin typeface="Cambria Math" panose="02040503050406030204" pitchFamily="18" charset="0"/>
+                                  <a:latin typeface="Cambria Math" charset="0"/>
                                   <a:cs typeface="Arial" panose="020B0604020202020204" pitchFamily="34" charset="0"/>
                                 </a:rPr>
                               </m:ctrlPr>
@@ -17742,7 +17746,7 @@
                             <m:sSubPr>
                               <m:ctrlPr>
                                 <a:rPr lang="en-US" i="1" smtClean="0">
-                                  <a:latin typeface="Cambria Math" panose="02040503050406030204" pitchFamily="18" charset="0"/>
+                                  <a:latin typeface="Cambria Math" charset="0"/>
                                   <a:cs typeface="Arial" panose="020B0604020202020204" pitchFamily="34" charset="0"/>
                                 </a:rPr>
                               </m:ctrlPr>
@@ -18163,7 +18167,7 @@
                                   <a:solidFill>
                                     <a:srgbClr val="FF0000"/>
                                   </a:solidFill>
-                                  <a:latin typeface="Cambria Math" panose="02040503050406030204" pitchFamily="18" charset="0"/>
+                                  <a:latin typeface="Cambria Math" charset="0"/>
                                   <a:cs typeface="Arial" panose="020B0604020202020204" pitchFamily="34" charset="0"/>
                                 </a:rPr>
                               </m:ctrlPr>
@@ -18340,7 +18344,7 @@
                           <m:sSubPr>
                             <m:ctrlPr>
                               <a:rPr lang="en-US" sz="2000" b="0" i="1" smtClean="0">
-                                <a:latin typeface="Cambria Math" panose="02040503050406030204" pitchFamily="18" charset="0"/>
+                                <a:latin typeface="Cambria Math" charset="0"/>
                                 <a:cs typeface="Arial" panose="020B0604020202020204" pitchFamily="34" charset="0"/>
                               </a:rPr>
                             </m:ctrlPr>
@@ -18351,7 +18355,7 @@
                                 <m:chr m:val="⃗"/>
                                 <m:ctrlPr>
                                   <a:rPr lang="en-US" sz="2000" b="0" i="1" smtClean="0">
-                                    <a:latin typeface="Cambria Math" panose="02040503050406030204" pitchFamily="18" charset="0"/>
+                                    <a:latin typeface="Cambria Math" charset="0"/>
                                     <a:cs typeface="Arial" panose="020B0604020202020204" pitchFamily="34" charset="0"/>
                                   </a:rPr>
                                 </m:ctrlPr>
@@ -18462,7 +18466,7 @@
                           <m:sSubPr>
                             <m:ctrlPr>
                               <a:rPr lang="en-US" sz="2000" b="0" i="1" smtClean="0">
-                                <a:latin typeface="Cambria Math" panose="02040503050406030204" pitchFamily="18" charset="0"/>
+                                <a:latin typeface="Cambria Math" charset="0"/>
                                 <a:cs typeface="Arial" panose="020B0604020202020204" pitchFamily="34" charset="0"/>
                               </a:rPr>
                             </m:ctrlPr>
@@ -18473,7 +18477,7 @@
                                 <m:chr m:val="⃗"/>
                                 <m:ctrlPr>
                                   <a:rPr lang="en-US" sz="2000" b="0" i="1" smtClean="0">
-                                    <a:latin typeface="Cambria Math" panose="02040503050406030204" pitchFamily="18" charset="0"/>
+                                    <a:latin typeface="Cambria Math" charset="0"/>
                                     <a:cs typeface="Arial" panose="020B0604020202020204" pitchFamily="34" charset="0"/>
                                   </a:rPr>
                                 </m:ctrlPr>
@@ -19326,7 +19330,7 @@
                             <m:sSubPr>
                               <m:ctrlPr>
                                 <a:rPr lang="en-US" b="0" i="1" smtClean="0">
-                                  <a:latin typeface="Cambria Math" panose="02040503050406030204" pitchFamily="18" charset="0"/>
+                                  <a:latin typeface="Cambria Math" charset="0"/>
                                 </a:rPr>
                               </m:ctrlPr>
                             </m:sSubPr>
@@ -19428,7 +19432,7 @@
                             <m:sSubPr>
                               <m:ctrlPr>
                                 <a:rPr lang="en-US" i="1" smtClean="0">
-                                  <a:latin typeface="Cambria Math" panose="02040503050406030204" pitchFamily="18" charset="0"/>
+                                  <a:latin typeface="Cambria Math" charset="0"/>
                                 </a:rPr>
                               </m:ctrlPr>
                             </m:sSubPr>
@@ -19530,7 +19534,7 @@
                             <m:sSubPr>
                               <m:ctrlPr>
                                 <a:rPr lang="en-US" i="1" smtClean="0">
-                                  <a:latin typeface="Cambria Math" panose="02040503050406030204" pitchFamily="18" charset="0"/>
+                                  <a:latin typeface="Cambria Math" charset="0"/>
                                 </a:rPr>
                               </m:ctrlPr>
                             </m:sSubPr>
@@ -20345,7 +20349,7 @@
                               <m:sSubPr>
                                 <m:ctrlPr>
                                   <a:rPr lang="en-US" i="1" smtClean="0">
-                                    <a:latin typeface="Cambria Math" panose="02040503050406030204" pitchFamily="18" charset="0"/>
+                                    <a:latin typeface="Cambria Math" charset="0"/>
                                   </a:rPr>
                                 </m:ctrlPr>
                               </m:sSubPr>
@@ -20531,7 +20535,7 @@
                             <m:sSubPr>
                               <m:ctrlPr>
                                 <a:rPr lang="en-US" b="0" i="1" smtClean="0">
-                                  <a:latin typeface="Cambria Math" panose="02040503050406030204" pitchFamily="18" charset="0"/>
+                                  <a:latin typeface="Cambria Math" charset="0"/>
                                 </a:rPr>
                               </m:ctrlPr>
                             </m:sSubPr>
@@ -20633,7 +20637,7 @@
                             <m:sSubPr>
                               <m:ctrlPr>
                                 <a:rPr lang="en-US" b="0" i="1" smtClean="0">
-                                  <a:latin typeface="Cambria Math" panose="02040503050406030204" pitchFamily="18" charset="0"/>
+                                  <a:latin typeface="Cambria Math" charset="0"/>
                                 </a:rPr>
                               </m:ctrlPr>
                             </m:sSubPr>
@@ -21549,7 +21553,7 @@
                               <m:sSubPr>
                                 <m:ctrlPr>
                                   <a:rPr lang="en-US" b="0" i="1" smtClean="0">
-                                    <a:latin typeface="Cambria Math" panose="02040503050406030204" pitchFamily="18" charset="0"/>
+                                    <a:latin typeface="Cambria Math" charset="0"/>
                                   </a:rPr>
                                 </m:ctrlPr>
                               </m:sSubPr>
@@ -21771,7 +21775,7 @@
                             <m:sSubPr>
                               <m:ctrlPr>
                                 <a:rPr lang="en-US" i="1" smtClean="0">
-                                  <a:latin typeface="Cambria Math" panose="02040503050406030204" pitchFamily="18" charset="0"/>
+                                  <a:latin typeface="Cambria Math" charset="0"/>
                                 </a:rPr>
                               </m:ctrlPr>
                             </m:sSubPr>
@@ -21873,7 +21877,7 @@
                             <m:sSubPr>
                               <m:ctrlPr>
                                 <a:rPr lang="en-US" i="1" smtClean="0">
-                                  <a:latin typeface="Cambria Math" panose="02040503050406030204" pitchFamily="18" charset="0"/>
+                                  <a:latin typeface="Cambria Math" charset="0"/>
                                 </a:rPr>
                               </m:ctrlPr>
                             </m:sSubPr>
@@ -22619,7 +22623,7 @@
                           <m:sSubPr>
                             <m:ctrlPr>
                               <a:rPr lang="en-US" b="0" i="1" smtClean="0">
-                                <a:latin typeface="Cambria Math" panose="02040503050406030204" pitchFamily="18" charset="0"/>
+                                <a:latin typeface="Cambria Math" charset="0"/>
                               </a:rPr>
                             </m:ctrlPr>
                           </m:sSubPr>
@@ -22721,7 +22725,7 @@
                           <m:sSubPr>
                             <m:ctrlPr>
                               <a:rPr lang="en-US" b="0" i="1" smtClean="0">
-                                <a:latin typeface="Cambria Math" panose="02040503050406030204" pitchFamily="18" charset="0"/>
+                                <a:latin typeface="Cambria Math" charset="0"/>
                               </a:rPr>
                             </m:ctrlPr>
                           </m:sSubPr>
@@ -22823,7 +22827,7 @@
                           <m:sSubPr>
                             <m:ctrlPr>
                               <a:rPr lang="en-US" i="1" smtClean="0">
-                                <a:latin typeface="Cambria Math" panose="02040503050406030204" pitchFamily="18" charset="0"/>
+                                <a:latin typeface="Cambria Math" charset="0"/>
                               </a:rPr>
                             </m:ctrlPr>
                           </m:sSubPr>
@@ -22925,7 +22929,7 @@
                           <m:sSubPr>
                             <m:ctrlPr>
                               <a:rPr lang="en-US" i="1" smtClean="0">
-                                <a:latin typeface="Cambria Math" panose="02040503050406030204" pitchFamily="18" charset="0"/>
+                                <a:latin typeface="Cambria Math" charset="0"/>
                               </a:rPr>
                             </m:ctrlPr>
                           </m:sSubPr>
@@ -24049,7 +24053,7 @@
                             <m:chr m:val="⃗"/>
                             <m:ctrlPr>
                               <a:rPr lang="en-US" b="0" i="1" smtClean="0">
-                                <a:latin typeface="Cambria Math" panose="02040503050406030204" pitchFamily="18" charset="0"/>
+                                <a:latin typeface="Cambria Math" charset="0"/>
                               </a:rPr>
                             </m:ctrlPr>
                           </m:accPr>
@@ -24144,7 +24148,7 @@
                             <m:chr m:val="⃗"/>
                             <m:ctrlPr>
                               <a:rPr lang="en-US" b="0" i="1" smtClean="0">
-                                <a:latin typeface="Cambria Math" panose="02040503050406030204" pitchFamily="18" charset="0"/>
+                                <a:latin typeface="Cambria Math" charset="0"/>
                               </a:rPr>
                             </m:ctrlPr>
                           </m:accPr>
@@ -24321,7 +24325,7 @@
                           <m:sSubPr>
                             <m:ctrlPr>
                               <a:rPr lang="en-US" b="0" i="1" smtClean="0">
-                                <a:latin typeface="Cambria Math" panose="02040503050406030204" pitchFamily="18" charset="0"/>
+                                <a:latin typeface="Cambria Math" charset="0"/>
                               </a:rPr>
                             </m:ctrlPr>
                           </m:sSubPr>
@@ -24423,7 +24427,7 @@
                           <m:sSubPr>
                             <m:ctrlPr>
                               <a:rPr lang="en-US" b="0" i="1" smtClean="0">
-                                <a:latin typeface="Cambria Math" panose="02040503050406030204" pitchFamily="18" charset="0"/>
+                                <a:latin typeface="Cambria Math" charset="0"/>
                               </a:rPr>
                             </m:ctrlPr>
                           </m:sSubPr>
@@ -25002,7 +25006,7 @@
                           <m:sSubPr>
                             <m:ctrlPr>
                               <a:rPr lang="en-US" b="0" i="1" smtClean="0">
-                                <a:latin typeface="Cambria Math" panose="02040503050406030204" pitchFamily="18" charset="0"/>
+                                <a:latin typeface="Cambria Math" charset="0"/>
                               </a:rPr>
                             </m:ctrlPr>
                           </m:sSubPr>
@@ -25186,7 +25190,7 @@
                           <m:sSubPr>
                             <m:ctrlPr>
                               <a:rPr lang="en-US" b="0" i="1" smtClean="0">
-                                <a:latin typeface="Cambria Math" panose="02040503050406030204" pitchFamily="18" charset="0"/>
+                                <a:latin typeface="Cambria Math" charset="0"/>
                               </a:rPr>
                             </m:ctrlPr>
                           </m:sSubPr>
@@ -25360,7 +25364,7 @@
                           <m:sSubPr>
                             <m:ctrlPr>
                               <a:rPr lang="en-US" b="0" i="1" smtClean="0">
-                                <a:latin typeface="Cambria Math" panose="02040503050406030204" pitchFamily="18" charset="0"/>
+                                <a:latin typeface="Cambria Math" charset="0"/>
                               </a:rPr>
                             </m:ctrlPr>
                           </m:sSubPr>
@@ -25370,7 +25374,7 @@
                                 <m:chr m:val="⃗"/>
                                 <m:ctrlPr>
                                   <a:rPr lang="en-US" b="0" i="1" smtClean="0">
-                                    <a:latin typeface="Cambria Math" panose="02040503050406030204" pitchFamily="18" charset="0"/>
+                                    <a:latin typeface="Cambria Math" charset="0"/>
                                   </a:rPr>
                                 </m:ctrlPr>
                               </m:accPr>
@@ -25474,7 +25478,7 @@
                           <m:sSubPr>
                             <m:ctrlPr>
                               <a:rPr lang="en-US" b="0" i="1" smtClean="0">
-                                <a:latin typeface="Cambria Math" panose="02040503050406030204" pitchFamily="18" charset="0"/>
+                                <a:latin typeface="Cambria Math" charset="0"/>
                               </a:rPr>
                             </m:ctrlPr>
                           </m:sSubPr>
@@ -25484,7 +25488,7 @@
                                 <m:chr m:val="⃗"/>
                                 <m:ctrlPr>
                                   <a:rPr lang="en-US" b="0" i="1" smtClean="0">
-                                    <a:latin typeface="Cambria Math" panose="02040503050406030204" pitchFamily="18" charset="0"/>
+                                    <a:latin typeface="Cambria Math" charset="0"/>
                                   </a:rPr>
                                 </m:ctrlPr>
                               </m:accPr>
@@ -26721,7 +26725,7 @@
                             <m:sSupPr>
                               <m:ctrlPr>
                                 <a:rPr lang="en-CA" i="1" smtClean="0">
-                                  <a:latin typeface="Cambria Math" panose="02040503050406030204" pitchFamily="18" charset="0"/>
+                                  <a:latin typeface="Cambria Math" charset="0"/>
                                 </a:rPr>
                               </m:ctrlPr>
                             </m:sSupPr>
@@ -26731,7 +26735,7 @@
                                   <m:chr m:val="⃗"/>
                                   <m:ctrlPr>
                                     <a:rPr lang="en-CA" i="1">
-                                      <a:latin typeface="Cambria Math" panose="02040503050406030204" pitchFamily="18" charset="0"/>
+                                      <a:latin typeface="Cambria Math" charset="0"/>
                                     </a:rPr>
                                   </m:ctrlPr>
                                 </m:accPr>
@@ -26847,7 +26851,7 @@
                             <m:sSupPr>
                               <m:ctrlPr>
                                 <a:rPr lang="en-US" b="0" i="1" smtClean="0">
-                                  <a:latin typeface="Cambria Math" panose="02040503050406030204" pitchFamily="18" charset="0"/>
+                                  <a:latin typeface="Cambria Math" charset="0"/>
                                 </a:rPr>
                               </m:ctrlPr>
                             </m:sSupPr>
@@ -26857,7 +26861,7 @@
                                   <m:chr m:val="⃗"/>
                                   <m:ctrlPr>
                                     <a:rPr lang="en-US" b="0" i="1" smtClean="0">
-                                      <a:latin typeface="Cambria Math" panose="02040503050406030204" pitchFamily="18" charset="0"/>
+                                      <a:latin typeface="Cambria Math" charset="0"/>
                                     </a:rPr>
                                   </m:ctrlPr>
                                 </m:accPr>
@@ -26985,7 +26989,7 @@
                             <m:sSupPr>
                               <m:ctrlPr>
                                 <a:rPr lang="en-US" b="0" i="1" smtClean="0">
-                                  <a:latin typeface="Cambria Math" panose="02040503050406030204" pitchFamily="18" charset="0"/>
+                                  <a:latin typeface="Cambria Math" charset="0"/>
                                 </a:rPr>
                               </m:ctrlPr>
                             </m:sSupPr>
@@ -26995,7 +26999,7 @@
                                   <m:chr m:val="⃗"/>
                                   <m:ctrlPr>
                                     <a:rPr lang="en-US" b="0" i="1" smtClean="0">
-                                      <a:latin typeface="Cambria Math" panose="02040503050406030204" pitchFamily="18" charset="0"/>
+                                      <a:latin typeface="Cambria Math" charset="0"/>
                                     </a:rPr>
                                   </m:ctrlPr>
                                 </m:accPr>
@@ -27154,7 +27158,7 @@
                           <m:sSupPr>
                             <m:ctrlPr>
                               <a:rPr lang="en-CA" b="0" i="1" smtClean="0">
-                                <a:latin typeface="Cambria Math" panose="02040503050406030204" pitchFamily="18" charset="0"/>
+                                <a:latin typeface="Cambria Math" charset="0"/>
                               </a:rPr>
                             </m:ctrlPr>
                           </m:sSupPr>
@@ -27164,7 +27168,7 @@
                                 <m:chr m:val="⃗"/>
                                 <m:ctrlPr>
                                   <a:rPr lang="en-CA" b="0" i="1" smtClean="0">
-                                    <a:latin typeface="Cambria Math" panose="02040503050406030204" pitchFamily="18" charset="0"/>
+                                    <a:latin typeface="Cambria Math" charset="0"/>
                                   </a:rPr>
                                 </m:ctrlPr>
                               </m:accPr>
@@ -27760,7 +27764,7 @@
                             <m:chr m:val="⃗"/>
                             <m:ctrlPr>
                               <a:rPr lang="en-US" b="0" i="1" smtClean="0">
-                                <a:latin typeface="Cambria Math" panose="02040503050406030204" pitchFamily="18" charset="0"/>
+                                <a:latin typeface="Cambria Math" charset="0"/>
                                 <a:cs typeface="Arial" panose="020B0604020202020204" pitchFamily="34" charset="0"/>
                               </a:rPr>
                             </m:ctrlPr>
@@ -27857,7 +27861,7 @@
                             <m:chr m:val="⃗"/>
                             <m:ctrlPr>
                               <a:rPr lang="en-US" b="0" i="1" smtClean="0">
-                                <a:latin typeface="Cambria Math" panose="02040503050406030204" pitchFamily="18" charset="0"/>
+                                <a:latin typeface="Cambria Math" charset="0"/>
                                 <a:cs typeface="Arial" panose="020B0604020202020204" pitchFamily="34" charset="0"/>
                               </a:rPr>
                             </m:ctrlPr>
@@ -27954,7 +27958,7 @@
                           <m:sSubPr>
                             <m:ctrlPr>
                               <a:rPr lang="en-US" sz="2000" b="0" i="1" smtClean="0">
-                                <a:latin typeface="Cambria Math" panose="02040503050406030204" pitchFamily="18" charset="0"/>
+                                <a:latin typeface="Cambria Math" charset="0"/>
                                 <a:cs typeface="Arial" panose="020B0604020202020204" pitchFamily="34" charset="0"/>
                               </a:rPr>
                             </m:ctrlPr>
@@ -28063,7 +28067,7 @@
                           <m:sSubPr>
                             <m:ctrlPr>
                               <a:rPr lang="en-US" sz="2000" b="0" i="1" smtClean="0">
-                                <a:latin typeface="Cambria Math" panose="02040503050406030204" pitchFamily="18" charset="0"/>
+                                <a:latin typeface="Cambria Math" charset="0"/>
                                 <a:cs typeface="Arial" panose="020B0604020202020204" pitchFamily="34" charset="0"/>
                               </a:rPr>
                             </m:ctrlPr>
@@ -28840,7 +28844,7 @@
                             <m:chr m:val="⃗"/>
                             <m:ctrlPr>
                               <a:rPr lang="en-US" b="0" i="1" smtClean="0">
-                                <a:latin typeface="Cambria Math" panose="02040503050406030204" pitchFamily="18" charset="0"/>
+                                <a:latin typeface="Cambria Math" charset="0"/>
                                 <a:cs typeface="Arial" panose="020B0604020202020204" pitchFamily="34" charset="0"/>
                               </a:rPr>
                             </m:ctrlPr>
@@ -28937,7 +28941,7 @@
                             <m:chr m:val="⃗"/>
                             <m:ctrlPr>
                               <a:rPr lang="en-US" b="0" i="1" smtClean="0">
-                                <a:latin typeface="Cambria Math" panose="02040503050406030204" pitchFamily="18" charset="0"/>
+                                <a:latin typeface="Cambria Math" charset="0"/>
                                 <a:cs typeface="Arial" panose="020B0604020202020204" pitchFamily="34" charset="0"/>
                               </a:rPr>
                             </m:ctrlPr>
@@ -29106,7 +29110,7 @@
                             <m:chr m:val="⃗"/>
                             <m:ctrlPr>
                               <a:rPr lang="en-US" b="0" i="1" smtClean="0">
-                                <a:latin typeface="Cambria Math" panose="02040503050406030204" pitchFamily="18" charset="0"/>
+                                <a:latin typeface="Cambria Math" charset="0"/>
                                 <a:cs typeface="Arial" panose="020B0604020202020204" pitchFamily="34" charset="0"/>
                               </a:rPr>
                             </m:ctrlPr>
@@ -29202,7 +29206,7 @@
                           <m:sSubPr>
                             <m:ctrlPr>
                               <a:rPr lang="en-US" sz="1400" b="0" i="1" smtClean="0">
-                                <a:latin typeface="Cambria Math" panose="02040503050406030204" pitchFamily="18" charset="0"/>
+                                <a:latin typeface="Cambria Math" charset="0"/>
                                 <a:cs typeface="Arial" panose="020B0604020202020204" pitchFamily="34" charset="0"/>
                               </a:rPr>
                             </m:ctrlPr>
@@ -29307,7 +29311,7 @@
                           <m:sSubPr>
                             <m:ctrlPr>
                               <a:rPr lang="en-US" sz="1400" b="0" i="1" smtClean="0">
-                                <a:latin typeface="Cambria Math" panose="02040503050406030204" pitchFamily="18" charset="0"/>
+                                <a:latin typeface="Cambria Math" charset="0"/>
                                 <a:cs typeface="Arial" panose="020B0604020202020204" pitchFamily="34" charset="0"/>
                               </a:rPr>
                             </m:ctrlPr>
@@ -29484,7 +29488,7 @@
                           <m:sSubPr>
                             <m:ctrlPr>
                               <a:rPr lang="en-US" sz="1400" b="0" i="1" smtClean="0">
-                                <a:latin typeface="Cambria Math" panose="02040503050406030204" pitchFamily="18" charset="0"/>
+                                <a:latin typeface="Cambria Math" charset="0"/>
                                 <a:cs typeface="Arial" panose="020B0604020202020204" pitchFamily="34" charset="0"/>
                               </a:rPr>
                             </m:ctrlPr>
@@ -29589,7 +29593,7 @@
                           <m:sSubPr>
                             <m:ctrlPr>
                               <a:rPr lang="en-US" sz="1400" b="0" i="1" smtClean="0">
-                                <a:latin typeface="Cambria Math" panose="02040503050406030204" pitchFamily="18" charset="0"/>
+                                <a:latin typeface="Cambria Math" charset="0"/>
                                 <a:cs typeface="Arial" panose="020B0604020202020204" pitchFamily="34" charset="0"/>
                               </a:rPr>
                             </m:ctrlPr>
@@ -29694,7 +29698,7 @@
                           <m:sSubPr>
                             <m:ctrlPr>
                               <a:rPr lang="en-US" b="0" i="1" smtClean="0">
-                                <a:latin typeface="Cambria Math" panose="02040503050406030204" pitchFamily="18" charset="0"/>
+                                <a:latin typeface="Cambria Math" charset="0"/>
                                 <a:cs typeface="Arial" panose="020B0604020202020204" pitchFamily="34" charset="0"/>
                               </a:rPr>
                             </m:ctrlPr>
@@ -29729,7 +29733,7 @@
                           <m:sSubPr>
                             <m:ctrlPr>
                               <a:rPr lang="en-US" b="0" i="1" smtClean="0">
-                                <a:latin typeface="Cambria Math" panose="02040503050406030204" pitchFamily="18" charset="0"/>
+                                <a:latin typeface="Cambria Math" charset="0"/>
                                 <a:cs typeface="Arial" panose="020B0604020202020204" pitchFamily="34" charset="0"/>
                               </a:rPr>
                             </m:ctrlPr>
@@ -29764,7 +29768,7 @@
                           <m:sSubPr>
                             <m:ctrlPr>
                               <a:rPr lang="en-US" b="0" i="1" smtClean="0">
-                                <a:latin typeface="Cambria Math" panose="02040503050406030204" pitchFamily="18" charset="0"/>
+                                <a:latin typeface="Cambria Math" charset="0"/>
                                 <a:cs typeface="Arial" panose="020B0604020202020204" pitchFamily="34" charset="0"/>
                               </a:rPr>
                             </m:ctrlPr>
@@ -29869,7 +29873,7 @@
                           <m:sSubPr>
                             <m:ctrlPr>
                               <a:rPr lang="en-US" b="0" i="1" smtClean="0">
-                                <a:latin typeface="Cambria Math" panose="02040503050406030204" pitchFamily="18" charset="0"/>
+                                <a:latin typeface="Cambria Math" charset="0"/>
                                 <a:cs typeface="Arial" panose="020B0604020202020204" pitchFamily="34" charset="0"/>
                               </a:rPr>
                             </m:ctrlPr>
@@ -29904,7 +29908,7 @@
                           <m:sSubPr>
                             <m:ctrlPr>
                               <a:rPr lang="en-US" b="0" i="1" smtClean="0">
-                                <a:latin typeface="Cambria Math" panose="02040503050406030204" pitchFamily="18" charset="0"/>
+                                <a:latin typeface="Cambria Math" charset="0"/>
                                 <a:cs typeface="Arial" panose="020B0604020202020204" pitchFamily="34" charset="0"/>
                               </a:rPr>
                             </m:ctrlPr>
@@ -29939,7 +29943,7 @@
                           <m:sSubPr>
                             <m:ctrlPr>
                               <a:rPr lang="en-US" b="0" i="1" smtClean="0">
-                                <a:latin typeface="Cambria Math" panose="02040503050406030204" pitchFamily="18" charset="0"/>
+                                <a:latin typeface="Cambria Math" charset="0"/>
                                 <a:cs typeface="Arial" panose="020B0604020202020204" pitchFamily="34" charset="0"/>
                               </a:rPr>
                             </m:ctrlPr>
@@ -30438,7 +30442,7 @@
                             <m:chr m:val="⃗"/>
                             <m:ctrlPr>
                               <a:rPr lang="en-US" b="0" i="1" smtClean="0">
-                                <a:latin typeface="Cambria Math" panose="02040503050406030204" pitchFamily="18" charset="0"/>
+                                <a:latin typeface="Cambria Math" charset="0"/>
                                 <a:cs typeface="Arial" panose="020B0604020202020204" pitchFamily="34" charset="0"/>
                               </a:rPr>
                             </m:ctrlPr>
@@ -30719,7 +30723,7 @@
                             <m:chr m:val="̂"/>
                             <m:ctrlPr>
                               <a:rPr lang="en-US" b="0" i="1" smtClean="0">
-                                <a:latin typeface="Cambria Math" panose="02040503050406030204" pitchFamily="18" charset="0"/>
+                                <a:latin typeface="Cambria Math" charset="0"/>
                                 <a:cs typeface="Arial" panose="020B0604020202020204" pitchFamily="34" charset="0"/>
                               </a:rPr>
                             </m:ctrlPr>
@@ -30816,7 +30820,7 @@
                             <m:chr m:val="̂"/>
                             <m:ctrlPr>
                               <a:rPr lang="en-US" b="0" i="1" smtClean="0">
-                                <a:latin typeface="Cambria Math" panose="02040503050406030204" pitchFamily="18" charset="0"/>
+                                <a:latin typeface="Cambria Math" charset="0"/>
                                 <a:cs typeface="Arial" panose="020B0604020202020204" pitchFamily="34" charset="0"/>
                               </a:rPr>
                             </m:ctrlPr>
@@ -30912,7 +30916,7 @@
                           <m:sSubPr>
                             <m:ctrlPr>
                               <a:rPr lang="en-US" b="0" i="1" smtClean="0">
-                                <a:latin typeface="Cambria Math" panose="02040503050406030204" pitchFamily="18" charset="0"/>
+                                <a:latin typeface="Cambria Math" charset="0"/>
                                 <a:cs typeface="Arial" panose="020B0604020202020204" pitchFamily="34" charset="0"/>
                               </a:rPr>
                             </m:ctrlPr>
@@ -30941,7 +30945,7 @@
                             <m:chr m:val="̂"/>
                             <m:ctrlPr>
                               <a:rPr lang="en-US" b="0" i="1" smtClean="0">
-                                <a:latin typeface="Cambria Math" panose="02040503050406030204" pitchFamily="18" charset="0"/>
+                                <a:latin typeface="Cambria Math" charset="0"/>
                                 <a:cs typeface="Arial" panose="020B0604020202020204" pitchFamily="34" charset="0"/>
                               </a:rPr>
                             </m:ctrlPr>
@@ -31037,7 +31041,7 @@
                           <m:sSubPr>
                             <m:ctrlPr>
                               <a:rPr lang="en-US" b="0" i="1" smtClean="0">
-                                <a:latin typeface="Cambria Math" panose="02040503050406030204" pitchFamily="18" charset="0"/>
+                                <a:latin typeface="Cambria Math" charset="0"/>
                                 <a:cs typeface="Arial" panose="020B0604020202020204" pitchFamily="34" charset="0"/>
                               </a:rPr>
                             </m:ctrlPr>
@@ -31066,7 +31070,7 @@
                             <m:chr m:val="̂"/>
                             <m:ctrlPr>
                               <a:rPr lang="en-US" b="0" i="1" smtClean="0">
-                                <a:latin typeface="Cambria Math" panose="02040503050406030204" pitchFamily="18" charset="0"/>
+                                <a:latin typeface="Cambria Math" charset="0"/>
                                 <a:cs typeface="Arial" panose="020B0604020202020204" pitchFamily="34" charset="0"/>
                               </a:rPr>
                             </m:ctrlPr>
@@ -31763,7 +31767,7 @@
                             <m:chr m:val="⃗"/>
                             <m:ctrlPr>
                               <a:rPr lang="en-US" b="0" i="1" smtClean="0">
-                                <a:latin typeface="Cambria Math" panose="02040503050406030204" pitchFamily="18" charset="0"/>
+                                <a:latin typeface="Cambria Math" charset="0"/>
                                 <a:cs typeface="Arial" panose="020B0604020202020204" pitchFamily="34" charset="0"/>
                               </a:rPr>
                             </m:ctrlPr>
@@ -31860,7 +31864,7 @@
                             <m:chr m:val="⃗"/>
                             <m:ctrlPr>
                               <a:rPr lang="en-US" b="0" i="1" smtClean="0">
-                                <a:latin typeface="Cambria Math" panose="02040503050406030204" pitchFamily="18" charset="0"/>
+                                <a:latin typeface="Cambria Math" charset="0"/>
                                 <a:cs typeface="Arial" panose="020B0604020202020204" pitchFamily="34" charset="0"/>
                               </a:rPr>
                             </m:ctrlPr>
@@ -32181,7 +32185,7 @@
                             <m:chr m:val="⃗"/>
                             <m:ctrlPr>
                               <a:rPr lang="en-US" sz="2000" b="0" i="1" smtClean="0">
-                                <a:latin typeface="Cambria Math" panose="02040503050406030204" pitchFamily="18" charset="0"/>
+                                <a:latin typeface="Cambria Math" charset="0"/>
                                 <a:cs typeface="Arial" panose="020B0604020202020204" pitchFamily="34" charset="0"/>
                               </a:rPr>
                             </m:ctrlPr>
@@ -32282,7 +32286,7 @@
                             <m:chr m:val="⃗"/>
                             <m:ctrlPr>
                               <a:rPr lang="en-US" sz="2000" b="0" i="1" smtClean="0">
-                                <a:latin typeface="Cambria Math" panose="02040503050406030204" pitchFamily="18" charset="0"/>
+                                <a:latin typeface="Cambria Math" charset="0"/>
                                 <a:cs typeface="Arial" panose="020B0604020202020204" pitchFamily="34" charset="0"/>
                               </a:rPr>
                             </m:ctrlPr>
@@ -32383,7 +32387,7 @@
                             <m:chr m:val="⃗"/>
                             <m:ctrlPr>
                               <a:rPr lang="en-US" sz="2000" b="0" i="1" smtClean="0">
-                                <a:latin typeface="Cambria Math" panose="02040503050406030204" pitchFamily="18" charset="0"/>
+                                <a:latin typeface="Cambria Math" charset="0"/>
                                 <a:cs typeface="Arial" panose="020B0604020202020204" pitchFamily="34" charset="0"/>
                               </a:rPr>
                             </m:ctrlPr>
@@ -32711,7 +32715,7 @@
                               <m:chr m:val="⃗"/>
                               <m:ctrlPr>
                                 <a:rPr lang="en-US" sz="2000" b="0" i="1" smtClean="0">
-                                  <a:latin typeface="Cambria Math" panose="02040503050406030204" pitchFamily="18" charset="0"/>
+                                  <a:latin typeface="Cambria Math" charset="0"/>
                                   <a:cs typeface="Arial" panose="020B0604020202020204" pitchFamily="34" charset="0"/>
                                 </a:rPr>
                               </m:ctrlPr>
@@ -32812,7 +32816,7 @@
                               <m:chr m:val="⃗"/>
                               <m:ctrlPr>
                                 <a:rPr lang="en-US" sz="2000" b="0" i="1" smtClean="0">
-                                  <a:latin typeface="Cambria Math" panose="02040503050406030204" pitchFamily="18" charset="0"/>
+                                  <a:latin typeface="Cambria Math" charset="0"/>
                                   <a:cs typeface="Arial" panose="020B0604020202020204" pitchFamily="34" charset="0"/>
                                 </a:rPr>
                               </m:ctrlPr>
@@ -33016,760 +33020,6 @@
       </p:grpSp>
       <p:grpSp>
         <p:nvGrpSpPr>
-          <p:cNvPr id="42" name="Group 41"/>
-          <p:cNvGrpSpPr/>
-          <p:nvPr/>
-        </p:nvGrpSpPr>
-        <p:grpSpPr>
-          <a:xfrm>
-            <a:off x="370840" y="2440028"/>
-            <a:ext cx="3372973" cy="2081821"/>
-            <a:chOff x="2189660" y="2683219"/>
-            <a:chExt cx="3372973" cy="2081821"/>
-          </a:xfrm>
-        </p:grpSpPr>
-        <p:sp>
-          <p:nvSpPr>
-            <p:cNvPr id="19" name="Oval 18"/>
-            <p:cNvSpPr/>
-            <p:nvPr/>
-          </p:nvSpPr>
-          <p:spPr>
-            <a:xfrm>
-              <a:off x="2189660" y="3180080"/>
-              <a:ext cx="1596411" cy="1584960"/>
-            </a:xfrm>
-            <a:prstGeom prst="ellipse">
-              <a:avLst/>
-            </a:prstGeom>
-            <a:solidFill>
-              <a:schemeClr val="bg2">
-                <a:lumMod val="90000"/>
-              </a:schemeClr>
-            </a:solidFill>
-            <a:ln w="38100">
-              <a:solidFill>
-                <a:schemeClr val="tx1"/>
-              </a:solidFill>
-            </a:ln>
-          </p:spPr>
-          <p:style>
-            <a:lnRef idx="2">
-              <a:schemeClr val="accent1">
-                <a:shade val="50000"/>
-              </a:schemeClr>
-            </a:lnRef>
-            <a:fillRef idx="1">
-              <a:schemeClr val="accent1"/>
-            </a:fillRef>
-            <a:effectRef idx="0">
-              <a:schemeClr val="accent1"/>
-            </a:effectRef>
-            <a:fontRef idx="minor">
-              <a:schemeClr val="lt1"/>
-            </a:fontRef>
-          </p:style>
-          <p:txBody>
-            <a:bodyPr rot="0" spcFirstLastPara="0" vertOverflow="overflow" horzOverflow="overflow" vert="horz" wrap="square" lIns="91440" tIns="45720" rIns="91440" bIns="45720" numCol="1" spcCol="0" rtlCol="0" fromWordArt="0" anchor="ctr" anchorCtr="0" forceAA="0" compatLnSpc="1">
-              <a:prstTxWarp prst="textNoShape">
-                <a:avLst/>
-              </a:prstTxWarp>
-              <a:noAutofit/>
-            </a:bodyPr>
-            <a:lstStyle/>
-            <a:p>
-              <a:pPr algn="ctr"/>
-              <a:endParaRPr lang="en-US"/>
-            </a:p>
-          </p:txBody>
-        </p:sp>
-        <p:cxnSp>
-          <p:nvCxnSpPr>
-            <p:cNvPr id="20" name="Straight Arrow Connector 19"/>
-            <p:cNvCxnSpPr/>
-            <p:nvPr/>
-          </p:nvCxnSpPr>
-          <p:spPr>
-            <a:xfrm flipV="1">
-              <a:off x="3745431" y="2683219"/>
-              <a:ext cx="259458" cy="1007692"/>
-            </a:xfrm>
-            <a:prstGeom prst="straightConnector1">
-              <a:avLst/>
-            </a:prstGeom>
-            <a:ln w="38100">
-              <a:solidFill>
-                <a:schemeClr val="tx1"/>
-              </a:solidFill>
-              <a:tailEnd type="triangle"/>
-            </a:ln>
-          </p:spPr>
-          <p:style>
-            <a:lnRef idx="1">
-              <a:schemeClr val="accent1"/>
-            </a:lnRef>
-            <a:fillRef idx="0">
-              <a:schemeClr val="accent1"/>
-            </a:fillRef>
-            <a:effectRef idx="0">
-              <a:schemeClr val="accent1"/>
-            </a:effectRef>
-            <a:fontRef idx="minor">
-              <a:schemeClr val="tx1"/>
-            </a:fontRef>
-          </p:style>
-        </p:cxnSp>
-        <mc:AlternateContent xmlns:mc="http://schemas.openxmlformats.org/markup-compatibility/2006" xmlns:a14="http://schemas.microsoft.com/office/drawing/2010/main">
-          <mc:Choice Requires="a14">
-            <p:sp>
-              <p:nvSpPr>
-                <p:cNvPr id="21" name="TextBox 20"/>
-                <p:cNvSpPr txBox="1"/>
-                <p:nvPr/>
-              </p:nvSpPr>
-              <p:spPr>
-                <a:xfrm>
-                  <a:off x="3596838" y="3007500"/>
-                  <a:ext cx="208416" cy="345159"/>
-                </a:xfrm>
-                <a:prstGeom prst="rect">
-                  <a:avLst/>
-                </a:prstGeom>
-                <a:noFill/>
-              </p:spPr>
-              <p:txBody>
-                <a:bodyPr wrap="square" lIns="0" tIns="0" rIns="0" bIns="0" rtlCol="0">
-                  <a:spAutoFit/>
-                </a:bodyPr>
-                <a:lstStyle/>
-                <a:p>
-                  <a:pPr/>
-                  <a14:m>
-                    <m:oMathPara xmlns:m="http://schemas.openxmlformats.org/officeDocument/2006/math">
-                      <m:oMathParaPr>
-                        <m:jc m:val="centerGroup"/>
-                      </m:oMathParaPr>
-                      <m:oMath xmlns:m="http://schemas.openxmlformats.org/officeDocument/2006/math">
-                        <m:acc>
-                          <m:accPr>
-                            <m:chr m:val="⃗"/>
-                            <m:ctrlPr>
-                              <a:rPr lang="en-US" sz="2000" b="0" i="1" smtClean="0">
-                                <a:latin typeface="Cambria Math" panose="02040503050406030204" pitchFamily="18" charset="0"/>
-                                <a:cs typeface="Arial" panose="020B0604020202020204" pitchFamily="34" charset="0"/>
-                              </a:rPr>
-                            </m:ctrlPr>
-                          </m:accPr>
-                          <m:e>
-                            <m:r>
-                              <a:rPr lang="en-US" sz="2000" b="0" i="1" smtClean="0">
-                                <a:latin typeface="Cambria Math" panose="02040503050406030204" pitchFamily="18" charset="0"/>
-                                <a:cs typeface="Arial" panose="020B0604020202020204" pitchFamily="34" charset="0"/>
-                              </a:rPr>
-                              <m:t>𝐹</m:t>
-                            </m:r>
-                          </m:e>
-                        </m:acc>
-                      </m:oMath>
-                    </m:oMathPara>
-                  </a14:m>
-                  <a:endParaRPr lang="en-US" sz="2000" dirty="0">
-                    <a:latin typeface="Arial" panose="020B0604020202020204" pitchFamily="34" charset="0"/>
-                    <a:cs typeface="Arial" panose="020B0604020202020204" pitchFamily="34" charset="0"/>
-                  </a:endParaRPr>
-                </a:p>
-              </p:txBody>
-            </p:sp>
-          </mc:Choice>
-          <mc:Fallback xmlns="">
-            <p:sp>
-              <p:nvSpPr>
-                <p:cNvPr id="21" name="TextBox 20"/>
-                <p:cNvSpPr txBox="1">
-                  <a:spLocks noRot="1" noChangeAspect="1" noMove="1" noResize="1" noEditPoints="1" noAdjustHandles="1" noChangeArrowheads="1" noChangeShapeType="1" noTextEdit="1"/>
-                </p:cNvSpPr>
-                <p:nvPr/>
-              </p:nvSpPr>
-              <p:spPr>
-                <a:xfrm>
-                  <a:off x="3596838" y="3007500"/>
-                  <a:ext cx="208416" cy="345159"/>
-                </a:xfrm>
-                <a:prstGeom prst="rect">
-                  <a:avLst/>
-                </a:prstGeom>
-                <a:blipFill>
-                  <a:blip r:embed="rId5"/>
-                  <a:stretch>
-                    <a:fillRect l="-32353" t="-33333" r="-97059" b="-8772"/>
-                  </a:stretch>
-                </a:blipFill>
-              </p:spPr>
-              <p:txBody>
-                <a:bodyPr/>
-                <a:lstStyle/>
-                <a:p>
-                  <a:r>
-                    <a:rPr lang="en-US">
-                      <a:noFill/>
-                    </a:rPr>
-                    <a:t> </a:t>
-                  </a:r>
-                </a:p>
-              </p:txBody>
-            </p:sp>
-          </mc:Fallback>
-        </mc:AlternateContent>
-        <p:cxnSp>
-          <p:nvCxnSpPr>
-            <p:cNvPr id="24" name="Straight Arrow Connector 23"/>
-            <p:cNvCxnSpPr/>
-            <p:nvPr/>
-          </p:nvCxnSpPr>
-          <p:spPr>
-            <a:xfrm flipV="1">
-              <a:off x="2942791" y="3690912"/>
-              <a:ext cx="802640" cy="310310"/>
-            </a:xfrm>
-            <a:prstGeom prst="straightConnector1">
-              <a:avLst/>
-            </a:prstGeom>
-            <a:ln w="38100">
-              <a:solidFill>
-                <a:schemeClr val="tx1"/>
-              </a:solidFill>
-              <a:tailEnd type="triangle"/>
-            </a:ln>
-          </p:spPr>
-          <p:style>
-            <a:lnRef idx="1">
-              <a:schemeClr val="accent1"/>
-            </a:lnRef>
-            <a:fillRef idx="0">
-              <a:schemeClr val="accent1"/>
-            </a:fillRef>
-            <a:effectRef idx="0">
-              <a:schemeClr val="accent1"/>
-            </a:effectRef>
-            <a:fontRef idx="minor">
-              <a:schemeClr val="tx1"/>
-            </a:fontRef>
-          </p:style>
-        </p:cxnSp>
-        <mc:AlternateContent xmlns:mc="http://schemas.openxmlformats.org/markup-compatibility/2006" xmlns:a14="http://schemas.microsoft.com/office/drawing/2010/main">
-          <mc:Choice Requires="a14">
-            <p:sp>
-              <p:nvSpPr>
-                <p:cNvPr id="27" name="TextBox 26"/>
-                <p:cNvSpPr txBox="1"/>
-                <p:nvPr/>
-              </p:nvSpPr>
-              <p:spPr>
-                <a:xfrm>
-                  <a:off x="3344111" y="3866025"/>
-                  <a:ext cx="198003" cy="307777"/>
-                </a:xfrm>
-                <a:prstGeom prst="rect">
-                  <a:avLst/>
-                </a:prstGeom>
-                <a:noFill/>
-              </p:spPr>
-              <p:txBody>
-                <a:bodyPr wrap="none" lIns="0" tIns="0" rIns="0" bIns="0" rtlCol="0">
-                  <a:spAutoFit/>
-                </a:bodyPr>
-                <a:lstStyle/>
-                <a:p>
-                  <a:pPr/>
-                  <a14:m>
-                    <m:oMathPara xmlns:m="http://schemas.openxmlformats.org/officeDocument/2006/math">
-                      <m:oMathParaPr>
-                        <m:jc m:val="centerGroup"/>
-                      </m:oMathParaPr>
-                      <m:oMath xmlns:m="http://schemas.openxmlformats.org/officeDocument/2006/math">
-                        <m:acc>
-                          <m:accPr>
-                            <m:chr m:val="⃗"/>
-                            <m:ctrlPr>
-                              <a:rPr lang="en-US" sz="2000" b="0" i="1" smtClean="0">
-                                <a:latin typeface="Cambria Math" panose="02040503050406030204" pitchFamily="18" charset="0"/>
-                                <a:cs typeface="Arial" panose="020B0604020202020204" pitchFamily="34" charset="0"/>
-                              </a:rPr>
-                            </m:ctrlPr>
-                          </m:accPr>
-                          <m:e>
-                            <m:r>
-                              <a:rPr lang="en-US" sz="2000" b="0" i="1" smtClean="0">
-                                <a:latin typeface="Cambria Math" panose="02040503050406030204" pitchFamily="18" charset="0"/>
-                                <a:cs typeface="Arial" panose="020B0604020202020204" pitchFamily="34" charset="0"/>
-                              </a:rPr>
-                              <m:t>𝑟</m:t>
-                            </m:r>
-                          </m:e>
-                        </m:acc>
-                      </m:oMath>
-                    </m:oMathPara>
-                  </a14:m>
-                  <a:endParaRPr lang="en-US" sz="2000" dirty="0">
-                    <a:latin typeface="Arial" panose="020B0604020202020204" pitchFamily="34" charset="0"/>
-                    <a:cs typeface="Arial" panose="020B0604020202020204" pitchFamily="34" charset="0"/>
-                  </a:endParaRPr>
-                </a:p>
-              </p:txBody>
-            </p:sp>
-          </mc:Choice>
-          <mc:Fallback xmlns="">
-            <p:sp>
-              <p:nvSpPr>
-                <p:cNvPr id="27" name="TextBox 26"/>
-                <p:cNvSpPr txBox="1">
-                  <a:spLocks noRot="1" noChangeAspect="1" noMove="1" noResize="1" noEditPoints="1" noAdjustHandles="1" noChangeArrowheads="1" noChangeShapeType="1" noTextEdit="1"/>
-                </p:cNvSpPr>
-                <p:nvPr/>
-              </p:nvSpPr>
-              <p:spPr>
-                <a:xfrm>
-                  <a:off x="3344111" y="3866025"/>
-                  <a:ext cx="198003" cy="307777"/>
-                </a:xfrm>
-                <a:prstGeom prst="rect">
-                  <a:avLst/>
-                </a:prstGeom>
-                <a:blipFill>
-                  <a:blip r:embed="rId6"/>
-                  <a:stretch>
-                    <a:fillRect l="-31250" t="-33333" r="-96875" b="-5882"/>
-                  </a:stretch>
-                </a:blipFill>
-              </p:spPr>
-              <p:txBody>
-                <a:bodyPr/>
-                <a:lstStyle/>
-                <a:p>
-                  <a:r>
-                    <a:rPr lang="en-US">
-                      <a:noFill/>
-                    </a:rPr>
-                    <a:t> </a:t>
-                  </a:r>
-                </a:p>
-              </p:txBody>
-            </p:sp>
-          </mc:Fallback>
-        </mc:AlternateContent>
-        <p:cxnSp>
-          <p:nvCxnSpPr>
-            <p:cNvPr id="34" name="Straight Arrow Connector 33"/>
-            <p:cNvCxnSpPr/>
-            <p:nvPr/>
-          </p:nvCxnSpPr>
-          <p:spPr>
-            <a:xfrm flipV="1">
-              <a:off x="4770153" y="2848813"/>
-              <a:ext cx="259458" cy="1007692"/>
-            </a:xfrm>
-            <a:prstGeom prst="straightConnector1">
-              <a:avLst/>
-            </a:prstGeom>
-            <a:ln w="38100">
-              <a:solidFill>
-                <a:schemeClr val="tx1"/>
-              </a:solidFill>
-              <a:tailEnd type="triangle"/>
-            </a:ln>
-          </p:spPr>
-          <p:style>
-            <a:lnRef idx="1">
-              <a:schemeClr val="accent1"/>
-            </a:lnRef>
-            <a:fillRef idx="0">
-              <a:schemeClr val="accent1"/>
-            </a:fillRef>
-            <a:effectRef idx="0">
-              <a:schemeClr val="accent1"/>
-            </a:effectRef>
-            <a:fontRef idx="minor">
-              <a:schemeClr val="tx1"/>
-            </a:fontRef>
-          </p:style>
-        </p:cxnSp>
-        <mc:AlternateContent xmlns:mc="http://schemas.openxmlformats.org/markup-compatibility/2006" xmlns:a14="http://schemas.microsoft.com/office/drawing/2010/main">
-          <mc:Choice Requires="a14">
-            <p:sp>
-              <p:nvSpPr>
-                <p:cNvPr id="35" name="TextBox 34"/>
-                <p:cNvSpPr txBox="1"/>
-                <p:nvPr/>
-              </p:nvSpPr>
-              <p:spPr>
-                <a:xfrm>
-                  <a:off x="4611400" y="3162934"/>
-                  <a:ext cx="208416" cy="345159"/>
-                </a:xfrm>
-                <a:prstGeom prst="rect">
-                  <a:avLst/>
-                </a:prstGeom>
-                <a:noFill/>
-              </p:spPr>
-              <p:txBody>
-                <a:bodyPr wrap="square" lIns="0" tIns="0" rIns="0" bIns="0" rtlCol="0">
-                  <a:spAutoFit/>
-                </a:bodyPr>
-                <a:lstStyle/>
-                <a:p>
-                  <a:pPr/>
-                  <a14:m>
-                    <m:oMathPara xmlns:m="http://schemas.openxmlformats.org/officeDocument/2006/math">
-                      <m:oMathParaPr>
-                        <m:jc m:val="centerGroup"/>
-                      </m:oMathParaPr>
-                      <m:oMath xmlns:m="http://schemas.openxmlformats.org/officeDocument/2006/math">
-                        <m:acc>
-                          <m:accPr>
-                            <m:chr m:val="⃗"/>
-                            <m:ctrlPr>
-                              <a:rPr lang="en-US" sz="2000" b="0" i="1" smtClean="0">
-                                <a:latin typeface="Cambria Math" panose="02040503050406030204" pitchFamily="18" charset="0"/>
-                                <a:cs typeface="Arial" panose="020B0604020202020204" pitchFamily="34" charset="0"/>
-                              </a:rPr>
-                            </m:ctrlPr>
-                          </m:accPr>
-                          <m:e>
-                            <m:r>
-                              <a:rPr lang="en-US" sz="2000" b="0" i="1" smtClean="0">
-                                <a:latin typeface="Cambria Math" panose="02040503050406030204" pitchFamily="18" charset="0"/>
-                                <a:cs typeface="Arial" panose="020B0604020202020204" pitchFamily="34" charset="0"/>
-                              </a:rPr>
-                              <m:t>𝐹</m:t>
-                            </m:r>
-                          </m:e>
-                        </m:acc>
-                      </m:oMath>
-                    </m:oMathPara>
-                  </a14:m>
-                  <a:endParaRPr lang="en-US" sz="2000" dirty="0">
-                    <a:latin typeface="Arial" panose="020B0604020202020204" pitchFamily="34" charset="0"/>
-                    <a:cs typeface="Arial" panose="020B0604020202020204" pitchFamily="34" charset="0"/>
-                  </a:endParaRPr>
-                </a:p>
-              </p:txBody>
-            </p:sp>
-          </mc:Choice>
-          <mc:Fallback xmlns="">
-            <p:sp>
-              <p:nvSpPr>
-                <p:cNvPr id="35" name="TextBox 34"/>
-                <p:cNvSpPr txBox="1">
-                  <a:spLocks noRot="1" noChangeAspect="1" noMove="1" noResize="1" noEditPoints="1" noAdjustHandles="1" noChangeArrowheads="1" noChangeShapeType="1" noTextEdit="1"/>
-                </p:cNvSpPr>
-                <p:nvPr/>
-              </p:nvSpPr>
-              <p:spPr>
-                <a:xfrm>
-                  <a:off x="4611400" y="3162934"/>
-                  <a:ext cx="208416" cy="345159"/>
-                </a:xfrm>
-                <a:prstGeom prst="rect">
-                  <a:avLst/>
-                </a:prstGeom>
-                <a:blipFill>
-                  <a:blip r:embed="rId7"/>
-                  <a:stretch>
-                    <a:fillRect l="-31429" t="-35714" r="-91429" b="-8929"/>
-                  </a:stretch>
-                </a:blipFill>
-              </p:spPr>
-              <p:txBody>
-                <a:bodyPr/>
-                <a:lstStyle/>
-                <a:p>
-                  <a:r>
-                    <a:rPr lang="en-US">
-                      <a:noFill/>
-                    </a:rPr>
-                    <a:t> </a:t>
-                  </a:r>
-                </a:p>
-              </p:txBody>
-            </p:sp>
-          </mc:Fallback>
-        </mc:AlternateContent>
-        <mc:AlternateContent xmlns:mc="http://schemas.openxmlformats.org/markup-compatibility/2006" xmlns:a14="http://schemas.microsoft.com/office/drawing/2010/main">
-          <mc:Choice Requires="a14">
-            <p:sp>
-              <p:nvSpPr>
-                <p:cNvPr id="37" name="TextBox 36"/>
-                <p:cNvSpPr txBox="1"/>
-                <p:nvPr/>
-              </p:nvSpPr>
-              <p:spPr>
-                <a:xfrm>
-                  <a:off x="5201478" y="3722003"/>
-                  <a:ext cx="198003" cy="307777"/>
-                </a:xfrm>
-                <a:prstGeom prst="rect">
-                  <a:avLst/>
-                </a:prstGeom>
-                <a:noFill/>
-              </p:spPr>
-              <p:txBody>
-                <a:bodyPr wrap="none" lIns="0" tIns="0" rIns="0" bIns="0" rtlCol="0">
-                  <a:spAutoFit/>
-                </a:bodyPr>
-                <a:lstStyle/>
-                <a:p>
-                  <a:pPr/>
-                  <a14:m>
-                    <m:oMathPara xmlns:m="http://schemas.openxmlformats.org/officeDocument/2006/math">
-                      <m:oMathParaPr>
-                        <m:jc m:val="centerGroup"/>
-                      </m:oMathParaPr>
-                      <m:oMath xmlns:m="http://schemas.openxmlformats.org/officeDocument/2006/math">
-                        <m:acc>
-                          <m:accPr>
-                            <m:chr m:val="⃗"/>
-                            <m:ctrlPr>
-                              <a:rPr lang="en-US" sz="2000" b="0" i="1" smtClean="0">
-                                <a:latin typeface="Cambria Math" panose="02040503050406030204" pitchFamily="18" charset="0"/>
-                                <a:cs typeface="Arial" panose="020B0604020202020204" pitchFamily="34" charset="0"/>
-                              </a:rPr>
-                            </m:ctrlPr>
-                          </m:accPr>
-                          <m:e>
-                            <m:r>
-                              <a:rPr lang="en-US" sz="2000" b="0" i="1" smtClean="0">
-                                <a:latin typeface="Cambria Math" panose="02040503050406030204" pitchFamily="18" charset="0"/>
-                                <a:cs typeface="Arial" panose="020B0604020202020204" pitchFamily="34" charset="0"/>
-                              </a:rPr>
-                              <m:t>𝑟</m:t>
-                            </m:r>
-                          </m:e>
-                        </m:acc>
-                      </m:oMath>
-                    </m:oMathPara>
-                  </a14:m>
-                  <a:endParaRPr lang="en-US" sz="2000" dirty="0">
-                    <a:latin typeface="Arial" panose="020B0604020202020204" pitchFamily="34" charset="0"/>
-                    <a:cs typeface="Arial" panose="020B0604020202020204" pitchFamily="34" charset="0"/>
-                  </a:endParaRPr>
-                </a:p>
-              </p:txBody>
-            </p:sp>
-          </mc:Choice>
-          <mc:Fallback xmlns="">
-            <p:sp>
-              <p:nvSpPr>
-                <p:cNvPr id="37" name="TextBox 36"/>
-                <p:cNvSpPr txBox="1">
-                  <a:spLocks noRot="1" noChangeAspect="1" noMove="1" noResize="1" noEditPoints="1" noAdjustHandles="1" noChangeArrowheads="1" noChangeShapeType="1" noTextEdit="1"/>
-                </p:cNvSpPr>
-                <p:nvPr/>
-              </p:nvSpPr>
-              <p:spPr>
-                <a:xfrm>
-                  <a:off x="5201478" y="3722003"/>
-                  <a:ext cx="198003" cy="307777"/>
-                </a:xfrm>
-                <a:prstGeom prst="rect">
-                  <a:avLst/>
-                </a:prstGeom>
-                <a:blipFill>
-                  <a:blip r:embed="rId8"/>
-                  <a:stretch>
-                    <a:fillRect l="-27273" t="-36000" r="-93939" b="-6000"/>
-                  </a:stretch>
-                </a:blipFill>
-              </p:spPr>
-              <p:txBody>
-                <a:bodyPr/>
-                <a:lstStyle/>
-                <a:p>
-                  <a:r>
-                    <a:rPr lang="en-US">
-                      <a:noFill/>
-                    </a:rPr>
-                    <a:t> </a:t>
-                  </a:r>
-                </a:p>
-              </p:txBody>
-            </p:sp>
-          </mc:Fallback>
-        </mc:AlternateContent>
-        <p:cxnSp>
-          <p:nvCxnSpPr>
-            <p:cNvPr id="38" name="Straight Arrow Connector 37"/>
-            <p:cNvCxnSpPr/>
-            <p:nvPr/>
-          </p:nvCxnSpPr>
-          <p:spPr>
-            <a:xfrm flipV="1">
-              <a:off x="4759993" y="3541845"/>
-              <a:ext cx="802640" cy="310310"/>
-            </a:xfrm>
-            <a:prstGeom prst="straightConnector1">
-              <a:avLst/>
-            </a:prstGeom>
-            <a:ln w="38100">
-              <a:solidFill>
-                <a:schemeClr val="tx1"/>
-              </a:solidFill>
-              <a:prstDash val="solid"/>
-              <a:tailEnd type="triangle"/>
-            </a:ln>
-          </p:spPr>
-          <p:style>
-            <a:lnRef idx="1">
-              <a:schemeClr val="accent1"/>
-            </a:lnRef>
-            <a:fillRef idx="0">
-              <a:schemeClr val="accent1"/>
-            </a:fillRef>
-            <a:effectRef idx="0">
-              <a:schemeClr val="accent1"/>
-            </a:effectRef>
-            <a:fontRef idx="minor">
-              <a:schemeClr val="tx1"/>
-            </a:fontRef>
-          </p:style>
-        </p:cxnSp>
-        <p:sp>
-          <p:nvSpPr>
-            <p:cNvPr id="40" name="Arc 39"/>
-            <p:cNvSpPr/>
-            <p:nvPr/>
-          </p:nvSpPr>
-          <p:spPr>
-            <a:xfrm rot="21358464">
-              <a:off x="4674794" y="3544951"/>
-              <a:ext cx="363438" cy="430210"/>
-            </a:xfrm>
-            <a:prstGeom prst="arc">
-              <a:avLst>
-                <a:gd name="adj1" fmla="val 16657186"/>
-                <a:gd name="adj2" fmla="val 20972173"/>
-              </a:avLst>
-            </a:prstGeom>
-            <a:ln w="19050">
-              <a:solidFill>
-                <a:schemeClr val="tx1"/>
-              </a:solidFill>
-              <a:prstDash val="sysDot"/>
-            </a:ln>
-          </p:spPr>
-          <p:style>
-            <a:lnRef idx="1">
-              <a:schemeClr val="accent1"/>
-            </a:lnRef>
-            <a:fillRef idx="0">
-              <a:schemeClr val="accent1"/>
-            </a:fillRef>
-            <a:effectRef idx="0">
-              <a:schemeClr val="accent1"/>
-            </a:effectRef>
-            <a:fontRef idx="minor">
-              <a:schemeClr val="tx1"/>
-            </a:fontRef>
-          </p:style>
-          <p:txBody>
-            <a:bodyPr rtlCol="0" anchor="ctr"/>
-            <a:lstStyle/>
-            <a:p>
-              <a:pPr algn="ctr"/>
-              <a:endParaRPr lang="en-US"/>
-            </a:p>
-          </p:txBody>
-        </p:sp>
-        <mc:AlternateContent xmlns:mc="http://schemas.openxmlformats.org/markup-compatibility/2006" xmlns:a14="http://schemas.microsoft.com/office/drawing/2010/main">
-          <mc:Choice Requires="a14">
-            <p:sp>
-              <p:nvSpPr>
-                <p:cNvPr id="41" name="TextBox 40"/>
-                <p:cNvSpPr txBox="1"/>
-                <p:nvPr/>
-              </p:nvSpPr>
-              <p:spPr>
-                <a:xfrm>
-                  <a:off x="4956753" y="3340453"/>
-                  <a:ext cx="222304" cy="307777"/>
-                </a:xfrm>
-                <a:prstGeom prst="rect">
-                  <a:avLst/>
-                </a:prstGeom>
-                <a:noFill/>
-              </p:spPr>
-              <p:txBody>
-                <a:bodyPr wrap="none" lIns="0" tIns="0" rIns="0" bIns="0" rtlCol="0">
-                  <a:spAutoFit/>
-                </a:bodyPr>
-                <a:lstStyle/>
-                <a:p>
-                  <a:pPr/>
-                  <a14:m>
-                    <m:oMathPara xmlns:m="http://schemas.openxmlformats.org/officeDocument/2006/math">
-                      <m:oMathParaPr>
-                        <m:jc m:val="centerGroup"/>
-                      </m:oMathParaPr>
-                      <m:oMath xmlns:m="http://schemas.openxmlformats.org/officeDocument/2006/math">
-                        <m:r>
-                          <a:rPr lang="en-US" sz="2000" b="0" i="1" smtClean="0">
-                            <a:latin typeface="Cambria Math" panose="02040503050406030204" pitchFamily="18" charset="0"/>
-                            <a:cs typeface="Arial" panose="020B0604020202020204" pitchFamily="34" charset="0"/>
-                          </a:rPr>
-                          <m:t>𝜃</m:t>
-                        </m:r>
-                      </m:oMath>
-                    </m:oMathPara>
-                  </a14:m>
-                  <a:endParaRPr lang="en-US" sz="2000" dirty="0">
-                    <a:latin typeface="Arial" panose="020B0604020202020204" pitchFamily="34" charset="0"/>
-                    <a:cs typeface="Arial" panose="020B0604020202020204" pitchFamily="34" charset="0"/>
-                  </a:endParaRPr>
-                </a:p>
-              </p:txBody>
-            </p:sp>
-          </mc:Choice>
-          <mc:Fallback xmlns="">
-            <p:sp>
-              <p:nvSpPr>
-                <p:cNvPr id="41" name="TextBox 40"/>
-                <p:cNvSpPr txBox="1">
-                  <a:spLocks noRot="1" noChangeAspect="1" noMove="1" noResize="1" noEditPoints="1" noAdjustHandles="1" noChangeArrowheads="1" noChangeShapeType="1" noTextEdit="1"/>
-                </p:cNvSpPr>
-                <p:nvPr/>
-              </p:nvSpPr>
-              <p:spPr>
-                <a:xfrm>
-                  <a:off x="4956753" y="3340453"/>
-                  <a:ext cx="222304" cy="307777"/>
-                </a:xfrm>
-                <a:prstGeom prst="rect">
-                  <a:avLst/>
-                </a:prstGeom>
-                <a:blipFill>
-                  <a:blip r:embed="rId9"/>
-                  <a:stretch>
-                    <a:fillRect l="-24324" r="-21622" b="-12000"/>
-                  </a:stretch>
-                </a:blipFill>
-              </p:spPr>
-              <p:txBody>
-                <a:bodyPr/>
-                <a:lstStyle/>
-                <a:p>
-                  <a:r>
-                    <a:rPr lang="en-US">
-                      <a:noFill/>
-                    </a:rPr>
-                    <a:t> </a:t>
-                  </a:r>
-                </a:p>
-              </p:txBody>
-            </p:sp>
-          </mc:Fallback>
-        </mc:AlternateContent>
-      </p:grpSp>
-      <p:grpSp>
-        <p:nvGrpSpPr>
           <p:cNvPr id="15" name="Group 14"/>
           <p:cNvGrpSpPr/>
           <p:nvPr/>
@@ -33903,7 +33153,7 @@
                           <m:sSubPr>
                             <m:ctrlPr>
                               <a:rPr lang="en-US" sz="2000" b="0" i="1" smtClean="0">
-                                <a:latin typeface="Cambria Math" panose="02040503050406030204" pitchFamily="18" charset="0"/>
+                                <a:latin typeface="Cambria Math" charset="0"/>
                                 <a:cs typeface="Arial" panose="020B0604020202020204" pitchFamily="34" charset="0"/>
                               </a:rPr>
                             </m:ctrlPr>
@@ -33914,7 +33164,7 @@
                                 <m:chr m:val="⃗"/>
                                 <m:ctrlPr>
                                   <a:rPr lang="en-US" sz="2000" b="0" i="1" smtClean="0">
-                                    <a:latin typeface="Cambria Math" panose="02040503050406030204" pitchFamily="18" charset="0"/>
+                                    <a:latin typeface="Cambria Math" charset="0"/>
                                     <a:cs typeface="Arial" panose="020B0604020202020204" pitchFamily="34" charset="0"/>
                                   </a:rPr>
                                 </m:ctrlPr>
@@ -34141,7 +33391,7 @@
                               <m:chr m:val="⃗"/>
                               <m:ctrlPr>
                                 <a:rPr lang="en-US" sz="2000" b="0" i="1" smtClean="0">
-                                  <a:latin typeface="Cambria Math" panose="02040503050406030204" pitchFamily="18" charset="0"/>
+                                  <a:latin typeface="Cambria Math" charset="0"/>
                                   <a:cs typeface="Arial" panose="020B0604020202020204" pitchFamily="34" charset="0"/>
                                 </a:rPr>
                               </m:ctrlPr>
@@ -34393,7 +33643,7 @@
                               <m:chr m:val="⃗"/>
                               <m:ctrlPr>
                                 <a:rPr lang="en-US" sz="2000" b="0" i="1" smtClean="0">
-                                  <a:latin typeface="Cambria Math" panose="02040503050406030204" pitchFamily="18" charset="0"/>
+                                  <a:latin typeface="Cambria Math" charset="0"/>
                                   <a:cs typeface="Arial" panose="020B0604020202020204" pitchFamily="34" charset="0"/>
                                 </a:rPr>
                               </m:ctrlPr>
@@ -34543,7 +33793,7 @@
           <p:cNvPr id="44" name="Group 43">
             <a:extLst>
               <a:ext uri="{FF2B5EF4-FFF2-40B4-BE49-F238E27FC236}">
-                <a16:creationId xmlns:a16="http://schemas.microsoft.com/office/drawing/2014/main" id="{8EAE65FF-F414-D844-9101-81534457BB78}"/>
+                <a16:creationId xmlns:a16="http://schemas.microsoft.com/office/drawing/2014/main" xmlns="" id="{8EAE65FF-F414-D844-9101-81534457BB78}"/>
               </a:ext>
             </a:extLst>
           </p:cNvPr>
@@ -34563,7 +33813,7 @@
             <p:cNvPr id="2" name="Rectangle 1">
               <a:extLst>
                 <a:ext uri="{FF2B5EF4-FFF2-40B4-BE49-F238E27FC236}">
-                  <a16:creationId xmlns:a16="http://schemas.microsoft.com/office/drawing/2014/main" id="{A317D95F-AD9F-354A-84CF-AB37E58FD834}"/>
+                  <a16:creationId xmlns:a16="http://schemas.microsoft.com/office/drawing/2014/main" xmlns="" id="{A317D95F-AD9F-354A-84CF-AB37E58FD834}"/>
                 </a:ext>
               </a:extLst>
             </p:cNvPr>
@@ -34615,7 +33865,7 @@
             <p:cNvPr id="3" name="Rectangle 2">
               <a:extLst>
                 <a:ext uri="{FF2B5EF4-FFF2-40B4-BE49-F238E27FC236}">
-                  <a16:creationId xmlns:a16="http://schemas.microsoft.com/office/drawing/2014/main" id="{6F8E2D6F-F584-5A44-A64A-632FB5C60417}"/>
+                  <a16:creationId xmlns:a16="http://schemas.microsoft.com/office/drawing/2014/main" xmlns="" id="{6F8E2D6F-F584-5A44-A64A-632FB5C60417}"/>
                 </a:ext>
               </a:extLst>
             </p:cNvPr>
@@ -34667,7 +33917,7 @@
             <p:cNvPr id="4" name="Rectangle 3">
               <a:extLst>
                 <a:ext uri="{FF2B5EF4-FFF2-40B4-BE49-F238E27FC236}">
-                  <a16:creationId xmlns:a16="http://schemas.microsoft.com/office/drawing/2014/main" id="{7B4E2826-C9FC-D141-9FBD-2505BE8992D6}"/>
+                  <a16:creationId xmlns:a16="http://schemas.microsoft.com/office/drawing/2014/main" xmlns="" id="{7B4E2826-C9FC-D141-9FBD-2505BE8992D6}"/>
                 </a:ext>
               </a:extLst>
             </p:cNvPr>
@@ -34719,7 +33969,7 @@
             <p:cNvPr id="5" name="Rectangle 4">
               <a:extLst>
                 <a:ext uri="{FF2B5EF4-FFF2-40B4-BE49-F238E27FC236}">
-                  <a16:creationId xmlns:a16="http://schemas.microsoft.com/office/drawing/2014/main" id="{6BAED393-2D0A-EA4D-AD3E-99F44392EF3E}"/>
+                  <a16:creationId xmlns:a16="http://schemas.microsoft.com/office/drawing/2014/main" xmlns="" id="{6BAED393-2D0A-EA4D-AD3E-99F44392EF3E}"/>
                 </a:ext>
               </a:extLst>
             </p:cNvPr>
@@ -34771,7 +34021,7 @@
             <p:cNvPr id="6" name="Straight Connector 5">
               <a:extLst>
                 <a:ext uri="{FF2B5EF4-FFF2-40B4-BE49-F238E27FC236}">
-                  <a16:creationId xmlns:a16="http://schemas.microsoft.com/office/drawing/2014/main" id="{D883AFDE-A82E-6844-B11A-5FAE70FF6D70}"/>
+                  <a16:creationId xmlns:a16="http://schemas.microsoft.com/office/drawing/2014/main" xmlns="" id="{D883AFDE-A82E-6844-B11A-5FAE70FF6D70}"/>
                 </a:ext>
               </a:extLst>
             </p:cNvPr>
@@ -34814,7 +34064,7 @@
             <p:cNvPr id="8" name="Straight Connector 7">
               <a:extLst>
                 <a:ext uri="{FF2B5EF4-FFF2-40B4-BE49-F238E27FC236}">
-                  <a16:creationId xmlns:a16="http://schemas.microsoft.com/office/drawing/2014/main" id="{E4E7C3DF-5D90-1C4E-9A12-BE9F492B95B8}"/>
+                  <a16:creationId xmlns:a16="http://schemas.microsoft.com/office/drawing/2014/main" xmlns="" id="{E4E7C3DF-5D90-1C4E-9A12-BE9F492B95B8}"/>
                 </a:ext>
               </a:extLst>
             </p:cNvPr>
@@ -34857,7 +34107,7 @@
             <p:cNvPr id="9" name="Straight Connector 8">
               <a:extLst>
                 <a:ext uri="{FF2B5EF4-FFF2-40B4-BE49-F238E27FC236}">
-                  <a16:creationId xmlns:a16="http://schemas.microsoft.com/office/drawing/2014/main" id="{6712C078-390D-0F40-8DF8-5830C7DB4A6F}"/>
+                  <a16:creationId xmlns:a16="http://schemas.microsoft.com/office/drawing/2014/main" xmlns="" id="{6712C078-390D-0F40-8DF8-5830C7DB4A6F}"/>
                 </a:ext>
               </a:extLst>
             </p:cNvPr>
@@ -34900,7 +34150,7 @@
             <p:cNvPr id="10" name="Straight Connector 9">
               <a:extLst>
                 <a:ext uri="{FF2B5EF4-FFF2-40B4-BE49-F238E27FC236}">
-                  <a16:creationId xmlns:a16="http://schemas.microsoft.com/office/drawing/2014/main" id="{DC525EBA-7839-0D42-99E0-B7A8CF118A93}"/>
+                  <a16:creationId xmlns:a16="http://schemas.microsoft.com/office/drawing/2014/main" xmlns="" id="{DC525EBA-7839-0D42-99E0-B7A8CF118A93}"/>
                 </a:ext>
               </a:extLst>
             </p:cNvPr>
@@ -34943,7 +34193,7 @@
             <p:cNvPr id="14" name="Straight Connector 13">
               <a:extLst>
                 <a:ext uri="{FF2B5EF4-FFF2-40B4-BE49-F238E27FC236}">
-                  <a16:creationId xmlns:a16="http://schemas.microsoft.com/office/drawing/2014/main" id="{A9451062-38DF-E440-B5A3-F6BD3995FA4D}"/>
+                  <a16:creationId xmlns:a16="http://schemas.microsoft.com/office/drawing/2014/main" xmlns="" id="{A9451062-38DF-E440-B5A3-F6BD3995FA4D}"/>
                 </a:ext>
               </a:extLst>
             </p:cNvPr>
@@ -34986,7 +34236,7 @@
             <p:cNvPr id="19" name="Straight Arrow Connector 18">
               <a:extLst>
                 <a:ext uri="{FF2B5EF4-FFF2-40B4-BE49-F238E27FC236}">
-                  <a16:creationId xmlns:a16="http://schemas.microsoft.com/office/drawing/2014/main" id="{4DA83C37-902C-144F-A897-EB614AF34AB2}"/>
+                  <a16:creationId xmlns:a16="http://schemas.microsoft.com/office/drawing/2014/main" xmlns="" id="{4DA83C37-902C-144F-A897-EB614AF34AB2}"/>
                 </a:ext>
               </a:extLst>
             </p:cNvPr>
@@ -35031,7 +34281,7 @@
             <p:cNvPr id="24" name="Straight Arrow Connector 23">
               <a:extLst>
                 <a:ext uri="{FF2B5EF4-FFF2-40B4-BE49-F238E27FC236}">
-                  <a16:creationId xmlns:a16="http://schemas.microsoft.com/office/drawing/2014/main" id="{2BFA5B68-70A8-4841-84A3-F1604E7BB737}"/>
+                  <a16:creationId xmlns:a16="http://schemas.microsoft.com/office/drawing/2014/main" xmlns="" id="{2BFA5B68-70A8-4841-84A3-F1604E7BB737}"/>
                 </a:ext>
               </a:extLst>
             </p:cNvPr>
@@ -35078,7 +34328,7 @@
                 <p:cNvPr id="26" name="Rectangle 25">
                   <a:extLst>
                     <a:ext uri="{FF2B5EF4-FFF2-40B4-BE49-F238E27FC236}">
-                      <a16:creationId xmlns:a16="http://schemas.microsoft.com/office/drawing/2014/main" id="{805B46A8-56BC-784D-A2C4-65AB8ECFAF52}"/>
+                      <a16:creationId xmlns:a16="http://schemas.microsoft.com/office/drawing/2014/main" xmlns="" id="{805B46A8-56BC-784D-A2C4-65AB8ECFAF52}"/>
                     </a:ext>
                   </a:extLst>
                 </p:cNvPr>
@@ -35179,7 +34429,7 @@
                 <p:cNvPr id="28" name="Rectangle 27">
                   <a:extLst>
                     <a:ext uri="{FF2B5EF4-FFF2-40B4-BE49-F238E27FC236}">
-                      <a16:creationId xmlns:a16="http://schemas.microsoft.com/office/drawing/2014/main" id="{5D366EF5-E10F-9C48-8364-5662D196B25C}"/>
+                      <a16:creationId xmlns:a16="http://schemas.microsoft.com/office/drawing/2014/main" xmlns="" id="{5D366EF5-E10F-9C48-8364-5662D196B25C}"/>
                     </a:ext>
                   </a:extLst>
                 </p:cNvPr>
@@ -35278,7 +34528,7 @@
             <p:cNvPr id="29" name="Straight Arrow Connector 28">
               <a:extLst>
                 <a:ext uri="{FF2B5EF4-FFF2-40B4-BE49-F238E27FC236}">
-                  <a16:creationId xmlns:a16="http://schemas.microsoft.com/office/drawing/2014/main" id="{208EA2CA-EAE1-A341-8A0F-59DA08DD26F6}"/>
+                  <a16:creationId xmlns:a16="http://schemas.microsoft.com/office/drawing/2014/main" xmlns="" id="{208EA2CA-EAE1-A341-8A0F-59DA08DD26F6}"/>
                 </a:ext>
               </a:extLst>
             </p:cNvPr>
@@ -35325,7 +34575,7 @@
                 <p:cNvPr id="31" name="Rectangle 30">
                   <a:extLst>
                     <a:ext uri="{FF2B5EF4-FFF2-40B4-BE49-F238E27FC236}">
-                      <a16:creationId xmlns:a16="http://schemas.microsoft.com/office/drawing/2014/main" id="{4C3269AC-A6D4-C443-BD63-90532BD67AB2}"/>
+                      <a16:creationId xmlns:a16="http://schemas.microsoft.com/office/drawing/2014/main" xmlns="" id="{4C3269AC-A6D4-C443-BD63-90532BD67AB2}"/>
                     </a:ext>
                   </a:extLst>
                 </p:cNvPr>
@@ -35424,7 +34674,7 @@
             <p:cNvPr id="32" name="Straight Arrow Connector 31">
               <a:extLst>
                 <a:ext uri="{FF2B5EF4-FFF2-40B4-BE49-F238E27FC236}">
-                  <a16:creationId xmlns:a16="http://schemas.microsoft.com/office/drawing/2014/main" id="{665B5D76-21CD-A944-A0FF-8F9569A985C2}"/>
+                  <a16:creationId xmlns:a16="http://schemas.microsoft.com/office/drawing/2014/main" xmlns="" id="{665B5D76-21CD-A944-A0FF-8F9569A985C2}"/>
                 </a:ext>
               </a:extLst>
             </p:cNvPr>
@@ -35471,7 +34721,7 @@
                 <p:cNvPr id="36" name="Rectangle 35">
                   <a:extLst>
                     <a:ext uri="{FF2B5EF4-FFF2-40B4-BE49-F238E27FC236}">
-                      <a16:creationId xmlns:a16="http://schemas.microsoft.com/office/drawing/2014/main" id="{26C80C5A-5AE1-AD4C-9B5B-6737DAF96CAC}"/>
+                      <a16:creationId xmlns:a16="http://schemas.microsoft.com/office/drawing/2014/main" xmlns="" id="{26C80C5A-5AE1-AD4C-9B5B-6737DAF96CAC}"/>
                     </a:ext>
                   </a:extLst>
                 </p:cNvPr>
@@ -35570,7 +34820,7 @@
             <p:cNvPr id="42" name="Oval 41">
               <a:extLst>
                 <a:ext uri="{FF2B5EF4-FFF2-40B4-BE49-F238E27FC236}">
-                  <a16:creationId xmlns:a16="http://schemas.microsoft.com/office/drawing/2014/main" id="{337E6CEC-93A0-264A-8B60-85302E2FC825}"/>
+                  <a16:creationId xmlns:a16="http://schemas.microsoft.com/office/drawing/2014/main" xmlns="" id="{337E6CEC-93A0-264A-8B60-85302E2FC825}"/>
                 </a:ext>
               </a:extLst>
             </p:cNvPr>
@@ -35622,7 +34872,7 @@
             <p:cNvPr id="43" name="Oval 42">
               <a:extLst>
                 <a:ext uri="{FF2B5EF4-FFF2-40B4-BE49-F238E27FC236}">
-                  <a16:creationId xmlns:a16="http://schemas.microsoft.com/office/drawing/2014/main" id="{35583F40-ECA8-2F41-8B4E-B945EFD5BA88}"/>
+                  <a16:creationId xmlns:a16="http://schemas.microsoft.com/office/drawing/2014/main" xmlns="" id="{35583F40-ECA8-2F41-8B4E-B945EFD5BA88}"/>
                 </a:ext>
               </a:extLst>
             </p:cNvPr>
@@ -35675,7 +34925,7 @@
           <p:cNvPr id="22" name="Group 21">
             <a:extLst>
               <a:ext uri="{FF2B5EF4-FFF2-40B4-BE49-F238E27FC236}">
-                <a16:creationId xmlns:a16="http://schemas.microsoft.com/office/drawing/2014/main" id="{E537E7BD-5E28-BC4A-908D-0EDC99521A36}"/>
+                <a16:creationId xmlns:a16="http://schemas.microsoft.com/office/drawing/2014/main" xmlns="" id="{E537E7BD-5E28-BC4A-908D-0EDC99521A36}"/>
               </a:ext>
             </a:extLst>
           </p:cNvPr>
@@ -35695,7 +34945,7 @@
             <p:cNvPr id="23" name="Arc 22">
               <a:extLst>
                 <a:ext uri="{FF2B5EF4-FFF2-40B4-BE49-F238E27FC236}">
-                  <a16:creationId xmlns:a16="http://schemas.microsoft.com/office/drawing/2014/main" id="{9D6638AC-4F22-7442-A32F-041C5E142C33}"/>
+                  <a16:creationId xmlns:a16="http://schemas.microsoft.com/office/drawing/2014/main" xmlns="" id="{9D6638AC-4F22-7442-A32F-041C5E142C33}"/>
                 </a:ext>
               </a:extLst>
             </p:cNvPr>
@@ -35747,7 +34997,7 @@
             <p:cNvPr id="25" name="Arc 24">
               <a:extLst>
                 <a:ext uri="{FF2B5EF4-FFF2-40B4-BE49-F238E27FC236}">
-                  <a16:creationId xmlns:a16="http://schemas.microsoft.com/office/drawing/2014/main" id="{5039A102-91C7-7147-9486-29110B6F2E58}"/>
+                  <a16:creationId xmlns:a16="http://schemas.microsoft.com/office/drawing/2014/main" xmlns="" id="{5039A102-91C7-7147-9486-29110B6F2E58}"/>
                 </a:ext>
               </a:extLst>
             </p:cNvPr>
@@ -35799,7 +35049,7 @@
             <p:cNvPr id="27" name="Arc 26">
               <a:extLst>
                 <a:ext uri="{FF2B5EF4-FFF2-40B4-BE49-F238E27FC236}">
-                  <a16:creationId xmlns:a16="http://schemas.microsoft.com/office/drawing/2014/main" id="{D1336244-C21B-5A43-A5A7-4A9A1FDB523F}"/>
+                  <a16:creationId xmlns:a16="http://schemas.microsoft.com/office/drawing/2014/main" xmlns="" id="{D1336244-C21B-5A43-A5A7-4A9A1FDB523F}"/>
                 </a:ext>
               </a:extLst>
             </p:cNvPr>
@@ -35851,7 +35101,7 @@
             <p:cNvPr id="30" name="Arc 29">
               <a:extLst>
                 <a:ext uri="{FF2B5EF4-FFF2-40B4-BE49-F238E27FC236}">
-                  <a16:creationId xmlns:a16="http://schemas.microsoft.com/office/drawing/2014/main" id="{F13E2C32-15BE-5749-9266-AA1C103F3E7E}"/>
+                  <a16:creationId xmlns:a16="http://schemas.microsoft.com/office/drawing/2014/main" xmlns="" id="{F13E2C32-15BE-5749-9266-AA1C103F3E7E}"/>
                 </a:ext>
               </a:extLst>
             </p:cNvPr>
@@ -35903,7 +35153,7 @@
             <p:cNvPr id="33" name="Arc 32">
               <a:extLst>
                 <a:ext uri="{FF2B5EF4-FFF2-40B4-BE49-F238E27FC236}">
-                  <a16:creationId xmlns:a16="http://schemas.microsoft.com/office/drawing/2014/main" id="{1FC41066-C700-A746-BF8F-713D7B297EF5}"/>
+                  <a16:creationId xmlns:a16="http://schemas.microsoft.com/office/drawing/2014/main" xmlns="" id="{1FC41066-C700-A746-BF8F-713D7B297EF5}"/>
                 </a:ext>
               </a:extLst>
             </p:cNvPr>
@@ -35955,7 +35205,7 @@
             <p:cNvPr id="34" name="Arc 33">
               <a:extLst>
                 <a:ext uri="{FF2B5EF4-FFF2-40B4-BE49-F238E27FC236}">
-                  <a16:creationId xmlns:a16="http://schemas.microsoft.com/office/drawing/2014/main" id="{95561B35-8D66-7840-A762-5E6A9E75362D}"/>
+                  <a16:creationId xmlns:a16="http://schemas.microsoft.com/office/drawing/2014/main" xmlns="" id="{95561B35-8D66-7840-A762-5E6A9E75362D}"/>
                 </a:ext>
               </a:extLst>
             </p:cNvPr>
@@ -36007,7 +35257,7 @@
             <p:cNvPr id="35" name="Arc 34">
               <a:extLst>
                 <a:ext uri="{FF2B5EF4-FFF2-40B4-BE49-F238E27FC236}">
-                  <a16:creationId xmlns:a16="http://schemas.microsoft.com/office/drawing/2014/main" id="{2C4486FE-C8E1-714F-BD67-7814586302CF}"/>
+                  <a16:creationId xmlns:a16="http://schemas.microsoft.com/office/drawing/2014/main" xmlns="" id="{2C4486FE-C8E1-714F-BD67-7814586302CF}"/>
                 </a:ext>
               </a:extLst>
             </p:cNvPr>
@@ -36098,7 +35348,7 @@
           <p:cNvPr id="27" name="Group 26">
             <a:extLst>
               <a:ext uri="{FF2B5EF4-FFF2-40B4-BE49-F238E27FC236}">
-                <a16:creationId xmlns:a16="http://schemas.microsoft.com/office/drawing/2014/main" id="{0F26F720-1E02-6442-B14F-3A3CFD933026}"/>
+                <a16:creationId xmlns:a16="http://schemas.microsoft.com/office/drawing/2014/main" xmlns="" id="{0F26F720-1E02-6442-B14F-3A3CFD933026}"/>
               </a:ext>
             </a:extLst>
           </p:cNvPr>
@@ -36118,7 +35368,7 @@
             <p:cNvPr id="24" name="Group 23">
               <a:extLst>
                 <a:ext uri="{FF2B5EF4-FFF2-40B4-BE49-F238E27FC236}">
-                  <a16:creationId xmlns:a16="http://schemas.microsoft.com/office/drawing/2014/main" id="{5544B094-50C8-AD4F-87FF-3C6CF4F57D41}"/>
+                  <a16:creationId xmlns:a16="http://schemas.microsoft.com/office/drawing/2014/main" xmlns="" id="{5544B094-50C8-AD4F-87FF-3C6CF4F57D41}"/>
                 </a:ext>
               </a:extLst>
             </p:cNvPr>
@@ -36138,7 +35388,7 @@
               <p:cNvPr id="21" name="Right Triangle 20">
                 <a:extLst>
                   <a:ext uri="{FF2B5EF4-FFF2-40B4-BE49-F238E27FC236}">
-                    <a16:creationId xmlns:a16="http://schemas.microsoft.com/office/drawing/2014/main" id="{B481015D-8291-6643-9D17-3AD92A2498E3}"/>
+                    <a16:creationId xmlns:a16="http://schemas.microsoft.com/office/drawing/2014/main" xmlns="" id="{B481015D-8291-6643-9D17-3AD92A2498E3}"/>
                   </a:ext>
                 </a:extLst>
               </p:cNvPr>
@@ -36195,7 +35445,7 @@
               <p:cNvPr id="20" name="Picture 19">
                 <a:extLst>
                   <a:ext uri="{FF2B5EF4-FFF2-40B4-BE49-F238E27FC236}">
-                    <a16:creationId xmlns:a16="http://schemas.microsoft.com/office/drawing/2014/main" id="{A6AE02DE-A37A-0746-8693-9E0457170A93}"/>
+                    <a16:creationId xmlns:a16="http://schemas.microsoft.com/office/drawing/2014/main" xmlns="" id="{A6AE02DE-A37A-0746-8693-9E0457170A93}"/>
                   </a:ext>
                 </a:extLst>
               </p:cNvPr>
@@ -36231,7 +35481,7 @@
               <p:cNvPr id="23" name="Picture 22">
                 <a:extLst>
                   <a:ext uri="{FF2B5EF4-FFF2-40B4-BE49-F238E27FC236}">
-                    <a16:creationId xmlns:a16="http://schemas.microsoft.com/office/drawing/2014/main" id="{27AE44A3-90A0-DA4E-949E-56A09226041F}"/>
+                    <a16:creationId xmlns:a16="http://schemas.microsoft.com/office/drawing/2014/main" xmlns="" id="{27AE44A3-90A0-DA4E-949E-56A09226041F}"/>
                   </a:ext>
                 </a:extLst>
               </p:cNvPr>
@@ -36268,7 +35518,7 @@
             <p:cNvPr id="25" name="Arc 24">
               <a:extLst>
                 <a:ext uri="{FF2B5EF4-FFF2-40B4-BE49-F238E27FC236}">
-                  <a16:creationId xmlns:a16="http://schemas.microsoft.com/office/drawing/2014/main" id="{7B4B00BF-D205-D341-9D3F-735E27C165E9}"/>
+                  <a16:creationId xmlns:a16="http://schemas.microsoft.com/office/drawing/2014/main" xmlns="" id="{7B4B00BF-D205-D341-9D3F-735E27C165E9}"/>
                 </a:ext>
               </a:extLst>
             </p:cNvPr>
@@ -36316,14 +35566,14 @@
             </a:p>
           </p:txBody>
         </p:sp>
-        <mc:AlternateContent xmlns:mc="http://schemas.openxmlformats.org/markup-compatibility/2006">
-          <mc:Choice xmlns:a14="http://schemas.microsoft.com/office/drawing/2010/main" Requires="a14">
+        <mc:AlternateContent xmlns:mc="http://schemas.openxmlformats.org/markup-compatibility/2006" xmlns:a14="http://schemas.microsoft.com/office/drawing/2010/main">
+          <mc:Choice Requires="a14">
             <p:sp>
               <p:nvSpPr>
                 <p:cNvPr id="26" name="Rectangle 25">
                   <a:extLst>
                     <a:ext uri="{FF2B5EF4-FFF2-40B4-BE49-F238E27FC236}">
-                      <a16:creationId xmlns:a16="http://schemas.microsoft.com/office/drawing/2014/main" id="{601ABF8B-5F13-E742-BFE2-4284EA253871}"/>
+                      <a16:creationId xmlns:a16="http://schemas.microsoft.com/office/drawing/2014/main" xmlns="" id="{601ABF8B-5F13-E742-BFE2-4284EA253871}"/>
                     </a:ext>
                   </a:extLst>
                 </p:cNvPr>
@@ -36364,7 +35614,7 @@
               </p:txBody>
             </p:sp>
           </mc:Choice>
-          <mc:Fallback>
+          <mc:Fallback xmlns="">
             <p:sp>
               <p:nvSpPr>
                 <p:cNvPr id="26" name="Rectangle 25">

</xml_diff>